<commit_message>
General updates to part 1
</commit_message>
<xml_diff>
--- a/slides/advanced_part1.pptx
+++ b/slides/advanced_part1.pptx
@@ -5,7 +5,7 @@
     <p:sldMasterId id="2147483648" r:id="rId1"/>
   </p:sldMasterIdLst>
   <p:notesMasterIdLst>
-    <p:notesMasterId r:id="rId25"/>
+    <p:notesMasterId r:id="rId26"/>
   </p:notesMasterIdLst>
   <p:sldIdLst>
     <p:sldId id="257" r:id="rId2"/>
@@ -25,12 +25,13 @@
     <p:sldId id="271" r:id="rId16"/>
     <p:sldId id="272" r:id="rId17"/>
     <p:sldId id="273" r:id="rId18"/>
-    <p:sldId id="274" r:id="rId19"/>
-    <p:sldId id="275" r:id="rId20"/>
-    <p:sldId id="276" r:id="rId21"/>
-    <p:sldId id="277" r:id="rId22"/>
-    <p:sldId id="278" r:id="rId23"/>
-    <p:sldId id="279" r:id="rId24"/>
+    <p:sldId id="280" r:id="rId19"/>
+    <p:sldId id="274" r:id="rId20"/>
+    <p:sldId id="275" r:id="rId21"/>
+    <p:sldId id="276" r:id="rId22"/>
+    <p:sldId id="277" r:id="rId23"/>
+    <p:sldId id="278" r:id="rId24"/>
+    <p:sldId id="279" r:id="rId25"/>
   </p:sldIdLst>
   <p:sldSz cx="9144000" cy="6858000" type="screen4x3"/>
   <p:notesSz cx="6858000" cy="9144000"/>
@@ -214,7 +215,7 @@
           <a:p>
             <a:fld id="{C020D4C0-2770-3946-ABDD-0C7492C2C34D}" type="datetimeFigureOut">
               <a:rPr lang="en-US" smtClean="0"/>
-              <a:t>05/05/15</a:t>
+              <a:t>06/05/15</a:t>
             </a:fld>
             <a:endParaRPr lang="en-GB"/>
           </a:p>
@@ -526,18 +527,6 @@
           <a:bodyPr/>
           <a:lstStyle/>
           <a:p>
-            <a:r>
-              <a:rPr lang="en-GB" dirty="0" smtClean="0"/>
-              <a:t>Also relevant for zero copy </a:t>
-            </a:r>
-            <a:r>
-              <a:rPr lang="en-GB" dirty="0" err="1" smtClean="0"/>
-              <a:t>etc</a:t>
-            </a:r>
-            <a:r>
-              <a:rPr lang="en-GB" baseline="0" dirty="0" smtClean="0"/>
-              <a:t> in presence of shared memory</a:t>
-            </a:r>
             <a:endParaRPr lang="en-GB" dirty="0"/>
           </a:p>
         </p:txBody>
@@ -760,7 +749,7 @@
           <a:p>
             <a:fld id="{8959E172-2558-6049-8DA8-C86E1F6924DD}" type="datetimeFigureOut">
               <a:rPr lang="en-US" smtClean="0"/>
-              <a:t>05/05/15</a:t>
+              <a:t>06/05/15</a:t>
             </a:fld>
             <a:endParaRPr lang="en-GB"/>
           </a:p>
@@ -930,7 +919,7 @@
           <a:p>
             <a:fld id="{8959E172-2558-6049-8DA8-C86E1F6924DD}" type="datetimeFigureOut">
               <a:rPr lang="en-US" smtClean="0"/>
-              <a:t>05/05/15</a:t>
+              <a:t>06/05/15</a:t>
             </a:fld>
             <a:endParaRPr lang="en-GB"/>
           </a:p>
@@ -1110,7 +1099,7 @@
           <a:p>
             <a:fld id="{8959E172-2558-6049-8DA8-C86E1F6924DD}" type="datetimeFigureOut">
               <a:rPr lang="en-US" smtClean="0"/>
-              <a:t>05/05/15</a:t>
+              <a:t>06/05/15</a:t>
             </a:fld>
             <a:endParaRPr lang="en-GB"/>
           </a:p>
@@ -1280,7 +1269,7 @@
           <a:p>
             <a:fld id="{8959E172-2558-6049-8DA8-C86E1F6924DD}" type="datetimeFigureOut">
               <a:rPr lang="en-US" smtClean="0"/>
-              <a:t>05/05/15</a:t>
+              <a:t>06/05/15</a:t>
             </a:fld>
             <a:endParaRPr lang="en-GB"/>
           </a:p>
@@ -1526,7 +1515,7 @@
           <a:p>
             <a:fld id="{8959E172-2558-6049-8DA8-C86E1F6924DD}" type="datetimeFigureOut">
               <a:rPr lang="en-US" smtClean="0"/>
-              <a:t>05/05/15</a:t>
+              <a:t>06/05/15</a:t>
             </a:fld>
             <a:endParaRPr lang="en-GB"/>
           </a:p>
@@ -1814,7 +1803,7 @@
           <a:p>
             <a:fld id="{8959E172-2558-6049-8DA8-C86E1F6924DD}" type="datetimeFigureOut">
               <a:rPr lang="en-US" smtClean="0"/>
-              <a:t>05/05/15</a:t>
+              <a:t>06/05/15</a:t>
             </a:fld>
             <a:endParaRPr lang="en-GB"/>
           </a:p>
@@ -2236,7 +2225,7 @@
           <a:p>
             <a:fld id="{8959E172-2558-6049-8DA8-C86E1F6924DD}" type="datetimeFigureOut">
               <a:rPr lang="en-US" smtClean="0"/>
-              <a:t>05/05/15</a:t>
+              <a:t>06/05/15</a:t>
             </a:fld>
             <a:endParaRPr lang="en-GB"/>
           </a:p>
@@ -2354,7 +2343,7 @@
           <a:p>
             <a:fld id="{8959E172-2558-6049-8DA8-C86E1F6924DD}" type="datetimeFigureOut">
               <a:rPr lang="en-US" smtClean="0"/>
-              <a:t>05/05/15</a:t>
+              <a:t>06/05/15</a:t>
             </a:fld>
             <a:endParaRPr lang="en-GB"/>
           </a:p>
@@ -2449,7 +2438,7 @@
           <a:p>
             <a:fld id="{8959E172-2558-6049-8DA8-C86E1F6924DD}" type="datetimeFigureOut">
               <a:rPr lang="en-US" smtClean="0"/>
-              <a:t>05/05/15</a:t>
+              <a:t>06/05/15</a:t>
             </a:fld>
             <a:endParaRPr lang="en-GB"/>
           </a:p>
@@ -2726,7 +2715,7 @@
           <a:p>
             <a:fld id="{8959E172-2558-6049-8DA8-C86E1F6924DD}" type="datetimeFigureOut">
               <a:rPr lang="en-US" smtClean="0"/>
-              <a:t>05/05/15</a:t>
+              <a:t>06/05/15</a:t>
             </a:fld>
             <a:endParaRPr lang="en-GB"/>
           </a:p>
@@ -2979,7 +2968,7 @@
           <a:p>
             <a:fld id="{8959E172-2558-6049-8DA8-C86E1F6924DD}" type="datetimeFigureOut">
               <a:rPr lang="en-US" smtClean="0"/>
-              <a:t>05/05/15</a:t>
+              <a:t>06/05/15</a:t>
             </a:fld>
             <a:endParaRPr lang="en-GB"/>
           </a:p>
@@ -3192,7 +3181,7 @@
           <a:p>
             <a:fld id="{8959E172-2558-6049-8DA8-C86E1F6924DD}" type="datetimeFigureOut">
               <a:rPr lang="en-US" smtClean="0"/>
-              <a:t>05/05/15</a:t>
+              <a:t>06/05/15</a:t>
             </a:fld>
             <a:endParaRPr lang="en-GB"/>
           </a:p>
@@ -3613,16 +3602,13 @@
                   <a:schemeClr val="tx1"/>
                 </a:solidFill>
               </a:rPr>
-              <a:t>Lecture </a:t>
-            </a:r>
-            <a:r>
-              <a:rPr lang="en-GB" dirty="0">
-                <a:solidFill>
-                  <a:schemeClr val="tx1"/>
-                </a:solidFill>
-              </a:rPr>
-              <a:t>8</a:t>
-            </a:r>
+              <a:t>Part 1</a:t>
+            </a:r>
+            <a:endParaRPr lang="en-GB" dirty="0">
+              <a:solidFill>
+                <a:schemeClr val="tx1"/>
+              </a:solidFill>
+            </a:endParaRPr>
           </a:p>
         </p:txBody>
       </p:sp>
@@ -6889,7 +6875,7 @@
           <a:p>
             <a:r>
               <a:rPr lang="en-US" dirty="0" smtClean="0"/>
-              <a:t>Multiple Devices</a:t>
+              <a:t>Zero copy transfers</a:t>
             </a:r>
             <a:endParaRPr lang="en-US" dirty="0"/>
           </a:p>
@@ -6910,22 +6896,6 @@
           <a:bodyPr/>
           <a:lstStyle/>
           <a:p>
-            <a:r>
-              <a:rPr lang="en-US" dirty="0" smtClean="0"/>
-              <a:t>Running across multiple devices can deliver better performance (if your problem scales well)</a:t>
-            </a:r>
-          </a:p>
-          <a:p>
-            <a:r>
-              <a:rPr lang="en-US" dirty="0" smtClean="0"/>
-              <a:t>Remember, the cost of moving data to/from a device are much greater than normal memcpys, so avoid where possible</a:t>
-            </a:r>
-          </a:p>
-          <a:p>
-            <a:r>
-              <a:rPr lang="en-US" dirty="0" smtClean="0"/>
-              <a:t>There are several options for using multiple devices</a:t>
-            </a:r>
             <a:endParaRPr lang="en-US" dirty="0"/>
           </a:p>
         </p:txBody>
@@ -6933,20 +6903,13 @@
     </p:spTree>
     <p:extLst>
       <p:ext uri="{BB962C8B-B14F-4D97-AF65-F5344CB8AC3E}">
-        <p14:creationId xmlns:p14="http://schemas.microsoft.com/office/powerpoint/2010/main" val="521625099"/>
+        <p14:creationId xmlns:p14="http://schemas.microsoft.com/office/powerpoint/2010/main" val="2818036140"/>
       </p:ext>
     </p:extLst>
   </p:cSld>
   <p:clrMapOvr>
     <a:masterClrMapping/>
   </p:clrMapOvr>
-  <p:timing>
-    <p:tnLst>
-      <p:par>
-        <p:cTn xmlns:p14="http://schemas.microsoft.com/office/powerpoint/2010/main" id="1" dur="indefinite" restart="never" nodeType="tmRoot"/>
-      </p:par>
-    </p:tnLst>
-  </p:timing>
 </p:sld>
 </file>
 
@@ -6984,7 +6947,7 @@
           <a:p>
             <a:r>
               <a:rPr lang="en-US" dirty="0" smtClean="0"/>
-              <a:t>Multiple Contexts</a:t>
+              <a:t>Multiple Devices</a:t>
             </a:r>
             <a:endParaRPr lang="en-US" dirty="0"/>
           </a:p>
@@ -7002,54 +6965,61 @@
         </p:nvSpPr>
         <p:spPr/>
         <p:txBody>
-          <a:bodyPr/>
+          <a:bodyPr>
+            <a:normAutofit fontScale="92500"/>
+          </a:bodyPr>
           <a:lstStyle/>
           <a:p>
             <a:r>
               <a:rPr lang="en-US" dirty="0" smtClean="0"/>
-              <a:t>The simplest method – just call </a:t>
-            </a:r>
-            <a:r>
-              <a:rPr lang="en-US" b="1" dirty="0" smtClean="0">
-                <a:solidFill>
-                  <a:srgbClr val="3366FF"/>
-                </a:solidFill>
-                <a:latin typeface="Courier New"/>
-                <a:cs typeface="Courier New"/>
-              </a:rPr>
-              <a:t>clCreateContext</a:t>
-            </a:r>
-            <a:r>
-              <a:rPr lang="en-US" dirty="0" smtClean="0">
-                <a:solidFill>
-                  <a:srgbClr val="3366FF"/>
-                </a:solidFill>
-              </a:rPr>
-              <a:t> </a:t>
-            </a:r>
-            <a:r>
-              <a:rPr lang="en-US" dirty="0" smtClean="0"/>
-              <a:t>multiple times, with a different device id.</a:t>
-            </a:r>
-          </a:p>
-          <a:p>
-            <a:r>
-              <a:rPr lang="en-US" dirty="0" smtClean="0"/>
-              <a:t>This is only useful if you don’t need to move data between devices – </a:t>
-            </a:r>
-            <a:r>
-              <a:rPr lang="en-US" b="1" dirty="0" smtClean="0">
-                <a:solidFill>
-                  <a:srgbClr val="3366FF"/>
-                </a:solidFill>
-                <a:latin typeface="Courier New"/>
-                <a:cs typeface="Courier New"/>
-              </a:rPr>
-              <a:t>clEnqueueCopyBuffer</a:t>
-            </a:r>
-            <a:r>
-              <a:rPr lang="en-US" dirty="0" smtClean="0"/>
-              <a:t> can’t work with memory objects created in different contexts</a:t>
+              <a:t>Running across multiple devices can deliver better performance (if your problem scales well</a:t>
+            </a:r>
+            <a:r>
+              <a:rPr lang="en-US" dirty="0" smtClean="0"/>
+              <a:t>)</a:t>
+            </a:r>
+          </a:p>
+          <a:p>
+            <a:r>
+              <a:rPr lang="en-US" dirty="0" smtClean="0"/>
+              <a:t>But have to manually partition problem / load balance</a:t>
+            </a:r>
+            <a:endParaRPr lang="en-US" dirty="0" smtClean="0"/>
+          </a:p>
+          <a:p>
+            <a:r>
+              <a:rPr lang="en-US" dirty="0" smtClean="0"/>
+              <a:t>Remember, the cost of moving data to/from a device are much greater than normal </a:t>
+            </a:r>
+            <a:r>
+              <a:rPr lang="en-US" dirty="0" err="1" smtClean="0"/>
+              <a:t>memcopys</a:t>
+            </a:r>
+            <a:r>
+              <a:rPr lang="en-US" dirty="0" smtClean="0"/>
+              <a:t>, so avoid where possible</a:t>
+            </a:r>
+          </a:p>
+          <a:p>
+            <a:r>
+              <a:rPr lang="en-US" dirty="0" smtClean="0"/>
+              <a:t>There are </a:t>
+            </a:r>
+            <a:r>
+              <a:rPr lang="en-US" dirty="0" smtClean="0"/>
+              <a:t>a couple of options </a:t>
+            </a:r>
+            <a:r>
+              <a:rPr lang="en-US" dirty="0" smtClean="0"/>
+              <a:t>for using multiple </a:t>
+            </a:r>
+            <a:r>
+              <a:rPr lang="en-US" dirty="0" smtClean="0"/>
+              <a:t>devices within </a:t>
+            </a:r>
+            <a:r>
+              <a:rPr lang="en-US" dirty="0" err="1" smtClean="0"/>
+              <a:t>OpenCL</a:t>
             </a:r>
             <a:endParaRPr lang="en-US" dirty="0"/>
           </a:p>
@@ -7058,7 +7028,7 @@
     </p:spTree>
     <p:extLst>
       <p:ext uri="{BB962C8B-B14F-4D97-AF65-F5344CB8AC3E}">
-        <p14:creationId xmlns:p14="http://schemas.microsoft.com/office/powerpoint/2010/main" val="1746524199"/>
+        <p14:creationId xmlns:p14="http://schemas.microsoft.com/office/powerpoint/2010/main" val="521625099"/>
       </p:ext>
     </p:extLst>
   </p:cSld>
@@ -7218,7 +7188,7 @@
           <a:p>
             <a:r>
               <a:rPr lang="en-US" dirty="0" smtClean="0"/>
-              <a:t>Multiple Command Queues</a:t>
+              <a:t>Multiple Contexts</a:t>
             </a:r>
             <a:endParaRPr lang="en-US" dirty="0"/>
           </a:p>
@@ -7236,10 +7206,27 @@
         </p:nvSpPr>
         <p:spPr/>
         <p:txBody>
-          <a:bodyPr/>
+          <a:bodyPr>
+            <a:normAutofit lnSpcReduction="10000"/>
+          </a:bodyPr>
           <a:lstStyle/>
           <a:p>
             <a:r>
+              <a:rPr lang="en-US" dirty="0" smtClean="0"/>
+              <a:t>The simplest method – just </a:t>
+            </a:r>
+            <a:r>
+              <a:rPr lang="en-US" dirty="0" smtClean="0"/>
+              <a:t>create a separate context and command queue for each device.</a:t>
+            </a:r>
+            <a:endParaRPr lang="en-US" dirty="0" smtClean="0"/>
+          </a:p>
+          <a:p>
+            <a:r>
+              <a:rPr lang="en-US" dirty="0" smtClean="0"/>
+              <a:t>This is only useful if you don’t need to move data between devices – </a:t>
+            </a:r>
+            <a:r>
               <a:rPr lang="en-US" b="1" dirty="0" smtClean="0">
                 <a:solidFill>
                   <a:srgbClr val="3366FF"/>
@@ -7247,24 +7234,41 @@
                 <a:latin typeface="Courier New"/>
                 <a:cs typeface="Courier New"/>
               </a:rPr>
-              <a:t>clCreateContext</a:t>
-            </a:r>
-            <a:r>
-              <a:rPr lang="en-US" dirty="0" smtClean="0"/>
-              <a:t> can support more than one  device, although only within the same platform.</a:t>
-            </a:r>
-          </a:p>
-          <a:p>
-            <a:r>
-              <a:rPr lang="en-US" dirty="0" smtClean="0"/>
-              <a:t>This allows copies between devices.</a:t>
-            </a:r>
-          </a:p>
-          <a:p>
-            <a:r>
-              <a:rPr lang="en-US" dirty="0" smtClean="0"/>
-              <a:t>However, there must be a separate command queue for each device in the context.</a:t>
-            </a:r>
+              <a:t>clEnqueueCopyBuffer</a:t>
+            </a:r>
+            <a:r>
+              <a:rPr lang="en-US" dirty="0" smtClean="0"/>
+              <a:t> can’t work with memory objects created in different </a:t>
+            </a:r>
+            <a:r>
+              <a:rPr lang="en-US" dirty="0" smtClean="0"/>
+              <a:t>contexts</a:t>
+            </a:r>
+          </a:p>
+          <a:p>
+            <a:pPr lvl="1"/>
+            <a:r>
+              <a:rPr lang="en-US" dirty="0" smtClean="0"/>
+              <a:t>All memory will have to be copied via host</a:t>
+            </a:r>
+            <a:endParaRPr lang="en-US" dirty="0"/>
+          </a:p>
+          <a:p>
+            <a:r>
+              <a:rPr lang="en-US" dirty="0" smtClean="0"/>
+              <a:t>CANNOT </a:t>
+            </a:r>
+            <a:r>
+              <a:rPr lang="en-US" dirty="0"/>
+              <a:t>synchronize with events between command queues within </a:t>
+            </a:r>
+            <a:r>
+              <a:rPr lang="en-US" dirty="0" smtClean="0"/>
+              <a:t>different contexts!</a:t>
+            </a:r>
+            <a:endParaRPr lang="en-US" dirty="0"/>
+          </a:p>
+          <a:p>
             <a:endParaRPr lang="en-US" dirty="0"/>
           </a:p>
         </p:txBody>
@@ -7272,7 +7276,7 @@
     </p:spTree>
     <p:extLst>
       <p:ext uri="{BB962C8B-B14F-4D97-AF65-F5344CB8AC3E}">
-        <p14:creationId xmlns:p14="http://schemas.microsoft.com/office/powerpoint/2010/main" val="2233503425"/>
+        <p14:creationId xmlns:p14="http://schemas.microsoft.com/office/powerpoint/2010/main" val="1746524199"/>
       </p:ext>
     </p:extLst>
   </p:cSld>
@@ -7323,7 +7327,7 @@
           <a:p>
             <a:r>
               <a:rPr lang="en-US" dirty="0" smtClean="0"/>
-              <a:t>OpenCL &amp; MPI</a:t>
+              <a:t>Multiple Command Queues</a:t>
             </a:r>
             <a:endParaRPr lang="en-US" dirty="0"/>
           </a:p>
@@ -7346,25 +7350,33 @@
           <a:p>
             <a:r>
               <a:rPr lang="en-US" dirty="0" smtClean="0"/>
-              <a:t>Using MPI, it is possible to use multiple devices.</a:t>
-            </a:r>
-          </a:p>
-          <a:p>
-            <a:r>
-              <a:rPr lang="en-US" dirty="0" smtClean="0"/>
-              <a:t>Typically, each MPI process gets a single device.</a:t>
-            </a:r>
-          </a:p>
-          <a:p>
-            <a:r>
-              <a:rPr lang="en-US" dirty="0" smtClean="0"/>
-              <a:t>This allows any number of OpenCL devices.</a:t>
-            </a:r>
-          </a:p>
-          <a:p>
-            <a:r>
-              <a:rPr lang="en-US" dirty="0" smtClean="0"/>
-              <a:t>However, moving memory between them can be very expensive.</a:t>
+              <a:t>A context can </a:t>
+            </a:r>
+            <a:r>
+              <a:rPr lang="en-US" dirty="0" smtClean="0"/>
+              <a:t>support more than one  device, although only within the same platform.</a:t>
+            </a:r>
+          </a:p>
+          <a:p>
+            <a:r>
+              <a:rPr lang="en-US" dirty="0" smtClean="0"/>
+              <a:t>This allows copies between devices.</a:t>
+            </a:r>
+          </a:p>
+          <a:p>
+            <a:r>
+              <a:rPr lang="en-US" dirty="0" smtClean="0"/>
+              <a:t>However, there must be a separate command queue for each device in the context</a:t>
+            </a:r>
+            <a:r>
+              <a:rPr lang="en-US" dirty="0" smtClean="0"/>
+              <a:t>.</a:t>
+            </a:r>
+          </a:p>
+          <a:p>
+            <a:r>
+              <a:rPr lang="en-US" dirty="0" smtClean="0"/>
+              <a:t>CAN synchronize with events between command queues within the same context!</a:t>
             </a:r>
             <a:endParaRPr lang="en-US" dirty="0"/>
           </a:p>
@@ -7373,7 +7385,7 @@
     </p:spTree>
     <p:extLst>
       <p:ext uri="{BB962C8B-B14F-4D97-AF65-F5344CB8AC3E}">
-        <p14:creationId xmlns:p14="http://schemas.microsoft.com/office/powerpoint/2010/main" val="1924167598"/>
+        <p14:creationId xmlns:p14="http://schemas.microsoft.com/office/powerpoint/2010/main" val="2233503425"/>
       </p:ext>
     </p:extLst>
   </p:cSld>
@@ -7424,7 +7436,7 @@
           <a:p>
             <a:r>
               <a:rPr lang="en-US" dirty="0" smtClean="0"/>
-              <a:t>Halo Exchange</a:t>
+              <a:t>OpenCL &amp; MPI</a:t>
             </a:r>
             <a:endParaRPr lang="en-US" dirty="0"/>
           </a:p>
@@ -7440,63 +7452,37 @@
             <p:ph idx="1"/>
           </p:nvPr>
         </p:nvSpPr>
-        <p:spPr>
-          <a:xfrm>
-            <a:off x="457200" y="1600200"/>
-            <a:ext cx="8229600" cy="4781128"/>
-          </a:xfrm>
-        </p:spPr>
-        <p:txBody>
-          <a:bodyPr>
-            <a:normAutofit fontScale="85000" lnSpcReduction="10000"/>
-          </a:bodyPr>
+        <p:spPr/>
+        <p:txBody>
+          <a:bodyPr/>
           <a:lstStyle/>
           <a:p>
             <a:r>
               <a:rPr lang="en-US" dirty="0" smtClean="0"/>
-              <a:t>If you can split your problem up into regions, then the edges must be synchronized across devices</a:t>
-            </a:r>
-          </a:p>
-          <a:p>
-            <a:r>
-              <a:rPr lang="en-US" dirty="0" smtClean="0"/>
-              <a:t>OpenCL allows for copying rectangular regions of a 3D buffer with </a:t>
-            </a:r>
-            <a:r>
-              <a:rPr lang="en-US" b="1" dirty="0" smtClean="0">
-                <a:solidFill>
-                  <a:srgbClr val="3366FF"/>
-                </a:solidFill>
-                <a:latin typeface="Courier New"/>
-                <a:cs typeface="Courier New"/>
-              </a:rPr>
-              <a:t>clEnqueueReadBufferRect</a:t>
-            </a:r>
-            <a:r>
-              <a:rPr lang="en-US" dirty="0" smtClean="0"/>
-              <a:t>/</a:t>
-            </a:r>
-            <a:r>
-              <a:rPr lang="en-US" b="1" dirty="0" smtClean="0">
-                <a:solidFill>
-                  <a:srgbClr val="3366FF"/>
-                </a:solidFill>
-                <a:latin typeface="Courier New"/>
-                <a:cs typeface="Courier New"/>
-              </a:rPr>
-              <a:t>writeBufferRect</a:t>
-            </a:r>
-          </a:p>
-          <a:p>
-            <a:r>
-              <a:rPr lang="en-US" dirty="0" smtClean="0"/>
-              <a:t>This is good approach to get something working; however, in practice this method is usually quite slow</a:t>
-            </a:r>
-          </a:p>
-          <a:p>
-            <a:r>
-              <a:rPr lang="en-US" dirty="0" smtClean="0"/>
-              <a:t>A much better alternative is to write kernels that will pack/unpack buffer regions into contiguous chunks that can be read directly, although this is much more complicated</a:t>
+              <a:t>Using MPI, it is possible to use multiple devices.</a:t>
+            </a:r>
+          </a:p>
+          <a:p>
+            <a:r>
+              <a:rPr lang="en-US" dirty="0" smtClean="0"/>
+              <a:t>Typically, each MPI process gets a single device</a:t>
+            </a:r>
+            <a:r>
+              <a:rPr lang="en-US" dirty="0" smtClean="0"/>
+              <a:t>.</a:t>
+            </a:r>
+            <a:endParaRPr lang="en-US" dirty="0" smtClean="0"/>
+          </a:p>
+          <a:p>
+            <a:r>
+              <a:rPr lang="en-US" dirty="0" smtClean="0"/>
+              <a:t>This allows any number of OpenCL devices.</a:t>
+            </a:r>
+          </a:p>
+          <a:p>
+            <a:r>
+              <a:rPr lang="en-US" dirty="0" smtClean="0"/>
+              <a:t>However, moving memory between them can be very expensive.</a:t>
             </a:r>
             <a:endParaRPr lang="en-US" dirty="0"/>
           </a:p>
@@ -7505,7 +7491,7 @@
     </p:spTree>
     <p:extLst>
       <p:ext uri="{BB962C8B-B14F-4D97-AF65-F5344CB8AC3E}">
-        <p14:creationId xmlns:p14="http://schemas.microsoft.com/office/powerpoint/2010/main" val="1383068024"/>
+        <p14:creationId xmlns:p14="http://schemas.microsoft.com/office/powerpoint/2010/main" val="1924167598"/>
       </p:ext>
     </p:extLst>
   </p:cSld>
@@ -7551,6 +7537,163 @@
         </p:nvSpPr>
         <p:spPr/>
         <p:txBody>
+          <a:bodyPr/>
+          <a:lstStyle/>
+          <a:p>
+            <a:r>
+              <a:rPr lang="en-US" dirty="0" smtClean="0"/>
+              <a:t>Halo Exchange</a:t>
+            </a:r>
+            <a:endParaRPr lang="en-US" dirty="0"/>
+          </a:p>
+        </p:txBody>
+      </p:sp>
+      <p:sp>
+        <p:nvSpPr>
+          <p:cNvPr id="3" name="Content Placeholder 2"/>
+          <p:cNvSpPr>
+            <a:spLocks noGrp="1"/>
+          </p:cNvSpPr>
+          <p:nvPr>
+            <p:ph idx="1"/>
+          </p:nvPr>
+        </p:nvSpPr>
+        <p:spPr>
+          <a:xfrm>
+            <a:off x="457200" y="1600200"/>
+            <a:ext cx="8229600" cy="4781128"/>
+          </a:xfrm>
+        </p:spPr>
+        <p:txBody>
+          <a:bodyPr>
+            <a:normAutofit fontScale="85000" lnSpcReduction="10000"/>
+          </a:bodyPr>
+          <a:lstStyle/>
+          <a:p>
+            <a:r>
+              <a:rPr lang="en-US" dirty="0" smtClean="0"/>
+              <a:t>If you can split your problem up into regions, then the edges </a:t>
+            </a:r>
+            <a:r>
+              <a:rPr lang="en-US" dirty="0" smtClean="0"/>
+              <a:t>may need to be </a:t>
+            </a:r>
+            <a:r>
+              <a:rPr lang="en-US" dirty="0" smtClean="0"/>
+              <a:t>synchronized across devices</a:t>
+            </a:r>
+          </a:p>
+          <a:p>
+            <a:r>
+              <a:rPr lang="en-US" dirty="0" smtClean="0"/>
+              <a:t>OpenCL allows for copying rectangular regions of a 3D buffer with </a:t>
+            </a:r>
+            <a:r>
+              <a:rPr lang="en-US" b="1" dirty="0" err="1" smtClean="0">
+                <a:solidFill>
+                  <a:srgbClr val="3366FF"/>
+                </a:solidFill>
+                <a:latin typeface="Courier New"/>
+                <a:cs typeface="Courier New"/>
+              </a:rPr>
+              <a:t>clEnqueueReadBufferRect</a:t>
+            </a:r>
+            <a:r>
+              <a:rPr lang="en-US" dirty="0" smtClean="0"/>
+              <a:t>/</a:t>
+            </a:r>
+            <a:r>
+              <a:rPr lang="en-US" b="1" dirty="0" err="1">
+                <a:solidFill>
+                  <a:srgbClr val="3366FF"/>
+                </a:solidFill>
+                <a:latin typeface="Courier New"/>
+                <a:cs typeface="Courier New"/>
+              </a:rPr>
+              <a:t>W</a:t>
+            </a:r>
+            <a:r>
+              <a:rPr lang="en-US" b="1" dirty="0" err="1" smtClean="0">
+                <a:solidFill>
+                  <a:srgbClr val="3366FF"/>
+                </a:solidFill>
+                <a:latin typeface="Courier New"/>
+                <a:cs typeface="Courier New"/>
+              </a:rPr>
+              <a:t>riteBufferRect</a:t>
+            </a:r>
+            <a:endParaRPr lang="en-US" b="1" dirty="0" smtClean="0">
+              <a:solidFill>
+                <a:srgbClr val="3366FF"/>
+              </a:solidFill>
+              <a:latin typeface="Courier New"/>
+              <a:cs typeface="Courier New"/>
+            </a:endParaRPr>
+          </a:p>
+          <a:p>
+            <a:r>
+              <a:rPr lang="en-US" dirty="0" smtClean="0"/>
+              <a:t>This is good approach to get something working; however, in practice this method is usually quite slow</a:t>
+            </a:r>
+          </a:p>
+          <a:p>
+            <a:r>
+              <a:rPr lang="en-US" dirty="0" smtClean="0"/>
+              <a:t>A much better alternative is to write kernels that will pack/unpack buffer regions into contiguous chunks that can be read directly, although this is much more complicated</a:t>
+            </a:r>
+            <a:endParaRPr lang="en-US" dirty="0"/>
+          </a:p>
+        </p:txBody>
+      </p:sp>
+    </p:spTree>
+    <p:extLst>
+      <p:ext uri="{BB962C8B-B14F-4D97-AF65-F5344CB8AC3E}">
+        <p14:creationId xmlns:p14="http://schemas.microsoft.com/office/powerpoint/2010/main" val="1383068024"/>
+      </p:ext>
+    </p:extLst>
+  </p:cSld>
+  <p:clrMapOvr>
+    <a:masterClrMapping/>
+  </p:clrMapOvr>
+  <p:timing>
+    <p:tnLst>
+      <p:par>
+        <p:cTn xmlns:p14="http://schemas.microsoft.com/office/powerpoint/2010/main" id="1" dur="indefinite" restart="never" nodeType="tmRoot"/>
+      </p:par>
+    </p:tnLst>
+  </p:timing>
+</p:sld>
+</file>
+
+<file path=ppt/slides/slide24.xml><?xml version="1.0" encoding="utf-8"?>
+<p:sld xmlns:a="http://schemas.openxmlformats.org/drawingml/2006/main" xmlns:r="http://schemas.openxmlformats.org/officeDocument/2006/relationships" xmlns:p="http://schemas.openxmlformats.org/presentationml/2006/main">
+  <p:cSld>
+    <p:spTree>
+      <p:nvGrpSpPr>
+        <p:cNvPr id="1" name=""/>
+        <p:cNvGrpSpPr/>
+        <p:nvPr/>
+      </p:nvGrpSpPr>
+      <p:grpSpPr>
+        <a:xfrm>
+          <a:off x="0" y="0"/>
+          <a:ext cx="0" cy="0"/>
+          <a:chOff x="0" y="0"/>
+          <a:chExt cx="0" cy="0"/>
+        </a:xfrm>
+      </p:grpSpPr>
+      <p:sp>
+        <p:nvSpPr>
+          <p:cNvPr id="2" name="Title 1"/>
+          <p:cNvSpPr>
+            <a:spLocks noGrp="1"/>
+          </p:cNvSpPr>
+          <p:nvPr>
+            <p:ph type="title"/>
+          </p:nvPr>
+        </p:nvSpPr>
+        <p:spPr/>
+        <p:txBody>
           <a:bodyPr>
             <a:normAutofit fontScale="90000"/>
           </a:bodyPr>
@@ -7562,11 +7705,15 @@
             </a:r>
             <a:r>
               <a:rPr lang="en-GB" dirty="0"/>
-              <a:t>9</a:t>
+              <a:t>1</a:t>
             </a:r>
             <a:r>
               <a:rPr lang="en-GB" dirty="0" smtClean="0"/>
               <a:t>:</a:t>
+            </a:r>
+            <a:r>
+              <a:rPr lang="en-GB" dirty="0" smtClean="0"/>
+              <a:t/>
             </a:r>
             <a:br>
               <a:rPr lang="en-GB" dirty="0" smtClean="0"/>
@@ -7620,8 +7767,13 @@
           <a:p>
             <a:r>
               <a:rPr lang="en-GB" dirty="0" smtClean="0"/>
-              <a:t>Improve the performance of the host-to-device data transfers by using mapped memory</a:t>
-            </a:r>
+              <a:t>Improve the performance of the host-to-device data transfers by using </a:t>
+            </a:r>
+            <a:r>
+              <a:rPr lang="en-GB" dirty="0" smtClean="0"/>
+              <a:t>pinned memory or zero-copy</a:t>
+            </a:r>
+            <a:endParaRPr lang="en-GB" dirty="0" smtClean="0"/>
           </a:p>
           <a:p>
             <a:r>
@@ -7778,7 +7930,52 @@
                 <a:latin typeface="Courier New"/>
                 <a:cs typeface="Courier New"/>
               </a:rPr>
-              <a:t>//get platforms</a:t>
+              <a:t>//get </a:t>
+            </a:r>
+            <a:r>
+              <a:rPr lang="en-US" sz="1600" b="1" dirty="0" smtClean="0">
+                <a:solidFill>
+                  <a:srgbClr val="3366FF"/>
+                </a:solidFill>
+                <a:latin typeface="Courier New"/>
+                <a:cs typeface="Courier New"/>
+              </a:rPr>
+              <a:t>platforms</a:t>
+            </a:r>
+          </a:p>
+          <a:p>
+            <a:pPr marL="0" indent="0">
+              <a:buNone/>
+            </a:pPr>
+            <a:r>
+              <a:rPr lang="en-US" sz="1600" b="1" dirty="0" err="1">
+                <a:solidFill>
+                  <a:srgbClr val="3366FF"/>
+                </a:solidFill>
+                <a:latin typeface="Courier New"/>
+                <a:cs typeface="Courier New"/>
+              </a:rPr>
+              <a:t>s</a:t>
+            </a:r>
+            <a:r>
+              <a:rPr lang="en-US" sz="1600" b="1" dirty="0" err="1" smtClean="0">
+                <a:solidFill>
+                  <a:srgbClr val="3366FF"/>
+                </a:solidFill>
+                <a:latin typeface="Courier New"/>
+                <a:cs typeface="Courier New"/>
+              </a:rPr>
+              <a:t>td</a:t>
+            </a:r>
+            <a:r>
+              <a:rPr lang="en-US" sz="1600" b="1" dirty="0" smtClean="0">
+                <a:solidFill>
+                  <a:srgbClr val="3366FF"/>
+                </a:solidFill>
+                <a:latin typeface="Courier New"/>
+                <a:cs typeface="Courier New"/>
+              </a:rPr>
+              <a:t>::vector&lt;cl::Platform&gt; platforms;</a:t>
             </a:r>
             <a:endParaRPr lang="en-US" sz="1600" b="1" dirty="0">
               <a:solidFill>
@@ -7793,14 +7990,14 @@
               <a:buNone/>
             </a:pPr>
             <a:r>
-              <a:rPr lang="en-US" sz="1600" b="1" dirty="0" err="1" smtClean="0">
-                <a:solidFill>
-                  <a:srgbClr val="3366FF"/>
-                </a:solidFill>
-                <a:latin typeface="Courier New"/>
-                <a:cs typeface="Courier New"/>
-              </a:rPr>
-              <a:t>cl_platform_id</a:t>
+              <a:rPr lang="en-US" sz="1600" b="1" dirty="0">
+                <a:solidFill>
+                  <a:srgbClr val="3366FF"/>
+                </a:solidFill>
+                <a:latin typeface="Courier New"/>
+                <a:cs typeface="Courier New"/>
+              </a:rPr>
+              <a:t>c</a:t>
             </a:r>
             <a:r>
               <a:rPr lang="en-US" sz="1600" b="1" dirty="0" smtClean="0">
@@ -7810,63 +8007,15 @@
                 <a:latin typeface="Courier New"/>
                 <a:cs typeface="Courier New"/>
               </a:rPr>
-              <a:t> </a:t>
-            </a:r>
-            <a:r>
-              <a:rPr lang="en-US" sz="1600" b="1" dirty="0">
-                <a:solidFill>
-                  <a:srgbClr val="3366FF"/>
-                </a:solidFill>
-                <a:latin typeface="Courier New"/>
-                <a:cs typeface="Courier New"/>
-              </a:rPr>
-              <a:t>platforms[2];</a:t>
-            </a:r>
-          </a:p>
-          <a:p>
-            <a:pPr marL="0" indent="0">
-              <a:buNone/>
-            </a:pPr>
-            <a:r>
-              <a:rPr lang="en-US" sz="1600" b="1" dirty="0" err="1" smtClean="0">
-                <a:solidFill>
-                  <a:srgbClr val="3366FF"/>
-                </a:solidFill>
-                <a:latin typeface="Courier New"/>
-                <a:cs typeface="Courier New"/>
-              </a:rPr>
-              <a:t>clGetPlatformIDs</a:t>
-            </a:r>
-            <a:r>
-              <a:rPr lang="en-US" sz="1600" b="1" dirty="0">
-                <a:solidFill>
-                  <a:srgbClr val="3366FF"/>
-                </a:solidFill>
-                <a:latin typeface="Courier New"/>
-                <a:cs typeface="Courier New"/>
-              </a:rPr>
-              <a:t>(1</a:t>
-            </a:r>
-            <a:r>
-              <a:rPr lang="en-US" sz="1600" b="1" dirty="0" smtClean="0">
-                <a:solidFill>
-                  <a:srgbClr val="3366FF"/>
-                </a:solidFill>
-                <a:latin typeface="Courier New"/>
-                <a:cs typeface="Courier New"/>
-              </a:rPr>
-              <a:t>,platforms,NULL</a:t>
-            </a:r>
-            <a:r>
-              <a:rPr lang="en-US" sz="1600" b="1" dirty="0">
-                <a:solidFill>
-                  <a:srgbClr val="3366FF"/>
-                </a:solidFill>
-                <a:latin typeface="Courier New"/>
-                <a:cs typeface="Courier New"/>
-              </a:rPr>
-              <a:t>);</a:t>
-            </a:r>
+              <a:t>l::Platform::get(&amp;platforms);</a:t>
+            </a:r>
+            <a:endParaRPr lang="en-US" sz="1600" b="1" dirty="0">
+              <a:solidFill>
+                <a:srgbClr val="3366FF"/>
+              </a:solidFill>
+              <a:latin typeface="Courier New"/>
+              <a:cs typeface="Courier New"/>
+            </a:endParaRPr>
           </a:p>
           <a:p>
             <a:pPr marL="0" indent="0">
@@ -7907,6 +8056,16 @@
               <a:buNone/>
             </a:pPr>
             <a:r>
+              <a:rPr lang="en-US" sz="1600" b="1" dirty="0" err="1">
+                <a:solidFill>
+                  <a:srgbClr val="3366FF"/>
+                </a:solidFill>
+                <a:latin typeface="Courier New"/>
+                <a:cs typeface="Courier New"/>
+              </a:rPr>
+              <a:t>s</a:t>
+            </a:r>
+            <a:r>
               <a:rPr lang="en-US" sz="1600" b="1" dirty="0" err="1" smtClean="0">
                 <a:solidFill>
                   <a:srgbClr val="3366FF"/>
@@ -7914,7 +8073,7 @@
                 <a:latin typeface="Courier New"/>
                 <a:cs typeface="Courier New"/>
               </a:rPr>
-              <a:t>cl_device_id</a:t>
+              <a:t>td</a:t>
             </a:r>
             <a:r>
               <a:rPr lang="en-US" sz="1600" b="1" dirty="0" smtClean="0">
@@ -7924,8 +8083,13 @@
                 <a:latin typeface="Courier New"/>
                 <a:cs typeface="Courier New"/>
               </a:rPr>
-              <a:t> </a:t>
-            </a:r>
+              <a:t>::vector&lt;cl::Device&gt; devices;</a:t>
+            </a:r>
+          </a:p>
+          <a:p>
+            <a:pPr marL="0" indent="0">
+              <a:buNone/>
+            </a:pPr>
             <a:r>
               <a:rPr lang="en-US" sz="1600" b="1" dirty="0">
                 <a:solidFill>
@@ -7934,7 +8098,37 @@
                 <a:latin typeface="Courier New"/>
                 <a:cs typeface="Courier New"/>
               </a:rPr>
-              <a:t>devices[3];</a:t>
+              <a:t>p</a:t>
+            </a:r>
+            <a:r>
+              <a:rPr lang="en-US" sz="1600" b="1" dirty="0" smtClean="0">
+                <a:solidFill>
+                  <a:srgbClr val="3366FF"/>
+                </a:solidFill>
+                <a:latin typeface="Courier New"/>
+                <a:cs typeface="Courier New"/>
+              </a:rPr>
+              <a:t>latforms[0].</a:t>
+            </a:r>
+            <a:r>
+              <a:rPr lang="en-US" sz="1600" b="1" dirty="0" err="1" smtClean="0">
+                <a:solidFill>
+                  <a:srgbClr val="3366FF"/>
+                </a:solidFill>
+                <a:latin typeface="Courier New"/>
+                <a:cs typeface="Courier New"/>
+              </a:rPr>
+              <a:t>getDevices</a:t>
+            </a:r>
+            <a:r>
+              <a:rPr lang="en-US" sz="1600" b="1" dirty="0" smtClean="0">
+                <a:solidFill>
+                  <a:srgbClr val="3366FF"/>
+                </a:solidFill>
+                <a:latin typeface="Courier New"/>
+                <a:cs typeface="Courier New"/>
+              </a:rPr>
+              <a:t>(</a:t>
             </a:r>
           </a:p>
           <a:p>
@@ -7942,16 +8136,6 @@
               <a:buNone/>
             </a:pPr>
             <a:r>
-              <a:rPr lang="en-US" sz="1600" b="1" dirty="0" err="1" smtClean="0">
-                <a:solidFill>
-                  <a:srgbClr val="3366FF"/>
-                </a:solidFill>
-                <a:latin typeface="Courier New"/>
-                <a:cs typeface="Courier New"/>
-              </a:rPr>
-              <a:t>clGetDeviceIDs</a:t>
-            </a:r>
-            <a:r>
               <a:rPr lang="en-US" sz="1600" b="1" dirty="0">
                 <a:solidFill>
                   <a:srgbClr val="3366FF"/>
@@ -7959,7 +8143,7 @@
                 <a:latin typeface="Courier New"/>
                 <a:cs typeface="Courier New"/>
               </a:rPr>
-              <a:t>(platforms[0], </a:t>
+              <a:t>	</a:t>
             </a:r>
             <a:r>
               <a:rPr lang="en-US" sz="1600" b="1" dirty="0" smtClean="0">
@@ -7969,37 +8153,15 @@
                 <a:latin typeface="Courier New"/>
                 <a:cs typeface="Courier New"/>
               </a:rPr>
-              <a:t/>
-            </a:r>
-            <a:br>
-              <a:rPr lang="en-US" sz="1600" b="1" dirty="0" smtClean="0">
-                <a:solidFill>
-                  <a:srgbClr val="3366FF"/>
-                </a:solidFill>
-                <a:latin typeface="Courier New"/>
-                <a:cs typeface="Courier New"/>
-              </a:rPr>
-            </a:br>
-            <a:r>
-              <a:rPr lang="en-US" sz="1600" b="1" dirty="0" smtClean="0">
-                <a:solidFill>
-                  <a:srgbClr val="3366FF"/>
-                </a:solidFill>
-                <a:latin typeface="Courier New"/>
-                <a:cs typeface="Courier New"/>
-              </a:rPr>
-              <a:t>  CL_DEVICE_TYPE_ALL,3,devices,NULL</a:t>
-            </a:r>
-            <a:r>
-              <a:rPr lang="en-US" sz="1600" b="1" dirty="0">
-                <a:solidFill>
-                  <a:srgbClr val="3366FF"/>
-                </a:solidFill>
-                <a:latin typeface="Courier New"/>
-                <a:cs typeface="Courier New"/>
-              </a:rPr>
-              <a:t>);</a:t>
-            </a:r>
+              <a:t>CL_DEVICE_TYPE_ALL, &amp;devices);</a:t>
+            </a:r>
+            <a:endParaRPr lang="en-US" sz="1600" b="1" dirty="0">
+              <a:solidFill>
+                <a:srgbClr val="3366FF"/>
+              </a:solidFill>
+              <a:latin typeface="Courier New"/>
+              <a:cs typeface="Courier New"/>
+            </a:endParaRPr>
           </a:p>
           <a:p>
             <a:pPr marL="0" indent="0">
@@ -8025,7 +8187,17 @@
                 <a:latin typeface="Courier New"/>
                 <a:cs typeface="Courier New"/>
               </a:rPr>
-              <a:t>//create context from the last device</a:t>
+              <a:t>//create context from </a:t>
+            </a:r>
+            <a:r>
+              <a:rPr lang="en-US" sz="1600" b="1" dirty="0" smtClean="0">
+                <a:solidFill>
+                  <a:srgbClr val="3366FF"/>
+                </a:solidFill>
+                <a:latin typeface="Courier New"/>
+                <a:cs typeface="Courier New"/>
+              </a:rPr>
+              <a:t>first device</a:t>
             </a:r>
             <a:endParaRPr lang="en-US" sz="1600" b="1" dirty="0">
               <a:solidFill>
@@ -8047,68 +8219,14 @@
                 <a:latin typeface="Courier New"/>
                 <a:cs typeface="Courier New"/>
               </a:rPr>
-              <a:t>return clCreateContext</a:t>
-            </a:r>
-            <a:r>
-              <a:rPr lang="en-US" sz="1600" b="1" dirty="0">
-                <a:solidFill>
-                  <a:srgbClr val="3366FF"/>
-                </a:solidFill>
-                <a:latin typeface="Courier New"/>
-                <a:cs typeface="Courier New"/>
-              </a:rPr>
-              <a:t>(NULL, 1, </a:t>
-            </a:r>
-            <a:br>
-              <a:rPr lang="en-US" sz="1600" b="1" dirty="0">
-                <a:solidFill>
-                  <a:srgbClr val="3366FF"/>
-                </a:solidFill>
-                <a:latin typeface="Courier New"/>
-                <a:cs typeface="Courier New"/>
-              </a:rPr>
-            </a:br>
-            <a:r>
-              <a:rPr lang="en-US" sz="1600" b="1" dirty="0" smtClean="0">
-                <a:solidFill>
-                  <a:srgbClr val="3366FF"/>
-                </a:solidFill>
-                <a:latin typeface="Courier New"/>
-                <a:cs typeface="Courier New"/>
-              </a:rPr>
-              <a:t>  &amp;</a:t>
-            </a:r>
-            <a:r>
-              <a:rPr lang="en-US" sz="1600" b="1" dirty="0">
-                <a:solidFill>
-                  <a:srgbClr val="3366FF"/>
-                </a:solidFill>
-                <a:latin typeface="Courier New"/>
-                <a:cs typeface="Courier New"/>
-              </a:rPr>
-              <a:t>devices[2], NULL, NULL, NULL</a:t>
-            </a:r>
-            <a:r>
-              <a:rPr lang="en-US" sz="1600" b="1" dirty="0" smtClean="0">
-                <a:solidFill>
-                  <a:srgbClr val="3366FF"/>
-                </a:solidFill>
-                <a:latin typeface="Courier New"/>
-                <a:cs typeface="Courier New"/>
-              </a:rPr>
-              <a:t>)</a:t>
-            </a:r>
-            <a:r>
-              <a:rPr lang="en-US" sz="1600" b="1" dirty="0">
-                <a:solidFill>
-                  <a:srgbClr val="3366FF"/>
-                </a:solidFill>
-                <a:latin typeface="Courier New"/>
-                <a:cs typeface="Courier New"/>
-              </a:rPr>
-              <a:t>;</a:t>
-            </a:r>
-            <a:endParaRPr lang="en-US" sz="1600" b="1" dirty="0" smtClean="0">
+              <a:t>cl::Context context(devices[0]);</a:t>
+            </a:r>
+          </a:p>
+          <a:p>
+            <a:pPr marL="0" indent="0">
+              <a:buNone/>
+            </a:pPr>
+            <a:endParaRPr lang="en-US" sz="1600" b="1" dirty="0">
               <a:solidFill>
                 <a:srgbClr val="3366FF"/>
               </a:solidFill>
@@ -8191,7 +8309,7 @@
         <p:spPr>
           <a:xfrm>
             <a:off x="107504" y="1556792"/>
-            <a:ext cx="4038600" cy="4525963"/>
+            <a:ext cx="4176464" cy="4525963"/>
           </a:xfrm>
         </p:spPr>
         <p:txBody>
@@ -8202,7 +8320,15 @@
           <a:p>
             <a:r>
               <a:rPr lang="en-US" dirty="0" smtClean="0"/>
-              <a:t>Pass platform &amp; device numbers in command line (with sane defaults)</a:t>
+              <a:t>Pass platform &amp; device numbers in command </a:t>
+            </a:r>
+            <a:r>
+              <a:rPr lang="en-US" dirty="0" smtClean="0"/>
+              <a:t>line or via GUI </a:t>
+            </a:r>
+            <a:r>
+              <a:rPr lang="en-US" dirty="0" smtClean="0"/>
+              <a:t>(with sane defaults)</a:t>
             </a:r>
           </a:p>
           <a:p>
@@ -8214,29 +8340,13 @@
           <a:p>
             <a:r>
               <a:rPr lang="en-US" dirty="0" smtClean="0"/>
-              <a:t>Needs more code..</a:t>
-            </a:r>
-          </a:p>
-          <a:p>
-            <a:r>
-              <a:rPr lang="en-US" dirty="0" smtClean="0"/>
-              <a:t>Also beware – </a:t>
-            </a:r>
-            <a:r>
-              <a:rPr lang="en-US" b="1" dirty="0" err="1" smtClean="0">
-                <a:solidFill>
-                  <a:srgbClr val="3366FF"/>
-                </a:solidFill>
-                <a:latin typeface="Courier New"/>
-                <a:cs typeface="Courier New"/>
-              </a:rPr>
-              <a:t>cl_uint</a:t>
-            </a:r>
-            <a:r>
-              <a:rPr lang="en-US" dirty="0" smtClean="0"/>
-              <a:t> is used for device cardinality</a:t>
-            </a:r>
-            <a:endParaRPr lang="en-US" dirty="0"/>
+              <a:t>Needs </a:t>
+            </a:r>
+            <a:r>
+              <a:rPr lang="en-US" dirty="0" smtClean="0"/>
+              <a:t>a little more code</a:t>
+            </a:r>
+            <a:endParaRPr lang="en-US" dirty="0" smtClean="0"/>
           </a:p>
         </p:txBody>
       </p:sp>
@@ -8266,16 +8376,6 @@
               <a:buNone/>
             </a:pPr>
             <a:r>
-              <a:rPr lang="en-US" sz="1200" b="1" dirty="0" err="1">
-                <a:solidFill>
-                  <a:srgbClr val="3366FF"/>
-                </a:solidFill>
-                <a:latin typeface="Courier New"/>
-                <a:cs typeface="Courier New"/>
-              </a:rPr>
-              <a:t>cl_context</a:t>
-            </a:r>
-            <a:r>
               <a:rPr lang="en-US" sz="1200" b="1" dirty="0">
                 <a:solidFill>
                   <a:srgbClr val="3366FF"/>
@@ -8283,7 +8383,17 @@
                 <a:latin typeface="Courier New"/>
                 <a:cs typeface="Courier New"/>
               </a:rPr>
-              <a:t> </a:t>
+              <a:t>c</a:t>
+            </a:r>
+            <a:r>
+              <a:rPr lang="en-US" sz="1200" b="1" dirty="0" smtClean="0">
+                <a:solidFill>
+                  <a:srgbClr val="3366FF"/>
+                </a:solidFill>
+                <a:latin typeface="Courier New"/>
+                <a:cs typeface="Courier New"/>
+              </a:rPr>
+              <a:t>l::Context </a:t>
             </a:r>
             <a:r>
               <a:rPr lang="en-US" sz="1200" b="1" dirty="0" err="1" smtClean="0">
@@ -8293,7 +8403,7 @@
                 <a:latin typeface="Courier New"/>
                 <a:cs typeface="Courier New"/>
               </a:rPr>
-              <a:t>getDevice</a:t>
+              <a:t>getContext</a:t>
             </a:r>
             <a:endParaRPr lang="en-US" sz="1200" b="1" dirty="0">
               <a:solidFill>
@@ -8418,6 +8528,16 @@
               <a:buNone/>
             </a:pPr>
             <a:r>
+              <a:rPr lang="en-US" sz="1200" b="1" dirty="0" smtClean="0">
+                <a:solidFill>
+                  <a:srgbClr val="3366FF"/>
+                </a:solidFill>
+                <a:latin typeface="Courier New"/>
+                <a:cs typeface="Courier New"/>
+              </a:rPr>
+              <a:t>  /</a:t>
+            </a:r>
+            <a:r>
               <a:rPr lang="en-US" sz="1200" b="1" dirty="0">
                 <a:solidFill>
                   <a:srgbClr val="3366FF"/>
@@ -8425,9 +8545,49 @@
                 <a:latin typeface="Courier New"/>
                 <a:cs typeface="Courier New"/>
               </a:rPr>
+              <a:t>/get platforms</a:t>
+            </a:r>
+          </a:p>
+          <a:p>
+            <a:pPr marL="0" indent="0">
+              <a:buNone/>
+            </a:pPr>
+            <a:r>
+              <a:rPr lang="en-US" sz="1200" b="1" dirty="0" smtClean="0">
+                <a:solidFill>
+                  <a:srgbClr val="3366FF"/>
+                </a:solidFill>
+                <a:latin typeface="Courier New"/>
+                <a:cs typeface="Courier New"/>
+              </a:rPr>
               <a:t>  </a:t>
             </a:r>
             <a:r>
+              <a:rPr lang="en-US" sz="1200" b="1" dirty="0" err="1" smtClean="0">
+                <a:solidFill>
+                  <a:srgbClr val="3366FF"/>
+                </a:solidFill>
+                <a:latin typeface="Courier New"/>
+                <a:cs typeface="Courier New"/>
+              </a:rPr>
+              <a:t>std</a:t>
+            </a:r>
+            <a:r>
+              <a:rPr lang="en-US" sz="1200" b="1" dirty="0">
+                <a:solidFill>
+                  <a:srgbClr val="3366FF"/>
+                </a:solidFill>
+                <a:latin typeface="Courier New"/>
+                <a:cs typeface="Courier New"/>
+              </a:rPr>
+              <a:t>::vector&lt;cl::Platform&gt; platforms;</a:t>
+            </a:r>
+          </a:p>
+          <a:p>
+            <a:pPr marL="0" indent="0">
+              <a:buNone/>
+            </a:pPr>
+            <a:r>
               <a:rPr lang="en-US" sz="1200" b="1" dirty="0" smtClean="0">
                 <a:solidFill>
                   <a:srgbClr val="3366FF"/>
@@ -8435,20 +8595,8 @@
                 <a:latin typeface="Courier New"/>
                 <a:cs typeface="Courier New"/>
               </a:rPr>
-              <a:t>//get number of platforms, devices</a:t>
-            </a:r>
-            <a:endParaRPr lang="en-US" sz="1200" b="1" dirty="0">
-              <a:solidFill>
-                <a:srgbClr val="3366FF"/>
-              </a:solidFill>
-              <a:latin typeface="Courier New"/>
-              <a:cs typeface="Courier New"/>
-            </a:endParaRPr>
-          </a:p>
-          <a:p>
-            <a:pPr marL="0" indent="0">
-              <a:buNone/>
-            </a:pPr>
+              <a:t>  cl</a:t>
+            </a:r>
             <a:r>
               <a:rPr lang="en-US" sz="1200" b="1" dirty="0">
                 <a:solidFill>
@@ -8457,102 +8605,7 @@
                 <a:latin typeface="Courier New"/>
                 <a:cs typeface="Courier New"/>
               </a:rPr>
-              <a:t>  </a:t>
-            </a:r>
-            <a:r>
-              <a:rPr lang="en-US" sz="1200" b="1" dirty="0" err="1">
-                <a:solidFill>
-                  <a:srgbClr val="3366FF"/>
-                </a:solidFill>
-                <a:latin typeface="Courier New"/>
-                <a:cs typeface="Courier New"/>
-              </a:rPr>
-              <a:t>cl_uint</a:t>
-            </a:r>
-            <a:r>
-              <a:rPr lang="en-US" sz="1200" b="1" dirty="0">
-                <a:solidFill>
-                  <a:srgbClr val="3366FF"/>
-                </a:solidFill>
-                <a:latin typeface="Courier New"/>
-                <a:cs typeface="Courier New"/>
-              </a:rPr>
-              <a:t> </a:t>
-            </a:r>
-            <a:r>
-              <a:rPr lang="en-US" sz="1200" b="1" dirty="0" err="1">
-                <a:solidFill>
-                  <a:srgbClr val="3366FF"/>
-                </a:solidFill>
-                <a:latin typeface="Courier New"/>
-                <a:cs typeface="Courier New"/>
-              </a:rPr>
-              <a:t>num_platforms</a:t>
-            </a:r>
-            <a:r>
-              <a:rPr lang="en-US" sz="1200" b="1" dirty="0">
-                <a:solidFill>
-                  <a:srgbClr val="3366FF"/>
-                </a:solidFill>
-                <a:latin typeface="Courier New"/>
-                <a:cs typeface="Courier New"/>
-              </a:rPr>
-              <a:t>;</a:t>
-            </a:r>
-          </a:p>
-          <a:p>
-            <a:pPr marL="0" indent="0">
-              <a:buNone/>
-            </a:pPr>
-            <a:r>
-              <a:rPr lang="en-US" sz="1200" b="1" dirty="0">
-                <a:solidFill>
-                  <a:srgbClr val="3366FF"/>
-                </a:solidFill>
-                <a:latin typeface="Courier New"/>
-                <a:cs typeface="Courier New"/>
-              </a:rPr>
-              <a:t>  </a:t>
-            </a:r>
-            <a:r>
-              <a:rPr lang="en-US" sz="1200" b="1" dirty="0" err="1">
-                <a:solidFill>
-                  <a:srgbClr val="3366FF"/>
-                </a:solidFill>
-                <a:latin typeface="Courier New"/>
-                <a:cs typeface="Courier New"/>
-              </a:rPr>
-              <a:t>clGetPlatformIDs</a:t>
-            </a:r>
-            <a:r>
-              <a:rPr lang="en-US" sz="1200" b="1" dirty="0">
-                <a:solidFill>
-                  <a:srgbClr val="3366FF"/>
-                </a:solidFill>
-                <a:latin typeface="Courier New"/>
-                <a:cs typeface="Courier New"/>
-              </a:rPr>
-              <a:t>(0, NULL, &amp;</a:t>
-            </a:r>
-            <a:r>
-              <a:rPr lang="en-US" sz="1200" b="1" dirty="0" err="1">
-                <a:solidFill>
-                  <a:srgbClr val="3366FF"/>
-                </a:solidFill>
-                <a:latin typeface="Courier New"/>
-                <a:cs typeface="Courier New"/>
-              </a:rPr>
-              <a:t>num_platforms</a:t>
-            </a:r>
-            <a:r>
-              <a:rPr lang="en-US" sz="1200" b="1" dirty="0">
-                <a:solidFill>
-                  <a:srgbClr val="3366FF"/>
-                </a:solidFill>
-                <a:latin typeface="Courier New"/>
-                <a:cs typeface="Courier New"/>
-              </a:rPr>
-              <a:t>);</a:t>
+              <a:t>::Platform::get(&amp;platforms);</a:t>
             </a:r>
           </a:p>
           <a:p>
@@ -8572,6 +8625,16 @@
               <a:buNone/>
             </a:pPr>
             <a:r>
+              <a:rPr lang="en-US" sz="1200" b="1" dirty="0" smtClean="0">
+                <a:solidFill>
+                  <a:srgbClr val="3366FF"/>
+                </a:solidFill>
+                <a:latin typeface="Courier New"/>
+                <a:cs typeface="Courier New"/>
+              </a:rPr>
+              <a:t>  /</a:t>
+            </a:r>
+            <a:r>
               <a:rPr lang="en-US" sz="1200" b="1" dirty="0">
                 <a:solidFill>
                   <a:srgbClr val="3366FF"/>
@@ -8579,9 +8642,89 @@
                 <a:latin typeface="Courier New"/>
                 <a:cs typeface="Courier New"/>
               </a:rPr>
+              <a:t>/get devices from the first platform</a:t>
+            </a:r>
+          </a:p>
+          <a:p>
+            <a:pPr marL="0" indent="0">
+              <a:buNone/>
+            </a:pPr>
+            <a:r>
+              <a:rPr lang="en-US" sz="1200" b="1" dirty="0" smtClean="0">
+                <a:solidFill>
+                  <a:srgbClr val="3366FF"/>
+                </a:solidFill>
+                <a:latin typeface="Courier New"/>
+                <a:cs typeface="Courier New"/>
+              </a:rPr>
               <a:t>  </a:t>
             </a:r>
             <a:r>
+              <a:rPr lang="en-US" sz="1200" b="1" dirty="0" err="1" smtClean="0">
+                <a:solidFill>
+                  <a:srgbClr val="3366FF"/>
+                </a:solidFill>
+                <a:latin typeface="Courier New"/>
+                <a:cs typeface="Courier New"/>
+              </a:rPr>
+              <a:t>std</a:t>
+            </a:r>
+            <a:r>
+              <a:rPr lang="en-US" sz="1200" b="1" dirty="0">
+                <a:solidFill>
+                  <a:srgbClr val="3366FF"/>
+                </a:solidFill>
+                <a:latin typeface="Courier New"/>
+                <a:cs typeface="Courier New"/>
+              </a:rPr>
+              <a:t>::vector&lt;cl::Device&gt; devices;</a:t>
+            </a:r>
+          </a:p>
+          <a:p>
+            <a:pPr marL="0" indent="0">
+              <a:buNone/>
+            </a:pPr>
+            <a:r>
+              <a:rPr lang="en-US" sz="1200" b="1" dirty="0" smtClean="0">
+                <a:solidFill>
+                  <a:srgbClr val="3366FF"/>
+                </a:solidFill>
+                <a:latin typeface="Courier New"/>
+                <a:cs typeface="Courier New"/>
+              </a:rPr>
+              <a:t>  platforms[</a:t>
+            </a:r>
+            <a:r>
+              <a:rPr lang="en-US" sz="1200" b="1" dirty="0" err="1" smtClean="0">
+                <a:solidFill>
+                  <a:srgbClr val="3366FF"/>
+                </a:solidFill>
+                <a:latin typeface="Courier New"/>
+                <a:cs typeface="Courier New"/>
+              </a:rPr>
+              <a:t>plat_num</a:t>
+            </a:r>
+            <a:r>
+              <a:rPr lang="en-US" sz="1200" b="1" dirty="0" smtClean="0">
+                <a:solidFill>
+                  <a:srgbClr val="3366FF"/>
+                </a:solidFill>
+                <a:latin typeface="Courier New"/>
+                <a:cs typeface="Courier New"/>
+              </a:rPr>
+              <a:t>]</a:t>
+            </a:r>
+            <a:r>
+              <a:rPr lang="en-US" sz="1200" b="1" dirty="0">
+                <a:solidFill>
+                  <a:srgbClr val="3366FF"/>
+                </a:solidFill>
+                <a:latin typeface="Courier New"/>
+                <a:cs typeface="Courier New"/>
+              </a:rPr>
+              <a:t>.</a:t>
+            </a:r>
+            <a:r>
               <a:rPr lang="en-US" sz="1200" b="1" dirty="0" err="1">
                 <a:solidFill>
                   <a:srgbClr val="3366FF"/>
@@ -8589,7 +8732,7 @@
                 <a:latin typeface="Courier New"/>
                 <a:cs typeface="Courier New"/>
               </a:rPr>
-              <a:t>cl_platform_id</a:t>
+              <a:t>getDevices</a:t>
             </a:r>
             <a:r>
               <a:rPr lang="en-US" sz="1200" b="1" dirty="0">
@@ -8599,18 +8742,13 @@
                 <a:latin typeface="Courier New"/>
                 <a:cs typeface="Courier New"/>
               </a:rPr>
-              <a:t> platforms[</a:t>
-            </a:r>
-            <a:r>
-              <a:rPr lang="en-US" sz="1200" b="1" dirty="0" err="1">
-                <a:solidFill>
-                  <a:srgbClr val="3366FF"/>
-                </a:solidFill>
-                <a:latin typeface="Courier New"/>
-                <a:cs typeface="Courier New"/>
-              </a:rPr>
-              <a:t>num_platforms</a:t>
-            </a:r>
+              <a:t>(</a:t>
+            </a:r>
+          </a:p>
+          <a:p>
+            <a:pPr marL="0" indent="0">
+              <a:buNone/>
+            </a:pPr>
             <a:r>
               <a:rPr lang="en-US" sz="1200" b="1" dirty="0">
                 <a:solidFill>
@@ -8619,62 +8757,7 @@
                 <a:latin typeface="Courier New"/>
                 <a:cs typeface="Courier New"/>
               </a:rPr>
-              <a:t>];</a:t>
-            </a:r>
-          </a:p>
-          <a:p>
-            <a:pPr marL="0" indent="0">
-              <a:buNone/>
-            </a:pPr>
-            <a:r>
-              <a:rPr lang="en-US" sz="1200" b="1" dirty="0">
-                <a:solidFill>
-                  <a:srgbClr val="3366FF"/>
-                </a:solidFill>
-                <a:latin typeface="Courier New"/>
-                <a:cs typeface="Courier New"/>
-              </a:rPr>
-              <a:t>  </a:t>
-            </a:r>
-            <a:r>
-              <a:rPr lang="en-US" sz="1200" b="1" dirty="0" err="1">
-                <a:solidFill>
-                  <a:srgbClr val="3366FF"/>
-                </a:solidFill>
-                <a:latin typeface="Courier New"/>
-                <a:cs typeface="Courier New"/>
-              </a:rPr>
-              <a:t>clGetPlatformIDs</a:t>
-            </a:r>
-            <a:r>
-              <a:rPr lang="en-US" sz="1200" b="1" dirty="0">
-                <a:solidFill>
-                  <a:srgbClr val="3366FF"/>
-                </a:solidFill>
-                <a:latin typeface="Courier New"/>
-                <a:cs typeface="Courier New"/>
-              </a:rPr>
-              <a:t>(</a:t>
-            </a:r>
-            <a:r>
-              <a:rPr lang="en-US" sz="1200" b="1" dirty="0" err="1">
-                <a:solidFill>
-                  <a:srgbClr val="3366FF"/>
-                </a:solidFill>
-                <a:latin typeface="Courier New"/>
-                <a:cs typeface="Courier New"/>
-              </a:rPr>
-              <a:t>num_platforms</a:t>
-            </a:r>
-            <a:r>
-              <a:rPr lang="en-US" sz="1200" b="1" dirty="0">
-                <a:solidFill>
-                  <a:srgbClr val="3366FF"/>
-                </a:solidFill>
-                <a:latin typeface="Courier New"/>
-                <a:cs typeface="Courier New"/>
-              </a:rPr>
-              <a:t>, platforms, NULL);</a:t>
+              <a:t>	CL_DEVICE_TYPE_ALL, &amp;devices);</a:t>
             </a:r>
           </a:p>
           <a:p>
@@ -8694,6 +8777,16 @@
               <a:buNone/>
             </a:pPr>
             <a:r>
+              <a:rPr lang="en-US" sz="1200" b="1" dirty="0" smtClean="0">
+                <a:solidFill>
+                  <a:srgbClr val="3366FF"/>
+                </a:solidFill>
+                <a:latin typeface="Courier New"/>
+                <a:cs typeface="Courier New"/>
+              </a:rPr>
+              <a:t>  /</a:t>
+            </a:r>
+            <a:r>
               <a:rPr lang="en-US" sz="1200" b="1" dirty="0">
                 <a:solidFill>
                   <a:srgbClr val="3366FF"/>
@@ -8701,102 +8794,7 @@
                 <a:latin typeface="Courier New"/>
                 <a:cs typeface="Courier New"/>
               </a:rPr>
-              <a:t>  </a:t>
-            </a:r>
-            <a:r>
-              <a:rPr lang="en-US" sz="1200" b="1" dirty="0" err="1">
-                <a:solidFill>
-                  <a:srgbClr val="3366FF"/>
-                </a:solidFill>
-                <a:latin typeface="Courier New"/>
-                <a:cs typeface="Courier New"/>
-              </a:rPr>
-              <a:t>cl_uint</a:t>
-            </a:r>
-            <a:r>
-              <a:rPr lang="en-US" sz="1200" b="1" dirty="0">
-                <a:solidFill>
-                  <a:srgbClr val="3366FF"/>
-                </a:solidFill>
-                <a:latin typeface="Courier New"/>
-                <a:cs typeface="Courier New"/>
-              </a:rPr>
-              <a:t> </a:t>
-            </a:r>
-            <a:r>
-              <a:rPr lang="en-US" sz="1200" b="1" dirty="0" err="1">
-                <a:solidFill>
-                  <a:srgbClr val="3366FF"/>
-                </a:solidFill>
-                <a:latin typeface="Courier New"/>
-                <a:cs typeface="Courier New"/>
-              </a:rPr>
-              <a:t>num_devices</a:t>
-            </a:r>
-            <a:r>
-              <a:rPr lang="en-US" sz="1200" b="1" dirty="0">
-                <a:solidFill>
-                  <a:srgbClr val="3366FF"/>
-                </a:solidFill>
-                <a:latin typeface="Courier New"/>
-                <a:cs typeface="Courier New"/>
-              </a:rPr>
-              <a:t>;</a:t>
-            </a:r>
-          </a:p>
-          <a:p>
-            <a:pPr marL="0" indent="0">
-              <a:buNone/>
-            </a:pPr>
-            <a:r>
-              <a:rPr lang="en-US" sz="1200" b="1" dirty="0">
-                <a:solidFill>
-                  <a:srgbClr val="3366FF"/>
-                </a:solidFill>
-                <a:latin typeface="Courier New"/>
-                <a:cs typeface="Courier New"/>
-              </a:rPr>
-              <a:t>  </a:t>
-            </a:r>
-            <a:r>
-              <a:rPr lang="en-US" sz="1200" b="1" dirty="0" err="1">
-                <a:solidFill>
-                  <a:srgbClr val="3366FF"/>
-                </a:solidFill>
-                <a:latin typeface="Courier New"/>
-                <a:cs typeface="Courier New"/>
-              </a:rPr>
-              <a:t>clGetDeviceIDs</a:t>
-            </a:r>
-            <a:r>
-              <a:rPr lang="en-US" sz="1200" b="1" dirty="0">
-                <a:solidFill>
-                  <a:srgbClr val="3366FF"/>
-                </a:solidFill>
-                <a:latin typeface="Courier New"/>
-                <a:cs typeface="Courier New"/>
-              </a:rPr>
-              <a:t>(platforms[</a:t>
-            </a:r>
-            <a:r>
-              <a:rPr lang="en-US" sz="1200" b="1" dirty="0" err="1">
-                <a:solidFill>
-                  <a:srgbClr val="3366FF"/>
-                </a:solidFill>
-                <a:latin typeface="Courier New"/>
-                <a:cs typeface="Courier New"/>
-              </a:rPr>
-              <a:t>plat_num</a:t>
-            </a:r>
-            <a:r>
-              <a:rPr lang="en-US" sz="1200" b="1" dirty="0">
-                <a:solidFill>
-                  <a:srgbClr val="3366FF"/>
-                </a:solidFill>
-                <a:latin typeface="Courier New"/>
-                <a:cs typeface="Courier New"/>
-              </a:rPr>
-              <a:t>]</a:t>
+              <a:t>/create context from </a:t>
             </a:r>
             <a:r>
               <a:rPr lang="en-US" sz="1200" b="1" dirty="0" smtClean="0">
@@ -8806,62 +8804,8 @@
                 <a:latin typeface="Courier New"/>
                 <a:cs typeface="Courier New"/>
               </a:rPr>
-              <a:t>,</a:t>
-            </a:r>
-            <a:br>
-              <a:rPr lang="en-US" sz="1200" b="1" dirty="0" smtClean="0">
-                <a:solidFill>
-                  <a:srgbClr val="3366FF"/>
-                </a:solidFill>
-                <a:latin typeface="Courier New"/>
-                <a:cs typeface="Courier New"/>
-              </a:rPr>
-            </a:br>
-            <a:r>
-              <a:rPr lang="en-US" sz="1200" b="1" dirty="0" smtClean="0">
-                <a:solidFill>
-                  <a:srgbClr val="3366FF"/>
-                </a:solidFill>
-                <a:latin typeface="Courier New"/>
-                <a:cs typeface="Courier New"/>
-              </a:rPr>
-              <a:t>    </a:t>
-            </a:r>
-            <a:r>
-              <a:rPr lang="en-US" sz="1200" b="1" dirty="0">
-                <a:solidFill>
-                  <a:srgbClr val="3366FF"/>
-                </a:solidFill>
-                <a:latin typeface="Courier New"/>
-                <a:cs typeface="Courier New"/>
-              </a:rPr>
-              <a:t>CL_DEVICE_TYPE_ALL, 0, NULL, &amp;</a:t>
-            </a:r>
-            <a:r>
-              <a:rPr lang="en-US" sz="1200" b="1" dirty="0" err="1">
-                <a:solidFill>
-                  <a:srgbClr val="3366FF"/>
-                </a:solidFill>
-                <a:latin typeface="Courier New"/>
-                <a:cs typeface="Courier New"/>
-              </a:rPr>
-              <a:t>num_devices</a:t>
-            </a:r>
-            <a:r>
-              <a:rPr lang="en-US" sz="1200" b="1" dirty="0">
-                <a:solidFill>
-                  <a:srgbClr val="3366FF"/>
-                </a:solidFill>
-                <a:latin typeface="Courier New"/>
-                <a:cs typeface="Courier New"/>
-              </a:rPr>
-              <a:t>);</a:t>
-            </a:r>
-          </a:p>
-          <a:p>
-            <a:pPr marL="0" indent="0">
-              <a:buNone/>
-            </a:pPr>
+              <a:t>device</a:t>
+            </a:r>
             <a:endParaRPr lang="en-US" sz="1200" b="1" dirty="0">
               <a:solidFill>
                 <a:srgbClr val="3366FF"/>
@@ -8875,6 +8819,16 @@
               <a:buNone/>
             </a:pPr>
             <a:r>
+              <a:rPr lang="en-US" sz="1200" b="1" dirty="0" smtClean="0">
+                <a:solidFill>
+                  <a:srgbClr val="3366FF"/>
+                </a:solidFill>
+                <a:latin typeface="Courier New"/>
+                <a:cs typeface="Courier New"/>
+              </a:rPr>
+              <a:t>  return cl</a:t>
+            </a:r>
+            <a:r>
               <a:rPr lang="en-US" sz="1200" b="1" dirty="0">
                 <a:solidFill>
                   <a:srgbClr val="3366FF"/>
@@ -8882,102 +8836,7 @@
                 <a:latin typeface="Courier New"/>
                 <a:cs typeface="Courier New"/>
               </a:rPr>
-              <a:t>  </a:t>
-            </a:r>
-            <a:r>
-              <a:rPr lang="en-US" sz="1200" b="1" dirty="0" err="1">
-                <a:solidFill>
-                  <a:srgbClr val="3366FF"/>
-                </a:solidFill>
-                <a:latin typeface="Courier New"/>
-                <a:cs typeface="Courier New"/>
-              </a:rPr>
-              <a:t>cl_device_id</a:t>
-            </a:r>
-            <a:r>
-              <a:rPr lang="en-US" sz="1200" b="1" dirty="0">
-                <a:solidFill>
-                  <a:srgbClr val="3366FF"/>
-                </a:solidFill>
-                <a:latin typeface="Courier New"/>
-                <a:cs typeface="Courier New"/>
-              </a:rPr>
-              <a:t> devices[</a:t>
-            </a:r>
-            <a:r>
-              <a:rPr lang="en-US" sz="1200" b="1" dirty="0" err="1">
-                <a:solidFill>
-                  <a:srgbClr val="3366FF"/>
-                </a:solidFill>
-                <a:latin typeface="Courier New"/>
-                <a:cs typeface="Courier New"/>
-              </a:rPr>
-              <a:t>num_devices</a:t>
-            </a:r>
-            <a:r>
-              <a:rPr lang="en-US" sz="1200" b="1" dirty="0">
-                <a:solidFill>
-                  <a:srgbClr val="3366FF"/>
-                </a:solidFill>
-                <a:latin typeface="Courier New"/>
-                <a:cs typeface="Courier New"/>
-              </a:rPr>
-              <a:t>];</a:t>
-            </a:r>
-          </a:p>
-          <a:p>
-            <a:pPr marL="0" indent="0">
-              <a:buNone/>
-            </a:pPr>
-            <a:r>
-              <a:rPr lang="en-US" sz="1200" b="1" dirty="0">
-                <a:solidFill>
-                  <a:srgbClr val="3366FF"/>
-                </a:solidFill>
-                <a:latin typeface="Courier New"/>
-                <a:cs typeface="Courier New"/>
-              </a:rPr>
-              <a:t>  </a:t>
-            </a:r>
-            <a:r>
-              <a:rPr lang="en-US" sz="1200" b="1" dirty="0" err="1">
-                <a:solidFill>
-                  <a:srgbClr val="3366FF"/>
-                </a:solidFill>
-                <a:latin typeface="Courier New"/>
-                <a:cs typeface="Courier New"/>
-              </a:rPr>
-              <a:t>clGetDeviceIDs</a:t>
-            </a:r>
-            <a:r>
-              <a:rPr lang="en-US" sz="1200" b="1" dirty="0">
-                <a:solidFill>
-                  <a:srgbClr val="3366FF"/>
-                </a:solidFill>
-                <a:latin typeface="Courier New"/>
-                <a:cs typeface="Courier New"/>
-              </a:rPr>
-              <a:t>(platforms[</a:t>
-            </a:r>
-            <a:r>
-              <a:rPr lang="en-US" sz="1200" b="1" dirty="0" err="1">
-                <a:solidFill>
-                  <a:srgbClr val="3366FF"/>
-                </a:solidFill>
-                <a:latin typeface="Courier New"/>
-                <a:cs typeface="Courier New"/>
-              </a:rPr>
-              <a:t>plat_num</a:t>
-            </a:r>
-            <a:r>
-              <a:rPr lang="en-US" sz="1200" b="1" dirty="0">
-                <a:solidFill>
-                  <a:srgbClr val="3366FF"/>
-                </a:solidFill>
-                <a:latin typeface="Courier New"/>
-                <a:cs typeface="Courier New"/>
-              </a:rPr>
-              <a:t>], </a:t>
+              <a:t>::</a:t>
             </a:r>
             <a:r>
               <a:rPr lang="en-US" sz="1200" b="1" dirty="0" smtClean="0">
@@ -8987,9 +8846,19 @@
                 <a:latin typeface="Courier New"/>
                 <a:cs typeface="Courier New"/>
               </a:rPr>
-              <a:t/>
-            </a:r>
-            <a:br>
+              <a:t>Context(devices[</a:t>
+            </a:r>
+            <a:r>
+              <a:rPr lang="en-US" sz="1200" b="1" dirty="0" err="1" smtClean="0">
+                <a:solidFill>
+                  <a:srgbClr val="3366FF"/>
+                </a:solidFill>
+                <a:latin typeface="Courier New"/>
+                <a:cs typeface="Courier New"/>
+              </a:rPr>
+              <a:t>dev_num</a:t>
+            </a:r>
+            <a:r>
               <a:rPr lang="en-US" sz="1200" b="1" dirty="0" smtClean="0">
                 <a:solidFill>
                   <a:srgbClr val="3366FF"/>
@@ -8997,66 +8866,7 @@
                 <a:latin typeface="Courier New"/>
                 <a:cs typeface="Courier New"/>
               </a:rPr>
-            </a:br>
-            <a:r>
-              <a:rPr lang="en-US" sz="1200" b="1" dirty="0" smtClean="0">
-                <a:solidFill>
-                  <a:srgbClr val="3366FF"/>
-                </a:solidFill>
-                <a:latin typeface="Courier New"/>
-                <a:cs typeface="Courier New"/>
-              </a:rPr>
-              <a:t>    CL_DEVICE_TYPE_ALL</a:t>
-            </a:r>
-            <a:r>
-              <a:rPr lang="en-US" sz="1200" b="1" dirty="0">
-                <a:solidFill>
-                  <a:srgbClr val="3366FF"/>
-                </a:solidFill>
-                <a:latin typeface="Courier New"/>
-                <a:cs typeface="Courier New"/>
-              </a:rPr>
-              <a:t>, </a:t>
-            </a:r>
-            <a:r>
-              <a:rPr lang="en-US" sz="1200" b="1" dirty="0" err="1">
-                <a:solidFill>
-                  <a:srgbClr val="3366FF"/>
-                </a:solidFill>
-                <a:latin typeface="Courier New"/>
-                <a:cs typeface="Courier New"/>
-              </a:rPr>
-              <a:t>num_devices</a:t>
-            </a:r>
-            <a:r>
-              <a:rPr lang="en-US" sz="1200" b="1" dirty="0">
-                <a:solidFill>
-                  <a:srgbClr val="3366FF"/>
-                </a:solidFill>
-                <a:latin typeface="Courier New"/>
-                <a:cs typeface="Courier New"/>
-              </a:rPr>
-              <a:t>, </a:t>
-            </a:r>
-            <a:r>
-              <a:rPr lang="en-US" sz="1200" b="1" dirty="0" err="1">
-                <a:solidFill>
-                  <a:srgbClr val="3366FF"/>
-                </a:solidFill>
-                <a:latin typeface="Courier New"/>
-                <a:cs typeface="Courier New"/>
-              </a:rPr>
-              <a:t>devices</a:t>
-            </a:r>
-            <a:r>
-              <a:rPr lang="en-US" sz="1200" b="1" dirty="0" err="1" smtClean="0">
-                <a:solidFill>
-                  <a:srgbClr val="3366FF"/>
-                </a:solidFill>
-                <a:latin typeface="Courier New"/>
-                <a:cs typeface="Courier New"/>
-              </a:rPr>
-              <a:t>,NULL</a:t>
+              <a:t>]</a:t>
             </a:r>
             <a:r>
               <a:rPr lang="en-US" sz="1200" b="1" dirty="0">
@@ -9118,16 +8928,6 @@
               <a:buNone/>
             </a:pPr>
             <a:r>
-              <a:rPr lang="en-US" sz="1200" b="1" dirty="0">
-                <a:solidFill>
-                  <a:srgbClr val="3366FF"/>
-                </a:solidFill>
-                <a:latin typeface="Courier New"/>
-                <a:cs typeface="Courier New"/>
-              </a:rPr>
-              <a:t>  return clCreateContext(NULL</a:t>
-            </a:r>
-            <a:r>
               <a:rPr lang="en-US" sz="1200" b="1" dirty="0" smtClean="0">
                 <a:solidFill>
                   <a:srgbClr val="3366FF"/>
@@ -9135,92 +8935,15 @@
                 <a:latin typeface="Courier New"/>
                 <a:cs typeface="Courier New"/>
               </a:rPr>
-              <a:t>,1,&amp;</a:t>
-            </a:r>
-            <a:r>
-              <a:rPr lang="en-US" sz="1200" b="1" dirty="0">
-                <a:solidFill>
-                  <a:srgbClr val="3366FF"/>
-                </a:solidFill>
-                <a:latin typeface="Courier New"/>
-                <a:cs typeface="Courier New"/>
-              </a:rPr>
-              <a:t>devices[</a:t>
-            </a:r>
-            <a:r>
-              <a:rPr lang="en-US" sz="1200" b="1" dirty="0" err="1">
-                <a:solidFill>
-                  <a:srgbClr val="3366FF"/>
-                </a:solidFill>
-                <a:latin typeface="Courier New"/>
-                <a:cs typeface="Courier New"/>
-              </a:rPr>
-              <a:t>dev_num</a:t>
-            </a:r>
-            <a:r>
-              <a:rPr lang="en-US" sz="1200" b="1" dirty="0">
-                <a:solidFill>
-                  <a:srgbClr val="3366FF"/>
-                </a:solidFill>
-                <a:latin typeface="Courier New"/>
-                <a:cs typeface="Courier New"/>
-              </a:rPr>
-              <a:t>]</a:t>
-            </a:r>
-            <a:r>
-              <a:rPr lang="en-US" sz="1200" b="1" dirty="0" smtClean="0">
-                <a:solidFill>
-                  <a:srgbClr val="3366FF"/>
-                </a:solidFill>
-                <a:latin typeface="Courier New"/>
-                <a:cs typeface="Courier New"/>
-              </a:rPr>
-              <a:t>,</a:t>
-            </a:r>
-            <a:br>
-              <a:rPr lang="en-US" sz="1200" b="1" dirty="0" smtClean="0">
-                <a:solidFill>
-                  <a:srgbClr val="3366FF"/>
-                </a:solidFill>
-                <a:latin typeface="Courier New"/>
-                <a:cs typeface="Courier New"/>
-              </a:rPr>
-            </a:br>
-            <a:r>
-              <a:rPr lang="en-US" sz="1200" b="1" dirty="0" smtClean="0">
-                <a:solidFill>
-                  <a:srgbClr val="3366FF"/>
-                </a:solidFill>
-                <a:latin typeface="Courier New"/>
-                <a:cs typeface="Courier New"/>
-              </a:rPr>
-              <a:t>    </a:t>
-            </a:r>
-            <a:r>
-              <a:rPr lang="en-US" sz="1200" b="1" dirty="0">
-                <a:solidFill>
-                  <a:srgbClr val="3366FF"/>
-                </a:solidFill>
-                <a:latin typeface="Courier New"/>
-                <a:cs typeface="Courier New"/>
-              </a:rPr>
-              <a:t>NULL, NULL, NULL);</a:t>
-            </a:r>
-          </a:p>
-          <a:p>
-            <a:pPr marL="0" indent="0">
-              <a:buNone/>
-            </a:pPr>
-            <a:r>
-              <a:rPr lang="en-US" sz="1200" b="1" dirty="0">
-                <a:solidFill>
-                  <a:srgbClr val="3366FF"/>
-                </a:solidFill>
-                <a:latin typeface="Courier New"/>
-                <a:cs typeface="Courier New"/>
-              </a:rPr>
               <a:t>}</a:t>
             </a:r>
+            <a:endParaRPr lang="en-US" sz="1200" b="1" dirty="0">
+              <a:solidFill>
+                <a:srgbClr val="3366FF"/>
+              </a:solidFill>
+              <a:latin typeface="Courier New"/>
+              <a:cs typeface="Courier New"/>
+            </a:endParaRPr>
           </a:p>
         </p:txBody>
       </p:sp>
@@ -9278,7 +9001,7 @@
           <a:p>
             <a:r>
               <a:rPr lang="en-US" dirty="0" smtClean="0"/>
-              <a:t>Selection</a:t>
+              <a:t>Interactive Selection</a:t>
             </a:r>
             <a:endParaRPr lang="en-US" dirty="0"/>
           </a:p>
@@ -9301,19 +9024,27 @@
           <a:p>
             <a:r>
               <a:rPr lang="en-US" dirty="0" smtClean="0"/>
-              <a:t>Give each platform/device a unique number</a:t>
-            </a:r>
-          </a:p>
-          <a:p>
-            <a:r>
-              <a:rPr lang="en-US" dirty="0" smtClean="0"/>
-              <a:t>Pass a single argument</a:t>
-            </a:r>
-          </a:p>
-          <a:p>
-            <a:r>
-              <a:rPr lang="en-US" dirty="0" smtClean="0"/>
-              <a:t>Much cleaner</a:t>
+              <a:t>Provide an interactive interface for selecting the device at run-time</a:t>
+            </a:r>
+          </a:p>
+          <a:p>
+            <a:r>
+              <a:rPr lang="en-US" dirty="0" smtClean="0"/>
+              <a:t>Give </a:t>
+            </a:r>
+            <a:r>
+              <a:rPr lang="en-US" dirty="0" smtClean="0"/>
+              <a:t>each platform/device a unique number</a:t>
+            </a:r>
+          </a:p>
+          <a:p>
+            <a:r>
+              <a:rPr lang="en-US" dirty="0" smtClean="0"/>
+              <a:t>Much </a:t>
+            </a:r>
+            <a:r>
+              <a:rPr lang="en-US" dirty="0" smtClean="0"/>
+              <a:t>cleaner</a:t>
             </a:r>
           </a:p>
           <a:p>

</xml_diff>

<commit_message>
runtime instead of run-time
</commit_message>
<xml_diff>
--- a/slides/advanced_part1.pptx
+++ b/slides/advanced_part1.pptx
@@ -6972,11 +6972,7 @@
           <a:p>
             <a:r>
               <a:rPr lang="en-US" dirty="0" smtClean="0"/>
-              <a:t>Running across multiple devices can deliver better performance (if your problem scales well</a:t>
-            </a:r>
-            <a:r>
-              <a:rPr lang="en-US" dirty="0" smtClean="0"/>
-              <a:t>)</a:t>
+              <a:t>Running across multiple devices can deliver better performance (if your problem scales well)</a:t>
             </a:r>
           </a:p>
           <a:p>
@@ -6984,7 +6980,6 @@
               <a:rPr lang="en-US" dirty="0" smtClean="0"/>
               <a:t>But have to manually partition problem / load balance</a:t>
             </a:r>
-            <a:endParaRPr lang="en-US" dirty="0" smtClean="0"/>
           </a:p>
           <a:p>
             <a:r>
@@ -7003,19 +6998,7 @@
           <a:p>
             <a:r>
               <a:rPr lang="en-US" dirty="0" smtClean="0"/>
-              <a:t>There are </a:t>
-            </a:r>
-            <a:r>
-              <a:rPr lang="en-US" dirty="0" smtClean="0"/>
-              <a:t>a couple of options </a:t>
-            </a:r>
-            <a:r>
-              <a:rPr lang="en-US" dirty="0" smtClean="0"/>
-              <a:t>for using multiple </a:t>
-            </a:r>
-            <a:r>
-              <a:rPr lang="en-US" dirty="0" smtClean="0"/>
-              <a:t>devices within </a:t>
+              <a:t>There are a couple of options for using multiple devices within </a:t>
             </a:r>
             <a:r>
               <a:rPr lang="en-US" dirty="0" err="1" smtClean="0"/>
@@ -7213,13 +7196,8 @@
           <a:p>
             <a:r>
               <a:rPr lang="en-US" dirty="0" smtClean="0"/>
-              <a:t>The simplest method – just </a:t>
-            </a:r>
-            <a:r>
-              <a:rPr lang="en-US" dirty="0" smtClean="0"/>
-              <a:t>create a separate context and command queue for each device.</a:t>
-            </a:r>
-            <a:endParaRPr lang="en-US" dirty="0" smtClean="0"/>
+              <a:t>The simplest method – just create a separate context and command queue for each device.</a:t>
+            </a:r>
           </a:p>
           <a:p>
             <a:r>
@@ -7238,11 +7216,7 @@
             </a:r>
             <a:r>
               <a:rPr lang="en-US" dirty="0" smtClean="0"/>
-              <a:t> can’t work with memory objects created in different </a:t>
-            </a:r>
-            <a:r>
-              <a:rPr lang="en-US" dirty="0" smtClean="0"/>
-              <a:t>contexts</a:t>
+              <a:t> can’t work with memory objects created in different contexts</a:t>
             </a:r>
           </a:p>
           <a:p>
@@ -7350,11 +7324,7 @@
           <a:p>
             <a:r>
               <a:rPr lang="en-US" dirty="0" smtClean="0"/>
-              <a:t>A context can </a:t>
-            </a:r>
-            <a:r>
-              <a:rPr lang="en-US" dirty="0" smtClean="0"/>
-              <a:t>support more than one  device, although only within the same platform.</a:t>
+              <a:t>A context can support more than one  device, although only within the same platform.</a:t>
             </a:r>
           </a:p>
           <a:p>
@@ -7366,11 +7336,7 @@
           <a:p>
             <a:r>
               <a:rPr lang="en-US" dirty="0" smtClean="0"/>
-              <a:t>However, there must be a separate command queue for each device in the context</a:t>
-            </a:r>
-            <a:r>
-              <a:rPr lang="en-US" dirty="0" smtClean="0"/>
-              <a:t>.</a:t>
+              <a:t>However, there must be a separate command queue for each device in the context.</a:t>
             </a:r>
           </a:p>
           <a:p>
@@ -7465,13 +7431,8 @@
           <a:p>
             <a:r>
               <a:rPr lang="en-US" dirty="0" smtClean="0"/>
-              <a:t>Typically, each MPI process gets a single device</a:t>
-            </a:r>
-            <a:r>
-              <a:rPr lang="en-US" dirty="0" smtClean="0"/>
-              <a:t>.</a:t>
-            </a:r>
-            <a:endParaRPr lang="en-US" dirty="0" smtClean="0"/>
+              <a:t>Typically, each MPI process gets a single device.</a:t>
+            </a:r>
           </a:p>
           <a:p>
             <a:r>
@@ -7572,15 +7533,7 @@
           <a:p>
             <a:r>
               <a:rPr lang="en-US" dirty="0" smtClean="0"/>
-              <a:t>If you can split your problem up into regions, then the edges </a:t>
-            </a:r>
-            <a:r>
-              <a:rPr lang="en-US" dirty="0" smtClean="0"/>
-              <a:t>may need to be </a:t>
-            </a:r>
-            <a:r>
-              <a:rPr lang="en-US" dirty="0" smtClean="0"/>
-              <a:t>synchronized across devices</a:t>
+              <a:t>If you can split your problem up into regions, then the edges may need to be synchronized across devices</a:t>
             </a:r>
           </a:p>
           <a:p>
@@ -7711,10 +7664,6 @@
               <a:rPr lang="en-GB" dirty="0" smtClean="0"/>
               <a:t>:</a:t>
             </a:r>
-            <a:r>
-              <a:rPr lang="en-GB" dirty="0" smtClean="0"/>
-              <a:t/>
-            </a:r>
             <a:br>
               <a:rPr lang="en-GB" dirty="0" smtClean="0"/>
             </a:br>
@@ -7767,13 +7716,8 @@
           <a:p>
             <a:r>
               <a:rPr lang="en-GB" dirty="0" smtClean="0"/>
-              <a:t>Improve the performance of the host-to-device data transfers by using </a:t>
-            </a:r>
-            <a:r>
-              <a:rPr lang="en-GB" dirty="0" smtClean="0"/>
-              <a:t>pinned memory or zero-copy</a:t>
-            </a:r>
-            <a:endParaRPr lang="en-GB" dirty="0" smtClean="0"/>
+              <a:t>Improve the performance of the host-to-device data transfers by using pinned memory or zero-copy</a:t>
+            </a:r>
           </a:p>
           <a:p>
             <a:r>
@@ -7930,17 +7874,7 @@
                 <a:latin typeface="Courier New"/>
                 <a:cs typeface="Courier New"/>
               </a:rPr>
-              <a:t>//get </a:t>
-            </a:r>
-            <a:r>
-              <a:rPr lang="en-US" sz="1600" b="1" dirty="0" smtClean="0">
-                <a:solidFill>
-                  <a:srgbClr val="3366FF"/>
-                </a:solidFill>
-                <a:latin typeface="Courier New"/>
-                <a:cs typeface="Courier New"/>
-              </a:rPr>
-              <a:t>platforms</a:t>
+              <a:t>//get platforms</a:t>
             </a:r>
           </a:p>
           <a:p>
@@ -8187,17 +8121,7 @@
                 <a:latin typeface="Courier New"/>
                 <a:cs typeface="Courier New"/>
               </a:rPr>
-              <a:t>//create context from </a:t>
-            </a:r>
-            <a:r>
-              <a:rPr lang="en-US" sz="1600" b="1" dirty="0" smtClean="0">
-                <a:solidFill>
-                  <a:srgbClr val="3366FF"/>
-                </a:solidFill>
-                <a:latin typeface="Courier New"/>
-                <a:cs typeface="Courier New"/>
-              </a:rPr>
-              <a:t>first device</a:t>
+              <a:t>//create context from first device</a:t>
             </a:r>
             <a:endParaRPr lang="en-US" sz="1600" b="1" dirty="0">
               <a:solidFill>
@@ -8320,15 +8244,7 @@
           <a:p>
             <a:r>
               <a:rPr lang="en-US" dirty="0" smtClean="0"/>
-              <a:t>Pass platform &amp; device numbers in command </a:t>
-            </a:r>
-            <a:r>
-              <a:rPr lang="en-US" dirty="0" smtClean="0"/>
-              <a:t>line or via GUI </a:t>
-            </a:r>
-            <a:r>
-              <a:rPr lang="en-US" dirty="0" smtClean="0"/>
-              <a:t>(with sane defaults)</a:t>
+              <a:t>Pass platform &amp; device numbers in command line or via GUI (with sane defaults)</a:t>
             </a:r>
           </a:p>
           <a:p>
@@ -8340,13 +8256,8 @@
           <a:p>
             <a:r>
               <a:rPr lang="en-US" dirty="0" smtClean="0"/>
-              <a:t>Needs </a:t>
-            </a:r>
-            <a:r>
-              <a:rPr lang="en-US" dirty="0" smtClean="0"/>
-              <a:t>a little more code</a:t>
-            </a:r>
-            <a:endParaRPr lang="en-US" dirty="0" smtClean="0"/>
+              <a:t>Needs a little more code</a:t>
+            </a:r>
           </a:p>
         </p:txBody>
       </p:sp>
@@ -9024,27 +8935,24 @@
           <a:p>
             <a:r>
               <a:rPr lang="en-US" dirty="0" smtClean="0"/>
-              <a:t>Provide an interactive interface for selecting the device at run-time</a:t>
-            </a:r>
-          </a:p>
-          <a:p>
-            <a:r>
-              <a:rPr lang="en-US" dirty="0" smtClean="0"/>
-              <a:t>Give </a:t>
-            </a:r>
-            <a:r>
-              <a:rPr lang="en-US" dirty="0" smtClean="0"/>
-              <a:t>each platform/device a unique number</a:t>
-            </a:r>
-          </a:p>
-          <a:p>
-            <a:r>
-              <a:rPr lang="en-US" dirty="0" smtClean="0"/>
-              <a:t>Much </a:t>
-            </a:r>
-            <a:r>
-              <a:rPr lang="en-US" dirty="0" smtClean="0"/>
-              <a:t>cleaner</a:t>
+              <a:t>Provide an interactive interface for selecting the device at </a:t>
+            </a:r>
+            <a:r>
+              <a:rPr lang="en-US" dirty="0" smtClean="0"/>
+              <a:t>runtime</a:t>
+            </a:r>
+            <a:endParaRPr lang="en-US" dirty="0" smtClean="0"/>
+          </a:p>
+          <a:p>
+            <a:r>
+              <a:rPr lang="en-US" dirty="0" smtClean="0"/>
+              <a:t>Give each platform/device a unique number</a:t>
+            </a:r>
+          </a:p>
+          <a:p>
+            <a:r>
+              <a:rPr lang="en-US" dirty="0" smtClean="0"/>
+              <a:t>Much cleaner</a:t>
             </a:r>
           </a:p>
           <a:p>

</xml_diff>

<commit_message>
Updated pinned memory allocation description.
</commit_message>
<xml_diff>
--- a/slides/advanced_part1.pptx
+++ b/slides/advanced_part1.pptx
@@ -215,7 +215,7 @@
           <a:p>
             <a:fld id="{C020D4C0-2770-3946-ABDD-0C7492C2C34D}" type="datetimeFigureOut">
               <a:rPr lang="en-US" smtClean="0"/>
-              <a:t>06/05/15</a:t>
+              <a:t>09/05/15</a:t>
             </a:fld>
             <a:endParaRPr lang="en-GB"/>
           </a:p>
@@ -749,7 +749,7 @@
           <a:p>
             <a:fld id="{8959E172-2558-6049-8DA8-C86E1F6924DD}" type="datetimeFigureOut">
               <a:rPr lang="en-US" smtClean="0"/>
-              <a:t>06/05/15</a:t>
+              <a:t>09/05/15</a:t>
             </a:fld>
             <a:endParaRPr lang="en-GB"/>
           </a:p>
@@ -919,7 +919,7 @@
           <a:p>
             <a:fld id="{8959E172-2558-6049-8DA8-C86E1F6924DD}" type="datetimeFigureOut">
               <a:rPr lang="en-US" smtClean="0"/>
-              <a:t>06/05/15</a:t>
+              <a:t>09/05/15</a:t>
             </a:fld>
             <a:endParaRPr lang="en-GB"/>
           </a:p>
@@ -1099,7 +1099,7 @@
           <a:p>
             <a:fld id="{8959E172-2558-6049-8DA8-C86E1F6924DD}" type="datetimeFigureOut">
               <a:rPr lang="en-US" smtClean="0"/>
-              <a:t>06/05/15</a:t>
+              <a:t>09/05/15</a:t>
             </a:fld>
             <a:endParaRPr lang="en-GB"/>
           </a:p>
@@ -1269,7 +1269,7 @@
           <a:p>
             <a:fld id="{8959E172-2558-6049-8DA8-C86E1F6924DD}" type="datetimeFigureOut">
               <a:rPr lang="en-US" smtClean="0"/>
-              <a:t>06/05/15</a:t>
+              <a:t>09/05/15</a:t>
             </a:fld>
             <a:endParaRPr lang="en-GB"/>
           </a:p>
@@ -1515,7 +1515,7 @@
           <a:p>
             <a:fld id="{8959E172-2558-6049-8DA8-C86E1F6924DD}" type="datetimeFigureOut">
               <a:rPr lang="en-US" smtClean="0"/>
-              <a:t>06/05/15</a:t>
+              <a:t>09/05/15</a:t>
             </a:fld>
             <a:endParaRPr lang="en-GB"/>
           </a:p>
@@ -1803,7 +1803,7 @@
           <a:p>
             <a:fld id="{8959E172-2558-6049-8DA8-C86E1F6924DD}" type="datetimeFigureOut">
               <a:rPr lang="en-US" smtClean="0"/>
-              <a:t>06/05/15</a:t>
+              <a:t>09/05/15</a:t>
             </a:fld>
             <a:endParaRPr lang="en-GB"/>
           </a:p>
@@ -2225,7 +2225,7 @@
           <a:p>
             <a:fld id="{8959E172-2558-6049-8DA8-C86E1F6924DD}" type="datetimeFigureOut">
               <a:rPr lang="en-US" smtClean="0"/>
-              <a:t>06/05/15</a:t>
+              <a:t>09/05/15</a:t>
             </a:fld>
             <a:endParaRPr lang="en-GB"/>
           </a:p>
@@ -2343,7 +2343,7 @@
           <a:p>
             <a:fld id="{8959E172-2558-6049-8DA8-C86E1F6924DD}" type="datetimeFigureOut">
               <a:rPr lang="en-US" smtClean="0"/>
-              <a:t>06/05/15</a:t>
+              <a:t>09/05/15</a:t>
             </a:fld>
             <a:endParaRPr lang="en-GB"/>
           </a:p>
@@ -2438,7 +2438,7 @@
           <a:p>
             <a:fld id="{8959E172-2558-6049-8DA8-C86E1F6924DD}" type="datetimeFigureOut">
               <a:rPr lang="en-US" smtClean="0"/>
-              <a:t>06/05/15</a:t>
+              <a:t>09/05/15</a:t>
             </a:fld>
             <a:endParaRPr lang="en-GB"/>
           </a:p>
@@ -2715,7 +2715,7 @@
           <a:p>
             <a:fld id="{8959E172-2558-6049-8DA8-C86E1F6924DD}" type="datetimeFigureOut">
               <a:rPr lang="en-US" smtClean="0"/>
-              <a:t>06/05/15</a:t>
+              <a:t>09/05/15</a:t>
             </a:fld>
             <a:endParaRPr lang="en-GB"/>
           </a:p>
@@ -2968,7 +2968,7 @@
           <a:p>
             <a:fld id="{8959E172-2558-6049-8DA8-C86E1F6924DD}" type="datetimeFigureOut">
               <a:rPr lang="en-US" smtClean="0"/>
-              <a:t>06/05/15</a:t>
+              <a:t>09/05/15</a:t>
             </a:fld>
             <a:endParaRPr lang="en-GB"/>
           </a:p>
@@ -3181,7 +3181,7 @@
           <a:p>
             <a:fld id="{8959E172-2558-6049-8DA8-C86E1F6924DD}" type="datetimeFigureOut">
               <a:rPr lang="en-US" smtClean="0"/>
-              <a:t>06/05/15</a:t>
+              <a:t>09/05/15</a:t>
             </a:fld>
             <a:endParaRPr lang="en-GB"/>
           </a:p>
@@ -3575,22 +3575,14 @@
           <a:p>
             <a:r>
               <a:rPr lang="en-GB" dirty="0" smtClean="0"/>
-              <a:t>Advanced OpenCL </a:t>
-            </a:r>
-            <a:r>
-              <a:rPr lang="en-GB" dirty="0" smtClean="0"/>
-              <a:t>Topics:</a:t>
+              <a:t>Advanced OpenCL Topics:</a:t>
             </a:r>
             <a:br>
               <a:rPr lang="en-GB" dirty="0" smtClean="0"/>
             </a:br>
             <a:r>
               <a:rPr lang="en-GB" dirty="0" smtClean="0"/>
-              <a:t>Host</a:t>
-            </a:r>
-            <a:r>
-              <a:rPr lang="en-GB" dirty="0" smtClean="0"/>
-              <a:t>-DEVICE Interactions</a:t>
+              <a:t>Host-DEVICE Interactions</a:t>
             </a:r>
             <a:endParaRPr lang="en-GB" dirty="0"/>
           </a:p>
@@ -5806,7 +5798,7 @@
         </p:spPr>
         <p:txBody>
           <a:bodyPr>
-            <a:normAutofit fontScale="62500" lnSpcReduction="20000"/>
+            <a:normAutofit fontScale="55000" lnSpcReduction="20000"/>
           </a:bodyPr>
           <a:lstStyle/>
           <a:p>
@@ -5827,7 +5819,15 @@
             </a:r>
             <a:r>
               <a:rPr lang="en-US" dirty="0"/>
-              <a:t>for pinned memory </a:t>
+              <a:t>for </a:t>
+            </a:r>
+            <a:r>
+              <a:rPr lang="en-US" dirty="0" smtClean="0"/>
+              <a:t>allocating pinned </a:t>
+            </a:r>
+            <a:r>
+              <a:rPr lang="en-US" dirty="0"/>
+              <a:t>memory </a:t>
             </a:r>
             <a:endParaRPr lang="en-US" dirty="0" smtClean="0"/>
           </a:p>
@@ -5841,7 +5841,23 @@
             </a:pPr>
             <a:r>
               <a:rPr lang="en-US" dirty="0" smtClean="0"/>
-              <a:t>But e.g. NVIDIA supports pinned </a:t>
+              <a:t>But </a:t>
+            </a:r>
+            <a:r>
+              <a:rPr lang="en-US" dirty="0" smtClean="0"/>
+              <a:t>some vendors (e.g</a:t>
+            </a:r>
+            <a:r>
+              <a:rPr lang="en-US" dirty="0" smtClean="0"/>
+              <a:t>. </a:t>
+            </a:r>
+            <a:r>
+              <a:rPr lang="en-US" dirty="0" smtClean="0"/>
+              <a:t>NVIDIA) do support </a:t>
+            </a:r>
+            <a:r>
+              <a:rPr lang="en-US" dirty="0" smtClean="0"/>
+              <a:t>pinned </a:t>
             </a:r>
             <a:r>
               <a:rPr lang="en-US" dirty="0"/>
@@ -5849,7 +5865,22 @@
             </a:r>
             <a:r>
               <a:rPr lang="en-US" dirty="0" smtClean="0"/>
-              <a:t>allocations (</a:t>
+              <a:t>allocations</a:t>
+            </a:r>
+          </a:p>
+          <a:p>
+            <a:pPr marL="285750" indent="-285750">
+              <a:lnSpc>
+                <a:spcPct val="110000"/>
+              </a:lnSpc>
+            </a:pPr>
+            <a:r>
+              <a:rPr lang="en-US" dirty="0" smtClean="0"/>
+              <a:t>We create an additional OpenCL buffer, and supply the</a:t>
+            </a:r>
+            <a:r>
+              <a:rPr lang="en-US" dirty="0"/>
+              <a:t> </a:t>
             </a:r>
             <a:r>
               <a:rPr lang="en-US" b="1" dirty="0" smtClean="0">
@@ -5871,8 +5902,9 @@
             </a:r>
             <a:r>
               <a:rPr lang="en-US" dirty="0" smtClean="0"/>
-              <a:t>flag)</a:t>
-            </a:r>
+              <a:t>flag</a:t>
+            </a:r>
+            <a:endParaRPr lang="en-US" dirty="0" smtClean="0"/>
           </a:p>
           <a:p>
             <a:pPr marL="285750" indent="-285750">
@@ -5883,28 +5915,20 @@
               <a:buChar char="•"/>
             </a:pPr>
             <a:r>
-              <a:rPr lang="en-US" dirty="0"/>
-              <a:t>When you allocate </a:t>
-            </a:r>
-            <a:r>
-              <a:rPr lang="en-US" dirty="0" smtClean="0"/>
-              <a:t>a </a:t>
-            </a:r>
-            <a:r>
-              <a:rPr lang="en-US" dirty="0" err="1" smtClean="0"/>
-              <a:t>cl_mem</a:t>
-            </a:r>
-            <a:r>
-              <a:rPr lang="en-US" dirty="0" smtClean="0"/>
-              <a:t> object, </a:t>
-            </a:r>
-            <a:r>
-              <a:rPr lang="en-US" dirty="0"/>
-              <a:t>you also allocate page-locked host </a:t>
-            </a:r>
-            <a:r>
-              <a:rPr lang="en-US" dirty="0" smtClean="0"/>
-              <a:t>memory of the same size</a:t>
+              <a:rPr lang="en-US" dirty="0" smtClean="0"/>
+              <a:t>We never use this buffer on the device, but instead use  </a:t>
+            </a:r>
+            <a:r>
+              <a:rPr lang="en-US" b="1" dirty="0" err="1" smtClean="0"/>
+              <a:t>enqueueMapBuffer</a:t>
+            </a:r>
+            <a:r>
+              <a:rPr lang="en-US" dirty="0" smtClean="0"/>
+              <a:t> to retrieve the host </a:t>
+            </a:r>
+            <a:r>
+              <a:rPr lang="en-US" dirty="0" smtClean="0"/>
+              <a:t>pointer</a:t>
             </a:r>
           </a:p>
           <a:p>
@@ -5917,7 +5941,47 @@
             </a:pPr>
             <a:r>
               <a:rPr lang="en-US" dirty="0" smtClean="0"/>
-              <a:t>But this does not return the host pointer </a:t>
+              <a:t>We can now use this host pointer in place of regular </a:t>
+            </a:r>
+            <a:r>
+              <a:rPr lang="en-US" b="1" dirty="0" err="1" smtClean="0"/>
+              <a:t>malloc</a:t>
+            </a:r>
+            <a:r>
+              <a:rPr lang="en-US" dirty="0" smtClean="0"/>
+              <a:t>/</a:t>
+            </a:r>
+            <a:r>
+              <a:rPr lang="en-US" b="1" dirty="0" smtClean="0"/>
+              <a:t>new</a:t>
+            </a:r>
+            <a:r>
+              <a:rPr lang="en-US" dirty="0" smtClean="0"/>
+              <a:t> allocations, and as arguments to </a:t>
+            </a:r>
+            <a:r>
+              <a:rPr lang="en-US" b="1" dirty="0" err="1" smtClean="0"/>
+              <a:t>enqueueRead</a:t>
+            </a:r>
+            <a:r>
+              <a:rPr lang="en-US" dirty="0" smtClean="0"/>
+              <a:t>/</a:t>
+            </a:r>
+            <a:r>
+              <a:rPr lang="en-US" b="1" dirty="0" smtClean="0"/>
+              <a:t>Write</a:t>
+            </a:r>
+            <a:r>
+              <a:rPr lang="en-US" dirty="0" smtClean="0"/>
+              <a:t> calls (to </a:t>
+            </a:r>
+            <a:r>
+              <a:rPr lang="en-US" i="1" dirty="0" smtClean="0"/>
+              <a:t>different</a:t>
+            </a:r>
+            <a:r>
+              <a:rPr lang="en-US" dirty="0" smtClean="0"/>
+              <a:t> OpenCL buffers)</a:t>
             </a:r>
           </a:p>
           <a:p>
@@ -5930,45 +5994,21 @@
             </a:pPr>
             <a:r>
               <a:rPr lang="en-US" dirty="0" smtClean="0"/>
-              <a:t>Reading and writing data is handled by </a:t>
+              <a:t>To release this host pointer, we call </a:t>
+            </a:r>
+            <a:r>
+              <a:rPr lang="en-US" b="1" dirty="0" err="1"/>
+              <a:t>e</a:t>
             </a:r>
             <a:r>
               <a:rPr lang="en-US" b="1" dirty="0" err="1" smtClean="0"/>
-              <a:t>enqueueMapBuffer</a:t>
-            </a:r>
-            <a:r>
-              <a:rPr lang="en-US" dirty="0" smtClean="0"/>
-              <a:t>, which </a:t>
-            </a:r>
-            <a:r>
-              <a:rPr lang="en-US" i="1" dirty="0" smtClean="0"/>
-              <a:t>does</a:t>
-            </a:r>
-            <a:r>
-              <a:rPr lang="en-US" dirty="0" smtClean="0"/>
-              <a:t> return the host pointer</a:t>
-            </a:r>
-          </a:p>
-          <a:p>
-            <a:pPr marL="285750" indent="-285750">
-              <a:lnSpc>
-                <a:spcPct val="110000"/>
-              </a:lnSpc>
-              <a:buFont typeface="Arial"/>
-              <a:buChar char="•"/>
-            </a:pPr>
-            <a:r>
-              <a:rPr lang="en-US" dirty="0" smtClean="0"/>
-              <a:t>Eventually call </a:t>
-            </a:r>
-            <a:r>
-              <a:rPr lang="en-US" dirty="0" err="1" smtClean="0"/>
-              <a:t>clEnqueueUnmapMemObject</a:t>
-            </a:r>
-            <a:r>
-              <a:rPr lang="en-US" dirty="0" smtClean="0"/>
-              <a:t> when you're done</a:t>
-            </a:r>
+              <a:t>nqueueUnmapMemObject</a:t>
+            </a:r>
+            <a:r>
+              <a:rPr lang="en-US" dirty="0" smtClean="0"/>
+              <a:t> before destroying the OpenCL buffer</a:t>
+            </a:r>
+            <a:endParaRPr lang="en-US" dirty="0" smtClean="0"/>
           </a:p>
         </p:txBody>
       </p:sp>
@@ -6008,6 +6048,16 @@
               <a:t>// create </a:t>
             </a:r>
             <a:r>
+              <a:rPr lang="en-US" sz="1400" b="1" dirty="0" smtClean="0">
+                <a:solidFill>
+                  <a:srgbClr val="3366FF"/>
+                </a:solidFill>
+                <a:latin typeface="Courier New"/>
+                <a:cs typeface="Courier New"/>
+              </a:rPr>
+              <a:t>additional device </a:t>
+            </a:r>
+            <a:r>
               <a:rPr lang="en-US" sz="1400" b="1" dirty="0">
                 <a:solidFill>
                   <a:srgbClr val="3366FF"/>
@@ -6015,7 +6065,7 @@
                 <a:latin typeface="Courier New"/>
                 <a:cs typeface="Courier New"/>
               </a:rPr>
-              <a:t>device buffer</a:t>
+              <a:t>buffer</a:t>
             </a:r>
           </a:p>
           <a:p>
@@ -6043,14 +6093,14 @@
               <a:t>::Buffer </a:t>
             </a:r>
             <a:r>
-              <a:rPr lang="en-US" sz="1400" b="1" dirty="0" err="1">
-                <a:solidFill>
-                  <a:srgbClr val="3366FF"/>
-                </a:solidFill>
-                <a:latin typeface="Courier New"/>
-                <a:cs typeface="Courier New"/>
-              </a:rPr>
-              <a:t>d_buffer</a:t>
+              <a:rPr lang="en-US" sz="1400" b="1" dirty="0" err="1" smtClean="0">
+                <a:solidFill>
+                  <a:srgbClr val="3366FF"/>
+                </a:solidFill>
+                <a:latin typeface="Courier New"/>
+                <a:cs typeface="Courier New"/>
+              </a:rPr>
+              <a:t>d_pinned</a:t>
             </a:r>
             <a:r>
               <a:rPr lang="en-US" sz="1400" b="1" dirty="0" smtClean="0">
@@ -6062,6 +6112,13 @@
               </a:rPr>
               <a:t>(</a:t>
             </a:r>
+            <a:endParaRPr lang="en-US" sz="1400" b="1" dirty="0" smtClean="0">
+              <a:solidFill>
+                <a:srgbClr val="3366FF"/>
+              </a:solidFill>
+              <a:latin typeface="Courier New"/>
+              <a:cs typeface="Courier New"/>
+            </a:endParaRPr>
           </a:p>
           <a:p>
             <a:pPr marL="0" indent="0">
@@ -6103,6 +6160,16 @@
               <a:buNone/>
             </a:pPr>
             <a:r>
+              <a:rPr lang="en-US" sz="1400" b="1" dirty="0">
+                <a:solidFill>
+                  <a:srgbClr val="3366FF"/>
+                </a:solidFill>
+                <a:latin typeface="Courier New"/>
+                <a:cs typeface="Courier New"/>
+              </a:rPr>
+              <a:t> </a:t>
+            </a:r>
+            <a:r>
               <a:rPr lang="en-US" sz="1400" b="1" dirty="0" smtClean="0">
                 <a:solidFill>
                   <a:srgbClr val="3366FF"/>
@@ -6110,17 +6177,7 @@
                 <a:latin typeface="Courier New"/>
                 <a:cs typeface="Courier New"/>
               </a:rPr>
-              <a:t>  CL_MEM_READ_WRITE </a:t>
-            </a:r>
-            <a:r>
-              <a:rPr lang="en-US" sz="1400" b="1" dirty="0">
-                <a:solidFill>
-                  <a:srgbClr val="3366FF"/>
-                </a:solidFill>
-                <a:latin typeface="Courier New"/>
-                <a:cs typeface="Courier New"/>
-              </a:rPr>
-              <a:t>| </a:t>
+              <a:t> </a:t>
             </a:r>
             <a:r>
               <a:rPr lang="en-US" sz="1400" b="1" dirty="0" smtClean="0">
@@ -6130,7 +6187,17 @@
                 <a:latin typeface="Courier New"/>
                 <a:cs typeface="Courier New"/>
               </a:rPr>
-              <a:t>CL_MEM_ALLOC_HOST_PTR,</a:t>
+              <a:t>CL_MEM_ALLOC_HOST_PTR</a:t>
+            </a:r>
+            <a:r>
+              <a:rPr lang="en-US" sz="1400" b="1" dirty="0" smtClean="0">
+                <a:solidFill>
+                  <a:srgbClr val="3366FF"/>
+                </a:solidFill>
+                <a:latin typeface="Courier New"/>
+                <a:cs typeface="Courier New"/>
+              </a:rPr>
+              <a:t>,</a:t>
             </a:r>
           </a:p>
           <a:p>
@@ -6328,7 +6395,7 @@
                 <a:latin typeface="Courier New"/>
                 <a:cs typeface="Courier New"/>
               </a:rPr>
-              <a:t>d_buffer</a:t>
+              <a:t>d_pinned</a:t>
             </a:r>
             <a:r>
               <a:rPr lang="en-US" sz="1400" b="1" dirty="0" smtClean="0">
@@ -6338,7 +6405,17 @@
                 <a:latin typeface="Courier New"/>
                 <a:cs typeface="Courier New"/>
               </a:rPr>
-              <a:t>,    // device buffer</a:t>
+              <a:t>,    </a:t>
+            </a:r>
+            <a:r>
+              <a:rPr lang="en-US" sz="1400" b="1" dirty="0" smtClean="0">
+                <a:solidFill>
+                  <a:srgbClr val="3366FF"/>
+                </a:solidFill>
+                <a:latin typeface="Courier New"/>
+                <a:cs typeface="Courier New"/>
+              </a:rPr>
+              <a:t>// device buffer</a:t>
             </a:r>
             <a:endParaRPr lang="en-US" sz="1400" b="1" dirty="0">
               <a:solidFill>
@@ -6830,7 +6907,19 @@
           <a:p>
             <a:r>
               <a:rPr lang="en-US" dirty="0" smtClean="0"/>
-              <a:t>Not all platforms support pinned memory. But, the above method will still work, and at least will not be any slower than regular use</a:t>
+              <a:t>Not all platforms support pinned memory. But, the above method will still work, and </a:t>
+            </a:r>
+            <a:r>
+              <a:rPr lang="en-US" dirty="0" smtClean="0"/>
+              <a:t>should not be </a:t>
+            </a:r>
+            <a:r>
+              <a:rPr lang="en-US" dirty="0" smtClean="0"/>
+              <a:t>any </a:t>
+            </a:r>
+            <a:r>
+              <a:rPr lang="en-US" dirty="0" smtClean="0"/>
+              <a:t>slower</a:t>
             </a:r>
             <a:endParaRPr lang="en-US" dirty="0"/>
           </a:p>

</xml_diff>

<commit_message>
Added slides describing zero-copy transfers.
</commit_message>
<xml_diff>
--- a/slides/advanced_part1.pptx
+++ b/slides/advanced_part1.pptx
@@ -5,7 +5,7 @@
     <p:sldMasterId id="2147483648" r:id="rId1"/>
   </p:sldMasterIdLst>
   <p:notesMasterIdLst>
-    <p:notesMasterId r:id="rId26"/>
+    <p:notesMasterId r:id="rId27"/>
   </p:notesMasterIdLst>
   <p:sldIdLst>
     <p:sldId id="257" r:id="rId2"/>
@@ -26,12 +26,13 @@
     <p:sldId id="272" r:id="rId17"/>
     <p:sldId id="273" r:id="rId18"/>
     <p:sldId id="280" r:id="rId19"/>
-    <p:sldId id="274" r:id="rId20"/>
-    <p:sldId id="275" r:id="rId21"/>
-    <p:sldId id="276" r:id="rId22"/>
-    <p:sldId id="277" r:id="rId23"/>
-    <p:sldId id="278" r:id="rId24"/>
-    <p:sldId id="279" r:id="rId25"/>
+    <p:sldId id="282" r:id="rId20"/>
+    <p:sldId id="274" r:id="rId21"/>
+    <p:sldId id="275" r:id="rId22"/>
+    <p:sldId id="276" r:id="rId23"/>
+    <p:sldId id="277" r:id="rId24"/>
+    <p:sldId id="278" r:id="rId25"/>
+    <p:sldId id="279" r:id="rId26"/>
   </p:sldIdLst>
   <p:sldSz cx="9144000" cy="6858000" type="screen4x3"/>
   <p:notesSz cx="6858000" cy="9144000"/>
@@ -550,6 +551,91 @@
               <a:rPr lang="en-GB" smtClean="0"/>
               <a:pPr/>
               <a:t>16</a:t>
+            </a:fld>
+            <a:endParaRPr lang="en-GB"/>
+          </a:p>
+        </p:txBody>
+      </p:sp>
+    </p:spTree>
+    <p:extLst>
+      <p:ext uri="{BB962C8B-B14F-4D97-AF65-F5344CB8AC3E}">
+        <p14:creationId xmlns:p14="http://schemas.microsoft.com/office/powerpoint/2010/main" val="2737519926"/>
+      </p:ext>
+    </p:extLst>
+  </p:cSld>
+  <p:clrMapOvr>
+    <a:masterClrMapping/>
+  </p:clrMapOvr>
+</p:notes>
+</file>
+
+<file path=ppt/notesSlides/notesSlide2.xml><?xml version="1.0" encoding="utf-8"?>
+<p:notes xmlns:a="http://schemas.openxmlformats.org/drawingml/2006/main" xmlns:r="http://schemas.openxmlformats.org/officeDocument/2006/relationships" xmlns:p="http://schemas.openxmlformats.org/presentationml/2006/main">
+  <p:cSld>
+    <p:spTree>
+      <p:nvGrpSpPr>
+        <p:cNvPr id="1" name=""/>
+        <p:cNvGrpSpPr/>
+        <p:nvPr/>
+      </p:nvGrpSpPr>
+      <p:grpSpPr>
+        <a:xfrm>
+          <a:off x="0" y="0"/>
+          <a:ext cx="0" cy="0"/>
+          <a:chOff x="0" y="0"/>
+          <a:chExt cx="0" cy="0"/>
+        </a:xfrm>
+      </p:grpSpPr>
+      <p:sp>
+        <p:nvSpPr>
+          <p:cNvPr id="2" name="Slide Image Placeholder 1"/>
+          <p:cNvSpPr>
+            <a:spLocks noGrp="1" noRot="1" noChangeAspect="1"/>
+          </p:cNvSpPr>
+          <p:nvPr>
+            <p:ph type="sldImg"/>
+          </p:nvPr>
+        </p:nvSpPr>
+        <p:spPr/>
+      </p:sp>
+      <p:sp>
+        <p:nvSpPr>
+          <p:cNvPr id="3" name="Notes Placeholder 2"/>
+          <p:cNvSpPr>
+            <a:spLocks noGrp="1"/>
+          </p:cNvSpPr>
+          <p:nvPr>
+            <p:ph type="body" idx="1"/>
+          </p:nvPr>
+        </p:nvSpPr>
+        <p:spPr/>
+        <p:txBody>
+          <a:bodyPr/>
+          <a:lstStyle/>
+          <a:p>
+            <a:endParaRPr lang="en-GB" dirty="0"/>
+          </a:p>
+        </p:txBody>
+      </p:sp>
+      <p:sp>
+        <p:nvSpPr>
+          <p:cNvPr id="4" name="Slide Number Placeholder 3"/>
+          <p:cNvSpPr>
+            <a:spLocks noGrp="1"/>
+          </p:cNvSpPr>
+          <p:nvPr>
+            <p:ph type="sldNum" sz="quarter" idx="10"/>
+          </p:nvPr>
+        </p:nvSpPr>
+        <p:spPr/>
+        <p:txBody>
+          <a:bodyPr/>
+          <a:lstStyle/>
+          <a:p>
+            <a:fld id="{9B3F2D69-97A9-4C41-91BD-6A22F8270148}" type="slidenum">
+              <a:rPr lang="en-GB" smtClean="0"/>
+              <a:pPr/>
+              <a:t>19</a:t>
             </a:fld>
             <a:endParaRPr lang="en-GB"/>
           </a:p>
@@ -6546,6 +6632,16 @@
               <a:t>bufferSize</a:t>
             </a:r>
             <a:r>
+              <a:rPr lang="en-US" sz="1400" b="1" dirty="0">
+                <a:solidFill>
+                  <a:srgbClr val="3366FF"/>
+                </a:solidFill>
+                <a:latin typeface="Courier New"/>
+                <a:cs typeface="Courier New"/>
+              </a:rPr>
+              <a:t> </a:t>
+            </a:r>
+            <a:r>
               <a:rPr lang="en-US" sz="1400" b="1" dirty="0" smtClean="0">
                 <a:solidFill>
                   <a:srgbClr val="3366FF"/>
@@ -6553,7 +6649,17 @@
                 <a:latin typeface="Courier New"/>
                 <a:cs typeface="Courier New"/>
               </a:rPr>
-              <a:t>,  // amount of data to be mapped</a:t>
+              <a:t>  </a:t>
+            </a:r>
+            <a:r>
+              <a:rPr lang="en-US" sz="1400" b="1" dirty="0" smtClean="0">
+                <a:solidFill>
+                  <a:srgbClr val="3366FF"/>
+                </a:solidFill>
+                <a:latin typeface="Courier New"/>
+                <a:cs typeface="Courier New"/>
+              </a:rPr>
+              <a:t>// amount of data to be mapped</a:t>
             </a:r>
             <a:endParaRPr lang="en-US" sz="1400" b="1" dirty="0">
               <a:solidFill>
@@ -6602,7 +6708,17 @@
                 <a:latin typeface="Courier New"/>
                 <a:cs typeface="Courier New"/>
               </a:rPr>
-              <a:t>// use buffer</a:t>
+              <a:t>// use </a:t>
+            </a:r>
+            <a:r>
+              <a:rPr lang="en-US" sz="1400" b="1" dirty="0" smtClean="0">
+                <a:solidFill>
+                  <a:srgbClr val="3366FF"/>
+                </a:solidFill>
+                <a:latin typeface="Courier New"/>
+                <a:cs typeface="Courier New"/>
+              </a:rPr>
+              <a:t>buffer</a:t>
             </a:r>
           </a:p>
           <a:p>
@@ -6684,7 +6800,7 @@
                 <a:latin typeface="Courier New"/>
                 <a:cs typeface="Courier New"/>
               </a:rPr>
-              <a:t>d_buffer</a:t>
+              <a:t>d_pinned</a:t>
             </a:r>
             <a:r>
               <a:rPr lang="en-US" sz="1400" b="1" dirty="0" smtClean="0">
@@ -6734,7 +6850,7 @@
         </p:nvSpPr>
         <p:spPr>
           <a:xfrm>
-            <a:off x="4067944" y="6093296"/>
+            <a:off x="4067944" y="6247711"/>
             <a:ext cx="5076056" cy="461665"/>
           </a:xfrm>
           <a:prstGeom prst="rect">
@@ -6979,7 +7095,11 @@
           <a:p>
             <a:r>
               <a:rPr lang="en-US" dirty="0" smtClean="0"/>
-              <a:t>Zero copy transfers</a:t>
+              <a:t>Zero-copy </a:t>
+            </a:r>
+            <a:r>
+              <a:rPr lang="en-US" dirty="0" smtClean="0"/>
+              <a:t>transfers</a:t>
             </a:r>
             <a:endParaRPr lang="en-US" dirty="0"/>
           </a:p>
@@ -6997,8 +7117,63 @@
         </p:nvSpPr>
         <p:spPr/>
         <p:txBody>
-          <a:bodyPr/>
+          <a:bodyPr>
+            <a:normAutofit fontScale="92500" lnSpcReduction="20000"/>
+          </a:bodyPr>
           <a:lstStyle/>
+          <a:p>
+            <a:r>
+              <a:rPr lang="en-US" dirty="0" smtClean="0"/>
+              <a:t>Some OpenCL platforms provide devices that have (physically) unified memory with the host</a:t>
+            </a:r>
+          </a:p>
+          <a:p>
+            <a:pPr lvl="1"/>
+            <a:r>
+              <a:rPr lang="en-US" dirty="0" smtClean="0"/>
+              <a:t>Mobile/integrated GPUs</a:t>
+            </a:r>
+          </a:p>
+          <a:p>
+            <a:pPr lvl="1"/>
+            <a:r>
+              <a:rPr lang="en-US" dirty="0" smtClean="0"/>
+              <a:t>CPU devices</a:t>
+            </a:r>
+          </a:p>
+          <a:p>
+            <a:r>
+              <a:rPr lang="en-US" dirty="0" smtClean="0"/>
+              <a:t>We can detect these devices by querying the </a:t>
+            </a:r>
+            <a:r>
+              <a:rPr lang="en-US" b="1" dirty="0" smtClean="0">
+                <a:solidFill>
+                  <a:srgbClr val="3366FF"/>
+                </a:solidFill>
+                <a:latin typeface="Courier New"/>
+                <a:cs typeface="Courier New"/>
+              </a:rPr>
+              <a:t>CL_DEVICE_HOST_UNIFIED_MEMORY</a:t>
+            </a:r>
+            <a:r>
+              <a:rPr lang="en-US" dirty="0" smtClean="0"/>
+              <a:t> flag</a:t>
+            </a:r>
+            <a:endParaRPr lang="en-US" dirty="0" smtClean="0"/>
+          </a:p>
+          <a:p>
+            <a:r>
+              <a:rPr lang="en-US" dirty="0" smtClean="0"/>
+              <a:t>On these devices, it is wasteful to copy data between the host and device</a:t>
+            </a:r>
+          </a:p>
+          <a:p>
+            <a:r>
+              <a:rPr lang="en-US" dirty="0" smtClean="0"/>
+              <a:t>We can instead create our buffers in a way that both the host and device can directly access the same region of memory</a:t>
+            </a:r>
+          </a:p>
           <a:p>
             <a:endParaRPr lang="en-US" dirty="0"/>
           </a:p>
@@ -7051,14 +7226,19 @@
             <p:ph type="title"/>
           </p:nvPr>
         </p:nvSpPr>
-        <p:spPr/>
+        <p:spPr>
+          <a:xfrm>
+            <a:off x="467544" y="0"/>
+            <a:ext cx="8229600" cy="980728"/>
+          </a:xfrm>
+        </p:spPr>
         <p:txBody>
           <a:bodyPr/>
           <a:lstStyle/>
           <a:p>
             <a:r>
               <a:rPr lang="en-US" dirty="0" smtClean="0"/>
-              <a:t>Multiple Devices</a:t>
+              <a:t>Zero-copy transfers</a:t>
             </a:r>
             <a:endParaRPr lang="en-US" dirty="0"/>
           </a:p>
@@ -7066,63 +7246,1081 @@
       </p:sp>
       <p:sp>
         <p:nvSpPr>
-          <p:cNvPr id="3" name="Content Placeholder 2"/>
+          <p:cNvPr id="4" name="Text Placeholder 3"/>
           <p:cNvSpPr>
             <a:spLocks noGrp="1"/>
           </p:cNvSpPr>
           <p:nvPr>
-            <p:ph idx="1"/>
-          </p:nvPr>
-        </p:nvSpPr>
-        <p:spPr/>
+            <p:ph type="body" sz="half" idx="4294967295"/>
+          </p:nvPr>
+        </p:nvSpPr>
+        <p:spPr>
+          <a:xfrm>
+            <a:off x="0" y="980728"/>
+            <a:ext cx="3779912" cy="5616624"/>
+          </a:xfrm>
+        </p:spPr>
         <p:txBody>
           <a:bodyPr>
-            <a:normAutofit fontScale="92500"/>
+            <a:normAutofit fontScale="62500" lnSpcReduction="20000"/>
           </a:bodyPr>
           <a:lstStyle/>
           <a:p>
-            <a:r>
-              <a:rPr lang="en-US" dirty="0" smtClean="0"/>
-              <a:t>Running across multiple devices can deliver better performance (if your problem scales well)</a:t>
-            </a:r>
-          </a:p>
-          <a:p>
-            <a:r>
-              <a:rPr lang="en-US" dirty="0" smtClean="0"/>
-              <a:t>But have to manually partition problem / load balance</a:t>
-            </a:r>
-          </a:p>
-          <a:p>
-            <a:r>
-              <a:rPr lang="en-US" dirty="0" smtClean="0"/>
-              <a:t>Remember, the cost of moving data to/from a device is much greater than normal </a:t>
-            </a:r>
-            <a:r>
-              <a:rPr lang="en-US" dirty="0" err="1" smtClean="0"/>
-              <a:t>memcpy's</a:t>
-            </a:r>
-            <a:r>
-              <a:rPr lang="en-US" dirty="0" smtClean="0"/>
-              <a:t>, so avoid where possible</a:t>
-            </a:r>
-          </a:p>
-          <a:p>
-            <a:r>
-              <a:rPr lang="en-US" dirty="0" smtClean="0"/>
-              <a:t>There are a couple of options for using multiple devices within </a:t>
-            </a:r>
-            <a:r>
-              <a:rPr lang="en-US" dirty="0" err="1" smtClean="0"/>
-              <a:t>OpenCL</a:t>
-            </a:r>
+            <a:pPr marL="285750" indent="-285750">
+              <a:lnSpc>
+                <a:spcPct val="110000"/>
+              </a:lnSpc>
+            </a:pPr>
+            <a:endParaRPr lang="en-US" dirty="0" smtClean="0"/>
+          </a:p>
+          <a:p>
+            <a:pPr marL="285750" indent="-285750">
+              <a:lnSpc>
+                <a:spcPct val="110000"/>
+              </a:lnSpc>
+            </a:pPr>
             <a:endParaRPr lang="en-US" dirty="0"/>
+          </a:p>
+          <a:p>
+            <a:pPr marL="285750" indent="-285750">
+              <a:lnSpc>
+                <a:spcPct val="110000"/>
+              </a:lnSpc>
+            </a:pPr>
+            <a:r>
+              <a:rPr lang="en-US" dirty="0" smtClean="0"/>
+              <a:t>The OpenCL specification doesn’t describe zero-copy transfers, but all the vendors that support this recommend the same approach</a:t>
+            </a:r>
+          </a:p>
+          <a:p>
+            <a:pPr marL="285750" indent="-285750">
+              <a:lnSpc>
+                <a:spcPct val="110000"/>
+              </a:lnSpc>
+            </a:pPr>
+            <a:r>
+              <a:rPr lang="en-US" dirty="0" smtClean="0"/>
+              <a:t>We supply the</a:t>
+            </a:r>
+            <a:r>
+              <a:rPr lang="en-US" dirty="0"/>
+              <a:t> </a:t>
+            </a:r>
+            <a:r>
+              <a:rPr lang="en-US" b="1" dirty="0" smtClean="0">
+                <a:solidFill>
+                  <a:srgbClr val="3366FF"/>
+                </a:solidFill>
+                <a:latin typeface="Courier New"/>
+                <a:cs typeface="Courier New"/>
+              </a:rPr>
+              <a:t>CL_MEM_ALLOC_HOST_PTR</a:t>
+            </a:r>
+            <a:r>
+              <a:rPr lang="en-US" dirty="0" smtClean="0">
+                <a:solidFill>
+                  <a:srgbClr val="3366FF"/>
+                </a:solidFill>
+              </a:rPr>
+              <a:t> </a:t>
+            </a:r>
+            <a:r>
+              <a:rPr lang="en-US" dirty="0" smtClean="0"/>
+              <a:t>flag when creating our device buffer</a:t>
+            </a:r>
+            <a:endParaRPr lang="en-US" dirty="0" smtClean="0"/>
+          </a:p>
+          <a:p>
+            <a:pPr marL="285750" indent="-285750">
+              <a:lnSpc>
+                <a:spcPct val="110000"/>
+              </a:lnSpc>
+              <a:buFont typeface="Arial"/>
+              <a:buChar char="•"/>
+            </a:pPr>
+            <a:r>
+              <a:rPr lang="en-US" dirty="0" smtClean="0"/>
+              <a:t>When we want to access the memory from the host, we map the buffer</a:t>
+            </a:r>
+          </a:p>
+          <a:p>
+            <a:pPr marL="285750" indent="-285750">
+              <a:lnSpc>
+                <a:spcPct val="110000"/>
+              </a:lnSpc>
+              <a:buFont typeface="Arial"/>
+              <a:buChar char="•"/>
+            </a:pPr>
+            <a:r>
+              <a:rPr lang="en-US" dirty="0" smtClean="0"/>
+              <a:t>The buffer </a:t>
+            </a:r>
+            <a:r>
+              <a:rPr lang="en-US" b="1" dirty="0" smtClean="0"/>
+              <a:t>must</a:t>
+            </a:r>
+            <a:r>
+              <a:rPr lang="en-US" dirty="0" smtClean="0"/>
+              <a:t> be unmapped before we can use it on the device again</a:t>
+            </a:r>
+          </a:p>
+        </p:txBody>
+      </p:sp>
+      <p:sp>
+        <p:nvSpPr>
+          <p:cNvPr id="6" name="Content Placeholder 3"/>
+          <p:cNvSpPr>
+            <a:spLocks noGrp="1"/>
+          </p:cNvSpPr>
+          <p:nvPr>
+            <p:ph idx="4294967295"/>
+          </p:nvPr>
+        </p:nvSpPr>
+        <p:spPr>
+          <a:xfrm>
+            <a:off x="4032250" y="836613"/>
+            <a:ext cx="5111750" cy="5853112"/>
+          </a:xfrm>
+        </p:spPr>
+        <p:txBody>
+          <a:bodyPr>
+            <a:normAutofit lnSpcReduction="10000"/>
+          </a:bodyPr>
+          <a:lstStyle/>
+          <a:p>
+            <a:pPr marL="0" indent="0">
+              <a:buNone/>
+            </a:pPr>
+            <a:r>
+              <a:rPr lang="en-US" sz="1400" b="1" dirty="0" smtClean="0">
+                <a:solidFill>
+                  <a:srgbClr val="3366FF"/>
+                </a:solidFill>
+                <a:latin typeface="Courier New"/>
+                <a:cs typeface="Courier New"/>
+              </a:rPr>
+              <a:t>// create </a:t>
+            </a:r>
+            <a:r>
+              <a:rPr lang="en-US" sz="1400" b="1" dirty="0" smtClean="0">
+                <a:solidFill>
+                  <a:srgbClr val="3366FF"/>
+                </a:solidFill>
+                <a:latin typeface="Courier New"/>
+                <a:cs typeface="Courier New"/>
+              </a:rPr>
+              <a:t>device buffer in host-accessible </a:t>
+            </a:r>
+            <a:r>
+              <a:rPr lang="en-US" sz="1400" b="1" dirty="0" err="1" smtClean="0">
+                <a:solidFill>
+                  <a:srgbClr val="3366FF"/>
+                </a:solidFill>
+                <a:latin typeface="Courier New"/>
+                <a:cs typeface="Courier New"/>
+              </a:rPr>
+              <a:t>mem</a:t>
+            </a:r>
+            <a:endParaRPr lang="en-US" sz="1400" b="1" dirty="0">
+              <a:solidFill>
+                <a:srgbClr val="3366FF"/>
+              </a:solidFill>
+              <a:latin typeface="Courier New"/>
+              <a:cs typeface="Courier New"/>
+            </a:endParaRPr>
+          </a:p>
+          <a:p>
+            <a:pPr marL="0" indent="0">
+              <a:buNone/>
+            </a:pPr>
+            <a:r>
+              <a:rPr lang="en-US" sz="1400" b="1" dirty="0" smtClean="0">
+                <a:solidFill>
+                  <a:srgbClr val="3366FF"/>
+                </a:solidFill>
+                <a:latin typeface="Courier New"/>
+                <a:cs typeface="Courier New"/>
+              </a:rPr>
+              <a:t>cl</a:t>
+            </a:r>
+            <a:r>
+              <a:rPr lang="en-US" sz="1400" b="1" dirty="0">
+                <a:solidFill>
+                  <a:srgbClr val="3366FF"/>
+                </a:solidFill>
+                <a:latin typeface="Courier New"/>
+                <a:cs typeface="Courier New"/>
+              </a:rPr>
+              <a:t>::Buffer </a:t>
+            </a:r>
+            <a:r>
+              <a:rPr lang="en-US" sz="1400" b="1" dirty="0" err="1" smtClean="0">
+                <a:solidFill>
+                  <a:srgbClr val="3366FF"/>
+                </a:solidFill>
+                <a:latin typeface="Courier New"/>
+                <a:cs typeface="Courier New"/>
+              </a:rPr>
+              <a:t>d_buffer</a:t>
+            </a:r>
+            <a:r>
+              <a:rPr lang="en-US" sz="1400" b="1" dirty="0" smtClean="0">
+                <a:solidFill>
+                  <a:srgbClr val="3366FF"/>
+                </a:solidFill>
+                <a:latin typeface="Courier New"/>
+                <a:cs typeface="Courier New"/>
+              </a:rPr>
+              <a:t>(</a:t>
+            </a:r>
+            <a:endParaRPr lang="en-US" sz="1400" b="1" dirty="0" smtClean="0">
+              <a:solidFill>
+                <a:srgbClr val="3366FF"/>
+              </a:solidFill>
+              <a:latin typeface="Courier New"/>
+              <a:cs typeface="Courier New"/>
+            </a:endParaRPr>
+          </a:p>
+          <a:p>
+            <a:pPr marL="0" indent="0">
+              <a:buNone/>
+            </a:pPr>
+            <a:r>
+              <a:rPr lang="en-US" sz="1400" b="1" dirty="0">
+                <a:solidFill>
+                  <a:srgbClr val="3366FF"/>
+                </a:solidFill>
+                <a:latin typeface="Courier New"/>
+                <a:cs typeface="Courier New"/>
+              </a:rPr>
+              <a:t> </a:t>
+            </a:r>
+            <a:r>
+              <a:rPr lang="en-US" sz="1400" b="1" dirty="0" smtClean="0">
+                <a:solidFill>
+                  <a:srgbClr val="3366FF"/>
+                </a:solidFill>
+                <a:latin typeface="Courier New"/>
+                <a:cs typeface="Courier New"/>
+              </a:rPr>
+              <a:t> context</a:t>
+            </a:r>
+            <a:r>
+              <a:rPr lang="en-US" sz="1400" b="1" dirty="0">
+                <a:solidFill>
+                  <a:srgbClr val="3366FF"/>
+                </a:solidFill>
+                <a:latin typeface="Courier New"/>
+                <a:cs typeface="Courier New"/>
+              </a:rPr>
+              <a:t>,                      </a:t>
+            </a:r>
+          </a:p>
+          <a:p>
+            <a:pPr marL="0" indent="0">
+              <a:buNone/>
+            </a:pPr>
+            <a:r>
+              <a:rPr lang="en-US" sz="1400" b="1" dirty="0">
+                <a:solidFill>
+                  <a:srgbClr val="3366FF"/>
+                </a:solidFill>
+                <a:latin typeface="Courier New"/>
+                <a:cs typeface="Courier New"/>
+              </a:rPr>
+              <a:t> </a:t>
+            </a:r>
+            <a:r>
+              <a:rPr lang="en-US" sz="1400" b="1" dirty="0" smtClean="0">
+                <a:solidFill>
+                  <a:srgbClr val="3366FF"/>
+                </a:solidFill>
+                <a:latin typeface="Courier New"/>
+                <a:cs typeface="Courier New"/>
+              </a:rPr>
+              <a:t> CL_MEM_READ_WRITE | </a:t>
+            </a:r>
+            <a:r>
+              <a:rPr lang="en-US" sz="1400" b="1" dirty="0" smtClean="0">
+                <a:solidFill>
+                  <a:srgbClr val="3366FF"/>
+                </a:solidFill>
+                <a:latin typeface="Courier New"/>
+                <a:cs typeface="Courier New"/>
+              </a:rPr>
+              <a:t>CL_MEM_ALLOC_HOST_PTR</a:t>
+            </a:r>
+            <a:r>
+              <a:rPr lang="en-US" sz="1400" b="1" dirty="0" smtClean="0">
+                <a:solidFill>
+                  <a:srgbClr val="3366FF"/>
+                </a:solidFill>
+                <a:latin typeface="Courier New"/>
+                <a:cs typeface="Courier New"/>
+              </a:rPr>
+              <a:t>,</a:t>
+            </a:r>
+          </a:p>
+          <a:p>
+            <a:pPr marL="0" indent="0">
+              <a:buNone/>
+            </a:pPr>
+            <a:r>
+              <a:rPr lang="en-US" sz="1400" b="1" dirty="0" smtClean="0">
+                <a:solidFill>
+                  <a:srgbClr val="3366FF"/>
+                </a:solidFill>
+                <a:latin typeface="Courier New"/>
+                <a:cs typeface="Courier New"/>
+              </a:rPr>
+              <a:t>  </a:t>
+            </a:r>
+            <a:r>
+              <a:rPr lang="en-US" sz="1400" b="1" dirty="0" err="1" smtClean="0">
+                <a:solidFill>
+                  <a:srgbClr val="3366FF"/>
+                </a:solidFill>
+                <a:latin typeface="Courier New"/>
+                <a:cs typeface="Courier New"/>
+              </a:rPr>
+              <a:t>bufferSize</a:t>
+            </a:r>
+            <a:r>
+              <a:rPr lang="en-US" sz="1400" b="1" dirty="0">
+                <a:solidFill>
+                  <a:srgbClr val="3366FF"/>
+                </a:solidFill>
+                <a:latin typeface="Courier New"/>
+                <a:cs typeface="Courier New"/>
+              </a:rPr>
+              <a:t>)</a:t>
+            </a:r>
+            <a:r>
+              <a:rPr lang="en-US" sz="1400" b="1" dirty="0" smtClean="0">
+                <a:solidFill>
+                  <a:srgbClr val="3366FF"/>
+                </a:solidFill>
+                <a:latin typeface="Courier New"/>
+                <a:cs typeface="Courier New"/>
+              </a:rPr>
+              <a:t>;</a:t>
+            </a:r>
+            <a:endParaRPr lang="en-US" sz="1400" b="1" dirty="0">
+              <a:solidFill>
+                <a:srgbClr val="3366FF"/>
+              </a:solidFill>
+              <a:latin typeface="Courier New"/>
+              <a:cs typeface="Courier New"/>
+            </a:endParaRPr>
+          </a:p>
+          <a:p>
+            <a:pPr marL="0" indent="0">
+              <a:buNone/>
+            </a:pPr>
+            <a:endParaRPr lang="en-US" sz="1400" b="1" dirty="0" smtClean="0">
+              <a:solidFill>
+                <a:srgbClr val="3366FF"/>
+              </a:solidFill>
+              <a:latin typeface="Courier New"/>
+              <a:cs typeface="Courier New"/>
+            </a:endParaRPr>
+          </a:p>
+          <a:p>
+            <a:pPr marL="0" indent="0">
+              <a:buNone/>
+            </a:pPr>
+            <a:r>
+              <a:rPr lang="en-US" sz="1400" b="1" dirty="0" smtClean="0">
+                <a:solidFill>
+                  <a:srgbClr val="3366FF"/>
+                </a:solidFill>
+                <a:latin typeface="Courier New"/>
+                <a:cs typeface="Courier New"/>
+              </a:rPr>
+              <a:t>// map </a:t>
+            </a:r>
+            <a:r>
+              <a:rPr lang="en-US" sz="1400" b="1" dirty="0" smtClean="0">
+                <a:solidFill>
+                  <a:srgbClr val="3366FF"/>
+                </a:solidFill>
+                <a:latin typeface="Courier New"/>
+                <a:cs typeface="Courier New"/>
+              </a:rPr>
+              <a:t>buffer into host address space</a:t>
+            </a:r>
+            <a:endParaRPr lang="en-US" sz="1400" b="1" dirty="0">
+              <a:solidFill>
+                <a:srgbClr val="3366FF"/>
+              </a:solidFill>
+              <a:latin typeface="Courier New"/>
+              <a:cs typeface="Courier New"/>
+            </a:endParaRPr>
+          </a:p>
+          <a:p>
+            <a:pPr marL="0" indent="0">
+              <a:buNone/>
+            </a:pPr>
+            <a:r>
+              <a:rPr lang="en-US" sz="1400" b="1" dirty="0">
+                <a:solidFill>
+                  <a:srgbClr val="3366FF"/>
+                </a:solidFill>
+                <a:latin typeface="Courier New"/>
+                <a:cs typeface="Courier New"/>
+              </a:rPr>
+              <a:t>float </a:t>
+            </a:r>
+            <a:r>
+              <a:rPr lang="en-US" sz="1400" b="1" dirty="0" smtClean="0">
+                <a:solidFill>
+                  <a:srgbClr val="3366FF"/>
+                </a:solidFill>
+                <a:latin typeface="Courier New"/>
+                <a:cs typeface="Courier New"/>
+              </a:rPr>
+              <a:t>*</a:t>
+            </a:r>
+            <a:r>
+              <a:rPr lang="en-US" sz="1400" b="1" dirty="0" err="1" smtClean="0">
+                <a:solidFill>
+                  <a:srgbClr val="3366FF"/>
+                </a:solidFill>
+                <a:latin typeface="Courier New"/>
+                <a:cs typeface="Courier New"/>
+              </a:rPr>
+              <a:t>h_ptr</a:t>
+            </a:r>
+            <a:r>
+              <a:rPr lang="en-US" sz="1400" b="1" dirty="0" smtClean="0">
+                <a:solidFill>
+                  <a:srgbClr val="3366FF"/>
+                </a:solidFill>
+                <a:latin typeface="Courier New"/>
+                <a:cs typeface="Courier New"/>
+              </a:rPr>
+              <a:t> = </a:t>
+            </a:r>
+            <a:endParaRPr lang="en-US" sz="1400" b="1" dirty="0">
+              <a:solidFill>
+                <a:srgbClr val="3366FF"/>
+              </a:solidFill>
+              <a:latin typeface="Courier New"/>
+              <a:cs typeface="Courier New"/>
+            </a:endParaRPr>
+          </a:p>
+          <a:p>
+            <a:pPr marL="0" indent="0">
+              <a:buNone/>
+            </a:pPr>
+            <a:r>
+              <a:rPr lang="en-US" sz="1400" b="1" dirty="0" smtClean="0">
+                <a:solidFill>
+                  <a:srgbClr val="3366FF"/>
+                </a:solidFill>
+                <a:latin typeface="Courier New"/>
+                <a:cs typeface="Courier New"/>
+              </a:rPr>
+              <a:t>(</a:t>
+            </a:r>
+            <a:r>
+              <a:rPr lang="en-US" sz="1400" b="1" dirty="0">
+                <a:solidFill>
+                  <a:srgbClr val="3366FF"/>
+                </a:solidFill>
+                <a:latin typeface="Courier New"/>
+                <a:cs typeface="Courier New"/>
+              </a:rPr>
+              <a:t>float *) </a:t>
+            </a:r>
+            <a:r>
+              <a:rPr lang="en-US" sz="1400" b="1" dirty="0" err="1" smtClean="0">
+                <a:solidFill>
+                  <a:srgbClr val="3366FF"/>
+                </a:solidFill>
+                <a:latin typeface="Courier New"/>
+                <a:cs typeface="Courier New"/>
+              </a:rPr>
+              <a:t>queue.enqueueMapBuffer</a:t>
+            </a:r>
+            <a:r>
+              <a:rPr lang="en-US" sz="1400" b="1" dirty="0" smtClean="0">
+                <a:solidFill>
+                  <a:srgbClr val="3366FF"/>
+                </a:solidFill>
+                <a:latin typeface="Courier New"/>
+                <a:cs typeface="Courier New"/>
+              </a:rPr>
+              <a:t>(</a:t>
+            </a:r>
+            <a:endParaRPr lang="en-US" sz="1400" b="1" dirty="0">
+              <a:solidFill>
+                <a:srgbClr val="3366FF"/>
+              </a:solidFill>
+              <a:latin typeface="Courier New"/>
+              <a:cs typeface="Courier New"/>
+            </a:endParaRPr>
+          </a:p>
+          <a:p>
+            <a:pPr marL="0" indent="0">
+              <a:buNone/>
+            </a:pPr>
+            <a:r>
+              <a:rPr lang="en-US" sz="1400" b="1" dirty="0" smtClean="0">
+                <a:solidFill>
+                  <a:srgbClr val="3366FF"/>
+                </a:solidFill>
+                <a:latin typeface="Courier New"/>
+                <a:cs typeface="Courier New"/>
+              </a:rPr>
+              <a:t>  </a:t>
+            </a:r>
+            <a:r>
+              <a:rPr lang="en-US" sz="1400" b="1" dirty="0" err="1" smtClean="0">
+                <a:solidFill>
+                  <a:srgbClr val="3366FF"/>
+                </a:solidFill>
+                <a:latin typeface="Courier New"/>
+                <a:cs typeface="Courier New"/>
+              </a:rPr>
+              <a:t>d_buffer</a:t>
+            </a:r>
+            <a:r>
+              <a:rPr lang="en-US" sz="1400" b="1" dirty="0" smtClean="0">
+                <a:solidFill>
+                  <a:srgbClr val="3366FF"/>
+                </a:solidFill>
+                <a:latin typeface="Courier New"/>
+                <a:cs typeface="Courier New"/>
+              </a:rPr>
+              <a:t>,     </a:t>
+            </a:r>
+            <a:r>
+              <a:rPr lang="en-US" sz="1400" b="1" dirty="0" smtClean="0">
+                <a:solidFill>
+                  <a:srgbClr val="3366FF"/>
+                </a:solidFill>
+                <a:latin typeface="Courier New"/>
+                <a:cs typeface="Courier New"/>
+              </a:rPr>
+              <a:t>// device buffer</a:t>
+            </a:r>
+            <a:endParaRPr lang="en-US" sz="1400" b="1" dirty="0">
+              <a:solidFill>
+                <a:srgbClr val="3366FF"/>
+              </a:solidFill>
+              <a:latin typeface="Courier New"/>
+              <a:cs typeface="Courier New"/>
+            </a:endParaRPr>
+          </a:p>
+          <a:p>
+            <a:pPr marL="0" indent="0">
+              <a:buNone/>
+            </a:pPr>
+            <a:r>
+              <a:rPr lang="en-US" sz="1400" b="1" dirty="0">
+                <a:solidFill>
+                  <a:srgbClr val="3366FF"/>
+                </a:solidFill>
+                <a:latin typeface="Courier New"/>
+                <a:cs typeface="Courier New"/>
+              </a:rPr>
+              <a:t>  CL_TRUE, </a:t>
+            </a:r>
+            <a:r>
+              <a:rPr lang="en-US" sz="1400" b="1" dirty="0" smtClean="0">
+                <a:solidFill>
+                  <a:srgbClr val="3366FF"/>
+                </a:solidFill>
+                <a:latin typeface="Courier New"/>
+                <a:cs typeface="Courier New"/>
+              </a:rPr>
+              <a:t>   </a:t>
+            </a:r>
+            <a:r>
+              <a:rPr lang="en-US" sz="1400" b="1" dirty="0" smtClean="0">
+                <a:solidFill>
+                  <a:srgbClr val="3366FF"/>
+                </a:solidFill>
+                <a:latin typeface="Courier New"/>
+                <a:cs typeface="Courier New"/>
+              </a:rPr>
+              <a:t>  </a:t>
+            </a:r>
+            <a:r>
+              <a:rPr lang="en-US" sz="1400" b="1" dirty="0" smtClean="0">
+                <a:solidFill>
+                  <a:srgbClr val="3366FF"/>
+                </a:solidFill>
+                <a:latin typeface="Courier New"/>
+                <a:cs typeface="Courier New"/>
+              </a:rPr>
+              <a:t>// blocking map</a:t>
+            </a:r>
+            <a:endParaRPr lang="en-US" sz="1400" b="1" dirty="0">
+              <a:solidFill>
+                <a:srgbClr val="3366FF"/>
+              </a:solidFill>
+              <a:latin typeface="Courier New"/>
+              <a:cs typeface="Courier New"/>
+            </a:endParaRPr>
+          </a:p>
+          <a:p>
+            <a:pPr marL="0" indent="0">
+              <a:buNone/>
+            </a:pPr>
+            <a:r>
+              <a:rPr lang="en-US" sz="1400" b="1" dirty="0">
+                <a:solidFill>
+                  <a:srgbClr val="3366FF"/>
+                </a:solidFill>
+                <a:latin typeface="Courier New"/>
+                <a:cs typeface="Courier New"/>
+              </a:rPr>
+              <a:t>  </a:t>
+            </a:r>
+            <a:r>
+              <a:rPr lang="en-US" sz="1400" b="1" dirty="0" smtClean="0">
+                <a:solidFill>
+                  <a:srgbClr val="3366FF"/>
+                </a:solidFill>
+                <a:latin typeface="Courier New"/>
+                <a:cs typeface="Courier New"/>
+              </a:rPr>
+              <a:t>CL_MAP_WRITE, </a:t>
+            </a:r>
+            <a:r>
+              <a:rPr lang="en-US" sz="1400" b="1" dirty="0" smtClean="0">
+                <a:solidFill>
+                  <a:srgbClr val="3366FF"/>
+                </a:solidFill>
+                <a:latin typeface="Courier New"/>
+                <a:cs typeface="Courier New"/>
+              </a:rPr>
+              <a:t>// read data*</a:t>
+            </a:r>
+            <a:endParaRPr lang="en-US" sz="1400" b="1" dirty="0">
+              <a:solidFill>
+                <a:srgbClr val="3366FF"/>
+              </a:solidFill>
+              <a:latin typeface="Courier New"/>
+              <a:cs typeface="Courier New"/>
+            </a:endParaRPr>
+          </a:p>
+          <a:p>
+            <a:pPr marL="0" indent="0">
+              <a:buNone/>
+            </a:pPr>
+            <a:r>
+              <a:rPr lang="en-US" sz="1400" b="1" dirty="0">
+                <a:solidFill>
+                  <a:srgbClr val="3366FF"/>
+                </a:solidFill>
+                <a:latin typeface="Courier New"/>
+                <a:cs typeface="Courier New"/>
+              </a:rPr>
+              <a:t>  0, </a:t>
+            </a:r>
+            <a:r>
+              <a:rPr lang="en-US" sz="1400" b="1" dirty="0" smtClean="0">
+                <a:solidFill>
+                  <a:srgbClr val="3366FF"/>
+                </a:solidFill>
+                <a:latin typeface="Courier New"/>
+                <a:cs typeface="Courier New"/>
+              </a:rPr>
+              <a:t>         </a:t>
+            </a:r>
+            <a:r>
+              <a:rPr lang="en-US" sz="1400" b="1" dirty="0" smtClean="0">
+                <a:solidFill>
+                  <a:srgbClr val="3366FF"/>
+                </a:solidFill>
+                <a:latin typeface="Courier New"/>
+                <a:cs typeface="Courier New"/>
+              </a:rPr>
+              <a:t>  </a:t>
+            </a:r>
+            <a:r>
+              <a:rPr lang="en-US" sz="1400" b="1" dirty="0" smtClean="0">
+                <a:solidFill>
+                  <a:srgbClr val="3366FF"/>
+                </a:solidFill>
+                <a:latin typeface="Courier New"/>
+                <a:cs typeface="Courier New"/>
+              </a:rPr>
+              <a:t>// offset of region</a:t>
+            </a:r>
+            <a:endParaRPr lang="en-US" sz="1400" b="1" dirty="0">
+              <a:solidFill>
+                <a:srgbClr val="3366FF"/>
+              </a:solidFill>
+              <a:latin typeface="Courier New"/>
+              <a:cs typeface="Courier New"/>
+            </a:endParaRPr>
+          </a:p>
+          <a:p>
+            <a:pPr marL="0" indent="0">
+              <a:buNone/>
+            </a:pPr>
+            <a:r>
+              <a:rPr lang="en-US" sz="1400" b="1" dirty="0">
+                <a:solidFill>
+                  <a:srgbClr val="3366FF"/>
+                </a:solidFill>
+                <a:latin typeface="Courier New"/>
+                <a:cs typeface="Courier New"/>
+              </a:rPr>
+              <a:t>  </a:t>
+            </a:r>
+            <a:r>
+              <a:rPr lang="en-US" sz="1400" b="1" dirty="0" err="1" smtClean="0">
+                <a:solidFill>
+                  <a:srgbClr val="3366FF"/>
+                </a:solidFill>
+                <a:latin typeface="Courier New"/>
+                <a:cs typeface="Courier New"/>
+              </a:rPr>
+              <a:t>bufferSize</a:t>
+            </a:r>
+            <a:r>
+              <a:rPr lang="en-US" sz="1400" b="1" dirty="0" smtClean="0">
+                <a:solidFill>
+                  <a:srgbClr val="3366FF"/>
+                </a:solidFill>
+                <a:latin typeface="Courier New"/>
+                <a:cs typeface="Courier New"/>
+              </a:rPr>
+              <a:t>    </a:t>
+            </a:r>
+            <a:r>
+              <a:rPr lang="en-US" sz="1400" b="1" dirty="0" smtClean="0">
+                <a:solidFill>
+                  <a:srgbClr val="3366FF"/>
+                </a:solidFill>
+                <a:latin typeface="Courier New"/>
+                <a:cs typeface="Courier New"/>
+              </a:rPr>
+              <a:t>// amount of data to be mapped</a:t>
+            </a:r>
+            <a:endParaRPr lang="en-US" sz="1400" b="1" dirty="0">
+              <a:solidFill>
+                <a:srgbClr val="3366FF"/>
+              </a:solidFill>
+              <a:latin typeface="Courier New"/>
+              <a:cs typeface="Courier New"/>
+            </a:endParaRPr>
+          </a:p>
+          <a:p>
+            <a:pPr marL="0" indent="0">
+              <a:buNone/>
+            </a:pPr>
+            <a:r>
+              <a:rPr lang="en-US" sz="1400" b="1" dirty="0" smtClean="0">
+                <a:solidFill>
+                  <a:srgbClr val="3366FF"/>
+                </a:solidFill>
+                <a:latin typeface="Courier New"/>
+                <a:cs typeface="Courier New"/>
+              </a:rPr>
+              <a:t>);</a:t>
+            </a:r>
+          </a:p>
+          <a:p>
+            <a:pPr marL="0" indent="0">
+              <a:buNone/>
+            </a:pPr>
+            <a:endParaRPr lang="en-US" sz="1400" b="1" dirty="0" smtClean="0">
+              <a:solidFill>
+                <a:srgbClr val="3366FF"/>
+              </a:solidFill>
+              <a:latin typeface="Courier New"/>
+              <a:cs typeface="Courier New"/>
+            </a:endParaRPr>
+          </a:p>
+          <a:p>
+            <a:pPr marL="0" indent="0">
+              <a:buNone/>
+            </a:pPr>
+            <a:r>
+              <a:rPr lang="en-US" sz="1400" b="1" dirty="0" smtClean="0">
+                <a:solidFill>
+                  <a:srgbClr val="3366FF"/>
+                </a:solidFill>
+                <a:latin typeface="Courier New"/>
+                <a:cs typeface="Courier New"/>
+              </a:rPr>
+              <a:t>// use buffer on the host</a:t>
+            </a:r>
+            <a:endParaRPr lang="en-US" sz="1400" b="1" dirty="0" smtClean="0">
+              <a:solidFill>
+                <a:srgbClr val="3366FF"/>
+              </a:solidFill>
+              <a:latin typeface="Courier New"/>
+              <a:cs typeface="Courier New"/>
+            </a:endParaRPr>
+          </a:p>
+          <a:p>
+            <a:pPr marL="0" indent="0">
+              <a:buNone/>
+            </a:pPr>
+            <a:r>
+              <a:rPr lang="en-US" sz="1400" b="1" dirty="0" err="1" smtClean="0">
+                <a:solidFill>
+                  <a:srgbClr val="3366FF"/>
+                </a:solidFill>
+                <a:latin typeface="Courier New"/>
+                <a:cs typeface="Courier New"/>
+              </a:rPr>
+              <a:t>memset</a:t>
+            </a:r>
+            <a:r>
+              <a:rPr lang="en-US" sz="1400" b="1" dirty="0" smtClean="0">
+                <a:solidFill>
+                  <a:srgbClr val="3366FF"/>
+                </a:solidFill>
+                <a:latin typeface="Courier New"/>
+                <a:cs typeface="Courier New"/>
+              </a:rPr>
+              <a:t>(</a:t>
+            </a:r>
+            <a:r>
+              <a:rPr lang="en-US" sz="1400" b="1" dirty="0" err="1" smtClean="0">
+                <a:solidFill>
+                  <a:srgbClr val="3366FF"/>
+                </a:solidFill>
+                <a:latin typeface="Courier New"/>
+                <a:cs typeface="Courier New"/>
+              </a:rPr>
+              <a:t>h_ptr</a:t>
+            </a:r>
+            <a:r>
+              <a:rPr lang="en-US" sz="1400" b="1" dirty="0" smtClean="0">
+                <a:solidFill>
+                  <a:srgbClr val="3366FF"/>
+                </a:solidFill>
+                <a:latin typeface="Courier New"/>
+                <a:cs typeface="Courier New"/>
+              </a:rPr>
+              <a:t>, 42, </a:t>
+            </a:r>
+            <a:r>
+              <a:rPr lang="en-US" sz="1400" b="1" dirty="0" err="1" smtClean="0">
+                <a:solidFill>
+                  <a:srgbClr val="3366FF"/>
+                </a:solidFill>
+                <a:latin typeface="Courier New"/>
+                <a:cs typeface="Courier New"/>
+              </a:rPr>
+              <a:t>bufferSize</a:t>
+            </a:r>
+            <a:r>
+              <a:rPr lang="en-US" sz="1400" b="1" dirty="0" smtClean="0">
+                <a:solidFill>
+                  <a:srgbClr val="3366FF"/>
+                </a:solidFill>
+                <a:latin typeface="Courier New"/>
+                <a:cs typeface="Courier New"/>
+              </a:rPr>
+              <a:t>);</a:t>
+            </a:r>
+            <a:endParaRPr lang="en-US" sz="1400" b="1" dirty="0">
+              <a:solidFill>
+                <a:srgbClr val="3366FF"/>
+              </a:solidFill>
+              <a:latin typeface="Courier New"/>
+              <a:cs typeface="Courier New"/>
+            </a:endParaRPr>
+          </a:p>
+          <a:p>
+            <a:pPr marL="0" indent="0">
+              <a:buNone/>
+            </a:pPr>
+            <a:endParaRPr lang="en-US" sz="1400" b="1" dirty="0" smtClean="0">
+              <a:solidFill>
+                <a:srgbClr val="3366FF"/>
+              </a:solidFill>
+              <a:latin typeface="Courier New"/>
+              <a:cs typeface="Courier New"/>
+            </a:endParaRPr>
+          </a:p>
+          <a:p>
+            <a:pPr marL="0" indent="0">
+              <a:buNone/>
+            </a:pPr>
+            <a:r>
+              <a:rPr lang="en-US" sz="1400" b="1" dirty="0" smtClean="0">
+                <a:solidFill>
+                  <a:srgbClr val="3366FF"/>
+                </a:solidFill>
+                <a:latin typeface="Courier New"/>
+                <a:cs typeface="Courier New"/>
+              </a:rPr>
+              <a:t>/</a:t>
+            </a:r>
+            <a:r>
+              <a:rPr lang="en-US" sz="1400" b="1" dirty="0">
+                <a:solidFill>
+                  <a:srgbClr val="3366FF"/>
+                </a:solidFill>
+                <a:latin typeface="Courier New"/>
+                <a:cs typeface="Courier New"/>
+              </a:rPr>
+              <a:t>/ </a:t>
+            </a:r>
+            <a:r>
+              <a:rPr lang="en-US" sz="1400" b="1" dirty="0" err="1">
+                <a:solidFill>
+                  <a:srgbClr val="3366FF"/>
+                </a:solidFill>
+                <a:latin typeface="Courier New"/>
+                <a:cs typeface="Courier New"/>
+              </a:rPr>
+              <a:t>unmap</a:t>
+            </a:r>
+            <a:r>
+              <a:rPr lang="en-US" sz="1400" b="1" dirty="0">
+                <a:solidFill>
+                  <a:srgbClr val="3366FF"/>
+                </a:solidFill>
+                <a:latin typeface="Courier New"/>
+                <a:cs typeface="Courier New"/>
+              </a:rPr>
+              <a:t> buffer</a:t>
+            </a:r>
+          </a:p>
+          <a:p>
+            <a:pPr marL="0" indent="0">
+              <a:buNone/>
+            </a:pPr>
+            <a:r>
+              <a:rPr lang="en-US" sz="1400" b="1" dirty="0" err="1">
+                <a:solidFill>
+                  <a:srgbClr val="3366FF"/>
+                </a:solidFill>
+                <a:latin typeface="Courier New"/>
+                <a:cs typeface="Courier New"/>
+              </a:rPr>
+              <a:t>queue.enqueueUnmapMemObject</a:t>
+            </a:r>
+            <a:r>
+              <a:rPr lang="en-US" sz="1400" b="1" dirty="0">
+                <a:solidFill>
+                  <a:srgbClr val="3366FF"/>
+                </a:solidFill>
+                <a:latin typeface="Courier New"/>
+                <a:cs typeface="Courier New"/>
+              </a:rPr>
+              <a:t>(</a:t>
+            </a:r>
+            <a:r>
+              <a:rPr lang="en-US" sz="1400" b="1" dirty="0" err="1">
+                <a:solidFill>
+                  <a:srgbClr val="3366FF"/>
+                </a:solidFill>
+                <a:latin typeface="Courier New"/>
+                <a:cs typeface="Courier New"/>
+              </a:rPr>
+              <a:t>d_buffer</a:t>
+            </a:r>
+            <a:r>
+              <a:rPr lang="en-US" sz="1400" b="1" dirty="0">
+                <a:solidFill>
+                  <a:srgbClr val="3366FF"/>
+                </a:solidFill>
+                <a:latin typeface="Courier New"/>
+                <a:cs typeface="Courier New"/>
+              </a:rPr>
+              <a:t>, </a:t>
+            </a:r>
+            <a:r>
+              <a:rPr lang="en-US" sz="1400" b="1" dirty="0" err="1">
+                <a:solidFill>
+                  <a:srgbClr val="3366FF"/>
+                </a:solidFill>
+                <a:latin typeface="Courier New"/>
+                <a:cs typeface="Courier New"/>
+              </a:rPr>
+              <a:t>h_ptr</a:t>
+            </a:r>
+            <a:r>
+              <a:rPr lang="en-US" sz="1400" b="1" dirty="0">
+                <a:solidFill>
+                  <a:srgbClr val="3366FF"/>
+                </a:solidFill>
+                <a:latin typeface="Courier New"/>
+                <a:cs typeface="Courier New"/>
+              </a:rPr>
+              <a:t>)</a:t>
+            </a:r>
+            <a:r>
+              <a:rPr lang="en-US" sz="1400" b="1" dirty="0" smtClean="0">
+                <a:solidFill>
+                  <a:srgbClr val="3366FF"/>
+                </a:solidFill>
+                <a:latin typeface="Courier New"/>
+                <a:cs typeface="Courier New"/>
+              </a:rPr>
+              <a:t>;</a:t>
+            </a:r>
+            <a:endParaRPr lang="en-US" sz="1400" b="1" dirty="0" smtClean="0">
+              <a:solidFill>
+                <a:srgbClr val="3366FF"/>
+              </a:solidFill>
+              <a:latin typeface="Courier New"/>
+              <a:cs typeface="Courier New"/>
+            </a:endParaRPr>
+          </a:p>
+          <a:p>
+            <a:pPr marL="0" indent="0">
+              <a:buNone/>
+            </a:pPr>
+            <a:endParaRPr lang="en-US" sz="1400" b="1" dirty="0" smtClean="0">
+              <a:solidFill>
+                <a:srgbClr val="3366FF"/>
+              </a:solidFill>
+              <a:latin typeface="Courier New"/>
+              <a:cs typeface="Courier New"/>
+            </a:endParaRPr>
+          </a:p>
+          <a:p>
+            <a:pPr marL="0" indent="0">
+              <a:buNone/>
+            </a:pPr>
+            <a:r>
+              <a:rPr lang="en-US" sz="1400" b="1" dirty="0" smtClean="0">
+                <a:solidFill>
+                  <a:srgbClr val="3366FF"/>
+                </a:solidFill>
+                <a:latin typeface="Courier New"/>
+                <a:cs typeface="Courier New"/>
+              </a:rPr>
+              <a:t>// use </a:t>
+            </a:r>
+            <a:r>
+              <a:rPr lang="en-US" sz="1400" b="1" dirty="0" smtClean="0">
+                <a:solidFill>
+                  <a:srgbClr val="3366FF"/>
+                </a:solidFill>
+                <a:latin typeface="Courier New"/>
+                <a:cs typeface="Courier New"/>
+              </a:rPr>
+              <a:t>buffer on device</a:t>
+            </a:r>
+            <a:endParaRPr lang="en-US" sz="1400" b="1" dirty="0" smtClean="0">
+              <a:solidFill>
+                <a:srgbClr val="3366FF"/>
+              </a:solidFill>
+              <a:latin typeface="Courier New"/>
+              <a:cs typeface="Courier New"/>
+            </a:endParaRPr>
           </a:p>
         </p:txBody>
       </p:sp>
     </p:spTree>
     <p:extLst>
       <p:ext uri="{BB962C8B-B14F-4D97-AF65-F5344CB8AC3E}">
-        <p14:creationId xmlns:p14="http://schemas.microsoft.com/office/powerpoint/2010/main" val="521625099"/>
+        <p14:creationId xmlns:p14="http://schemas.microsoft.com/office/powerpoint/2010/main" val="3529810499"/>
       </p:ext>
     </p:extLst>
   </p:cSld>
@@ -7282,7 +8480,7 @@
           <a:p>
             <a:r>
               <a:rPr lang="en-US" dirty="0" smtClean="0"/>
-              <a:t>Multiple Contexts</a:t>
+              <a:t>Multiple Devices</a:t>
             </a:r>
             <a:endParaRPr lang="en-US" dirty="0"/>
           </a:p>
@@ -7301,59 +8499,44 @@
         <p:spPr/>
         <p:txBody>
           <a:bodyPr>
-            <a:normAutofit lnSpcReduction="10000"/>
+            <a:normAutofit fontScale="92500"/>
           </a:bodyPr>
           <a:lstStyle/>
           <a:p>
             <a:r>
               <a:rPr lang="en-US" dirty="0" smtClean="0"/>
-              <a:t>The simplest method – just create a separate context and command queue for each device.</a:t>
-            </a:r>
-          </a:p>
-          <a:p>
-            <a:r>
-              <a:rPr lang="en-US" dirty="0" smtClean="0"/>
-              <a:t>This is only useful if you don’t need to move data between devices – </a:t>
-            </a:r>
-            <a:r>
-              <a:rPr lang="en-US" b="1" dirty="0" smtClean="0">
-                <a:solidFill>
-                  <a:srgbClr val="3366FF"/>
-                </a:solidFill>
-                <a:latin typeface="Courier New"/>
-                <a:cs typeface="Courier New"/>
-              </a:rPr>
-              <a:t>clEnqueueCopyBuffer</a:t>
-            </a:r>
-            <a:r>
-              <a:rPr lang="en-US" dirty="0" smtClean="0"/>
-              <a:t> can’t work with memory objects created in different contexts</a:t>
-            </a:r>
-          </a:p>
-          <a:p>
-            <a:pPr lvl="1"/>
-            <a:r>
-              <a:rPr lang="en-US" dirty="0" smtClean="0"/>
-              <a:t>All memory will have to be copied via host</a:t>
-            </a:r>
-            <a:endParaRPr lang="en-US" dirty="0"/>
-          </a:p>
-          <a:p>
-            <a:r>
-              <a:rPr lang="en-US" dirty="0" smtClean="0"/>
-              <a:t>CANNOT </a:t>
-            </a:r>
-            <a:r>
-              <a:rPr lang="en-US" dirty="0"/>
-              <a:t>synchronize with events between command queues within </a:t>
-            </a:r>
-            <a:r>
-              <a:rPr lang="en-US" dirty="0" smtClean="0"/>
-              <a:t>different contexts!</a:t>
-            </a:r>
-            <a:endParaRPr lang="en-US" dirty="0"/>
-          </a:p>
-          <a:p>
+              <a:t>Running across multiple devices can deliver better performance (if your problem scales well)</a:t>
+            </a:r>
+          </a:p>
+          <a:p>
+            <a:r>
+              <a:rPr lang="en-US" dirty="0" smtClean="0"/>
+              <a:t>But have to manually partition problem / load balance</a:t>
+            </a:r>
+          </a:p>
+          <a:p>
+            <a:r>
+              <a:rPr lang="en-US" dirty="0" smtClean="0"/>
+              <a:t>Remember, the cost of moving data to/from a device is much greater than normal </a:t>
+            </a:r>
+            <a:r>
+              <a:rPr lang="en-US" dirty="0" err="1" smtClean="0"/>
+              <a:t>memcpy's</a:t>
+            </a:r>
+            <a:r>
+              <a:rPr lang="en-US" dirty="0" smtClean="0"/>
+              <a:t>, so avoid where possible</a:t>
+            </a:r>
+          </a:p>
+          <a:p>
+            <a:r>
+              <a:rPr lang="en-US" dirty="0" smtClean="0"/>
+              <a:t>There are a couple of options for using multiple devices within </a:t>
+            </a:r>
+            <a:r>
+              <a:rPr lang="en-US" dirty="0" err="1" smtClean="0"/>
+              <a:t>OpenCL</a:t>
+            </a:r>
             <a:endParaRPr lang="en-US" dirty="0"/>
           </a:p>
         </p:txBody>
@@ -7361,7 +8544,7 @@
     </p:spTree>
     <p:extLst>
       <p:ext uri="{BB962C8B-B14F-4D97-AF65-F5344CB8AC3E}">
-        <p14:creationId xmlns:p14="http://schemas.microsoft.com/office/powerpoint/2010/main" val="1746524199"/>
+        <p14:creationId xmlns:p14="http://schemas.microsoft.com/office/powerpoint/2010/main" val="521625099"/>
       </p:ext>
     </p:extLst>
   </p:cSld>
@@ -7412,7 +8595,7 @@
           <a:p>
             <a:r>
               <a:rPr lang="en-US" dirty="0" smtClean="0"/>
-              <a:t>Multiple Command Queues</a:t>
+              <a:t>Multiple Contexts</a:t>
             </a:r>
             <a:endParaRPr lang="en-US" dirty="0"/>
           </a:p>
@@ -7430,31 +8613,60 @@
         </p:nvSpPr>
         <p:spPr/>
         <p:txBody>
-          <a:bodyPr/>
+          <a:bodyPr>
+            <a:normAutofit lnSpcReduction="10000"/>
+          </a:bodyPr>
           <a:lstStyle/>
           <a:p>
             <a:r>
               <a:rPr lang="en-US" dirty="0" smtClean="0"/>
-              <a:t>A context can support more than one  device, although only within the same platform.</a:t>
-            </a:r>
-          </a:p>
-          <a:p>
-            <a:r>
-              <a:rPr lang="en-US" dirty="0" smtClean="0"/>
-              <a:t>This allows copies between devices.</a:t>
-            </a:r>
-          </a:p>
-          <a:p>
-            <a:r>
-              <a:rPr lang="en-US" dirty="0" smtClean="0"/>
-              <a:t>However, there must be a separate command queue for each device in the context.</a:t>
-            </a:r>
-          </a:p>
-          <a:p>
-            <a:r>
-              <a:rPr lang="en-US" dirty="0" smtClean="0"/>
-              <a:t>CAN synchronize with events between command queues within the same context!</a:t>
-            </a:r>
+              <a:t>The simplest method – just create a separate context and command queue for each device.</a:t>
+            </a:r>
+          </a:p>
+          <a:p>
+            <a:r>
+              <a:rPr lang="en-US" dirty="0" smtClean="0"/>
+              <a:t>This is only useful if you don’t need to move data between devices – </a:t>
+            </a:r>
+            <a:r>
+              <a:rPr lang="en-US" b="1" dirty="0" smtClean="0">
+                <a:solidFill>
+                  <a:srgbClr val="3366FF"/>
+                </a:solidFill>
+                <a:latin typeface="Courier New"/>
+                <a:cs typeface="Courier New"/>
+              </a:rPr>
+              <a:t>clEnqueueCopyBuffer</a:t>
+            </a:r>
+            <a:r>
+              <a:rPr lang="en-US" dirty="0" smtClean="0"/>
+              <a:t> can’t work with memory objects created in different contexts</a:t>
+            </a:r>
+          </a:p>
+          <a:p>
+            <a:pPr lvl="1"/>
+            <a:r>
+              <a:rPr lang="en-US" dirty="0" smtClean="0"/>
+              <a:t>All memory will have to be copied via host</a:t>
+            </a:r>
+            <a:endParaRPr lang="en-US" dirty="0"/>
+          </a:p>
+          <a:p>
+            <a:r>
+              <a:rPr lang="en-US" dirty="0" smtClean="0"/>
+              <a:t>CANNOT </a:t>
+            </a:r>
+            <a:r>
+              <a:rPr lang="en-US" dirty="0"/>
+              <a:t>synchronize with events between command queues within </a:t>
+            </a:r>
+            <a:r>
+              <a:rPr lang="en-US" dirty="0" smtClean="0"/>
+              <a:t>different contexts!</a:t>
+            </a:r>
+            <a:endParaRPr lang="en-US" dirty="0"/>
+          </a:p>
+          <a:p>
             <a:endParaRPr lang="en-US" dirty="0"/>
           </a:p>
         </p:txBody>
@@ -7462,7 +8674,7 @@
     </p:spTree>
     <p:extLst>
       <p:ext uri="{BB962C8B-B14F-4D97-AF65-F5344CB8AC3E}">
-        <p14:creationId xmlns:p14="http://schemas.microsoft.com/office/powerpoint/2010/main" val="2233503425"/>
+        <p14:creationId xmlns:p14="http://schemas.microsoft.com/office/powerpoint/2010/main" val="1746524199"/>
       </p:ext>
     </p:extLst>
   </p:cSld>
@@ -7513,7 +8725,7 @@
           <a:p>
             <a:r>
               <a:rPr lang="en-US" dirty="0" smtClean="0"/>
-              <a:t>OpenCL &amp; MPI</a:t>
+              <a:t>Multiple Command Queues</a:t>
             </a:r>
             <a:endParaRPr lang="en-US" dirty="0"/>
           </a:p>
@@ -7536,25 +8748,25 @@
           <a:p>
             <a:r>
               <a:rPr lang="en-US" dirty="0" smtClean="0"/>
-              <a:t>Using MPI, it is possible to use multiple devices.</a:t>
-            </a:r>
-          </a:p>
-          <a:p>
-            <a:r>
-              <a:rPr lang="en-US" dirty="0" smtClean="0"/>
-              <a:t>Typically, each MPI process gets a single device.</a:t>
-            </a:r>
-          </a:p>
-          <a:p>
-            <a:r>
-              <a:rPr lang="en-US" dirty="0" smtClean="0"/>
-              <a:t>This allows any number of OpenCL devices.</a:t>
-            </a:r>
-          </a:p>
-          <a:p>
-            <a:r>
-              <a:rPr lang="en-US" dirty="0" smtClean="0"/>
-              <a:t>However, moving memory between them can be very expensive.</a:t>
+              <a:t>A context can support more than one  device, although only within the same platform.</a:t>
+            </a:r>
+          </a:p>
+          <a:p>
+            <a:r>
+              <a:rPr lang="en-US" dirty="0" smtClean="0"/>
+              <a:t>This allows copies between devices.</a:t>
+            </a:r>
+          </a:p>
+          <a:p>
+            <a:r>
+              <a:rPr lang="en-US" dirty="0" smtClean="0"/>
+              <a:t>However, there must be a separate command queue for each device in the context.</a:t>
+            </a:r>
+          </a:p>
+          <a:p>
+            <a:r>
+              <a:rPr lang="en-US" dirty="0" smtClean="0"/>
+              <a:t>CAN synchronize with events between command queues within the same context!</a:t>
             </a:r>
             <a:endParaRPr lang="en-US" dirty="0"/>
           </a:p>
@@ -7563,7 +8775,7 @@
     </p:spTree>
     <p:extLst>
       <p:ext uri="{BB962C8B-B14F-4D97-AF65-F5344CB8AC3E}">
-        <p14:creationId xmlns:p14="http://schemas.microsoft.com/office/powerpoint/2010/main" val="1924167598"/>
+        <p14:creationId xmlns:p14="http://schemas.microsoft.com/office/powerpoint/2010/main" val="2233503425"/>
       </p:ext>
     </p:extLst>
   </p:cSld>
@@ -7614,6 +8826,107 @@
           <a:p>
             <a:r>
               <a:rPr lang="en-US" dirty="0" smtClean="0"/>
+              <a:t>OpenCL &amp; MPI</a:t>
+            </a:r>
+            <a:endParaRPr lang="en-US" dirty="0"/>
+          </a:p>
+        </p:txBody>
+      </p:sp>
+      <p:sp>
+        <p:nvSpPr>
+          <p:cNvPr id="3" name="Content Placeholder 2"/>
+          <p:cNvSpPr>
+            <a:spLocks noGrp="1"/>
+          </p:cNvSpPr>
+          <p:nvPr>
+            <p:ph idx="1"/>
+          </p:nvPr>
+        </p:nvSpPr>
+        <p:spPr/>
+        <p:txBody>
+          <a:bodyPr/>
+          <a:lstStyle/>
+          <a:p>
+            <a:r>
+              <a:rPr lang="en-US" dirty="0" smtClean="0"/>
+              <a:t>Using MPI, it is possible to use multiple devices.</a:t>
+            </a:r>
+          </a:p>
+          <a:p>
+            <a:r>
+              <a:rPr lang="en-US" dirty="0" smtClean="0"/>
+              <a:t>Typically, each MPI process gets a single device.</a:t>
+            </a:r>
+          </a:p>
+          <a:p>
+            <a:r>
+              <a:rPr lang="en-US" dirty="0" smtClean="0"/>
+              <a:t>This allows any number of OpenCL devices.</a:t>
+            </a:r>
+          </a:p>
+          <a:p>
+            <a:r>
+              <a:rPr lang="en-US" dirty="0" smtClean="0"/>
+              <a:t>However, moving memory between them can be very expensive.</a:t>
+            </a:r>
+            <a:endParaRPr lang="en-US" dirty="0"/>
+          </a:p>
+        </p:txBody>
+      </p:sp>
+    </p:spTree>
+    <p:extLst>
+      <p:ext uri="{BB962C8B-B14F-4D97-AF65-F5344CB8AC3E}">
+        <p14:creationId xmlns:p14="http://schemas.microsoft.com/office/powerpoint/2010/main" val="1924167598"/>
+      </p:ext>
+    </p:extLst>
+  </p:cSld>
+  <p:clrMapOvr>
+    <a:masterClrMapping/>
+  </p:clrMapOvr>
+  <p:timing>
+    <p:tnLst>
+      <p:par>
+        <p:cTn xmlns:p14="http://schemas.microsoft.com/office/powerpoint/2010/main" id="1" dur="indefinite" restart="never" nodeType="tmRoot"/>
+      </p:par>
+    </p:tnLst>
+  </p:timing>
+</p:sld>
+</file>
+
+<file path=ppt/slides/slide24.xml><?xml version="1.0" encoding="utf-8"?>
+<p:sld xmlns:a="http://schemas.openxmlformats.org/drawingml/2006/main" xmlns:r="http://schemas.openxmlformats.org/officeDocument/2006/relationships" xmlns:p="http://schemas.openxmlformats.org/presentationml/2006/main">
+  <p:cSld>
+    <p:spTree>
+      <p:nvGrpSpPr>
+        <p:cNvPr id="1" name=""/>
+        <p:cNvGrpSpPr/>
+        <p:nvPr/>
+      </p:nvGrpSpPr>
+      <p:grpSpPr>
+        <a:xfrm>
+          <a:off x="0" y="0"/>
+          <a:ext cx="0" cy="0"/>
+          <a:chOff x="0" y="0"/>
+          <a:chExt cx="0" cy="0"/>
+        </a:xfrm>
+      </p:grpSpPr>
+      <p:sp>
+        <p:nvSpPr>
+          <p:cNvPr id="2" name="Title 1"/>
+          <p:cNvSpPr>
+            <a:spLocks noGrp="1"/>
+          </p:cNvSpPr>
+          <p:nvPr>
+            <p:ph type="title"/>
+          </p:nvPr>
+        </p:nvSpPr>
+        <p:spPr/>
+        <p:txBody>
+          <a:bodyPr/>
+          <a:lstStyle/>
+          <a:p>
+            <a:r>
+              <a:rPr lang="en-US" dirty="0" smtClean="0"/>
               <a:t>Halo Exchange</a:t>
             </a:r>
             <a:endParaRPr lang="en-US" dirty="0"/>
@@ -7729,7 +9042,7 @@
 </p:sld>
 </file>
 
-<file path=ppt/slides/slide24.xml><?xml version="1.0" encoding="utf-8"?>
+<file path=ppt/slides/slide25.xml><?xml version="1.0" encoding="utf-8"?>
 <p:sld xmlns:a="http://schemas.openxmlformats.org/drawingml/2006/main" xmlns:r="http://schemas.openxmlformats.org/officeDocument/2006/relationships" xmlns:p="http://schemas.openxmlformats.org/presentationml/2006/main">
   <p:cSld>
     <p:spTree>

</xml_diff>

<commit_message>
Added slide about shared memory objects.
</commit_message>
<xml_diff>
--- a/slides/advanced_part1.pptx
+++ b/slides/advanced_part1.pptx
@@ -5,7 +5,7 @@
     <p:sldMasterId id="2147483648" r:id="rId1"/>
   </p:sldMasterIdLst>
   <p:notesMasterIdLst>
-    <p:notesMasterId r:id="rId27"/>
+    <p:notesMasterId r:id="rId28"/>
   </p:notesMasterIdLst>
   <p:sldIdLst>
     <p:sldId id="257" r:id="rId2"/>
@@ -30,9 +30,10 @@
     <p:sldId id="274" r:id="rId21"/>
     <p:sldId id="275" r:id="rId22"/>
     <p:sldId id="276" r:id="rId23"/>
-    <p:sldId id="277" r:id="rId24"/>
-    <p:sldId id="278" r:id="rId25"/>
-    <p:sldId id="279" r:id="rId26"/>
+    <p:sldId id="283" r:id="rId24"/>
+    <p:sldId id="277" r:id="rId25"/>
+    <p:sldId id="278" r:id="rId26"/>
+    <p:sldId id="279" r:id="rId27"/>
   </p:sldIdLst>
   <p:sldSz cx="9144000" cy="6858000" type="screen4x3"/>
   <p:notesSz cx="6858000" cy="9144000"/>
@@ -216,7 +217,7 @@
           <a:p>
             <a:fld id="{C020D4C0-2770-3946-ABDD-0C7492C2C34D}" type="datetimeFigureOut">
               <a:rPr lang="en-US" smtClean="0"/>
-              <a:t>09/05/15</a:t>
+              <a:t>10/05/15</a:t>
             </a:fld>
             <a:endParaRPr lang="en-GB"/>
           </a:p>
@@ -835,7 +836,7 @@
           <a:p>
             <a:fld id="{8959E172-2558-6049-8DA8-C86E1F6924DD}" type="datetimeFigureOut">
               <a:rPr lang="en-US" smtClean="0"/>
-              <a:t>09/05/15</a:t>
+              <a:t>10/05/15</a:t>
             </a:fld>
             <a:endParaRPr lang="en-GB"/>
           </a:p>
@@ -1005,7 +1006,7 @@
           <a:p>
             <a:fld id="{8959E172-2558-6049-8DA8-C86E1F6924DD}" type="datetimeFigureOut">
               <a:rPr lang="en-US" smtClean="0"/>
-              <a:t>09/05/15</a:t>
+              <a:t>10/05/15</a:t>
             </a:fld>
             <a:endParaRPr lang="en-GB"/>
           </a:p>
@@ -1185,7 +1186,7 @@
           <a:p>
             <a:fld id="{8959E172-2558-6049-8DA8-C86E1F6924DD}" type="datetimeFigureOut">
               <a:rPr lang="en-US" smtClean="0"/>
-              <a:t>09/05/15</a:t>
+              <a:t>10/05/15</a:t>
             </a:fld>
             <a:endParaRPr lang="en-GB"/>
           </a:p>
@@ -1355,7 +1356,7 @@
           <a:p>
             <a:fld id="{8959E172-2558-6049-8DA8-C86E1F6924DD}" type="datetimeFigureOut">
               <a:rPr lang="en-US" smtClean="0"/>
-              <a:t>09/05/15</a:t>
+              <a:t>10/05/15</a:t>
             </a:fld>
             <a:endParaRPr lang="en-GB"/>
           </a:p>
@@ -1601,7 +1602,7 @@
           <a:p>
             <a:fld id="{8959E172-2558-6049-8DA8-C86E1F6924DD}" type="datetimeFigureOut">
               <a:rPr lang="en-US" smtClean="0"/>
-              <a:t>09/05/15</a:t>
+              <a:t>10/05/15</a:t>
             </a:fld>
             <a:endParaRPr lang="en-GB"/>
           </a:p>
@@ -1889,7 +1890,7 @@
           <a:p>
             <a:fld id="{8959E172-2558-6049-8DA8-C86E1F6924DD}" type="datetimeFigureOut">
               <a:rPr lang="en-US" smtClean="0"/>
-              <a:t>09/05/15</a:t>
+              <a:t>10/05/15</a:t>
             </a:fld>
             <a:endParaRPr lang="en-GB"/>
           </a:p>
@@ -2311,7 +2312,7 @@
           <a:p>
             <a:fld id="{8959E172-2558-6049-8DA8-C86E1F6924DD}" type="datetimeFigureOut">
               <a:rPr lang="en-US" smtClean="0"/>
-              <a:t>09/05/15</a:t>
+              <a:t>10/05/15</a:t>
             </a:fld>
             <a:endParaRPr lang="en-GB"/>
           </a:p>
@@ -2429,7 +2430,7 @@
           <a:p>
             <a:fld id="{8959E172-2558-6049-8DA8-C86E1F6924DD}" type="datetimeFigureOut">
               <a:rPr lang="en-US" smtClean="0"/>
-              <a:t>09/05/15</a:t>
+              <a:t>10/05/15</a:t>
             </a:fld>
             <a:endParaRPr lang="en-GB"/>
           </a:p>
@@ -2524,7 +2525,7 @@
           <a:p>
             <a:fld id="{8959E172-2558-6049-8DA8-C86E1F6924DD}" type="datetimeFigureOut">
               <a:rPr lang="en-US" smtClean="0"/>
-              <a:t>09/05/15</a:t>
+              <a:t>10/05/15</a:t>
             </a:fld>
             <a:endParaRPr lang="en-GB"/>
           </a:p>
@@ -2801,7 +2802,7 @@
           <a:p>
             <a:fld id="{8959E172-2558-6049-8DA8-C86E1F6924DD}" type="datetimeFigureOut">
               <a:rPr lang="en-US" smtClean="0"/>
-              <a:t>09/05/15</a:t>
+              <a:t>10/05/15</a:t>
             </a:fld>
             <a:endParaRPr lang="en-GB"/>
           </a:p>
@@ -3054,7 +3055,7 @@
           <a:p>
             <a:fld id="{8959E172-2558-6049-8DA8-C86E1F6924DD}" type="datetimeFigureOut">
               <a:rPr lang="en-US" smtClean="0"/>
-              <a:t>09/05/15</a:t>
+              <a:t>10/05/15</a:t>
             </a:fld>
             <a:endParaRPr lang="en-GB"/>
           </a:p>
@@ -3267,7 +3268,7 @@
           <a:p>
             <a:fld id="{8959E172-2558-6049-8DA8-C86E1F6924DD}" type="datetimeFigureOut">
               <a:rPr lang="en-US" smtClean="0"/>
-              <a:t>09/05/15</a:t>
+              <a:t>10/05/15</a:t>
             </a:fld>
             <a:endParaRPr lang="en-GB"/>
           </a:p>
@@ -5927,23 +5928,7 @@
             </a:pPr>
             <a:r>
               <a:rPr lang="en-US" dirty="0" smtClean="0"/>
-              <a:t>But </a:t>
-            </a:r>
-            <a:r>
-              <a:rPr lang="en-US" dirty="0" smtClean="0"/>
-              <a:t>some vendors (e.g</a:t>
-            </a:r>
-            <a:r>
-              <a:rPr lang="en-US" dirty="0" smtClean="0"/>
-              <a:t>. </a:t>
-            </a:r>
-            <a:r>
-              <a:rPr lang="en-US" dirty="0" smtClean="0"/>
-              <a:t>NVIDIA) do support </a:t>
-            </a:r>
-            <a:r>
-              <a:rPr lang="en-US" dirty="0" smtClean="0"/>
-              <a:t>pinned </a:t>
+              <a:t>But some vendors (e.g. NVIDIA) do support pinned </a:t>
             </a:r>
             <a:r>
               <a:rPr lang="en-US" dirty="0"/>
@@ -5990,7 +5975,6 @@
               <a:rPr lang="en-US" dirty="0" smtClean="0"/>
               <a:t>flag</a:t>
             </a:r>
-            <a:endParaRPr lang="en-US" dirty="0" smtClean="0"/>
           </a:p>
           <a:p>
             <a:pPr marL="285750" indent="-285750">
@@ -6010,11 +5994,7 @@
             </a:r>
             <a:r>
               <a:rPr lang="en-US" dirty="0" smtClean="0"/>
-              <a:t> to retrieve the host </a:t>
-            </a:r>
-            <a:r>
-              <a:rPr lang="en-US" dirty="0" smtClean="0"/>
-              <a:t>pointer</a:t>
+              <a:t> to retrieve the host pointer</a:t>
             </a:r>
           </a:p>
           <a:p>
@@ -6094,7 +6074,6 @@
               <a:rPr lang="en-US" dirty="0" smtClean="0"/>
               <a:t> before destroying the OpenCL buffer</a:t>
             </a:r>
-            <a:endParaRPr lang="en-US" dirty="0" smtClean="0"/>
           </a:p>
         </p:txBody>
       </p:sp>
@@ -6131,8 +6110,23 @@
                 <a:latin typeface="Courier New"/>
                 <a:cs typeface="Courier New"/>
               </a:rPr>
-              <a:t>// create </a:t>
-            </a:r>
+              <a:t>// create additional device </a:t>
+            </a:r>
+            <a:r>
+              <a:rPr lang="en-US" sz="1400" b="1" dirty="0">
+                <a:solidFill>
+                  <a:srgbClr val="3366FF"/>
+                </a:solidFill>
+                <a:latin typeface="Courier New"/>
+                <a:cs typeface="Courier New"/>
+              </a:rPr>
+              <a:t>buffer</a:t>
+            </a:r>
+          </a:p>
+          <a:p>
+            <a:pPr marL="0" indent="0">
+              <a:buNone/>
+            </a:pPr>
             <a:r>
               <a:rPr lang="en-US" sz="1400" b="1" dirty="0" smtClean="0">
                 <a:solidFill>
@@ -6141,7 +6135,7 @@
                 <a:latin typeface="Courier New"/>
                 <a:cs typeface="Courier New"/>
               </a:rPr>
-              <a:t>additional device </a:t>
+              <a:t>cl</a:t>
             </a:r>
             <a:r>
               <a:rPr lang="en-US" sz="1400" b="1" dirty="0">
@@ -6151,7 +6145,27 @@
                 <a:latin typeface="Courier New"/>
                 <a:cs typeface="Courier New"/>
               </a:rPr>
-              <a:t>buffer</a:t>
+              <a:t>::Buffer </a:t>
+            </a:r>
+            <a:r>
+              <a:rPr lang="en-US" sz="1400" b="1" dirty="0" err="1" smtClean="0">
+                <a:solidFill>
+                  <a:srgbClr val="3366FF"/>
+                </a:solidFill>
+                <a:latin typeface="Courier New"/>
+                <a:cs typeface="Courier New"/>
+              </a:rPr>
+              <a:t>d_pinned</a:t>
+            </a:r>
+            <a:r>
+              <a:rPr lang="en-US" sz="1400" b="1" dirty="0" smtClean="0">
+                <a:solidFill>
+                  <a:srgbClr val="3366FF"/>
+                </a:solidFill>
+                <a:latin typeface="Courier New"/>
+                <a:cs typeface="Courier New"/>
+              </a:rPr>
+              <a:t>(</a:t>
             </a:r>
           </a:p>
           <a:p>
@@ -6159,6 +6173,16 @@
               <a:buNone/>
             </a:pPr>
             <a:r>
+              <a:rPr lang="en-US" sz="1400" b="1" dirty="0">
+                <a:solidFill>
+                  <a:srgbClr val="3366FF"/>
+                </a:solidFill>
+                <a:latin typeface="Courier New"/>
+                <a:cs typeface="Courier New"/>
+              </a:rPr>
+              <a:t> </a:t>
+            </a:r>
+            <a:r>
               <a:rPr lang="en-US" sz="1400" b="1" dirty="0" smtClean="0">
                 <a:solidFill>
                   <a:srgbClr val="3366FF"/>
@@ -6166,7 +6190,7 @@
                 <a:latin typeface="Courier New"/>
                 <a:cs typeface="Courier New"/>
               </a:rPr>
-              <a:t>cl</a:t>
+              <a:t> context</a:t>
             </a:r>
             <a:r>
               <a:rPr lang="en-US" sz="1400" b="1" dirty="0">
@@ -6176,17 +6200,22 @@
                 <a:latin typeface="Courier New"/>
                 <a:cs typeface="Courier New"/>
               </a:rPr>
-              <a:t>::Buffer </a:t>
-            </a:r>
-            <a:r>
-              <a:rPr lang="en-US" sz="1400" b="1" dirty="0" err="1" smtClean="0">
-                <a:solidFill>
-                  <a:srgbClr val="3366FF"/>
-                </a:solidFill>
-                <a:latin typeface="Courier New"/>
-                <a:cs typeface="Courier New"/>
-              </a:rPr>
-              <a:t>d_pinned</a:t>
+              <a:t>,                      </a:t>
+            </a:r>
+          </a:p>
+          <a:p>
+            <a:pPr marL="0" indent="0">
+              <a:buNone/>
+            </a:pPr>
+            <a:r>
+              <a:rPr lang="en-US" sz="1400" b="1" dirty="0">
+                <a:solidFill>
+                  <a:srgbClr val="3366FF"/>
+                </a:solidFill>
+                <a:latin typeface="Courier New"/>
+                <a:cs typeface="Courier New"/>
+              </a:rPr>
+              <a:t> </a:t>
             </a:r>
             <a:r>
               <a:rPr lang="en-US" sz="1400" b="1" dirty="0" smtClean="0">
@@ -6196,94 +6225,7 @@
                 <a:latin typeface="Courier New"/>
                 <a:cs typeface="Courier New"/>
               </a:rPr>
-              <a:t>(</a:t>
-            </a:r>
-            <a:endParaRPr lang="en-US" sz="1400" b="1" dirty="0" smtClean="0">
-              <a:solidFill>
-                <a:srgbClr val="3366FF"/>
-              </a:solidFill>
-              <a:latin typeface="Courier New"/>
-              <a:cs typeface="Courier New"/>
-            </a:endParaRPr>
-          </a:p>
-          <a:p>
-            <a:pPr marL="0" indent="0">
-              <a:buNone/>
-            </a:pPr>
-            <a:r>
-              <a:rPr lang="en-US" sz="1400" b="1" dirty="0">
-                <a:solidFill>
-                  <a:srgbClr val="3366FF"/>
-                </a:solidFill>
-                <a:latin typeface="Courier New"/>
-                <a:cs typeface="Courier New"/>
-              </a:rPr>
-              <a:t> </a:t>
-            </a:r>
-            <a:r>
-              <a:rPr lang="en-US" sz="1400" b="1" dirty="0" smtClean="0">
-                <a:solidFill>
-                  <a:srgbClr val="3366FF"/>
-                </a:solidFill>
-                <a:latin typeface="Courier New"/>
-                <a:cs typeface="Courier New"/>
-              </a:rPr>
-              <a:t> context</a:t>
-            </a:r>
-            <a:r>
-              <a:rPr lang="en-US" sz="1400" b="1" dirty="0">
-                <a:solidFill>
-                  <a:srgbClr val="3366FF"/>
-                </a:solidFill>
-                <a:latin typeface="Courier New"/>
-                <a:cs typeface="Courier New"/>
-              </a:rPr>
-              <a:t>,                      </a:t>
-            </a:r>
-          </a:p>
-          <a:p>
-            <a:pPr marL="0" indent="0">
-              <a:buNone/>
-            </a:pPr>
-            <a:r>
-              <a:rPr lang="en-US" sz="1400" b="1" dirty="0">
-                <a:solidFill>
-                  <a:srgbClr val="3366FF"/>
-                </a:solidFill>
-                <a:latin typeface="Courier New"/>
-                <a:cs typeface="Courier New"/>
-              </a:rPr>
-              <a:t> </a:t>
-            </a:r>
-            <a:r>
-              <a:rPr lang="en-US" sz="1400" b="1" dirty="0" smtClean="0">
-                <a:solidFill>
-                  <a:srgbClr val="3366FF"/>
-                </a:solidFill>
-                <a:latin typeface="Courier New"/>
-                <a:cs typeface="Courier New"/>
-              </a:rPr>
-              <a:t> </a:t>
-            </a:r>
-            <a:r>
-              <a:rPr lang="en-US" sz="1400" b="1" dirty="0" smtClean="0">
-                <a:solidFill>
-                  <a:srgbClr val="3366FF"/>
-                </a:solidFill>
-                <a:latin typeface="Courier New"/>
-                <a:cs typeface="Courier New"/>
-              </a:rPr>
-              <a:t>CL_MEM_ALLOC_HOST_PTR</a:t>
-            </a:r>
-            <a:r>
-              <a:rPr lang="en-US" sz="1400" b="1" dirty="0" smtClean="0">
-                <a:solidFill>
-                  <a:srgbClr val="3366FF"/>
-                </a:solidFill>
-                <a:latin typeface="Courier New"/>
-                <a:cs typeface="Courier New"/>
-              </a:rPr>
-              <a:t>,</a:t>
+              <a:t> CL_MEM_ALLOC_HOST_PTR,</a:t>
             </a:r>
           </a:p>
           <a:p>
@@ -6491,17 +6433,7 @@
                 <a:latin typeface="Courier New"/>
                 <a:cs typeface="Courier New"/>
               </a:rPr>
-              <a:t>,    </a:t>
-            </a:r>
-            <a:r>
-              <a:rPr lang="en-US" sz="1400" b="1" dirty="0" smtClean="0">
-                <a:solidFill>
-                  <a:srgbClr val="3366FF"/>
-                </a:solidFill>
-                <a:latin typeface="Courier New"/>
-                <a:cs typeface="Courier New"/>
-              </a:rPr>
-              <a:t>// device buffer</a:t>
+              <a:t>,    // device buffer</a:t>
             </a:r>
             <a:endParaRPr lang="en-US" sz="1400" b="1" dirty="0">
               <a:solidFill>
@@ -6649,17 +6581,7 @@
                 <a:latin typeface="Courier New"/>
                 <a:cs typeface="Courier New"/>
               </a:rPr>
-              <a:t>  </a:t>
-            </a:r>
-            <a:r>
-              <a:rPr lang="en-US" sz="1400" b="1" dirty="0" smtClean="0">
-                <a:solidFill>
-                  <a:srgbClr val="3366FF"/>
-                </a:solidFill>
-                <a:latin typeface="Courier New"/>
-                <a:cs typeface="Courier New"/>
-              </a:rPr>
-              <a:t>// amount of data to be mapped</a:t>
+              <a:t>  // amount of data to be mapped</a:t>
             </a:r>
             <a:endParaRPr lang="en-US" sz="1400" b="1" dirty="0">
               <a:solidFill>
@@ -6708,17 +6630,7 @@
                 <a:latin typeface="Courier New"/>
                 <a:cs typeface="Courier New"/>
               </a:rPr>
-              <a:t>// use </a:t>
-            </a:r>
-            <a:r>
-              <a:rPr lang="en-US" sz="1400" b="1" dirty="0" smtClean="0">
-                <a:solidFill>
-                  <a:srgbClr val="3366FF"/>
-                </a:solidFill>
-                <a:latin typeface="Courier New"/>
-                <a:cs typeface="Courier New"/>
-              </a:rPr>
-              <a:t>buffer</a:t>
+              <a:t>// use buffer</a:t>
             </a:r>
           </a:p>
           <a:p>
@@ -7023,19 +6935,7 @@
           <a:p>
             <a:r>
               <a:rPr lang="en-US" dirty="0" smtClean="0"/>
-              <a:t>Not all platforms support pinned memory. But, the above method will still work, and </a:t>
-            </a:r>
-            <a:r>
-              <a:rPr lang="en-US" dirty="0" smtClean="0"/>
-              <a:t>should not be </a:t>
-            </a:r>
-            <a:r>
-              <a:rPr lang="en-US" dirty="0" smtClean="0"/>
-              <a:t>any </a:t>
-            </a:r>
-            <a:r>
-              <a:rPr lang="en-US" dirty="0" smtClean="0"/>
-              <a:t>slower</a:t>
+              <a:t>Not all platforms support pinned memory. But, the above method will still work, and should not be any slower</a:t>
             </a:r>
             <a:endParaRPr lang="en-US" dirty="0"/>
           </a:p>
@@ -7095,11 +6995,7 @@
           <a:p>
             <a:r>
               <a:rPr lang="en-US" dirty="0" smtClean="0"/>
-              <a:t>Zero-copy </a:t>
-            </a:r>
-            <a:r>
-              <a:rPr lang="en-US" dirty="0" smtClean="0"/>
-              <a:t>transfers</a:t>
+              <a:t>Zero-copy transfers</a:t>
             </a:r>
             <a:endParaRPr lang="en-US" dirty="0"/>
           </a:p>
@@ -7160,7 +7056,6 @@
               <a:rPr lang="en-US" dirty="0" smtClean="0"/>
               <a:t> flag</a:t>
             </a:r>
-            <a:endParaRPr lang="en-US" dirty="0" smtClean="0"/>
           </a:p>
           <a:p>
             <a:r>
@@ -7328,7 +7223,6 @@
               <a:rPr lang="en-US" dirty="0" smtClean="0"/>
               <a:t>flag when creating our device buffer</a:t>
             </a:r>
-            <a:endParaRPr lang="en-US" dirty="0" smtClean="0"/>
           </a:p>
           <a:p>
             <a:pPr marL="285750" indent="-285750">
@@ -7399,17 +7293,7 @@
                 <a:latin typeface="Courier New"/>
                 <a:cs typeface="Courier New"/>
               </a:rPr>
-              <a:t>// create </a:t>
-            </a:r>
-            <a:r>
-              <a:rPr lang="en-US" sz="1400" b="1" dirty="0" smtClean="0">
-                <a:solidFill>
-                  <a:srgbClr val="3366FF"/>
-                </a:solidFill>
-                <a:latin typeface="Courier New"/>
-                <a:cs typeface="Courier New"/>
-              </a:rPr>
-              <a:t>device buffer in host-accessible </a:t>
+              <a:t>// create device buffer in host-accessible </a:t>
             </a:r>
             <a:r>
               <a:rPr lang="en-US" sz="1400" b="1" dirty="0" err="1" smtClean="0">
@@ -7473,13 +7357,6 @@
               </a:rPr>
               <a:t>(</a:t>
             </a:r>
-            <a:endParaRPr lang="en-US" sz="1400" b="1" dirty="0" smtClean="0">
-              <a:solidFill>
-                <a:srgbClr val="3366FF"/>
-              </a:solidFill>
-              <a:latin typeface="Courier New"/>
-              <a:cs typeface="Courier New"/>
-            </a:endParaRPr>
           </a:p>
           <a:p>
             <a:pPr marL="0" indent="0">
@@ -7538,27 +7415,7 @@
                 <a:latin typeface="Courier New"/>
                 <a:cs typeface="Courier New"/>
               </a:rPr>
-              <a:t> CL_MEM_READ_WRITE | </a:t>
-            </a:r>
-            <a:r>
-              <a:rPr lang="en-US" sz="1400" b="1" dirty="0" smtClean="0">
-                <a:solidFill>
-                  <a:srgbClr val="3366FF"/>
-                </a:solidFill>
-                <a:latin typeface="Courier New"/>
-                <a:cs typeface="Courier New"/>
-              </a:rPr>
-              <a:t>CL_MEM_ALLOC_HOST_PTR</a:t>
-            </a:r>
-            <a:r>
-              <a:rPr lang="en-US" sz="1400" b="1" dirty="0" smtClean="0">
-                <a:solidFill>
-                  <a:srgbClr val="3366FF"/>
-                </a:solidFill>
-                <a:latin typeface="Courier New"/>
-                <a:cs typeface="Courier New"/>
-              </a:rPr>
-              <a:t>,</a:t>
+              <a:t> CL_MEM_READ_WRITE | CL_MEM_ALLOC_HOST_PTR,</a:t>
             </a:r>
           </a:p>
           <a:p>
@@ -7637,17 +7494,7 @@
                 <a:latin typeface="Courier New"/>
                 <a:cs typeface="Courier New"/>
               </a:rPr>
-              <a:t>// map </a:t>
-            </a:r>
-            <a:r>
-              <a:rPr lang="en-US" sz="1400" b="1" dirty="0" smtClean="0">
-                <a:solidFill>
-                  <a:srgbClr val="3366FF"/>
-                </a:solidFill>
-                <a:latin typeface="Courier New"/>
-                <a:cs typeface="Courier New"/>
-              </a:rPr>
-              <a:t>buffer into host address space</a:t>
+              <a:t>// map buffer into host address space</a:t>
             </a:r>
             <a:endParaRPr lang="en-US" sz="1400" b="1" dirty="0">
               <a:solidFill>
@@ -7793,17 +7640,7 @@
                 <a:latin typeface="Courier New"/>
                 <a:cs typeface="Courier New"/>
               </a:rPr>
-              <a:t>,     </a:t>
-            </a:r>
-            <a:r>
-              <a:rPr lang="en-US" sz="1400" b="1" dirty="0" smtClean="0">
-                <a:solidFill>
-                  <a:srgbClr val="3366FF"/>
-                </a:solidFill>
-                <a:latin typeface="Courier New"/>
-                <a:cs typeface="Courier New"/>
-              </a:rPr>
-              <a:t>// device buffer</a:t>
+              <a:t>,     // device buffer</a:t>
             </a:r>
             <a:endParaRPr lang="en-US" sz="1400" b="1" dirty="0">
               <a:solidFill>
@@ -7835,27 +7672,7 @@
                 <a:latin typeface="Courier New"/>
                 <a:cs typeface="Courier New"/>
               </a:rPr>
-              <a:t>   </a:t>
-            </a:r>
-            <a:r>
-              <a:rPr lang="en-US" sz="1400" b="1" dirty="0" smtClean="0">
-                <a:solidFill>
-                  <a:srgbClr val="3366FF"/>
-                </a:solidFill>
-                <a:latin typeface="Courier New"/>
-                <a:cs typeface="Courier New"/>
-              </a:rPr>
-              <a:t>  </a:t>
-            </a:r>
-            <a:r>
-              <a:rPr lang="en-US" sz="1400" b="1" dirty="0" smtClean="0">
-                <a:solidFill>
-                  <a:srgbClr val="3366FF"/>
-                </a:solidFill>
-                <a:latin typeface="Courier New"/>
-                <a:cs typeface="Courier New"/>
-              </a:rPr>
-              <a:t>// blocking map</a:t>
+              <a:t>     // blocking map</a:t>
             </a:r>
             <a:endParaRPr lang="en-US" sz="1400" b="1" dirty="0">
               <a:solidFill>
@@ -7887,17 +7704,7 @@
                 <a:latin typeface="Courier New"/>
                 <a:cs typeface="Courier New"/>
               </a:rPr>
-              <a:t>CL_MAP_WRITE, </a:t>
-            </a:r>
-            <a:r>
-              <a:rPr lang="en-US" sz="1400" b="1" dirty="0" smtClean="0">
-                <a:solidFill>
-                  <a:srgbClr val="3366FF"/>
-                </a:solidFill>
-                <a:latin typeface="Courier New"/>
-                <a:cs typeface="Courier New"/>
-              </a:rPr>
-              <a:t>// read data*</a:t>
+              <a:t>CL_MAP_WRITE, // read data*</a:t>
             </a:r>
             <a:endParaRPr lang="en-US" sz="1400" b="1" dirty="0">
               <a:solidFill>
@@ -7929,27 +7736,7 @@
                 <a:latin typeface="Courier New"/>
                 <a:cs typeface="Courier New"/>
               </a:rPr>
-              <a:t>         </a:t>
-            </a:r>
-            <a:r>
-              <a:rPr lang="en-US" sz="1400" b="1" dirty="0" smtClean="0">
-                <a:solidFill>
-                  <a:srgbClr val="3366FF"/>
-                </a:solidFill>
-                <a:latin typeface="Courier New"/>
-                <a:cs typeface="Courier New"/>
-              </a:rPr>
-              <a:t>  </a:t>
-            </a:r>
-            <a:r>
-              <a:rPr lang="en-US" sz="1400" b="1" dirty="0" smtClean="0">
-                <a:solidFill>
-                  <a:srgbClr val="3366FF"/>
-                </a:solidFill>
-                <a:latin typeface="Courier New"/>
-                <a:cs typeface="Courier New"/>
-              </a:rPr>
-              <a:t>// offset of region</a:t>
+              <a:t>           // offset of region</a:t>
             </a:r>
             <a:endParaRPr lang="en-US" sz="1400" b="1" dirty="0">
               <a:solidFill>
@@ -7991,17 +7778,7 @@
                 <a:latin typeface="Courier New"/>
                 <a:cs typeface="Courier New"/>
               </a:rPr>
-              <a:t>    </a:t>
-            </a:r>
-            <a:r>
-              <a:rPr lang="en-US" sz="1400" b="1" dirty="0" smtClean="0">
-                <a:solidFill>
-                  <a:srgbClr val="3366FF"/>
-                </a:solidFill>
-                <a:latin typeface="Courier New"/>
-                <a:cs typeface="Courier New"/>
-              </a:rPr>
-              <a:t>// amount of data to be mapped</a:t>
+              <a:t>    // amount of data to be mapped</a:t>
             </a:r>
             <a:endParaRPr lang="en-US" sz="1400" b="1" dirty="0">
               <a:solidFill>
@@ -8052,13 +7829,6 @@
               </a:rPr>
               <a:t>// use buffer on the host</a:t>
             </a:r>
-            <a:endParaRPr lang="en-US" sz="1400" b="1" dirty="0" smtClean="0">
-              <a:solidFill>
-                <a:srgbClr val="3366FF"/>
-              </a:solidFill>
-              <a:latin typeface="Courier New"/>
-              <a:cs typeface="Courier New"/>
-            </a:endParaRPr>
           </a:p>
           <a:p>
             <a:pPr marL="0" indent="0">
@@ -8263,13 +8033,6 @@
               </a:rPr>
               <a:t>;</a:t>
             </a:r>
-            <a:endParaRPr lang="en-US" sz="1400" b="1" dirty="0" smtClean="0">
-              <a:solidFill>
-                <a:srgbClr val="3366FF"/>
-              </a:solidFill>
-              <a:latin typeface="Courier New"/>
-              <a:cs typeface="Courier New"/>
-            </a:endParaRPr>
           </a:p>
           <a:p>
             <a:pPr marL="0" indent="0">
@@ -8295,25 +8058,8 @@
                 <a:latin typeface="Courier New"/>
                 <a:cs typeface="Courier New"/>
               </a:rPr>
-              <a:t>// use </a:t>
-            </a:r>
-            <a:r>
-              <a:rPr lang="en-US" sz="1400" b="1" dirty="0" smtClean="0">
-                <a:solidFill>
-                  <a:srgbClr val="3366FF"/>
-                </a:solidFill>
-                <a:latin typeface="Courier New"/>
-                <a:cs typeface="Courier New"/>
-              </a:rPr>
-              <a:t>buffer on device</a:t>
-            </a:r>
-            <a:endParaRPr lang="en-US" sz="1400" b="1" dirty="0" smtClean="0">
-              <a:solidFill>
-                <a:srgbClr val="3366FF"/>
-              </a:solidFill>
-              <a:latin typeface="Courier New"/>
-              <a:cs typeface="Courier New"/>
-            </a:endParaRPr>
+              <a:t>// use buffer on device</a:t>
+            </a:r>
           </a:p>
         </p:txBody>
       </p:sp>
@@ -8620,8 +8366,13 @@
           <a:p>
             <a:r>
               <a:rPr lang="en-US" dirty="0" smtClean="0"/>
-              <a:t>The simplest method – just create a separate context and command queue for each device.</a:t>
-            </a:r>
+              <a:t>The simplest method – just create a separate context and command queue for each </a:t>
+            </a:r>
+            <a:r>
+              <a:rPr lang="en-US" dirty="0" smtClean="0"/>
+              <a:t>device</a:t>
+            </a:r>
+            <a:endParaRPr lang="en-US" dirty="0" smtClean="0"/>
           </a:p>
           <a:p>
             <a:r>
@@ -8748,20 +8499,43 @@
           <a:p>
             <a:r>
               <a:rPr lang="en-US" dirty="0" smtClean="0"/>
-              <a:t>A context can support more than one  device, although only within the same platform.</a:t>
-            </a:r>
-          </a:p>
-          <a:p>
-            <a:r>
-              <a:rPr lang="en-US" dirty="0" smtClean="0"/>
-              <a:t>This allows copies between devices.</a:t>
-            </a:r>
-          </a:p>
-          <a:p>
-            <a:r>
-              <a:rPr lang="en-US" dirty="0" smtClean="0"/>
-              <a:t>However, there must be a separate command queue for each device in the context.</a:t>
-            </a:r>
+              <a:t>A context can support more than one  device, although only within the same </a:t>
+            </a:r>
+            <a:r>
+              <a:rPr lang="en-US" dirty="0" smtClean="0"/>
+              <a:t>platform</a:t>
+            </a:r>
+            <a:endParaRPr lang="en-US" dirty="0" smtClean="0"/>
+          </a:p>
+          <a:p>
+            <a:r>
+              <a:rPr lang="en-US" dirty="0" smtClean="0"/>
+              <a:t>This allows </a:t>
+            </a:r>
+            <a:r>
+              <a:rPr lang="en-US" dirty="0" smtClean="0"/>
+              <a:t>memory copies </a:t>
+            </a:r>
+            <a:r>
+              <a:rPr lang="en-US" dirty="0" smtClean="0"/>
+              <a:t>between </a:t>
+            </a:r>
+            <a:r>
+              <a:rPr lang="en-US" dirty="0" smtClean="0"/>
+              <a:t>devices</a:t>
+            </a:r>
+            <a:endParaRPr lang="en-US" dirty="0" smtClean="0"/>
+          </a:p>
+          <a:p>
+            <a:r>
+              <a:rPr lang="en-US" dirty="0" smtClean="0"/>
+              <a:t>However, there must be a separate command queue for each device in the </a:t>
+            </a:r>
+            <a:r>
+              <a:rPr lang="en-US" dirty="0" smtClean="0"/>
+              <a:t>context</a:t>
+            </a:r>
+            <a:endParaRPr lang="en-US" dirty="0" smtClean="0"/>
           </a:p>
           <a:p>
             <a:r>
@@ -8825,10 +8599,10 @@
           <a:lstStyle/>
           <a:p>
             <a:r>
-              <a:rPr lang="en-US" dirty="0" smtClean="0"/>
-              <a:t>OpenCL &amp; MPI</a:t>
-            </a:r>
-            <a:endParaRPr lang="en-US" dirty="0"/>
+              <a:rPr lang="en-GB" dirty="0" smtClean="0"/>
+              <a:t>Shared Memory Objects</a:t>
+            </a:r>
+            <a:endParaRPr lang="en-GB" dirty="0"/>
           </a:p>
         </p:txBody>
       </p:sp>
@@ -8840,6 +8614,109 @@
           </p:cNvSpPr>
           <p:nvPr>
             <p:ph idx="1"/>
+          </p:nvPr>
+        </p:nvSpPr>
+        <p:spPr/>
+        <p:txBody>
+          <a:bodyPr>
+            <a:normAutofit fontScale="85000" lnSpcReduction="20000"/>
+          </a:bodyPr>
+          <a:lstStyle/>
+          <a:p>
+            <a:r>
+              <a:rPr lang="en-GB" dirty="0" smtClean="0"/>
+              <a:t>Memory objects can be shared across multiple devices that share a context</a:t>
+            </a:r>
+          </a:p>
+          <a:p>
+            <a:r>
+              <a:rPr lang="en-GB" dirty="0" smtClean="0"/>
+              <a:t>The runtime will ensure that data is copied between the devices as needed</a:t>
+            </a:r>
+          </a:p>
+          <a:p>
+            <a:r>
+              <a:rPr lang="en-GB" dirty="0" smtClean="0"/>
+              <a:t>However, synchronization must be performed explicitly, by providing event dependencies when </a:t>
+            </a:r>
+            <a:r>
+              <a:rPr lang="en-GB" dirty="0" err="1" smtClean="0"/>
+              <a:t>enqueuing</a:t>
+            </a:r>
+            <a:r>
+              <a:rPr lang="en-GB" dirty="0" smtClean="0"/>
+              <a:t> commands</a:t>
+            </a:r>
+          </a:p>
+          <a:p>
+            <a:r>
+              <a:rPr lang="en-GB" dirty="0" smtClean="0"/>
+              <a:t>Some platforms might not concurrently execute kernels on multiple devices that use the same memory objects, even if they don’t access overlapping regions</a:t>
+            </a:r>
+          </a:p>
+          <a:p>
+            <a:pPr lvl="1"/>
+            <a:r>
+              <a:rPr lang="en-GB" dirty="0" smtClean="0"/>
+              <a:t>You might be able to circumvent this with sub-buffers</a:t>
+            </a:r>
+          </a:p>
+          <a:p>
+            <a:pPr lvl="1"/>
+            <a:r>
+              <a:rPr lang="en-GB" dirty="0" smtClean="0"/>
+              <a:t>Separate kernel objects </a:t>
+            </a:r>
+            <a:r>
+              <a:rPr lang="en-GB" smtClean="0"/>
+              <a:t>may also </a:t>
+            </a:r>
+            <a:r>
+              <a:rPr lang="en-GB" dirty="0" smtClean="0"/>
+              <a:t>need to be used</a:t>
+            </a:r>
+            <a:endParaRPr lang="en-GB" dirty="0"/>
+          </a:p>
+        </p:txBody>
+      </p:sp>
+    </p:spTree>
+    <p:extLst>
+      <p:ext uri="{BB962C8B-B14F-4D97-AF65-F5344CB8AC3E}">
+        <p14:creationId xmlns:p14="http://schemas.microsoft.com/office/powerpoint/2010/main" val="1120596660"/>
+      </p:ext>
+    </p:extLst>
+  </p:cSld>
+  <p:clrMapOvr>
+    <a:masterClrMapping/>
+  </p:clrMapOvr>
+</p:sld>
+</file>
+
+<file path=ppt/slides/slide24.xml><?xml version="1.0" encoding="utf-8"?>
+<p:sld xmlns:a="http://schemas.openxmlformats.org/drawingml/2006/main" xmlns:r="http://schemas.openxmlformats.org/officeDocument/2006/relationships" xmlns:p="http://schemas.openxmlformats.org/presentationml/2006/main">
+  <p:cSld>
+    <p:spTree>
+      <p:nvGrpSpPr>
+        <p:cNvPr id="1" name=""/>
+        <p:cNvGrpSpPr/>
+        <p:nvPr/>
+      </p:nvGrpSpPr>
+      <p:grpSpPr>
+        <a:xfrm>
+          <a:off x="0" y="0"/>
+          <a:ext cx="0" cy="0"/>
+          <a:chOff x="0" y="0"/>
+          <a:chExt cx="0" cy="0"/>
+        </a:xfrm>
+      </p:grpSpPr>
+      <p:sp>
+        <p:nvSpPr>
+          <p:cNvPr id="2" name="Title 1"/>
+          <p:cNvSpPr>
+            <a:spLocks noGrp="1"/>
+          </p:cNvSpPr>
+          <p:nvPr>
+            <p:ph type="title"/>
           </p:nvPr>
         </p:nvSpPr>
         <p:spPr/>
@@ -8849,25 +8726,67 @@
           <a:p>
             <a:r>
               <a:rPr lang="en-US" dirty="0" smtClean="0"/>
-              <a:t>Using MPI, it is possible to use multiple devices.</a:t>
-            </a:r>
-          </a:p>
-          <a:p>
-            <a:r>
-              <a:rPr lang="en-US" dirty="0" smtClean="0"/>
-              <a:t>Typically, each MPI process gets a single device.</a:t>
-            </a:r>
-          </a:p>
-          <a:p>
-            <a:r>
-              <a:rPr lang="en-US" dirty="0" smtClean="0"/>
-              <a:t>This allows any number of OpenCL devices.</a:t>
-            </a:r>
-          </a:p>
-          <a:p>
-            <a:r>
-              <a:rPr lang="en-US" dirty="0" smtClean="0"/>
-              <a:t>However, moving memory between them can be very expensive.</a:t>
+              <a:t>OpenCL &amp; MPI</a:t>
+            </a:r>
+            <a:endParaRPr lang="en-US" dirty="0"/>
+          </a:p>
+        </p:txBody>
+      </p:sp>
+      <p:sp>
+        <p:nvSpPr>
+          <p:cNvPr id="3" name="Content Placeholder 2"/>
+          <p:cNvSpPr>
+            <a:spLocks noGrp="1"/>
+          </p:cNvSpPr>
+          <p:nvPr>
+            <p:ph idx="1"/>
+          </p:nvPr>
+        </p:nvSpPr>
+        <p:spPr/>
+        <p:txBody>
+          <a:bodyPr/>
+          <a:lstStyle/>
+          <a:p>
+            <a:r>
+              <a:rPr lang="en-US" dirty="0" smtClean="0"/>
+              <a:t>Using MPI, it is possible to use multiple </a:t>
+            </a:r>
+            <a:r>
+              <a:rPr lang="en-US" dirty="0" smtClean="0"/>
+              <a:t>devices</a:t>
+            </a:r>
+            <a:endParaRPr lang="en-US" dirty="0" smtClean="0"/>
+          </a:p>
+          <a:p>
+            <a:r>
+              <a:rPr lang="en-US" dirty="0" smtClean="0"/>
+              <a:t>Typically, each MPI process gets a single </a:t>
+            </a:r>
+            <a:r>
+              <a:rPr lang="en-US" dirty="0" smtClean="0"/>
+              <a:t>device</a:t>
+            </a:r>
+            <a:endParaRPr lang="en-US" dirty="0" smtClean="0"/>
+          </a:p>
+          <a:p>
+            <a:r>
+              <a:rPr lang="en-US" dirty="0" smtClean="0"/>
+              <a:t>This allows any number of OpenCL </a:t>
+            </a:r>
+            <a:r>
+              <a:rPr lang="en-US" dirty="0" smtClean="0"/>
+              <a:t>devices</a:t>
+            </a:r>
+            <a:endParaRPr lang="en-US" dirty="0" smtClean="0"/>
+          </a:p>
+          <a:p>
+            <a:r>
+              <a:rPr lang="en-US" dirty="0" smtClean="0"/>
+              <a:t>However, moving memory between them can be very </a:t>
+            </a:r>
+            <a:r>
+              <a:rPr lang="en-US" dirty="0" smtClean="0"/>
+              <a:t>expensive</a:t>
             </a:r>
             <a:endParaRPr lang="en-US" dirty="0"/>
           </a:p>
@@ -8893,7 +8812,7 @@
 </p:sld>
 </file>
 
-<file path=ppt/slides/slide24.xml><?xml version="1.0" encoding="utf-8"?>
+<file path=ppt/slides/slide25.xml><?xml version="1.0" encoding="utf-8"?>
 <p:sld xmlns:a="http://schemas.openxmlformats.org/drawingml/2006/main" xmlns:r="http://schemas.openxmlformats.org/officeDocument/2006/relationships" xmlns:p="http://schemas.openxmlformats.org/presentationml/2006/main">
   <p:cSld>
     <p:spTree>
@@ -9042,7 +8961,7 @@
 </p:sld>
 </file>
 
-<file path=ppt/slides/slide25.xml><?xml version="1.0" encoding="utf-8"?>
+<file path=ppt/slides/slide26.xml><?xml version="1.0" encoding="utf-8"?>
 <p:sld xmlns:a="http://schemas.openxmlformats.org/drawingml/2006/main" xmlns:r="http://schemas.openxmlformats.org/officeDocument/2006/relationships" xmlns:p="http://schemas.openxmlformats.org/presentationml/2006/main">
   <p:cSld>
     <p:spTree>

</xml_diff>

<commit_message>
dd speaker note to part 1 slides
</commit_message>
<xml_diff>
--- a/slides/advanced_part1.pptx
+++ b/slides/advanced_part1.pptx
@@ -217,7 +217,7 @@
           <a:p>
             <a:fld id="{C020D4C0-2770-3946-ABDD-0C7492C2C34D}" type="datetimeFigureOut">
               <a:rPr lang="en-US" smtClean="0"/>
-              <a:t>10/05/15</a:t>
+              <a:t>11/05/15</a:t>
             </a:fld>
             <a:endParaRPr lang="en-GB"/>
           </a:p>
@@ -614,6 +614,102 @@
           <a:bodyPr/>
           <a:lstStyle/>
           <a:p>
+            <a:r>
+              <a:rPr lang="en-US" dirty="0" err="1" smtClean="0"/>
+              <a:t>OpenCL</a:t>
+            </a:r>
+            <a:r>
+              <a:rPr lang="en-US" baseline="0" dirty="0" smtClean="0"/>
+              <a:t> 2.0 shared virtual memory will improve </a:t>
+            </a:r>
+            <a:r>
+              <a:rPr lang="en-US" baseline="0" smtClean="0"/>
+              <a:t>on this</a:t>
+            </a:r>
+            <a:endParaRPr lang="en-US" dirty="0"/>
+          </a:p>
+        </p:txBody>
+      </p:sp>
+      <p:sp>
+        <p:nvSpPr>
+          <p:cNvPr id="4" name="Slide Number Placeholder 3"/>
+          <p:cNvSpPr>
+            <a:spLocks noGrp="1"/>
+          </p:cNvSpPr>
+          <p:nvPr>
+            <p:ph type="sldNum" sz="quarter" idx="10"/>
+          </p:nvPr>
+        </p:nvSpPr>
+        <p:spPr/>
+        <p:txBody>
+          <a:bodyPr/>
+          <a:lstStyle/>
+          <a:p>
+            <a:fld id="{18B7B4CC-BAF8-A446-A722-9B4FBD8C20C1}" type="slidenum">
+              <a:rPr lang="en-GB" smtClean="0"/>
+              <a:t>18</a:t>
+            </a:fld>
+            <a:endParaRPr lang="en-GB"/>
+          </a:p>
+        </p:txBody>
+      </p:sp>
+    </p:spTree>
+    <p:extLst>
+      <p:ext uri="{BB962C8B-B14F-4D97-AF65-F5344CB8AC3E}">
+        <p14:creationId xmlns:p14="http://schemas.microsoft.com/office/powerpoint/2010/main" val="4260444199"/>
+      </p:ext>
+    </p:extLst>
+  </p:cSld>
+  <p:clrMapOvr>
+    <a:masterClrMapping/>
+  </p:clrMapOvr>
+</p:notes>
+</file>
+
+<file path=ppt/notesSlides/notesSlide3.xml><?xml version="1.0" encoding="utf-8"?>
+<p:notes xmlns:a="http://schemas.openxmlformats.org/drawingml/2006/main" xmlns:r="http://schemas.openxmlformats.org/officeDocument/2006/relationships" xmlns:p="http://schemas.openxmlformats.org/presentationml/2006/main">
+  <p:cSld>
+    <p:spTree>
+      <p:nvGrpSpPr>
+        <p:cNvPr id="1" name=""/>
+        <p:cNvGrpSpPr/>
+        <p:nvPr/>
+      </p:nvGrpSpPr>
+      <p:grpSpPr>
+        <a:xfrm>
+          <a:off x="0" y="0"/>
+          <a:ext cx="0" cy="0"/>
+          <a:chOff x="0" y="0"/>
+          <a:chExt cx="0" cy="0"/>
+        </a:xfrm>
+      </p:grpSpPr>
+      <p:sp>
+        <p:nvSpPr>
+          <p:cNvPr id="2" name="Slide Image Placeholder 1"/>
+          <p:cNvSpPr>
+            <a:spLocks noGrp="1" noRot="1" noChangeAspect="1"/>
+          </p:cNvSpPr>
+          <p:nvPr>
+            <p:ph type="sldImg"/>
+          </p:nvPr>
+        </p:nvSpPr>
+        <p:spPr/>
+      </p:sp>
+      <p:sp>
+        <p:nvSpPr>
+          <p:cNvPr id="3" name="Notes Placeholder 2"/>
+          <p:cNvSpPr>
+            <a:spLocks noGrp="1"/>
+          </p:cNvSpPr>
+          <p:nvPr>
+            <p:ph type="body" idx="1"/>
+          </p:nvPr>
+        </p:nvSpPr>
+        <p:spPr/>
+        <p:txBody>
+          <a:bodyPr/>
+          <a:lstStyle/>
+          <a:p>
             <a:endParaRPr lang="en-GB" dirty="0"/>
           </a:p>
         </p:txBody>
@@ -836,7 +932,7 @@
           <a:p>
             <a:fld id="{8959E172-2558-6049-8DA8-C86E1F6924DD}" type="datetimeFigureOut">
               <a:rPr lang="en-US" smtClean="0"/>
-              <a:t>10/05/15</a:t>
+              <a:t>11/05/15</a:t>
             </a:fld>
             <a:endParaRPr lang="en-GB"/>
           </a:p>
@@ -1006,7 +1102,7 @@
           <a:p>
             <a:fld id="{8959E172-2558-6049-8DA8-C86E1F6924DD}" type="datetimeFigureOut">
               <a:rPr lang="en-US" smtClean="0"/>
-              <a:t>10/05/15</a:t>
+              <a:t>11/05/15</a:t>
             </a:fld>
             <a:endParaRPr lang="en-GB"/>
           </a:p>
@@ -1186,7 +1282,7 @@
           <a:p>
             <a:fld id="{8959E172-2558-6049-8DA8-C86E1F6924DD}" type="datetimeFigureOut">
               <a:rPr lang="en-US" smtClean="0"/>
-              <a:t>10/05/15</a:t>
+              <a:t>11/05/15</a:t>
             </a:fld>
             <a:endParaRPr lang="en-GB"/>
           </a:p>
@@ -1356,7 +1452,7 @@
           <a:p>
             <a:fld id="{8959E172-2558-6049-8DA8-C86E1F6924DD}" type="datetimeFigureOut">
               <a:rPr lang="en-US" smtClean="0"/>
-              <a:t>10/05/15</a:t>
+              <a:t>11/05/15</a:t>
             </a:fld>
             <a:endParaRPr lang="en-GB"/>
           </a:p>
@@ -1602,7 +1698,7 @@
           <a:p>
             <a:fld id="{8959E172-2558-6049-8DA8-C86E1F6924DD}" type="datetimeFigureOut">
               <a:rPr lang="en-US" smtClean="0"/>
-              <a:t>10/05/15</a:t>
+              <a:t>11/05/15</a:t>
             </a:fld>
             <a:endParaRPr lang="en-GB"/>
           </a:p>
@@ -1890,7 +1986,7 @@
           <a:p>
             <a:fld id="{8959E172-2558-6049-8DA8-C86E1F6924DD}" type="datetimeFigureOut">
               <a:rPr lang="en-US" smtClean="0"/>
-              <a:t>10/05/15</a:t>
+              <a:t>11/05/15</a:t>
             </a:fld>
             <a:endParaRPr lang="en-GB"/>
           </a:p>
@@ -2312,7 +2408,7 @@
           <a:p>
             <a:fld id="{8959E172-2558-6049-8DA8-C86E1F6924DD}" type="datetimeFigureOut">
               <a:rPr lang="en-US" smtClean="0"/>
-              <a:t>10/05/15</a:t>
+              <a:t>11/05/15</a:t>
             </a:fld>
             <a:endParaRPr lang="en-GB"/>
           </a:p>
@@ -2430,7 +2526,7 @@
           <a:p>
             <a:fld id="{8959E172-2558-6049-8DA8-C86E1F6924DD}" type="datetimeFigureOut">
               <a:rPr lang="en-US" smtClean="0"/>
-              <a:t>10/05/15</a:t>
+              <a:t>11/05/15</a:t>
             </a:fld>
             <a:endParaRPr lang="en-GB"/>
           </a:p>
@@ -2525,7 +2621,7 @@
           <a:p>
             <a:fld id="{8959E172-2558-6049-8DA8-C86E1F6924DD}" type="datetimeFigureOut">
               <a:rPr lang="en-US" smtClean="0"/>
-              <a:t>10/05/15</a:t>
+              <a:t>11/05/15</a:t>
             </a:fld>
             <a:endParaRPr lang="en-GB"/>
           </a:p>
@@ -2802,7 +2898,7 @@
           <a:p>
             <a:fld id="{8959E172-2558-6049-8DA8-C86E1F6924DD}" type="datetimeFigureOut">
               <a:rPr lang="en-US" smtClean="0"/>
-              <a:t>10/05/15</a:t>
+              <a:t>11/05/15</a:t>
             </a:fld>
             <a:endParaRPr lang="en-GB"/>
           </a:p>
@@ -3055,7 +3151,7 @@
           <a:p>
             <a:fld id="{8959E172-2558-6049-8DA8-C86E1F6924DD}" type="datetimeFigureOut">
               <a:rPr lang="en-US" smtClean="0"/>
-              <a:t>10/05/15</a:t>
+              <a:t>11/05/15</a:t>
             </a:fld>
             <a:endParaRPr lang="en-GB"/>
           </a:p>
@@ -3268,7 +3364,7 @@
           <a:p>
             <a:fld id="{8959E172-2558-6049-8DA8-C86E1F6924DD}" type="datetimeFigureOut">
               <a:rPr lang="en-US" smtClean="0"/>
-              <a:t>10/05/15</a:t>
+              <a:t>11/05/15</a:t>
             </a:fld>
             <a:endParaRPr lang="en-GB"/>
           </a:p>
@@ -8366,13 +8462,8 @@
           <a:p>
             <a:r>
               <a:rPr lang="en-US" dirty="0" smtClean="0"/>
-              <a:t>The simplest method – just create a separate context and command queue for each </a:t>
-            </a:r>
-            <a:r>
-              <a:rPr lang="en-US" dirty="0" smtClean="0"/>
-              <a:t>device</a:t>
-            </a:r>
-            <a:endParaRPr lang="en-US" dirty="0" smtClean="0"/>
+              <a:t>The simplest method – just create a separate context and command queue for each device</a:t>
+            </a:r>
           </a:p>
           <a:p>
             <a:r>
@@ -8499,43 +8590,20 @@
           <a:p>
             <a:r>
               <a:rPr lang="en-US" dirty="0" smtClean="0"/>
-              <a:t>A context can support more than one  device, although only within the same </a:t>
-            </a:r>
-            <a:r>
-              <a:rPr lang="en-US" dirty="0" smtClean="0"/>
-              <a:t>platform</a:t>
-            </a:r>
-            <a:endParaRPr lang="en-US" dirty="0" smtClean="0"/>
-          </a:p>
-          <a:p>
-            <a:r>
-              <a:rPr lang="en-US" dirty="0" smtClean="0"/>
-              <a:t>This allows </a:t>
-            </a:r>
-            <a:r>
-              <a:rPr lang="en-US" dirty="0" smtClean="0"/>
-              <a:t>memory copies </a:t>
-            </a:r>
-            <a:r>
-              <a:rPr lang="en-US" dirty="0" smtClean="0"/>
-              <a:t>between </a:t>
-            </a:r>
-            <a:r>
-              <a:rPr lang="en-US" dirty="0" smtClean="0"/>
-              <a:t>devices</a:t>
-            </a:r>
-            <a:endParaRPr lang="en-US" dirty="0" smtClean="0"/>
-          </a:p>
-          <a:p>
-            <a:r>
-              <a:rPr lang="en-US" dirty="0" smtClean="0"/>
-              <a:t>However, there must be a separate command queue for each device in the </a:t>
-            </a:r>
-            <a:r>
-              <a:rPr lang="en-US" dirty="0" smtClean="0"/>
-              <a:t>context</a:t>
-            </a:r>
-            <a:endParaRPr lang="en-US" dirty="0" smtClean="0"/>
+              <a:t>A context can support more than one  device, although only within the same platform</a:t>
+            </a:r>
+          </a:p>
+          <a:p>
+            <a:r>
+              <a:rPr lang="en-US" dirty="0" smtClean="0"/>
+              <a:t>This allows memory copies between devices</a:t>
+            </a:r>
+          </a:p>
+          <a:p>
+            <a:r>
+              <a:rPr lang="en-US" dirty="0" smtClean="0"/>
+              <a:t>However, there must be a separate command queue for each device in the context</a:t>
+            </a:r>
           </a:p>
           <a:p>
             <a:r>
@@ -8749,44 +8817,25 @@
           <a:p>
             <a:r>
               <a:rPr lang="en-US" dirty="0" smtClean="0"/>
-              <a:t>Using MPI, it is possible to use multiple </a:t>
-            </a:r>
-            <a:r>
-              <a:rPr lang="en-US" dirty="0" smtClean="0"/>
-              <a:t>devices</a:t>
-            </a:r>
-            <a:endParaRPr lang="en-US" dirty="0" smtClean="0"/>
-          </a:p>
-          <a:p>
-            <a:r>
-              <a:rPr lang="en-US" dirty="0" smtClean="0"/>
-              <a:t>Typically, each MPI process gets a single </a:t>
-            </a:r>
-            <a:r>
-              <a:rPr lang="en-US" dirty="0" smtClean="0"/>
-              <a:t>device</a:t>
-            </a:r>
-            <a:endParaRPr lang="en-US" dirty="0" smtClean="0"/>
-          </a:p>
-          <a:p>
-            <a:r>
-              <a:rPr lang="en-US" dirty="0" smtClean="0"/>
-              <a:t>This allows any number of OpenCL </a:t>
-            </a:r>
-            <a:r>
-              <a:rPr lang="en-US" dirty="0" smtClean="0"/>
-              <a:t>devices</a:t>
-            </a:r>
-            <a:endParaRPr lang="en-US" dirty="0" smtClean="0"/>
-          </a:p>
-          <a:p>
-            <a:r>
-              <a:rPr lang="en-US" dirty="0" smtClean="0"/>
-              <a:t>However, moving memory between them can be very </a:t>
-            </a:r>
-            <a:r>
-              <a:rPr lang="en-US" dirty="0" smtClean="0"/>
-              <a:t>expensive</a:t>
+              <a:t>Using MPI, it is possible to use multiple devices</a:t>
+            </a:r>
+          </a:p>
+          <a:p>
+            <a:r>
+              <a:rPr lang="en-US" dirty="0" smtClean="0"/>
+              <a:t>Typically, each MPI process gets a single device</a:t>
+            </a:r>
+          </a:p>
+          <a:p>
+            <a:r>
+              <a:rPr lang="en-US" dirty="0" smtClean="0"/>
+              <a:t>This allows any number of OpenCL devices</a:t>
+            </a:r>
+          </a:p>
+          <a:p>
+            <a:r>
+              <a:rPr lang="en-US" dirty="0" smtClean="0"/>
+              <a:t>However, moving memory between them can be very expensive</a:t>
             </a:r>
             <a:endParaRPr lang="en-US" dirty="0"/>
           </a:p>

</xml_diff>

<commit_message>
Update part2 slides with changes from Waters training
</commit_message>
<xml_diff>
--- a/slides/advanced_part1.pptx
+++ b/slides/advanced_part1.pptx
@@ -5986,9 +5986,39 @@
                 <a:latin typeface="Courier New"/>
                 <a:cs typeface="Courier New"/>
               </a:rPr>
+              <a:t> main(</a:t>
+            </a:r>
+            <a:r>
+              <a:rPr lang="en-US" sz="1400" b="1" dirty="0" err="1" smtClean="0">
+                <a:solidFill>
+                  <a:srgbClr val="3366FF"/>
+                </a:solidFill>
+                <a:latin typeface="Courier New"/>
+                <a:cs typeface="Courier New"/>
+              </a:rPr>
+              <a:t>int</a:t>
+            </a:r>
+            <a:r>
+              <a:rPr lang="en-US" sz="1400" b="1" dirty="0" smtClean="0">
+                <a:solidFill>
+                  <a:srgbClr val="3366FF"/>
+                </a:solidFill>
+                <a:latin typeface="Courier New"/>
+                <a:cs typeface="Courier New"/>
+              </a:rPr>
               <a:t> </a:t>
             </a:r>
             <a:r>
+              <a:rPr lang="en-US" sz="1400" b="1" dirty="0" err="1" smtClean="0">
+                <a:solidFill>
+                  <a:srgbClr val="3366FF"/>
+                </a:solidFill>
+                <a:latin typeface="Courier New"/>
+                <a:cs typeface="Courier New"/>
+              </a:rPr>
+              <a:t>argc</a:t>
+            </a:r>
+            <a:r>
               <a:rPr lang="en-US" sz="1400" b="1" dirty="0" smtClean="0">
                 <a:solidFill>
                   <a:srgbClr val="3366FF"/>
@@ -5996,7 +6026,7 @@
                 <a:latin typeface="Courier New"/>
                 <a:cs typeface="Courier New"/>
               </a:rPr>
-              <a:t>main(</a:t>
+              <a:t>, char **</a:t>
             </a:r>
             <a:r>
               <a:rPr lang="en-US" sz="1400" b="1" dirty="0" err="1" smtClean="0">
@@ -6006,7 +6036,7 @@
                 <a:latin typeface="Courier New"/>
                 <a:cs typeface="Courier New"/>
               </a:rPr>
-              <a:t>int</a:t>
+              <a:t>argv</a:t>
             </a:r>
             <a:r>
               <a:rPr lang="en-US" sz="1400" b="1" dirty="0" smtClean="0">
@@ -6016,9 +6046,43 @@
                 <a:latin typeface="Courier New"/>
                 <a:cs typeface="Courier New"/>
               </a:rPr>
+              <a:t>)</a:t>
+            </a:r>
+          </a:p>
+          <a:p>
+            <a:r>
+              <a:rPr lang="en-US" sz="1400" b="1" dirty="0" smtClean="0">
+                <a:solidFill>
+                  <a:srgbClr val="3366FF"/>
+                </a:solidFill>
+                <a:latin typeface="Courier New"/>
+                <a:cs typeface="Courier New"/>
+              </a:rPr>
+              <a:t>{</a:t>
+            </a:r>
+          </a:p>
+          <a:p>
+            <a:r>
+              <a:rPr lang="en-US" sz="1400" b="1" dirty="0">
+                <a:solidFill>
+                  <a:srgbClr val="3366FF"/>
+                </a:solidFill>
+                <a:latin typeface="Courier New"/>
+                <a:cs typeface="Courier New"/>
+              </a:rPr>
               <a:t> </a:t>
             </a:r>
             <a:r>
+              <a:rPr lang="en-US" sz="1400" b="1" dirty="0" smtClean="0">
+                <a:solidFill>
+                  <a:srgbClr val="3366FF"/>
+                </a:solidFill>
+                <a:latin typeface="Courier New"/>
+                <a:cs typeface="Courier New"/>
+              </a:rPr>
+              <a:t> </a:t>
+            </a:r>
+            <a:r>
               <a:rPr lang="en-US" sz="1400" b="1" dirty="0" err="1" smtClean="0">
                 <a:solidFill>
                   <a:srgbClr val="3366FF"/>
@@ -6026,7 +6090,7 @@
                 <a:latin typeface="Courier New"/>
                 <a:cs typeface="Courier New"/>
               </a:rPr>
-              <a:t>argc</a:t>
+              <a:t>size_t</a:t>
             </a:r>
             <a:r>
               <a:rPr lang="en-US" sz="1400" b="1" dirty="0" smtClean="0">
@@ -6036,7 +6100,7 @@
                 <a:latin typeface="Courier New"/>
                 <a:cs typeface="Courier New"/>
               </a:rPr>
-              <a:t>, char **</a:t>
+              <a:t> </a:t>
             </a:r>
             <a:r>
               <a:rPr lang="en-US" sz="1400" b="1" dirty="0" err="1" smtClean="0">
@@ -6046,7 +6110,7 @@
                 <a:latin typeface="Courier New"/>
                 <a:cs typeface="Courier New"/>
               </a:rPr>
-              <a:t>argv</a:t>
+              <a:t>len</a:t>
             </a:r>
             <a:r>
               <a:rPr lang="en-US" sz="1400" b="1" dirty="0" smtClean="0">
@@ -6056,91 +6120,7 @@
                 <a:latin typeface="Courier New"/>
                 <a:cs typeface="Courier New"/>
               </a:rPr>
-              <a:t>)</a:t>
-            </a:r>
-          </a:p>
-          <a:p>
-            <a:r>
-              <a:rPr lang="en-US" sz="1400" b="1" dirty="0" smtClean="0">
-                <a:solidFill>
-                  <a:srgbClr val="3366FF"/>
-                </a:solidFill>
-                <a:latin typeface="Courier New"/>
-                <a:cs typeface="Courier New"/>
-              </a:rPr>
-              <a:t>{</a:t>
-            </a:r>
-          </a:p>
-          <a:p>
-            <a:r>
-              <a:rPr lang="en-US" sz="1400" b="1" dirty="0">
-                <a:solidFill>
-                  <a:srgbClr val="3366FF"/>
-                </a:solidFill>
-                <a:latin typeface="Courier New"/>
-                <a:cs typeface="Courier New"/>
-              </a:rPr>
-              <a:t> </a:t>
-            </a:r>
-            <a:r>
-              <a:rPr lang="en-US" sz="1400" b="1" dirty="0" smtClean="0">
-                <a:solidFill>
-                  <a:srgbClr val="3366FF"/>
-                </a:solidFill>
-                <a:latin typeface="Courier New"/>
-                <a:cs typeface="Courier New"/>
-              </a:rPr>
-              <a:t> </a:t>
-            </a:r>
-            <a:r>
-              <a:rPr lang="en-US" sz="1400" b="1" dirty="0" err="1" smtClean="0">
-                <a:solidFill>
-                  <a:srgbClr val="3366FF"/>
-                </a:solidFill>
-                <a:latin typeface="Courier New"/>
-                <a:cs typeface="Courier New"/>
-              </a:rPr>
-              <a:t>size_t</a:t>
-            </a:r>
-            <a:r>
-              <a:rPr lang="en-US" sz="1400" b="1" dirty="0" smtClean="0">
-                <a:solidFill>
-                  <a:srgbClr val="3366FF"/>
-                </a:solidFill>
-                <a:latin typeface="Courier New"/>
-                <a:cs typeface="Courier New"/>
-              </a:rPr>
-              <a:t> </a:t>
-            </a:r>
-            <a:r>
-              <a:rPr lang="en-US" sz="1400" b="1" dirty="0" err="1" smtClean="0">
-                <a:solidFill>
-                  <a:srgbClr val="3366FF"/>
-                </a:solidFill>
-                <a:latin typeface="Courier New"/>
-                <a:cs typeface="Courier New"/>
-              </a:rPr>
-              <a:t>len</a:t>
-            </a:r>
-            <a:r>
-              <a:rPr lang="en-US" sz="1400" b="1" dirty="0" smtClean="0">
-                <a:solidFill>
-                  <a:srgbClr val="3366FF"/>
-                </a:solidFill>
-                <a:latin typeface="Courier New"/>
-                <a:cs typeface="Courier New"/>
-              </a:rPr>
-              <a:t>    = 16 * 1024*1024</a:t>
-            </a:r>
-            <a:r>
-              <a:rPr lang="en-US" sz="1400" b="1" dirty="0" smtClean="0">
-                <a:solidFill>
-                  <a:srgbClr val="3366FF"/>
-                </a:solidFill>
-                <a:latin typeface="Courier New"/>
-                <a:cs typeface="Courier New"/>
-              </a:rPr>
-              <a:t>;</a:t>
+              <a:t>    = 16 * 1024*1024;</a:t>
             </a:r>
           </a:p>
           <a:p>
@@ -6161,17 +6141,7 @@
                 <a:latin typeface="Courier New"/>
                 <a:cs typeface="Courier New"/>
               </a:rPr>
-              <a:t>  float *buffer </a:t>
-            </a:r>
-            <a:r>
-              <a:rPr lang="en-US" sz="1400" b="1" dirty="0" smtClean="0">
-                <a:solidFill>
-                  <a:srgbClr val="3366FF"/>
-                </a:solidFill>
-                <a:latin typeface="Courier New"/>
-                <a:cs typeface="Courier New"/>
-              </a:rPr>
-              <a:t>= </a:t>
+              <a:t>  float *buffer = </a:t>
             </a:r>
             <a:r>
               <a:rPr lang="en-US" sz="1400" b="1" dirty="0" err="1" smtClean="0">
@@ -6509,17 +6479,7 @@
                 <a:latin typeface="Courier New"/>
                 <a:cs typeface="Courier New"/>
               </a:rPr>
-              <a:t> </a:t>
-            </a:r>
-            <a:r>
-              <a:rPr lang="en-US" sz="1400" b="1" dirty="0" smtClean="0">
-                <a:solidFill>
-                  <a:srgbClr val="3366FF"/>
-                </a:solidFill>
-                <a:latin typeface="Courier New"/>
-                <a:cs typeface="Courier New"/>
-              </a:rPr>
-              <a:t>main(</a:t>
+              <a:t> main(</a:t>
             </a:r>
             <a:r>
               <a:rPr lang="en-US" sz="1400" b="1" dirty="0" err="1" smtClean="0">
@@ -6674,17 +6634,7 @@
                 <a:latin typeface="Courier New"/>
                 <a:cs typeface="Courier New"/>
               </a:rPr>
-              <a:t>  float *</a:t>
-            </a:r>
-            <a:r>
-              <a:rPr lang="en-US" sz="1400" b="1" dirty="0" smtClean="0">
-                <a:solidFill>
-                  <a:srgbClr val="3366FF"/>
-                </a:solidFill>
-                <a:latin typeface="Courier New"/>
-                <a:cs typeface="Courier New"/>
-              </a:rPr>
-              <a:t>buffer = </a:t>
+              <a:t>  float *buffer = </a:t>
             </a:r>
             <a:r>
               <a:rPr lang="en-US" sz="1400" b="1" dirty="0" err="1" smtClean="0">
@@ -8414,11 +8364,7 @@
           <a:p>
             <a:r>
               <a:rPr lang="en-US" dirty="0" smtClean="0"/>
-              <a:t>Allocating </a:t>
-            </a:r>
-            <a:r>
-              <a:rPr lang="en-US" dirty="0" smtClean="0"/>
-              <a:t>pinned memory is much more expensive (about 100x slower) than regular memory, so frequent allocations will be bad for performance.</a:t>
+              <a:t>Allocating pinned memory is much more expensive (about 100x slower) than regular memory, so frequent allocations will be bad for performance.</a:t>
             </a:r>
           </a:p>
           <a:p>
@@ -9604,15 +9550,11 @@
           <a:p>
             <a:r>
               <a:rPr lang="en-GB" dirty="0" smtClean="0"/>
-              <a:t>Exercise </a:t>
-            </a:r>
-            <a:r>
-              <a:rPr lang="en-GB" dirty="0"/>
-              <a:t>1</a:t>
+              <a:t>Exercise:</a:t>
             </a:r>
             <a:r>
               <a:rPr lang="en-GB" dirty="0" smtClean="0"/>
-              <a:t>:</a:t>
+              <a:t/>
             </a:r>
             <a:br>
               <a:rPr lang="en-GB" dirty="0" smtClean="0"/>
@@ -9825,27 +9767,7 @@
                 <a:latin typeface="Courier New"/>
                 <a:cs typeface="Courier New"/>
               </a:rPr>
-              <a:t>/</a:t>
-            </a:r>
-            <a:r>
-              <a:rPr lang="en-US" sz="1600" b="1" dirty="0" smtClean="0">
-                <a:solidFill>
-                  <a:srgbClr val="3366FF"/>
-                </a:solidFill>
-                <a:latin typeface="Courier New"/>
-                <a:cs typeface="Courier New"/>
-              </a:rPr>
-              <a:t>/ get </a:t>
-            </a:r>
-            <a:r>
-              <a:rPr lang="en-US" sz="1600" b="1" dirty="0" smtClean="0">
-                <a:solidFill>
-                  <a:srgbClr val="3366FF"/>
-                </a:solidFill>
-                <a:latin typeface="Courier New"/>
-                <a:cs typeface="Courier New"/>
-              </a:rPr>
-              <a:t>platforms</a:t>
+              <a:t>// get platforms</a:t>
             </a:r>
           </a:p>
           <a:p>
@@ -9946,27 +9868,7 @@
                 <a:latin typeface="Courier New"/>
                 <a:cs typeface="Courier New"/>
               </a:rPr>
-              <a:t>/</a:t>
-            </a:r>
-            <a:r>
-              <a:rPr lang="en-US" sz="1600" b="1" dirty="0" smtClean="0">
-                <a:solidFill>
-                  <a:srgbClr val="3366FF"/>
-                </a:solidFill>
-                <a:latin typeface="Courier New"/>
-                <a:cs typeface="Courier New"/>
-              </a:rPr>
-              <a:t>/ get </a:t>
-            </a:r>
-            <a:r>
-              <a:rPr lang="en-US" sz="1600" b="1" dirty="0" smtClean="0">
-                <a:solidFill>
-                  <a:srgbClr val="3366FF"/>
-                </a:solidFill>
-                <a:latin typeface="Courier New"/>
-                <a:cs typeface="Courier New"/>
-              </a:rPr>
-              <a:t>devices from the first platform</a:t>
+              <a:t>// get devices from the first platform</a:t>
             </a:r>
             <a:endParaRPr lang="en-US" sz="1600" b="1" dirty="0">
               <a:solidFill>
@@ -10112,27 +10014,7 @@
                 <a:latin typeface="Courier New"/>
                 <a:cs typeface="Courier New"/>
               </a:rPr>
-              <a:t>/</a:t>
-            </a:r>
-            <a:r>
-              <a:rPr lang="en-US" sz="1600" b="1" dirty="0" smtClean="0">
-                <a:solidFill>
-                  <a:srgbClr val="3366FF"/>
-                </a:solidFill>
-                <a:latin typeface="Courier New"/>
-                <a:cs typeface="Courier New"/>
-              </a:rPr>
-              <a:t>/ create </a:t>
-            </a:r>
-            <a:r>
-              <a:rPr lang="en-US" sz="1600" b="1" dirty="0" smtClean="0">
-                <a:solidFill>
-                  <a:srgbClr val="3366FF"/>
-                </a:solidFill>
-                <a:latin typeface="Courier New"/>
-                <a:cs typeface="Courier New"/>
-              </a:rPr>
-              <a:t>context from first device</a:t>
+              <a:t>// create context from first device</a:t>
             </a:r>
             <a:endParaRPr lang="en-US" sz="1600" b="1" dirty="0">
               <a:solidFill>
@@ -10445,17 +10327,7 @@
                 <a:latin typeface="Courier New"/>
                 <a:cs typeface="Courier New"/>
               </a:rPr>
-              <a:t>  /</a:t>
-            </a:r>
-            <a:r>
-              <a:rPr lang="en-US" sz="1200" b="1" dirty="0" smtClean="0">
-                <a:solidFill>
-                  <a:srgbClr val="3366FF"/>
-                </a:solidFill>
-                <a:latin typeface="Courier New"/>
-                <a:cs typeface="Courier New"/>
-              </a:rPr>
-              <a:t>/ get </a:t>
+              <a:t>  // get </a:t>
             </a:r>
             <a:r>
               <a:rPr lang="en-US" sz="1200" b="1" dirty="0">
@@ -10552,17 +10424,7 @@
                 <a:latin typeface="Courier New"/>
                 <a:cs typeface="Courier New"/>
               </a:rPr>
-              <a:t>  /</a:t>
-            </a:r>
-            <a:r>
-              <a:rPr lang="en-US" sz="1200" b="1" dirty="0" smtClean="0">
-                <a:solidFill>
-                  <a:srgbClr val="3366FF"/>
-                </a:solidFill>
-                <a:latin typeface="Courier New"/>
-                <a:cs typeface="Courier New"/>
-              </a:rPr>
-              <a:t>/ get </a:t>
+              <a:t>  // get </a:t>
             </a:r>
             <a:r>
               <a:rPr lang="en-US" sz="1200" b="1" dirty="0">
@@ -10714,17 +10576,7 @@
                 <a:latin typeface="Courier New"/>
                 <a:cs typeface="Courier New"/>
               </a:rPr>
-              <a:t>  /</a:t>
-            </a:r>
-            <a:r>
-              <a:rPr lang="en-US" sz="1200" b="1" dirty="0" smtClean="0">
-                <a:solidFill>
-                  <a:srgbClr val="3366FF"/>
-                </a:solidFill>
-                <a:latin typeface="Courier New"/>
-                <a:cs typeface="Courier New"/>
-              </a:rPr>
-              <a:t>/ create </a:t>
+              <a:t>  // create </a:t>
             </a:r>
             <a:r>
               <a:rPr lang="en-US" sz="1200" b="1" dirty="0">
@@ -10853,37 +10705,7 @@
                 <a:latin typeface="Courier New"/>
                 <a:cs typeface="Courier New"/>
               </a:rPr>
-              <a:t> /</a:t>
-            </a:r>
-            <a:r>
-              <a:rPr lang="en-US" sz="1200" b="1" dirty="0" smtClean="0">
-                <a:solidFill>
-                  <a:srgbClr val="3366FF"/>
-                </a:solidFill>
-                <a:latin typeface="Courier New"/>
-                <a:cs typeface="Courier New"/>
-              </a:rPr>
-              <a:t>/ remember</a:t>
-            </a:r>
-            <a:r>
-              <a:rPr lang="en-US" sz="1200" b="1" dirty="0" smtClean="0">
-                <a:solidFill>
-                  <a:srgbClr val="3366FF"/>
-                </a:solidFill>
-                <a:latin typeface="Courier New"/>
-                <a:cs typeface="Courier New"/>
-              </a:rPr>
-              <a:t>: check ids are in </a:t>
-            </a:r>
-            <a:r>
-              <a:rPr lang="en-US" sz="1200" b="1" dirty="0" smtClean="0">
-                <a:solidFill>
-                  <a:srgbClr val="3366FF"/>
-                </a:solidFill>
-                <a:latin typeface="Courier New"/>
-                <a:cs typeface="Courier New"/>
-              </a:rPr>
-              <a:t>range</a:t>
+              <a:t> // remember: check ids are in range</a:t>
             </a:r>
             <a:endParaRPr lang="en-US" sz="1200" b="1" dirty="0">
               <a:solidFill>

</xml_diff>

<commit_message>
Added HostTransfer results slide
Added some transfer result times from yawai for K40c, K20 and CPU zero
copy.
</commit_message>
<xml_diff>
--- a/slides/advanced_part1.pptx
+++ b/slides/advanced_part1.pptx
@@ -5,7 +5,7 @@
     <p:sldMasterId id="2147483648" r:id="rId1"/>
   </p:sldMasterIdLst>
   <p:notesMasterIdLst>
-    <p:notesMasterId r:id="rId29"/>
+    <p:notesMasterId r:id="rId30"/>
   </p:notesMasterIdLst>
   <p:sldIdLst>
     <p:sldId id="257" r:id="rId2"/>
@@ -35,6 +35,7 @@
     <p:sldId id="280" r:id="rId26"/>
     <p:sldId id="282" r:id="rId27"/>
     <p:sldId id="279" r:id="rId28"/>
+    <p:sldId id="285" r:id="rId29"/>
   </p:sldIdLst>
   <p:sldSz cx="9144000" cy="6858000" type="screen4x3"/>
   <p:notesSz cx="6858000" cy="9144000"/>
@@ -218,7 +219,7 @@
           <a:p>
             <a:fld id="{C020D4C0-2770-3946-ABDD-0C7492C2C34D}" type="datetimeFigureOut">
               <a:rPr lang="en-US" smtClean="0"/>
-              <a:t>08/04/16</a:t>
+              <a:t>14/04/16</a:t>
             </a:fld>
             <a:endParaRPr lang="en-GB"/>
           </a:p>
@@ -933,7 +934,7 @@
           <a:p>
             <a:fld id="{8959E172-2558-6049-8DA8-C86E1F6924DD}" type="datetimeFigureOut">
               <a:rPr lang="en-US" smtClean="0"/>
-              <a:t>08/04/16</a:t>
+              <a:t>14/04/16</a:t>
             </a:fld>
             <a:endParaRPr lang="en-GB"/>
           </a:p>
@@ -1103,7 +1104,7 @@
           <a:p>
             <a:fld id="{8959E172-2558-6049-8DA8-C86E1F6924DD}" type="datetimeFigureOut">
               <a:rPr lang="en-US" smtClean="0"/>
-              <a:t>08/04/16</a:t>
+              <a:t>14/04/16</a:t>
             </a:fld>
             <a:endParaRPr lang="en-GB"/>
           </a:p>
@@ -1283,7 +1284,7 @@
           <a:p>
             <a:fld id="{8959E172-2558-6049-8DA8-C86E1F6924DD}" type="datetimeFigureOut">
               <a:rPr lang="en-US" smtClean="0"/>
-              <a:t>08/04/16</a:t>
+              <a:t>14/04/16</a:t>
             </a:fld>
             <a:endParaRPr lang="en-GB"/>
           </a:p>
@@ -1453,7 +1454,7 @@
           <a:p>
             <a:fld id="{8959E172-2558-6049-8DA8-C86E1F6924DD}" type="datetimeFigureOut">
               <a:rPr lang="en-US" smtClean="0"/>
-              <a:t>08/04/16</a:t>
+              <a:t>14/04/16</a:t>
             </a:fld>
             <a:endParaRPr lang="en-GB"/>
           </a:p>
@@ -1699,7 +1700,7 @@
           <a:p>
             <a:fld id="{8959E172-2558-6049-8DA8-C86E1F6924DD}" type="datetimeFigureOut">
               <a:rPr lang="en-US" smtClean="0"/>
-              <a:t>08/04/16</a:t>
+              <a:t>14/04/16</a:t>
             </a:fld>
             <a:endParaRPr lang="en-GB"/>
           </a:p>
@@ -1987,7 +1988,7 @@
           <a:p>
             <a:fld id="{8959E172-2558-6049-8DA8-C86E1F6924DD}" type="datetimeFigureOut">
               <a:rPr lang="en-US" smtClean="0"/>
-              <a:t>08/04/16</a:t>
+              <a:t>14/04/16</a:t>
             </a:fld>
             <a:endParaRPr lang="en-GB"/>
           </a:p>
@@ -2409,7 +2410,7 @@
           <a:p>
             <a:fld id="{8959E172-2558-6049-8DA8-C86E1F6924DD}" type="datetimeFigureOut">
               <a:rPr lang="en-US" smtClean="0"/>
-              <a:t>08/04/16</a:t>
+              <a:t>14/04/16</a:t>
             </a:fld>
             <a:endParaRPr lang="en-GB"/>
           </a:p>
@@ -2527,7 +2528,7 @@
           <a:p>
             <a:fld id="{8959E172-2558-6049-8DA8-C86E1F6924DD}" type="datetimeFigureOut">
               <a:rPr lang="en-US" smtClean="0"/>
-              <a:t>08/04/16</a:t>
+              <a:t>14/04/16</a:t>
             </a:fld>
             <a:endParaRPr lang="en-GB"/>
           </a:p>
@@ -2622,7 +2623,7 @@
           <a:p>
             <a:fld id="{8959E172-2558-6049-8DA8-C86E1F6924DD}" type="datetimeFigureOut">
               <a:rPr lang="en-US" smtClean="0"/>
-              <a:t>08/04/16</a:t>
+              <a:t>14/04/16</a:t>
             </a:fld>
             <a:endParaRPr lang="en-GB"/>
           </a:p>
@@ -2899,7 +2900,7 @@
           <a:p>
             <a:fld id="{8959E172-2558-6049-8DA8-C86E1F6924DD}" type="datetimeFigureOut">
               <a:rPr lang="en-US" smtClean="0"/>
-              <a:t>08/04/16</a:t>
+              <a:t>14/04/16</a:t>
             </a:fld>
             <a:endParaRPr lang="en-GB"/>
           </a:p>
@@ -3152,7 +3153,7 @@
           <a:p>
             <a:fld id="{8959E172-2558-6049-8DA8-C86E1F6924DD}" type="datetimeFigureOut">
               <a:rPr lang="en-US" smtClean="0"/>
-              <a:t>08/04/16</a:t>
+              <a:t>14/04/16</a:t>
             </a:fld>
             <a:endParaRPr lang="en-GB"/>
           </a:p>
@@ -3365,7 +3366,7 @@
           <a:p>
             <a:fld id="{8959E172-2558-6049-8DA8-C86E1F6924DD}" type="datetimeFigureOut">
               <a:rPr lang="en-US" smtClean="0"/>
-              <a:t>08/04/16</a:t>
+              <a:t>14/04/16</a:t>
             </a:fld>
             <a:endParaRPr lang="en-GB"/>
           </a:p>
@@ -4412,14 +4413,40 @@
           <a:p>
             <a:r>
               <a:rPr lang="en-US" dirty="0"/>
-              <a:t>The pointer we got back, when accessed, will trigger a page fault in the kernel.</a:t>
-            </a:r>
-          </a:p>
-          <a:p>
+              <a:t>The pointer we </a:t>
+            </a:r>
+            <a:r>
+              <a:rPr lang="en-US" dirty="0" smtClean="0"/>
+              <a:t>get back from </a:t>
+            </a:r>
+            <a:r>
+              <a:rPr lang="en-US" dirty="0" err="1" smtClean="0"/>
+              <a:t>malloc</a:t>
+            </a:r>
+            <a:r>
+              <a:rPr lang="en-US" dirty="0" smtClean="0"/>
+              <a:t>, </a:t>
+            </a:r>
             <a:r>
               <a:rPr lang="en-US" dirty="0"/>
-              <a:t>The kernel will then allocate us some memory, and allow us to write to it.</a:t>
-            </a:r>
+              <a:t>when accessed, will trigger a page fault in the </a:t>
+            </a:r>
+            <a:r>
+              <a:rPr lang="en-US" dirty="0" smtClean="0"/>
+              <a:t>kernel</a:t>
+            </a:r>
+            <a:endParaRPr lang="en-US" dirty="0"/>
+          </a:p>
+          <a:p>
+            <a:r>
+              <a:rPr lang="en-US" dirty="0"/>
+              <a:t>The kernel will then allocate us some memory, and allow us to write to </a:t>
+            </a:r>
+            <a:r>
+              <a:rPr lang="en-US" dirty="0" smtClean="0"/>
+              <a:t>it</a:t>
+            </a:r>
+            <a:endParaRPr lang="en-US" dirty="0"/>
           </a:p>
           <a:p>
             <a:endParaRPr lang="en-US" dirty="0"/>
@@ -7140,7 +7167,11 @@
             </a:pPr>
             <a:r>
               <a:rPr lang="en-US" dirty="0" smtClean="0"/>
-              <a:t>In fact, an allocation may not even be contiguous</a:t>
+              <a:t>Allocations </a:t>
+            </a:r>
+            <a:r>
+              <a:rPr lang="en-US" dirty="0" smtClean="0"/>
+              <a:t>may not even be contiguous</a:t>
             </a:r>
           </a:p>
           <a:p>
@@ -7151,7 +7182,7 @@
             </a:pPr>
             <a:r>
               <a:rPr lang="en-US" dirty="0" smtClean="0"/>
-              <a:t>So, </a:t>
+              <a:t>Therefore, </a:t>
             </a:r>
             <a:r>
               <a:rPr lang="en-US" dirty="0" err="1" smtClean="0"/>
@@ -7179,9 +7210,21 @@
             </a:r>
             <a:r>
               <a:rPr lang="en-US" dirty="0" smtClean="0"/>
-              <a:t> incur an additional host memory to host memory copy, wasting bandwidth and costing performance</a:t>
-            </a:r>
-            <a:endParaRPr lang="en-US" dirty="0"/>
+              <a:t> incur an additional host memory to host memory copy, </a:t>
+            </a:r>
+            <a:r>
+              <a:rPr lang="en-US" u="sng" dirty="0" smtClean="0">
+                <a:solidFill>
+                  <a:srgbClr val="FF0000"/>
+                </a:solidFill>
+              </a:rPr>
+              <a:t>wasting bandwidth and costing performance</a:t>
+            </a:r>
+            <a:endParaRPr lang="en-US" u="sng" dirty="0">
+              <a:solidFill>
+                <a:srgbClr val="FF0000"/>
+              </a:solidFill>
+            </a:endParaRPr>
           </a:p>
         </p:txBody>
       </p:sp>
@@ -8513,14 +8556,98 @@
           <a:lstStyle/>
           <a:p>
             <a:r>
-              <a:rPr lang="en-US" dirty="0" smtClean="0"/>
-              <a:t>Allocating pinned memory is much more expensive (about 100x slower) than regular memory, so frequent allocations will be bad for performance.</a:t>
-            </a:r>
-          </a:p>
-          <a:p>
-            <a:r>
-              <a:rPr lang="en-US" dirty="0" smtClean="0"/>
-              <a:t>However, frequent reads and writes will be much faster!</a:t>
+              <a:rPr lang="en-US" dirty="0" smtClean="0">
+                <a:solidFill>
+                  <a:srgbClr val="FF0000"/>
+                </a:solidFill>
+              </a:rPr>
+              <a:t>Allocating pinned memory is </a:t>
+            </a:r>
+            <a:r>
+              <a:rPr lang="en-US" b="1" dirty="0" smtClean="0">
+                <a:solidFill>
+                  <a:srgbClr val="FF0000"/>
+                </a:solidFill>
+              </a:rPr>
+              <a:t>much</a:t>
+            </a:r>
+            <a:r>
+              <a:rPr lang="en-US" dirty="0" smtClean="0">
+                <a:solidFill>
+                  <a:srgbClr val="FF0000"/>
+                </a:solidFill>
+              </a:rPr>
+              <a:t> more expensive </a:t>
+            </a:r>
+            <a:r>
+              <a:rPr lang="en-US" dirty="0" smtClean="0">
+                <a:solidFill>
+                  <a:srgbClr val="FF0000"/>
+                </a:solidFill>
+              </a:rPr>
+              <a:t>than </a:t>
+            </a:r>
+            <a:r>
+              <a:rPr lang="en-US" dirty="0" smtClean="0">
+                <a:solidFill>
+                  <a:srgbClr val="FF0000"/>
+                </a:solidFill>
+              </a:rPr>
+              <a:t>regular </a:t>
+            </a:r>
+            <a:r>
+              <a:rPr lang="en-US" dirty="0" smtClean="0">
+                <a:solidFill>
+                  <a:srgbClr val="FF0000"/>
+                </a:solidFill>
+              </a:rPr>
+              <a:t>memory </a:t>
+            </a:r>
+            <a:r>
+              <a:rPr lang="en-US" dirty="0" smtClean="0"/>
+              <a:t>(</a:t>
+            </a:r>
+            <a:r>
+              <a:rPr lang="en-US" dirty="0"/>
+              <a:t>about 100x slower</a:t>
+            </a:r>
+            <a:r>
+              <a:rPr lang="en-US" dirty="0" smtClean="0"/>
+              <a:t>), </a:t>
+            </a:r>
+            <a:r>
+              <a:rPr lang="en-US" dirty="0" smtClean="0"/>
+              <a:t>so frequent allocations will be bad for performance.</a:t>
+            </a:r>
+          </a:p>
+          <a:p>
+            <a:r>
+              <a:rPr lang="en-US" dirty="0" smtClean="0"/>
+              <a:t>However, </a:t>
+            </a:r>
+            <a:r>
+              <a:rPr lang="en-US" dirty="0" smtClean="0">
+                <a:solidFill>
+                  <a:srgbClr val="008000"/>
+                </a:solidFill>
+              </a:rPr>
+              <a:t>frequent reads and writes will be </a:t>
+            </a:r>
+            <a:r>
+              <a:rPr lang="en-US" b="1" i="1" dirty="0" smtClean="0">
+                <a:solidFill>
+                  <a:srgbClr val="008000"/>
+                </a:solidFill>
+              </a:rPr>
+              <a:t>much</a:t>
+            </a:r>
+            <a:r>
+              <a:rPr lang="en-US" dirty="0" smtClean="0">
+                <a:solidFill>
+                  <a:srgbClr val="008000"/>
+                </a:solidFill>
+              </a:rPr>
+              <a:t> faster!</a:t>
             </a:r>
           </a:p>
           <a:p>
@@ -9798,6 +9925,401 @@
 </p:sld>
 </file>
 
+<file path=ppt/slides/slide28.xml><?xml version="1.0" encoding="utf-8"?>
+<p:sld xmlns:a="http://schemas.openxmlformats.org/drawingml/2006/main" xmlns:r="http://schemas.openxmlformats.org/officeDocument/2006/relationships" xmlns:p="http://schemas.openxmlformats.org/presentationml/2006/main">
+  <p:cSld>
+    <p:spTree>
+      <p:nvGrpSpPr>
+        <p:cNvPr id="1" name=""/>
+        <p:cNvGrpSpPr/>
+        <p:nvPr/>
+      </p:nvGrpSpPr>
+      <p:grpSpPr>
+        <a:xfrm>
+          <a:off x="0" y="0"/>
+          <a:ext cx="0" cy="0"/>
+          <a:chOff x="0" y="0"/>
+          <a:chExt cx="0" cy="0"/>
+        </a:xfrm>
+      </p:grpSpPr>
+      <p:sp>
+        <p:nvSpPr>
+          <p:cNvPr id="2" name="Title 1"/>
+          <p:cNvSpPr>
+            <a:spLocks noGrp="1"/>
+          </p:cNvSpPr>
+          <p:nvPr>
+            <p:ph type="title"/>
+          </p:nvPr>
+        </p:nvSpPr>
+        <p:spPr>
+          <a:xfrm>
+            <a:off x="457200" y="23016"/>
+            <a:ext cx="8229600" cy="839663"/>
+          </a:xfrm>
+        </p:spPr>
+        <p:txBody>
+          <a:bodyPr>
+            <a:normAutofit fontScale="90000"/>
+          </a:bodyPr>
+          <a:lstStyle/>
+          <a:p>
+            <a:r>
+              <a:rPr lang="en-GB" dirty="0" smtClean="0"/>
+              <a:t>Exercise results (Zoo </a:t>
+            </a:r>
+            <a:r>
+              <a:rPr lang="en-GB" dirty="0"/>
+              <a:t>machine </a:t>
+            </a:r>
+            <a:r>
+              <a:rPr lang="en-GB" dirty="0" err="1" smtClean="0"/>
+              <a:t>yawai</a:t>
+            </a:r>
+            <a:r>
+              <a:rPr lang="en-GB" dirty="0" smtClean="0"/>
+              <a:t>)</a:t>
+            </a:r>
+            <a:endParaRPr lang="en-GB" dirty="0"/>
+          </a:p>
+        </p:txBody>
+      </p:sp>
+      <p:sp>
+        <p:nvSpPr>
+          <p:cNvPr id="3" name="Content Placeholder 2"/>
+          <p:cNvSpPr>
+            <a:spLocks noGrp="1"/>
+          </p:cNvSpPr>
+          <p:nvPr>
+            <p:ph idx="1"/>
+          </p:nvPr>
+        </p:nvSpPr>
+        <p:spPr>
+          <a:xfrm>
+            <a:off x="457200" y="1042404"/>
+            <a:ext cx="8229600" cy="5607415"/>
+          </a:xfrm>
+        </p:spPr>
+        <p:txBody>
+          <a:bodyPr>
+            <a:normAutofit fontScale="47500" lnSpcReduction="20000"/>
+          </a:bodyPr>
+          <a:lstStyle/>
+          <a:p>
+            <a:pPr marL="0" indent="0">
+              <a:buNone/>
+            </a:pPr>
+            <a:r>
+              <a:rPr lang="en-GB" b="1" dirty="0" smtClean="0"/>
+              <a:t>$ </a:t>
+            </a:r>
+            <a:r>
+              <a:rPr lang="en-GB" b="1" dirty="0"/>
+              <a:t>./transfer --</a:t>
+            </a:r>
+            <a:r>
+              <a:rPr lang="en-GB" b="1" dirty="0" smtClean="0"/>
+              <a:t>list</a:t>
+            </a:r>
+            <a:endParaRPr lang="en-GB" b="1" dirty="0"/>
+          </a:p>
+          <a:p>
+            <a:pPr marL="0" indent="0">
+              <a:buNone/>
+            </a:pPr>
+            <a:r>
+              <a:rPr lang="en-GB" dirty="0"/>
+              <a:t>Devices:</a:t>
+            </a:r>
+          </a:p>
+          <a:p>
+            <a:pPr marL="0" indent="0">
+              <a:buNone/>
+            </a:pPr>
+            <a:r>
+              <a:rPr lang="nb-NO" dirty="0"/>
+              <a:t>0: Tesla K40c</a:t>
+            </a:r>
+          </a:p>
+          <a:p>
+            <a:pPr marL="0" indent="0">
+              <a:buNone/>
+            </a:pPr>
+            <a:r>
+              <a:rPr lang="nb-NO" dirty="0"/>
+              <a:t>1: Tesla K20c</a:t>
+            </a:r>
+          </a:p>
+          <a:p>
+            <a:pPr marL="0" indent="0">
+              <a:buNone/>
+            </a:pPr>
+            <a:r>
+              <a:rPr lang="de-DE" dirty="0"/>
+              <a:t>2: </a:t>
+            </a:r>
+            <a:r>
+              <a:rPr lang="de-DE" dirty="0" smtClean="0"/>
+              <a:t>Intel</a:t>
+            </a:r>
+            <a:r>
+              <a:rPr lang="de-DE" dirty="0"/>
+              <a:t>(R) Core(TM) i5-3550 CPU @ </a:t>
+            </a:r>
+            <a:r>
+              <a:rPr lang="de-DE" dirty="0" smtClean="0"/>
+              <a:t>3.30GHz</a:t>
+            </a:r>
+          </a:p>
+          <a:p>
+            <a:pPr marL="0" indent="0">
+              <a:buNone/>
+            </a:pPr>
+            <a:endParaRPr lang="de-DE" dirty="0"/>
+          </a:p>
+          <a:p>
+            <a:pPr marL="0" indent="0">
+              <a:buNone/>
+            </a:pPr>
+            <a:r>
+              <a:rPr lang="en-GB" b="1" dirty="0" smtClean="0"/>
+              <a:t>Using </a:t>
+            </a:r>
+            <a:r>
+              <a:rPr lang="en-GB" b="1" dirty="0"/>
+              <a:t>OpenCL device: Tesla </a:t>
+            </a:r>
+            <a:r>
+              <a:rPr lang="en-GB" b="1" dirty="0" smtClean="0"/>
+              <a:t>K40c</a:t>
+            </a:r>
+            <a:endParaRPr lang="en-GB" b="1" dirty="0"/>
+          </a:p>
+          <a:p>
+            <a:pPr marL="0" indent="0">
+              <a:buNone/>
+            </a:pPr>
+            <a:r>
+              <a:rPr lang="en-GB" dirty="0"/>
+              <a:t>Type          Total   Transfer       Bandwidth</a:t>
+            </a:r>
+          </a:p>
+          <a:p>
+            <a:pPr marL="0" indent="0">
+              <a:buNone/>
+            </a:pPr>
+            <a:r>
+              <a:rPr lang="en-US" dirty="0"/>
+              <a:t>----------------------------------------------</a:t>
+            </a:r>
+          </a:p>
+          <a:p>
+            <a:pPr marL="0" indent="0">
+              <a:buNone/>
+            </a:pPr>
+            <a:r>
+              <a:rPr lang="de-DE" dirty="0"/>
+              <a:t>Baseline      5.28s      1.77s       4.86 GB/s</a:t>
+            </a:r>
+          </a:p>
+          <a:p>
+            <a:pPr marL="0" indent="0">
+              <a:buNone/>
+            </a:pPr>
+            <a:r>
+              <a:rPr lang="de-DE" dirty="0" err="1"/>
+              <a:t>Pinned</a:t>
+            </a:r>
+            <a:r>
+              <a:rPr lang="de-DE" dirty="0"/>
+              <a:t>        4.86s      1.30s       6.61 GB/s</a:t>
+            </a:r>
+            <a:endParaRPr lang="de-DE" dirty="0" smtClean="0"/>
+          </a:p>
+          <a:p>
+            <a:pPr marL="0" indent="0">
+              <a:buNone/>
+            </a:pPr>
+            <a:endParaRPr lang="de-DE" dirty="0"/>
+          </a:p>
+          <a:p>
+            <a:pPr marL="0" indent="0">
+              <a:buNone/>
+            </a:pPr>
+            <a:r>
+              <a:rPr lang="en-GB" b="1" dirty="0" smtClean="0"/>
+              <a:t>Using </a:t>
+            </a:r>
+            <a:r>
+              <a:rPr lang="en-GB" b="1" dirty="0"/>
+              <a:t>OpenCL device: Tesla </a:t>
+            </a:r>
+            <a:r>
+              <a:rPr lang="en-GB" b="1" dirty="0" smtClean="0"/>
+              <a:t>K20c</a:t>
+            </a:r>
+            <a:endParaRPr lang="en-GB" b="1" dirty="0"/>
+          </a:p>
+          <a:p>
+            <a:pPr marL="0" indent="0">
+              <a:buNone/>
+            </a:pPr>
+            <a:r>
+              <a:rPr lang="en-GB" dirty="0"/>
+              <a:t>Type          Total   Transfer       Bandwidth</a:t>
+            </a:r>
+          </a:p>
+          <a:p>
+            <a:pPr marL="0" indent="0">
+              <a:buNone/>
+            </a:pPr>
+            <a:r>
+              <a:rPr lang="en-US" dirty="0"/>
+              <a:t>----------------------------------------------</a:t>
+            </a:r>
+          </a:p>
+          <a:p>
+            <a:pPr marL="0" indent="0">
+              <a:buNone/>
+            </a:pPr>
+            <a:r>
+              <a:rPr lang="de-DE" dirty="0"/>
+              <a:t>Baseline      6.21s      2.61s       3.29 GB/s</a:t>
+            </a:r>
+          </a:p>
+          <a:p>
+            <a:pPr marL="0" indent="0">
+              <a:buNone/>
+            </a:pPr>
+            <a:r>
+              <a:rPr lang="de-DE" dirty="0" err="1"/>
+              <a:t>Pinned</a:t>
+            </a:r>
+            <a:r>
+              <a:rPr lang="de-DE" dirty="0"/>
+              <a:t>        6.18s      2.56s       3.36 GB/</a:t>
+            </a:r>
+            <a:r>
+              <a:rPr lang="de-DE" dirty="0" smtClean="0"/>
+              <a:t>s</a:t>
+            </a:r>
+          </a:p>
+          <a:p>
+            <a:pPr marL="0" indent="0">
+              <a:buNone/>
+            </a:pPr>
+            <a:endParaRPr lang="de-DE" dirty="0"/>
+          </a:p>
+          <a:p>
+            <a:pPr marL="0" indent="0">
+              <a:buNone/>
+            </a:pPr>
+            <a:r>
+              <a:rPr lang="en-GB" b="1" dirty="0"/>
+              <a:t>Using OpenCL device:         Intel(R) Core(TM) i5-3550 CPU @ 3.30GHz</a:t>
+            </a:r>
+          </a:p>
+          <a:p>
+            <a:pPr marL="0" indent="0">
+              <a:buNone/>
+            </a:pPr>
+            <a:r>
+              <a:rPr lang="en-GB" b="1" dirty="0" smtClean="0"/>
+              <a:t>Device </a:t>
+            </a:r>
+            <a:r>
+              <a:rPr lang="en-GB" b="1" dirty="0"/>
+              <a:t>has host-unified </a:t>
+            </a:r>
+            <a:r>
+              <a:rPr lang="en-GB" b="1" dirty="0" smtClean="0"/>
+              <a:t>memory</a:t>
+            </a:r>
+            <a:endParaRPr lang="en-GB" b="1" dirty="0"/>
+          </a:p>
+          <a:p>
+            <a:pPr marL="0" indent="0">
+              <a:buNone/>
+            </a:pPr>
+            <a:r>
+              <a:rPr lang="en-GB" dirty="0"/>
+              <a:t>Type          Total   Transfer       Bandwidth</a:t>
+            </a:r>
+          </a:p>
+          <a:p>
+            <a:pPr marL="0" indent="0">
+              <a:buNone/>
+            </a:pPr>
+            <a:r>
+              <a:rPr lang="en-US" dirty="0"/>
+              <a:t>----------------------------------------------</a:t>
+            </a:r>
+          </a:p>
+          <a:p>
+            <a:pPr marL="0" indent="0">
+              <a:buNone/>
+            </a:pPr>
+            <a:r>
+              <a:rPr lang="de-DE" dirty="0"/>
+              <a:t>Baseline      4.06s      1.44s       5.95 GB/s</a:t>
+            </a:r>
+          </a:p>
+          <a:p>
+            <a:pPr marL="0" indent="0">
+              <a:buNone/>
+            </a:pPr>
+            <a:r>
+              <a:rPr lang="de-DE" dirty="0"/>
+              <a:t>Zero-</a:t>
+            </a:r>
+            <a:r>
+              <a:rPr lang="de-DE" dirty="0" err="1"/>
+              <a:t>Copy</a:t>
+            </a:r>
+            <a:r>
+              <a:rPr lang="de-DE" dirty="0"/>
+              <a:t>     2.82s      0.00s    5156.02 GB/s</a:t>
+            </a:r>
+          </a:p>
+          <a:p>
+            <a:pPr marL="0" indent="0">
+              <a:buNone/>
+            </a:pPr>
+            <a:endParaRPr lang="de-DE" dirty="0" smtClean="0"/>
+          </a:p>
+          <a:p>
+            <a:pPr marL="0" indent="0">
+              <a:buNone/>
+            </a:pPr>
+            <a:endParaRPr lang="de-DE" dirty="0"/>
+          </a:p>
+          <a:p>
+            <a:pPr marL="0" indent="0">
+              <a:buNone/>
+            </a:pPr>
+            <a:endParaRPr lang="de-DE" dirty="0"/>
+          </a:p>
+          <a:p>
+            <a:pPr marL="0" indent="0">
+              <a:buNone/>
+            </a:pPr>
+            <a:endParaRPr lang="en-GB" dirty="0"/>
+          </a:p>
+        </p:txBody>
+      </p:sp>
+    </p:spTree>
+    <p:extLst>
+      <p:ext uri="{BB962C8B-B14F-4D97-AF65-F5344CB8AC3E}">
+        <p14:creationId xmlns:p14="http://schemas.microsoft.com/office/powerpoint/2010/main" val="3716420950"/>
+      </p:ext>
+    </p:extLst>
+  </p:cSld>
+  <p:clrMapOvr>
+    <a:masterClrMapping/>
+  </p:clrMapOvr>
+</p:sld>
+</file>
+
 <file path=ppt/slides/slide3.xml><?xml version="1.0" encoding="utf-8"?>
 <p:sld xmlns:a="http://schemas.openxmlformats.org/drawingml/2006/main" xmlns:r="http://schemas.openxmlformats.org/officeDocument/2006/relationships" xmlns:p="http://schemas.openxmlformats.org/presentationml/2006/main">
   <p:cSld>
@@ -11563,7 +12085,7 @@
           <a:lstStyle/>
           <a:p>
             <a:r>
-              <a:rPr lang="en-GB" dirty="0" smtClean="0"/>
+              <a:rPr lang="en-GB" b="1" dirty="0" smtClean="0"/>
               <a:t>Memory objects can be shared across multiple devices that share a context</a:t>
             </a:r>
           </a:p>
@@ -11601,8 +12123,16 @@
           </a:p>
           <a:p>
             <a:r>
+              <a:rPr lang="en-GB" dirty="0" smtClean="0">
+                <a:solidFill>
+                  <a:srgbClr val="FF0000"/>
+                </a:solidFill>
+              </a:rPr>
+              <a:t>Some platforms might not concurrently execute kernels on multiple devices that use the same memory objects</a:t>
+            </a:r>
+            <a:r>
               <a:rPr lang="en-GB" dirty="0" smtClean="0"/>
-              <a:t>Some platforms might not concurrently execute kernels on multiple devices that use the same memory objects, even if they don’t access overlapping regions</a:t>
+              <a:t>, even if they don’t access overlapping regions</a:t>
             </a:r>
           </a:p>
           <a:p>

</xml_diff>

<commit_message>
Add a couple of notes about NVIDIA's latest pinned memory guidelines
</commit_message>
<xml_diff>
--- a/slides/advanced_part1.pptx
+++ b/slides/advanced_part1.pptx
@@ -219,7 +219,7 @@
           <a:p>
             <a:fld id="{C020D4C0-2770-3946-ABDD-0C7492C2C34D}" type="datetimeFigureOut">
               <a:rPr lang="en-US" smtClean="0"/>
-              <a:t>14/04/16</a:t>
+              <a:t>18/04/16</a:t>
             </a:fld>
             <a:endParaRPr lang="en-GB"/>
           </a:p>
@@ -531,6 +531,28 @@
           <a:bodyPr/>
           <a:lstStyle/>
           <a:p>
+            <a:r>
+              <a:rPr lang="en-GB" dirty="0" smtClean="0"/>
+              <a:t>This comes from NVIDIA’s (fairly old) OpenCL</a:t>
+            </a:r>
+            <a:r>
+              <a:rPr lang="en-GB" baseline="0" dirty="0" smtClean="0"/>
+              <a:t> optimisation guidelines.</a:t>
+            </a:r>
+          </a:p>
+          <a:p>
+            <a:r>
+              <a:rPr lang="en-GB" baseline="0" dirty="0" smtClean="0"/>
+              <a:t>NVIDIA now recommend a new approach with latest drivers, using regular map/</a:t>
+            </a:r>
+            <a:r>
+              <a:rPr lang="en-GB" baseline="0" dirty="0" err="1" smtClean="0"/>
+              <a:t>unmap</a:t>
+            </a:r>
+            <a:r>
+              <a:rPr lang="en-GB" baseline="0" dirty="0" smtClean="0"/>
+              <a:t> approach (mentioned later on zero-copy slide).</a:t>
+            </a:r>
             <a:endParaRPr lang="en-GB" dirty="0"/>
           </a:p>
         </p:txBody>
@@ -712,6 +734,16 @@
           <a:bodyPr/>
           <a:lstStyle/>
           <a:p>
+            <a:r>
+              <a:rPr lang="en-GB" dirty="0" smtClean="0"/>
+              <a:t>This</a:t>
+            </a:r>
+            <a:r>
+              <a:rPr lang="en-GB" baseline="0" dirty="0" smtClean="0"/>
+              <a:t> is now how NVIDIA recommend using pinned memory on their discrete GPUs (CL_MEM_ALLOC_HOST_PTR flag not required)</a:t>
+            </a:r>
+          </a:p>
+          <a:p>
             <a:endParaRPr lang="en-GB" dirty="0"/>
           </a:p>
         </p:txBody>
@@ -934,7 +966,7 @@
           <a:p>
             <a:fld id="{8959E172-2558-6049-8DA8-C86E1F6924DD}" type="datetimeFigureOut">
               <a:rPr lang="en-US" smtClean="0"/>
-              <a:t>14/04/16</a:t>
+              <a:t>18/04/16</a:t>
             </a:fld>
             <a:endParaRPr lang="en-GB"/>
           </a:p>
@@ -1104,7 +1136,7 @@
           <a:p>
             <a:fld id="{8959E172-2558-6049-8DA8-C86E1F6924DD}" type="datetimeFigureOut">
               <a:rPr lang="en-US" smtClean="0"/>
-              <a:t>14/04/16</a:t>
+              <a:t>18/04/16</a:t>
             </a:fld>
             <a:endParaRPr lang="en-GB"/>
           </a:p>
@@ -1284,7 +1316,7 @@
           <a:p>
             <a:fld id="{8959E172-2558-6049-8DA8-C86E1F6924DD}" type="datetimeFigureOut">
               <a:rPr lang="en-US" smtClean="0"/>
-              <a:t>14/04/16</a:t>
+              <a:t>18/04/16</a:t>
             </a:fld>
             <a:endParaRPr lang="en-GB"/>
           </a:p>
@@ -1454,7 +1486,7 @@
           <a:p>
             <a:fld id="{8959E172-2558-6049-8DA8-C86E1F6924DD}" type="datetimeFigureOut">
               <a:rPr lang="en-US" smtClean="0"/>
-              <a:t>14/04/16</a:t>
+              <a:t>18/04/16</a:t>
             </a:fld>
             <a:endParaRPr lang="en-GB"/>
           </a:p>
@@ -1700,7 +1732,7 @@
           <a:p>
             <a:fld id="{8959E172-2558-6049-8DA8-C86E1F6924DD}" type="datetimeFigureOut">
               <a:rPr lang="en-US" smtClean="0"/>
-              <a:t>14/04/16</a:t>
+              <a:t>18/04/16</a:t>
             </a:fld>
             <a:endParaRPr lang="en-GB"/>
           </a:p>
@@ -1988,7 +2020,7 @@
           <a:p>
             <a:fld id="{8959E172-2558-6049-8DA8-C86E1F6924DD}" type="datetimeFigureOut">
               <a:rPr lang="en-US" smtClean="0"/>
-              <a:t>14/04/16</a:t>
+              <a:t>18/04/16</a:t>
             </a:fld>
             <a:endParaRPr lang="en-GB"/>
           </a:p>
@@ -2410,7 +2442,7 @@
           <a:p>
             <a:fld id="{8959E172-2558-6049-8DA8-C86E1F6924DD}" type="datetimeFigureOut">
               <a:rPr lang="en-US" smtClean="0"/>
-              <a:t>14/04/16</a:t>
+              <a:t>18/04/16</a:t>
             </a:fld>
             <a:endParaRPr lang="en-GB"/>
           </a:p>
@@ -2528,7 +2560,7 @@
           <a:p>
             <a:fld id="{8959E172-2558-6049-8DA8-C86E1F6924DD}" type="datetimeFigureOut">
               <a:rPr lang="en-US" smtClean="0"/>
-              <a:t>14/04/16</a:t>
+              <a:t>18/04/16</a:t>
             </a:fld>
             <a:endParaRPr lang="en-GB"/>
           </a:p>
@@ -2623,7 +2655,7 @@
           <a:p>
             <a:fld id="{8959E172-2558-6049-8DA8-C86E1F6924DD}" type="datetimeFigureOut">
               <a:rPr lang="en-US" smtClean="0"/>
-              <a:t>14/04/16</a:t>
+              <a:t>18/04/16</a:t>
             </a:fld>
             <a:endParaRPr lang="en-GB"/>
           </a:p>
@@ -2900,7 +2932,7 @@
           <a:p>
             <a:fld id="{8959E172-2558-6049-8DA8-C86E1F6924DD}" type="datetimeFigureOut">
               <a:rPr lang="en-US" smtClean="0"/>
-              <a:t>14/04/16</a:t>
+              <a:t>18/04/16</a:t>
             </a:fld>
             <a:endParaRPr lang="en-GB"/>
           </a:p>
@@ -3153,7 +3185,7 @@
           <a:p>
             <a:fld id="{8959E172-2558-6049-8DA8-C86E1F6924DD}" type="datetimeFigureOut">
               <a:rPr lang="en-US" smtClean="0"/>
-              <a:t>14/04/16</a:t>
+              <a:t>18/04/16</a:t>
             </a:fld>
             <a:endParaRPr lang="en-GB"/>
           </a:p>
@@ -3366,7 +3398,7 @@
           <a:p>
             <a:fld id="{8959E172-2558-6049-8DA8-C86E1F6924DD}" type="datetimeFigureOut">
               <a:rPr lang="en-US" smtClean="0"/>
-              <a:t>14/04/16</a:t>
+              <a:t>18/04/16</a:t>
             </a:fld>
             <a:endParaRPr lang="en-GB"/>
           </a:p>
@@ -5056,11 +5088,11 @@
   <p:clrMapOvr>
     <a:masterClrMapping/>
   </p:clrMapOvr>
-  <mc:AlternateContent xmlns:mc="http://schemas.openxmlformats.org/markup-compatibility/2006">
-    <mc:Choice xmlns:p14="http://schemas.microsoft.com/office/powerpoint/2010/main" Requires="p14">
+  <mc:AlternateContent xmlns:mc="http://schemas.openxmlformats.org/markup-compatibility/2006" xmlns:p14="http://schemas.microsoft.com/office/powerpoint/2010/main">
+    <mc:Choice Requires="p14">
       <p:transition spd="slow" p14:dur="2000"/>
     </mc:Choice>
-    <mc:Fallback>
+    <mc:Fallback xmlns="">
       <p:transition xmlns:p14="http://schemas.microsoft.com/office/powerpoint/2010/main" spd="slow"/>
     </mc:Fallback>
   </mc:AlternateContent>
@@ -5254,11 +5286,11 @@
   <p:clrMapOvr>
     <a:masterClrMapping/>
   </p:clrMapOvr>
-  <mc:AlternateContent xmlns:mc="http://schemas.openxmlformats.org/markup-compatibility/2006">
-    <mc:Choice xmlns:p14="http://schemas.microsoft.com/office/powerpoint/2010/main" Requires="p14">
+  <mc:AlternateContent xmlns:mc="http://schemas.openxmlformats.org/markup-compatibility/2006" xmlns:p14="http://schemas.microsoft.com/office/powerpoint/2010/main">
+    <mc:Choice Requires="p14">
       <p:transition spd="slow" p14:dur="2000"/>
     </mc:Choice>
-    <mc:Fallback>
+    <mc:Fallback xmlns="">
       <p:transition xmlns:p14="http://schemas.microsoft.com/office/powerpoint/2010/main" spd="slow"/>
     </mc:Fallback>
   </mc:AlternateContent>
@@ -5931,11 +5963,11 @@
   <p:clrMapOvr>
     <a:masterClrMapping/>
   </p:clrMapOvr>
-  <mc:AlternateContent xmlns:mc="http://schemas.openxmlformats.org/markup-compatibility/2006">
-    <mc:Choice xmlns:p14="http://schemas.microsoft.com/office/powerpoint/2010/main" Requires="p14">
+  <mc:AlternateContent xmlns:mc="http://schemas.openxmlformats.org/markup-compatibility/2006" xmlns:p14="http://schemas.microsoft.com/office/powerpoint/2010/main">
+    <mc:Choice Requires="p14">
       <p:transition spd="slow" p14:dur="2000"/>
     </mc:Choice>
-    <mc:Fallback>
+    <mc:Fallback xmlns="">
       <p:transition xmlns:p14="http://schemas.microsoft.com/office/powerpoint/2010/main" spd="slow"/>
     </mc:Fallback>
   </mc:AlternateContent>
@@ -6426,11 +6458,11 @@
   <p:clrMapOvr>
     <a:masterClrMapping/>
   </p:clrMapOvr>
-  <mc:AlternateContent xmlns:mc="http://schemas.openxmlformats.org/markup-compatibility/2006">
-    <mc:Choice xmlns:p14="http://schemas.microsoft.com/office/powerpoint/2010/main" Requires="p14">
+  <mc:AlternateContent xmlns:mc="http://schemas.openxmlformats.org/markup-compatibility/2006" xmlns:p14="http://schemas.microsoft.com/office/powerpoint/2010/main">
+    <mc:Choice Requires="p14">
       <p:transition spd="slow" p14:dur="2000"/>
     </mc:Choice>
-    <mc:Fallback>
+    <mc:Fallback xmlns="">
       <p:transition xmlns:p14="http://schemas.microsoft.com/office/powerpoint/2010/main" spd="slow"/>
     </mc:Fallback>
   </mc:AlternateContent>
@@ -6948,11 +6980,11 @@
   <p:clrMapOvr>
     <a:masterClrMapping/>
   </p:clrMapOvr>
-  <mc:AlternateContent xmlns:mc="http://schemas.openxmlformats.org/markup-compatibility/2006">
-    <mc:Choice xmlns:p14="http://schemas.microsoft.com/office/powerpoint/2010/main" Requires="p14">
+  <mc:AlternateContent xmlns:mc="http://schemas.openxmlformats.org/markup-compatibility/2006" xmlns:p14="http://schemas.microsoft.com/office/powerpoint/2010/main">
+    <mc:Choice Requires="p14">
       <p:transition spd="slow" p14:dur="2000"/>
     </mc:Choice>
-    <mc:Fallback>
+    <mc:Fallback xmlns="">
       <p:transition xmlns:p14="http://schemas.microsoft.com/office/powerpoint/2010/main" spd="slow"/>
     </mc:Fallback>
   </mc:AlternateContent>
@@ -7167,11 +7199,7 @@
             </a:pPr>
             <a:r>
               <a:rPr lang="en-US" dirty="0" smtClean="0"/>
-              <a:t>Allocations </a:t>
-            </a:r>
-            <a:r>
-              <a:rPr lang="en-US" dirty="0" smtClean="0"/>
-              <a:t>may not even be contiguous</a:t>
+              <a:t>Allocations may not even be contiguous</a:t>
             </a:r>
           </a:p>
           <a:p>
@@ -8577,31 +8605,7 @@
                   <a:srgbClr val="FF0000"/>
                 </a:solidFill>
               </a:rPr>
-              <a:t> more expensive </a:t>
-            </a:r>
-            <a:r>
-              <a:rPr lang="en-US" dirty="0" smtClean="0">
-                <a:solidFill>
-                  <a:srgbClr val="FF0000"/>
-                </a:solidFill>
-              </a:rPr>
-              <a:t>than </a:t>
-            </a:r>
-            <a:r>
-              <a:rPr lang="en-US" dirty="0" smtClean="0">
-                <a:solidFill>
-                  <a:srgbClr val="FF0000"/>
-                </a:solidFill>
-              </a:rPr>
-              <a:t>regular </a:t>
-            </a:r>
-            <a:r>
-              <a:rPr lang="en-US" dirty="0" smtClean="0">
-                <a:solidFill>
-                  <a:srgbClr val="FF0000"/>
-                </a:solidFill>
-              </a:rPr>
-              <a:t>memory </a:t>
+              <a:t> more expensive than regular memory </a:t>
             </a:r>
             <a:r>
               <a:rPr lang="en-US" dirty="0" smtClean="0"/>
@@ -8613,11 +8617,7 @@
             </a:r>
             <a:r>
               <a:rPr lang="en-US" dirty="0" smtClean="0"/>
-              <a:t>), </a:t>
-            </a:r>
-            <a:r>
-              <a:rPr lang="en-US" dirty="0" smtClean="0"/>
-              <a:t>so frequent allocations will be bad for performance.</a:t>
+              <a:t>), so frequent allocations will be bad for performance.</a:t>
             </a:r>
           </a:p>
           <a:p>
@@ -8875,7 +8875,7 @@
         </p:spPr>
         <p:txBody>
           <a:bodyPr>
-            <a:normAutofit fontScale="62500" lnSpcReduction="20000"/>
+            <a:normAutofit fontScale="55000" lnSpcReduction="20000"/>
           </a:bodyPr>
           <a:lstStyle/>
           <a:p>
@@ -8973,8 +8973,26 @@
             </a:r>
             <a:r>
               <a:rPr lang="en-US" dirty="0" smtClean="0"/>
-              <a:t> be unmapped before we can use it on the device again</a:t>
-            </a:r>
+              <a:t> be unmapped before we can use it on the device </a:t>
+            </a:r>
+            <a:r>
+              <a:rPr lang="en-US" dirty="0" smtClean="0"/>
+              <a:t>again</a:t>
+            </a:r>
+          </a:p>
+          <a:p>
+            <a:pPr marL="285750" indent="-285750">
+              <a:lnSpc>
+                <a:spcPct val="110000"/>
+              </a:lnSpc>
+              <a:buFont typeface="Arial"/>
+              <a:buChar char="•"/>
+            </a:pPr>
+            <a:r>
+              <a:rPr lang="en-US" dirty="0" smtClean="0"/>
+              <a:t>This approach often performs well for discrete devices too, although this may depend on the platform/device/driver</a:t>
+            </a:r>
+            <a:endParaRPr lang="en-US" dirty="0" smtClean="0"/>
           </a:p>
         </p:txBody>
       </p:sp>
@@ -10010,25 +10028,40 @@
               <a:buNone/>
             </a:pPr>
             <a:r>
-              <a:rPr lang="en-GB" b="1" dirty="0" smtClean="0"/>
+              <a:rPr lang="en-GB" b="1" dirty="0" smtClean="0">
+                <a:latin typeface="Courier New"/>
+                <a:cs typeface="Courier New"/>
+              </a:rPr>
               <a:t>$ </a:t>
             </a:r>
             <a:r>
-              <a:rPr lang="en-GB" b="1" dirty="0"/>
+              <a:rPr lang="en-GB" b="1" dirty="0">
+                <a:latin typeface="Courier New"/>
+                <a:cs typeface="Courier New"/>
+              </a:rPr>
               <a:t>./transfer --</a:t>
             </a:r>
             <a:r>
-              <a:rPr lang="en-GB" b="1" dirty="0" smtClean="0"/>
+              <a:rPr lang="en-GB" b="1" dirty="0" smtClean="0">
+                <a:latin typeface="Courier New"/>
+                <a:cs typeface="Courier New"/>
+              </a:rPr>
               <a:t>list</a:t>
             </a:r>
-            <a:endParaRPr lang="en-GB" b="1" dirty="0"/>
+            <a:endParaRPr lang="en-GB" b="1" dirty="0">
+              <a:latin typeface="Courier New"/>
+              <a:cs typeface="Courier New"/>
+            </a:endParaRPr>
           </a:p>
           <a:p>
             <a:pPr marL="0" indent="0">
               <a:buNone/>
             </a:pPr>
             <a:r>
-              <a:rPr lang="en-GB" dirty="0"/>
+              <a:rPr lang="en-GB" dirty="0">
+                <a:latin typeface="Courier New"/>
+                <a:cs typeface="Courier New"/>
+              </a:rPr>
               <a:t>Devices:</a:t>
             </a:r>
           </a:p>
@@ -10037,7 +10070,10 @@
               <a:buNone/>
             </a:pPr>
             <a:r>
-              <a:rPr lang="nb-NO" dirty="0"/>
+              <a:rPr lang="nb-NO" dirty="0">
+                <a:latin typeface="Courier New"/>
+                <a:cs typeface="Courier New"/>
+              </a:rPr>
               <a:t>0: Tesla K40c</a:t>
             </a:r>
           </a:p>
@@ -10046,7 +10082,10 @@
               <a:buNone/>
             </a:pPr>
             <a:r>
-              <a:rPr lang="nb-NO" dirty="0"/>
+              <a:rPr lang="nb-NO" dirty="0">
+                <a:latin typeface="Courier New"/>
+                <a:cs typeface="Courier New"/>
+              </a:rPr>
               <a:t>1: Tesla K20c</a:t>
             </a:r>
           </a:p>
@@ -10055,19 +10094,31 @@
               <a:buNone/>
             </a:pPr>
             <a:r>
-              <a:rPr lang="de-DE" dirty="0"/>
+              <a:rPr lang="de-DE" dirty="0">
+                <a:latin typeface="Courier New"/>
+                <a:cs typeface="Courier New"/>
+              </a:rPr>
               <a:t>2: </a:t>
             </a:r>
             <a:r>
-              <a:rPr lang="de-DE" dirty="0" smtClean="0"/>
+              <a:rPr lang="de-DE" dirty="0" smtClean="0">
+                <a:latin typeface="Courier New"/>
+                <a:cs typeface="Courier New"/>
+              </a:rPr>
               <a:t>Intel</a:t>
             </a:r>
             <a:r>
-              <a:rPr lang="de-DE" dirty="0"/>
+              <a:rPr lang="de-DE" dirty="0">
+                <a:latin typeface="Courier New"/>
+                <a:cs typeface="Courier New"/>
+              </a:rPr>
               <a:t>(R) Core(TM) i5-3550 CPU @ </a:t>
             </a:r>
             <a:r>
-              <a:rPr lang="de-DE" dirty="0" smtClean="0"/>
+              <a:rPr lang="de-DE" dirty="0" smtClean="0">
+                <a:latin typeface="Courier New"/>
+                <a:cs typeface="Courier New"/>
+              </a:rPr>
               <a:t>3.30GHz</a:t>
             </a:r>
           </a:p>
@@ -10075,32 +10126,50 @@
             <a:pPr marL="0" indent="0">
               <a:buNone/>
             </a:pPr>
-            <a:endParaRPr lang="de-DE" dirty="0"/>
+            <a:endParaRPr lang="de-DE" dirty="0">
+              <a:latin typeface="Courier New"/>
+              <a:cs typeface="Courier New"/>
+            </a:endParaRPr>
           </a:p>
           <a:p>
             <a:pPr marL="0" indent="0">
               <a:buNone/>
             </a:pPr>
             <a:r>
-              <a:rPr lang="en-GB" b="1" dirty="0" smtClean="0"/>
+              <a:rPr lang="en-GB" b="1" dirty="0" smtClean="0">
+                <a:latin typeface="Courier New"/>
+                <a:cs typeface="Courier New"/>
+              </a:rPr>
               <a:t>Using </a:t>
             </a:r>
             <a:r>
-              <a:rPr lang="en-GB" b="1" dirty="0"/>
+              <a:rPr lang="en-GB" b="1" dirty="0">
+                <a:latin typeface="Courier New"/>
+                <a:cs typeface="Courier New"/>
+              </a:rPr>
               <a:t>OpenCL device: Tesla </a:t>
             </a:r>
             <a:r>
-              <a:rPr lang="en-GB" b="1" dirty="0" smtClean="0"/>
+              <a:rPr lang="en-GB" b="1" dirty="0" smtClean="0">
+                <a:latin typeface="Courier New"/>
+                <a:cs typeface="Courier New"/>
+              </a:rPr>
               <a:t>K40c</a:t>
             </a:r>
-            <a:endParaRPr lang="en-GB" b="1" dirty="0"/>
+            <a:endParaRPr lang="en-GB" b="1" dirty="0">
+              <a:latin typeface="Courier New"/>
+              <a:cs typeface="Courier New"/>
+            </a:endParaRPr>
           </a:p>
           <a:p>
             <a:pPr marL="0" indent="0">
               <a:buNone/>
             </a:pPr>
             <a:r>
-              <a:rPr lang="en-GB" dirty="0"/>
+              <a:rPr lang="en-GB" dirty="0">
+                <a:latin typeface="Courier New"/>
+                <a:cs typeface="Courier New"/>
+              </a:rPr>
               <a:t>Type          Total   Transfer       Bandwidth</a:t>
             </a:r>
           </a:p>
@@ -10109,7 +10178,10 @@
               <a:buNone/>
             </a:pPr>
             <a:r>
-              <a:rPr lang="en-US" dirty="0"/>
+              <a:rPr lang="en-US" dirty="0">
+                <a:latin typeface="Courier New"/>
+                <a:cs typeface="Courier New"/>
+              </a:rPr>
               <a:t>----------------------------------------------</a:t>
             </a:r>
           </a:p>
@@ -10118,7 +10190,10 @@
               <a:buNone/>
             </a:pPr>
             <a:r>
-              <a:rPr lang="de-DE" dirty="0"/>
+              <a:rPr lang="de-DE" dirty="0">
+                <a:latin typeface="Courier New"/>
+                <a:cs typeface="Courier New"/>
+              </a:rPr>
               <a:t>Baseline      5.28s      1.77s       4.86 GB/s</a:t>
             </a:r>
           </a:p>
@@ -10127,45 +10202,72 @@
               <a:buNone/>
             </a:pPr>
             <a:r>
-              <a:rPr lang="de-DE" dirty="0" err="1"/>
+              <a:rPr lang="de-DE" dirty="0" err="1">
+                <a:latin typeface="Courier New"/>
+                <a:cs typeface="Courier New"/>
+              </a:rPr>
               <a:t>Pinned</a:t>
             </a:r>
             <a:r>
-              <a:rPr lang="de-DE" dirty="0"/>
+              <a:rPr lang="de-DE" dirty="0">
+                <a:latin typeface="Courier New"/>
+                <a:cs typeface="Courier New"/>
+              </a:rPr>
               <a:t>        4.86s      1.30s       6.61 GB/s</a:t>
             </a:r>
-            <a:endParaRPr lang="de-DE" dirty="0" smtClean="0"/>
+            <a:endParaRPr lang="de-DE" dirty="0" smtClean="0">
+              <a:latin typeface="Courier New"/>
+              <a:cs typeface="Courier New"/>
+            </a:endParaRPr>
           </a:p>
           <a:p>
             <a:pPr marL="0" indent="0">
               <a:buNone/>
             </a:pPr>
-            <a:endParaRPr lang="de-DE" dirty="0"/>
+            <a:endParaRPr lang="de-DE" dirty="0">
+              <a:latin typeface="Courier New"/>
+              <a:cs typeface="Courier New"/>
+            </a:endParaRPr>
           </a:p>
           <a:p>
             <a:pPr marL="0" indent="0">
               <a:buNone/>
             </a:pPr>
             <a:r>
-              <a:rPr lang="en-GB" b="1" dirty="0" smtClean="0"/>
+              <a:rPr lang="en-GB" b="1" dirty="0" smtClean="0">
+                <a:latin typeface="Courier New"/>
+                <a:cs typeface="Courier New"/>
+              </a:rPr>
               <a:t>Using </a:t>
             </a:r>
             <a:r>
-              <a:rPr lang="en-GB" b="1" dirty="0"/>
+              <a:rPr lang="en-GB" b="1" dirty="0">
+                <a:latin typeface="Courier New"/>
+                <a:cs typeface="Courier New"/>
+              </a:rPr>
               <a:t>OpenCL device: Tesla </a:t>
             </a:r>
             <a:r>
-              <a:rPr lang="en-GB" b="1" dirty="0" smtClean="0"/>
+              <a:rPr lang="en-GB" b="1" dirty="0" smtClean="0">
+                <a:latin typeface="Courier New"/>
+                <a:cs typeface="Courier New"/>
+              </a:rPr>
               <a:t>K20c</a:t>
             </a:r>
-            <a:endParaRPr lang="en-GB" b="1" dirty="0"/>
+            <a:endParaRPr lang="en-GB" b="1" dirty="0">
+              <a:latin typeface="Courier New"/>
+              <a:cs typeface="Courier New"/>
+            </a:endParaRPr>
           </a:p>
           <a:p>
             <a:pPr marL="0" indent="0">
               <a:buNone/>
             </a:pPr>
             <a:r>
-              <a:rPr lang="en-GB" dirty="0"/>
+              <a:rPr lang="en-GB" dirty="0">
+                <a:latin typeface="Courier New"/>
+                <a:cs typeface="Courier New"/>
+              </a:rPr>
               <a:t>Type          Total   Transfer       Bandwidth</a:t>
             </a:r>
           </a:p>
@@ -10174,7 +10276,10 @@
               <a:buNone/>
             </a:pPr>
             <a:r>
-              <a:rPr lang="en-US" dirty="0"/>
+              <a:rPr lang="en-US" dirty="0">
+                <a:latin typeface="Courier New"/>
+                <a:cs typeface="Courier New"/>
+              </a:rPr>
               <a:t>----------------------------------------------</a:t>
             </a:r>
           </a:p>
@@ -10183,7 +10288,10 @@
               <a:buNone/>
             </a:pPr>
             <a:r>
-              <a:rPr lang="de-DE" dirty="0"/>
+              <a:rPr lang="de-DE" dirty="0">
+                <a:latin typeface="Courier New"/>
+                <a:cs typeface="Courier New"/>
+              </a:rPr>
               <a:t>Baseline      6.21s      2.61s       3.29 GB/s</a:t>
             </a:r>
           </a:p>
@@ -10192,15 +10300,24 @@
               <a:buNone/>
             </a:pPr>
             <a:r>
-              <a:rPr lang="de-DE" dirty="0" err="1"/>
+              <a:rPr lang="de-DE" dirty="0" err="1">
+                <a:latin typeface="Courier New"/>
+                <a:cs typeface="Courier New"/>
+              </a:rPr>
               <a:t>Pinned</a:t>
             </a:r>
             <a:r>
-              <a:rPr lang="de-DE" dirty="0"/>
+              <a:rPr lang="de-DE" dirty="0">
+                <a:latin typeface="Courier New"/>
+                <a:cs typeface="Courier New"/>
+              </a:rPr>
               <a:t>        6.18s      2.56s       3.36 GB/</a:t>
             </a:r>
             <a:r>
-              <a:rPr lang="de-DE" dirty="0" smtClean="0"/>
+              <a:rPr lang="de-DE" dirty="0" smtClean="0">
+                <a:latin typeface="Courier New"/>
+                <a:cs typeface="Courier New"/>
+              </a:rPr>
               <a:t>s</a:t>
             </a:r>
           </a:p>
@@ -10208,14 +10325,20 @@
             <a:pPr marL="0" indent="0">
               <a:buNone/>
             </a:pPr>
-            <a:endParaRPr lang="de-DE" dirty="0"/>
+            <a:endParaRPr lang="de-DE" dirty="0">
+              <a:latin typeface="Courier New"/>
+              <a:cs typeface="Courier New"/>
+            </a:endParaRPr>
           </a:p>
           <a:p>
             <a:pPr marL="0" indent="0">
               <a:buNone/>
             </a:pPr>
             <a:r>
-              <a:rPr lang="en-GB" b="1" dirty="0"/>
+              <a:rPr lang="en-GB" b="1" dirty="0">
+                <a:latin typeface="Courier New"/>
+                <a:cs typeface="Courier New"/>
+              </a:rPr>
               <a:t>Using OpenCL device:         Intel(R) Core(TM) i5-3550 CPU @ 3.30GHz</a:t>
             </a:r>
           </a:p>
@@ -10224,25 +10347,40 @@
               <a:buNone/>
             </a:pPr>
             <a:r>
-              <a:rPr lang="en-GB" b="1" dirty="0" smtClean="0"/>
+              <a:rPr lang="en-GB" b="1" dirty="0" smtClean="0">
+                <a:latin typeface="Courier New"/>
+                <a:cs typeface="Courier New"/>
+              </a:rPr>
               <a:t>Device </a:t>
             </a:r>
             <a:r>
-              <a:rPr lang="en-GB" b="1" dirty="0"/>
+              <a:rPr lang="en-GB" b="1" dirty="0">
+                <a:latin typeface="Courier New"/>
+                <a:cs typeface="Courier New"/>
+              </a:rPr>
               <a:t>has host-unified </a:t>
             </a:r>
             <a:r>
-              <a:rPr lang="en-GB" b="1" dirty="0" smtClean="0"/>
+              <a:rPr lang="en-GB" b="1" dirty="0" smtClean="0">
+                <a:latin typeface="Courier New"/>
+                <a:cs typeface="Courier New"/>
+              </a:rPr>
               <a:t>memory</a:t>
             </a:r>
-            <a:endParaRPr lang="en-GB" b="1" dirty="0"/>
+            <a:endParaRPr lang="en-GB" b="1" dirty="0">
+              <a:latin typeface="Courier New"/>
+              <a:cs typeface="Courier New"/>
+            </a:endParaRPr>
           </a:p>
           <a:p>
             <a:pPr marL="0" indent="0">
               <a:buNone/>
             </a:pPr>
             <a:r>
-              <a:rPr lang="en-GB" dirty="0"/>
+              <a:rPr lang="en-GB" dirty="0">
+                <a:latin typeface="Courier New"/>
+                <a:cs typeface="Courier New"/>
+              </a:rPr>
               <a:t>Type          Total   Transfer       Bandwidth</a:t>
             </a:r>
           </a:p>
@@ -10251,7 +10389,10 @@
               <a:buNone/>
             </a:pPr>
             <a:r>
-              <a:rPr lang="en-US" dirty="0"/>
+              <a:rPr lang="en-US" dirty="0">
+                <a:latin typeface="Courier New"/>
+                <a:cs typeface="Courier New"/>
+              </a:rPr>
               <a:t>----------------------------------------------</a:t>
             </a:r>
           </a:p>
@@ -10260,7 +10401,10 @@
               <a:buNone/>
             </a:pPr>
             <a:r>
-              <a:rPr lang="de-DE" dirty="0"/>
+              <a:rPr lang="de-DE" dirty="0">
+                <a:latin typeface="Courier New"/>
+                <a:cs typeface="Courier New"/>
+              </a:rPr>
               <a:t>Baseline      4.06s      1.44s       5.95 GB/s</a:t>
             </a:r>
           </a:p>
@@ -10269,15 +10413,24 @@
               <a:buNone/>
             </a:pPr>
             <a:r>
-              <a:rPr lang="de-DE" dirty="0"/>
+              <a:rPr lang="de-DE" dirty="0">
+                <a:latin typeface="Courier New"/>
+                <a:cs typeface="Courier New"/>
+              </a:rPr>
               <a:t>Zero-</a:t>
             </a:r>
             <a:r>
-              <a:rPr lang="de-DE" dirty="0" err="1"/>
+              <a:rPr lang="de-DE" dirty="0" err="1">
+                <a:latin typeface="Courier New"/>
+                <a:cs typeface="Courier New"/>
+              </a:rPr>
               <a:t>Copy</a:t>
             </a:r>
             <a:r>
-              <a:rPr lang="de-DE" dirty="0"/>
+              <a:rPr lang="de-DE" dirty="0">
+                <a:latin typeface="Courier New"/>
+                <a:cs typeface="Courier New"/>
+              </a:rPr>
               <a:t>     2.82s      0.00s    5156.02 GB/s</a:t>
             </a:r>
           </a:p>

</xml_diff>

<commit_message>
Comment correction in zero-copy
</commit_message>
<xml_diff>
--- a/slides/advanced_part1.pptx
+++ b/slides/advanced_part1.pptx
@@ -219,7 +219,7 @@
           <a:p>
             <a:fld id="{C020D4C0-2770-3946-ABDD-0C7492C2C34D}" type="datetimeFigureOut">
               <a:rPr lang="en-US" smtClean="0"/>
-              <a:t>18/04/16</a:t>
+              <a:t>19/04/16</a:t>
             </a:fld>
             <a:endParaRPr lang="en-GB"/>
           </a:p>
@@ -1050,7 +1050,7 @@
           <a:p>
             <a:fld id="{8959E172-2558-6049-8DA8-C86E1F6924DD}" type="datetimeFigureOut">
               <a:rPr lang="en-US" smtClean="0"/>
-              <a:t>18/04/16</a:t>
+              <a:t>19/04/16</a:t>
             </a:fld>
             <a:endParaRPr lang="en-GB"/>
           </a:p>
@@ -1220,7 +1220,7 @@
           <a:p>
             <a:fld id="{8959E172-2558-6049-8DA8-C86E1F6924DD}" type="datetimeFigureOut">
               <a:rPr lang="en-US" smtClean="0"/>
-              <a:t>18/04/16</a:t>
+              <a:t>19/04/16</a:t>
             </a:fld>
             <a:endParaRPr lang="en-GB"/>
           </a:p>
@@ -1400,7 +1400,7 @@
           <a:p>
             <a:fld id="{8959E172-2558-6049-8DA8-C86E1F6924DD}" type="datetimeFigureOut">
               <a:rPr lang="en-US" smtClean="0"/>
-              <a:t>18/04/16</a:t>
+              <a:t>19/04/16</a:t>
             </a:fld>
             <a:endParaRPr lang="en-GB"/>
           </a:p>
@@ -1570,7 +1570,7 @@
           <a:p>
             <a:fld id="{8959E172-2558-6049-8DA8-C86E1F6924DD}" type="datetimeFigureOut">
               <a:rPr lang="en-US" smtClean="0"/>
-              <a:t>18/04/16</a:t>
+              <a:t>19/04/16</a:t>
             </a:fld>
             <a:endParaRPr lang="en-GB"/>
           </a:p>
@@ -1816,7 +1816,7 @@
           <a:p>
             <a:fld id="{8959E172-2558-6049-8DA8-C86E1F6924DD}" type="datetimeFigureOut">
               <a:rPr lang="en-US" smtClean="0"/>
-              <a:t>18/04/16</a:t>
+              <a:t>19/04/16</a:t>
             </a:fld>
             <a:endParaRPr lang="en-GB"/>
           </a:p>
@@ -2104,7 +2104,7 @@
           <a:p>
             <a:fld id="{8959E172-2558-6049-8DA8-C86E1F6924DD}" type="datetimeFigureOut">
               <a:rPr lang="en-US" smtClean="0"/>
-              <a:t>18/04/16</a:t>
+              <a:t>19/04/16</a:t>
             </a:fld>
             <a:endParaRPr lang="en-GB"/>
           </a:p>
@@ -2526,7 +2526,7 @@
           <a:p>
             <a:fld id="{8959E172-2558-6049-8DA8-C86E1F6924DD}" type="datetimeFigureOut">
               <a:rPr lang="en-US" smtClean="0"/>
-              <a:t>18/04/16</a:t>
+              <a:t>19/04/16</a:t>
             </a:fld>
             <a:endParaRPr lang="en-GB"/>
           </a:p>
@@ -2644,7 +2644,7 @@
           <a:p>
             <a:fld id="{8959E172-2558-6049-8DA8-C86E1F6924DD}" type="datetimeFigureOut">
               <a:rPr lang="en-US" smtClean="0"/>
-              <a:t>18/04/16</a:t>
+              <a:t>19/04/16</a:t>
             </a:fld>
             <a:endParaRPr lang="en-GB"/>
           </a:p>
@@ -2739,7 +2739,7 @@
           <a:p>
             <a:fld id="{8959E172-2558-6049-8DA8-C86E1F6924DD}" type="datetimeFigureOut">
               <a:rPr lang="en-US" smtClean="0"/>
-              <a:t>18/04/16</a:t>
+              <a:t>19/04/16</a:t>
             </a:fld>
             <a:endParaRPr lang="en-GB"/>
           </a:p>
@@ -3016,7 +3016,7 @@
           <a:p>
             <a:fld id="{8959E172-2558-6049-8DA8-C86E1F6924DD}" type="datetimeFigureOut">
               <a:rPr lang="en-US" smtClean="0"/>
-              <a:t>18/04/16</a:t>
+              <a:t>19/04/16</a:t>
             </a:fld>
             <a:endParaRPr lang="en-GB"/>
           </a:p>
@@ -3269,7 +3269,7 @@
           <a:p>
             <a:fld id="{8959E172-2558-6049-8DA8-C86E1F6924DD}" type="datetimeFigureOut">
               <a:rPr lang="en-US" smtClean="0"/>
-              <a:t>18/04/16</a:t>
+              <a:t>19/04/16</a:t>
             </a:fld>
             <a:endParaRPr lang="en-GB"/>
           </a:p>
@@ -3482,7 +3482,7 @@
           <a:p>
             <a:fld id="{8959E172-2558-6049-8DA8-C86E1F6924DD}" type="datetimeFigureOut">
               <a:rPr lang="en-US" smtClean="0"/>
-              <a:t>18/04/16</a:t>
+              <a:t>19/04/16</a:t>
             </a:fld>
             <a:endParaRPr lang="en-GB"/>
           </a:p>
@@ -9177,11 +9177,7 @@
             </a:r>
             <a:r>
               <a:rPr lang="en-US" dirty="0" smtClean="0"/>
-              <a:t> be unmapped before we can use it on the device </a:t>
-            </a:r>
-            <a:r>
-              <a:rPr lang="en-US" dirty="0" smtClean="0"/>
-              <a:t>again</a:t>
+              <a:t> be unmapped before we can use it on the device again</a:t>
             </a:r>
           </a:p>
           <a:p>
@@ -9196,7 +9192,6 @@
               <a:rPr lang="en-US" dirty="0" smtClean="0"/>
               <a:t>This approach often performs well for discrete devices too, although this may depend on the platform/device/driver</a:t>
             </a:r>
-            <a:endParaRPr lang="en-US" dirty="0" smtClean="0"/>
           </a:p>
         </p:txBody>
       </p:sp>
@@ -9665,7 +9660,27 @@
                 <a:latin typeface="Courier New"/>
                 <a:cs typeface="Courier New"/>
               </a:rPr>
-              <a:t>// read data*</a:t>
+              <a:t>// </a:t>
+            </a:r>
+            <a:r>
+              <a:rPr lang="en-US" sz="1400" b="1" dirty="0" smtClean="0">
+                <a:solidFill>
+                  <a:srgbClr val="008000"/>
+                </a:solidFill>
+                <a:latin typeface="Courier New"/>
+                <a:cs typeface="Courier New"/>
+              </a:rPr>
+              <a:t>map </a:t>
+            </a:r>
+            <a:r>
+              <a:rPr lang="en-US" sz="1400" b="1" smtClean="0">
+                <a:solidFill>
+                  <a:srgbClr val="008000"/>
+                </a:solidFill>
+                <a:latin typeface="Courier New"/>
+                <a:cs typeface="Courier New"/>
+              </a:rPr>
+              <a:t>for writing</a:t>
             </a:r>
             <a:endParaRPr lang="en-US" sz="1400" b="1" dirty="0">
               <a:solidFill>

</xml_diff>

<commit_message>
Add SVM slides to Part 1
</commit_message>
<xml_diff>
--- a/slides/advanced_part1.pptx
+++ b/slides/advanced_part1.pptx
@@ -5,7 +5,7 @@
     <p:sldMasterId id="2147483648" r:id="rId1"/>
   </p:sldMasterIdLst>
   <p:notesMasterIdLst>
-    <p:notesMasterId r:id="rId30"/>
+    <p:notesMasterId r:id="rId36"/>
   </p:notesMasterIdLst>
   <p:sldIdLst>
     <p:sldId id="257" r:id="rId2"/>
@@ -34,8 +34,14 @@
     <p:sldId id="273" r:id="rId25"/>
     <p:sldId id="280" r:id="rId26"/>
     <p:sldId id="282" r:id="rId27"/>
-    <p:sldId id="279" r:id="rId28"/>
-    <p:sldId id="285" r:id="rId29"/>
+    <p:sldId id="286" r:id="rId28"/>
+    <p:sldId id="287" r:id="rId29"/>
+    <p:sldId id="288" r:id="rId30"/>
+    <p:sldId id="289" r:id="rId31"/>
+    <p:sldId id="290" r:id="rId32"/>
+    <p:sldId id="291" r:id="rId33"/>
+    <p:sldId id="279" r:id="rId34"/>
+    <p:sldId id="285" r:id="rId35"/>
   </p:sldIdLst>
   <p:sldSz cx="9144000" cy="6858000" type="screen4x3"/>
   <p:notesSz cx="6858000" cy="9144000"/>
@@ -219,7 +225,7 @@
           <a:p>
             <a:fld id="{C020D4C0-2770-3946-ABDD-0C7492C2C34D}" type="datetimeFigureOut">
               <a:rPr lang="en-US" smtClean="0"/>
-              <a:t>25/07/16</a:t>
+              <a:t>12/05/17</a:t>
             </a:fld>
             <a:endParaRPr lang="en-GB"/>
           </a:p>
@@ -1050,7 +1056,7 @@
           <a:p>
             <a:fld id="{8959E172-2558-6049-8DA8-C86E1F6924DD}" type="datetimeFigureOut">
               <a:rPr lang="en-US" smtClean="0"/>
-              <a:t>25/07/16</a:t>
+              <a:t>12/05/17</a:t>
             </a:fld>
             <a:endParaRPr lang="en-GB"/>
           </a:p>
@@ -1220,7 +1226,7 @@
           <a:p>
             <a:fld id="{8959E172-2558-6049-8DA8-C86E1F6924DD}" type="datetimeFigureOut">
               <a:rPr lang="en-US" smtClean="0"/>
-              <a:t>25/07/16</a:t>
+              <a:t>12/05/17</a:t>
             </a:fld>
             <a:endParaRPr lang="en-GB"/>
           </a:p>
@@ -1400,7 +1406,7 @@
           <a:p>
             <a:fld id="{8959E172-2558-6049-8DA8-C86E1F6924DD}" type="datetimeFigureOut">
               <a:rPr lang="en-US" smtClean="0"/>
-              <a:t>25/07/16</a:t>
+              <a:t>12/05/17</a:t>
             </a:fld>
             <a:endParaRPr lang="en-GB"/>
           </a:p>
@@ -1570,7 +1576,7 @@
           <a:p>
             <a:fld id="{8959E172-2558-6049-8DA8-C86E1F6924DD}" type="datetimeFigureOut">
               <a:rPr lang="en-US" smtClean="0"/>
-              <a:t>25/07/16</a:t>
+              <a:t>12/05/17</a:t>
             </a:fld>
             <a:endParaRPr lang="en-GB"/>
           </a:p>
@@ -1816,7 +1822,7 @@
           <a:p>
             <a:fld id="{8959E172-2558-6049-8DA8-C86E1F6924DD}" type="datetimeFigureOut">
               <a:rPr lang="en-US" smtClean="0"/>
-              <a:t>25/07/16</a:t>
+              <a:t>12/05/17</a:t>
             </a:fld>
             <a:endParaRPr lang="en-GB"/>
           </a:p>
@@ -2104,7 +2110,7 @@
           <a:p>
             <a:fld id="{8959E172-2558-6049-8DA8-C86E1F6924DD}" type="datetimeFigureOut">
               <a:rPr lang="en-US" smtClean="0"/>
-              <a:t>25/07/16</a:t>
+              <a:t>12/05/17</a:t>
             </a:fld>
             <a:endParaRPr lang="en-GB"/>
           </a:p>
@@ -2526,7 +2532,7 @@
           <a:p>
             <a:fld id="{8959E172-2558-6049-8DA8-C86E1F6924DD}" type="datetimeFigureOut">
               <a:rPr lang="en-US" smtClean="0"/>
-              <a:t>25/07/16</a:t>
+              <a:t>12/05/17</a:t>
             </a:fld>
             <a:endParaRPr lang="en-GB"/>
           </a:p>
@@ -2644,7 +2650,7 @@
           <a:p>
             <a:fld id="{8959E172-2558-6049-8DA8-C86E1F6924DD}" type="datetimeFigureOut">
               <a:rPr lang="en-US" smtClean="0"/>
-              <a:t>25/07/16</a:t>
+              <a:t>12/05/17</a:t>
             </a:fld>
             <a:endParaRPr lang="en-GB"/>
           </a:p>
@@ -2739,7 +2745,7 @@
           <a:p>
             <a:fld id="{8959E172-2558-6049-8DA8-C86E1F6924DD}" type="datetimeFigureOut">
               <a:rPr lang="en-US" smtClean="0"/>
-              <a:t>25/07/16</a:t>
+              <a:t>12/05/17</a:t>
             </a:fld>
             <a:endParaRPr lang="en-GB"/>
           </a:p>
@@ -3016,7 +3022,7 @@
           <a:p>
             <a:fld id="{8959E172-2558-6049-8DA8-C86E1F6924DD}" type="datetimeFigureOut">
               <a:rPr lang="en-US" smtClean="0"/>
-              <a:t>25/07/16</a:t>
+              <a:t>12/05/17</a:t>
             </a:fld>
             <a:endParaRPr lang="en-GB"/>
           </a:p>
@@ -3269,7 +3275,7 @@
           <a:p>
             <a:fld id="{8959E172-2558-6049-8DA8-C86E1F6924DD}" type="datetimeFigureOut">
               <a:rPr lang="en-US" smtClean="0"/>
-              <a:t>25/07/16</a:t>
+              <a:t>12/05/17</a:t>
             </a:fld>
             <a:endParaRPr lang="en-GB"/>
           </a:p>
@@ -3482,7 +3488,7 @@
           <a:p>
             <a:fld id="{8959E172-2558-6049-8DA8-C86E1F6924DD}" type="datetimeFigureOut">
               <a:rPr lang="en-US" smtClean="0"/>
-              <a:t>25/07/16</a:t>
+              <a:t>12/05/17</a:t>
             </a:fld>
             <a:endParaRPr lang="en-GB"/>
           </a:p>
@@ -9660,17 +9666,7 @@
                 <a:latin typeface="Courier New"/>
                 <a:cs typeface="Courier New"/>
               </a:rPr>
-              <a:t>// map </a:t>
-            </a:r>
-            <a:r>
-              <a:rPr lang="en-US" sz="1400" b="1" smtClean="0">
-                <a:solidFill>
-                  <a:srgbClr val="008000"/>
-                </a:solidFill>
-                <a:latin typeface="Courier New"/>
-                <a:cs typeface="Courier New"/>
-              </a:rPr>
-              <a:t>for writing</a:t>
+              <a:t>// map for writing</a:t>
             </a:r>
             <a:endParaRPr lang="en-US" sz="1400" b="1" dirty="0">
               <a:solidFill>
@@ -10148,23 +10144,14 @@
         </p:nvSpPr>
         <p:spPr/>
         <p:txBody>
-          <a:bodyPr>
-            <a:normAutofit fontScale="90000"/>
-          </a:bodyPr>
+          <a:bodyPr/>
           <a:lstStyle/>
           <a:p>
             <a:r>
-              <a:rPr lang="en-GB" dirty="0" smtClean="0"/>
-              <a:t>Exercise:</a:t>
-            </a:r>
-            <a:br>
-              <a:rPr lang="en-GB" dirty="0" smtClean="0"/>
-            </a:br>
-            <a:r>
-              <a:rPr lang="en-GB" dirty="0" smtClean="0"/>
-              <a:t>Fast host-device data transfers</a:t>
-            </a:r>
-            <a:endParaRPr lang="en-GB" dirty="0"/>
+              <a:rPr lang="en-US" smtClean="0"/>
+              <a:t>Shared Virtual Memory</a:t>
+            </a:r>
+            <a:endParaRPr lang="en-US" dirty="0"/>
           </a:p>
         </p:txBody>
       </p:sp>
@@ -10186,62 +10173,89 @@
         </p:spPr>
         <p:txBody>
           <a:bodyPr>
-            <a:normAutofit/>
+            <a:normAutofit fontScale="92500" lnSpcReduction="20000"/>
           </a:bodyPr>
           <a:lstStyle/>
           <a:p>
             <a:r>
-              <a:rPr lang="en-GB" dirty="0" smtClean="0"/>
-              <a:t>Start with the </a:t>
-            </a:r>
-            <a:r>
-              <a:rPr lang="en-GB" dirty="0" err="1" smtClean="0">
-                <a:latin typeface="Courier New"/>
-                <a:cs typeface="Courier New"/>
-              </a:rPr>
-              <a:t>HostDevTransfer</a:t>
-            </a:r>
-            <a:r>
-              <a:rPr lang="en-GB" dirty="0" smtClean="0"/>
-              <a:t> example</a:t>
-            </a:r>
-          </a:p>
-          <a:p>
-            <a:r>
-              <a:rPr lang="en-GB" dirty="0" smtClean="0"/>
-              <a:t>Improve the performance of the host-to-device data transfers by using pinned memory or zero-copy</a:t>
-            </a:r>
-          </a:p>
-          <a:p>
-            <a:r>
-              <a:rPr lang="en-GB" dirty="0" smtClean="0"/>
-              <a:t>Experiment with different sized buffers</a:t>
-            </a:r>
-          </a:p>
-          <a:p>
-            <a:r>
-              <a:rPr lang="en-GB" dirty="0" smtClean="0"/>
-              <a:t>Experiment with different devices</a:t>
-            </a:r>
-          </a:p>
-          <a:p>
-            <a:r>
-              <a:rPr lang="en-GB" dirty="0" smtClean="0"/>
-              <a:t>An example solution will be provided</a:t>
-            </a:r>
+              <a:rPr lang="en-US" dirty="0" smtClean="0"/>
+              <a:t>In OpenCL 1.x buffer objects can only be passed as kernel arguments</a:t>
+            </a:r>
+          </a:p>
+          <a:p>
+            <a:r>
+              <a:rPr lang="en-US" dirty="0" smtClean="0"/>
+              <a:t>Buffer object are described as a pointer to type in kernels</a:t>
+            </a:r>
+          </a:p>
+          <a:p>
+            <a:r>
+              <a:rPr lang="en-US" dirty="0" smtClean="0"/>
+              <a:t>Restrictions</a:t>
+            </a:r>
+          </a:p>
+          <a:p>
+            <a:pPr lvl="1"/>
+            <a:r>
+              <a:rPr lang="en-US" dirty="0" smtClean="0"/>
+              <a:t>Can't pass a pointer + offset as argument value</a:t>
+            </a:r>
+          </a:p>
+          <a:p>
+            <a:pPr lvl="1"/>
+            <a:r>
+              <a:rPr lang="en-US" dirty="0" smtClean="0"/>
+              <a:t>Can't store pointers in buffer object(s)</a:t>
+            </a:r>
+          </a:p>
+          <a:p>
+            <a:r>
+              <a:rPr lang="en-US" dirty="0" smtClean="0"/>
+              <a:t>Why?</a:t>
+            </a:r>
+          </a:p>
+          <a:p>
+            <a:pPr lvl="1"/>
+            <a:r>
+              <a:rPr lang="en-US" dirty="0" smtClean="0"/>
+              <a:t>Host and OpenCL device do not share the same virtual address space</a:t>
+            </a:r>
+          </a:p>
+          <a:p>
+            <a:pPr lvl="1"/>
+            <a:r>
+              <a:rPr lang="en-US" dirty="0" smtClean="0"/>
+              <a:t>No guarantee that the same virtual address will be used for a kernel argument across multiple </a:t>
+            </a:r>
+            <a:r>
+              <a:rPr lang="en-US" dirty="0" err="1" smtClean="0"/>
+              <a:t>enqueues</a:t>
+            </a:r>
+            <a:endParaRPr lang="en-US" dirty="0" smtClean="0"/>
+          </a:p>
+          <a:p>
+            <a:endParaRPr lang="en-US" dirty="0" smtClean="0"/>
           </a:p>
         </p:txBody>
       </p:sp>
     </p:spTree>
     <p:extLst>
       <p:ext uri="{BB962C8B-B14F-4D97-AF65-F5344CB8AC3E}">
-        <p14:creationId xmlns:p14="http://schemas.microsoft.com/office/powerpoint/2010/main" val="2740977216"/>
+        <p14:creationId xmlns:p14="http://schemas.microsoft.com/office/powerpoint/2010/main" val="4270955650"/>
       </p:ext>
     </p:extLst>
   </p:cSld>
   <p:clrMapOvr>
     <a:masterClrMapping/>
   </p:clrMapOvr>
+  <mc:AlternateContent xmlns:mc="http://schemas.openxmlformats.org/markup-compatibility/2006" xmlns:p14="http://schemas.microsoft.com/office/powerpoint/2010/main">
+    <mc:Choice Requires="p14">
+      <p:transition spd="slow" p14:dur="2000"/>
+    </mc:Choice>
+    <mc:Fallback xmlns="">
+      <p:transition xmlns:p14="http://schemas.microsoft.com/office/powerpoint/2010/main" spd="slow"/>
+    </mc:Fallback>
+  </mc:AlternateContent>
   <p:timing>
     <p:tnLst>
       <p:par>
@@ -10279,10 +10293,33 @@
             <p:ph type="title"/>
           </p:nvPr>
         </p:nvSpPr>
+        <p:spPr/>
+        <p:txBody>
+          <a:bodyPr/>
+          <a:lstStyle/>
+          <a:p>
+            <a:r>
+              <a:rPr lang="en-US" dirty="0" smtClean="0"/>
+              <a:t>Shared Virtual Memory</a:t>
+            </a:r>
+            <a:endParaRPr lang="en-US" dirty="0"/>
+          </a:p>
+        </p:txBody>
+      </p:sp>
+      <p:sp>
+        <p:nvSpPr>
+          <p:cNvPr id="3" name="Content Placeholder 2"/>
+          <p:cNvSpPr>
+            <a:spLocks noGrp="1"/>
+          </p:cNvSpPr>
+          <p:nvPr>
+            <p:ph idx="1"/>
+          </p:nvPr>
+        </p:nvSpPr>
         <p:spPr>
           <a:xfrm>
-            <a:off x="457200" y="23016"/>
-            <a:ext cx="8229600" cy="839663"/>
+            <a:off x="683568" y="1412776"/>
+            <a:ext cx="8064896" cy="5256584"/>
           </a:xfrm>
         </p:spPr>
         <p:txBody>
@@ -10292,14 +10329,150 @@
           <a:lstStyle/>
           <a:p>
             <a:r>
-              <a:rPr lang="en-GB" dirty="0" smtClean="0"/>
-              <a:t>Exercise </a:t>
-            </a:r>
-            <a:r>
-              <a:rPr lang="en-GB" dirty="0" smtClean="0"/>
-              <a:t>results</a:t>
-            </a:r>
-            <a:endParaRPr lang="en-GB" dirty="0"/>
+              <a:rPr lang="en-US" b="1" dirty="0" err="1" smtClean="0">
+                <a:solidFill>
+                  <a:srgbClr val="3366FF"/>
+                </a:solidFill>
+                <a:latin typeface="Courier New"/>
+                <a:cs typeface="Courier New"/>
+              </a:rPr>
+              <a:t>clSVMAlloc</a:t>
+            </a:r>
+            <a:r>
+              <a:rPr lang="en-US" b="1" dirty="0" smtClean="0">
+                <a:solidFill>
+                  <a:srgbClr val="3366FF"/>
+                </a:solidFill>
+                <a:latin typeface="Courier New"/>
+                <a:cs typeface="Courier New"/>
+              </a:rPr>
+              <a:t>()</a:t>
+            </a:r>
+            <a:r>
+              <a:rPr lang="en-US" dirty="0" smtClean="0">
+                <a:solidFill>
+                  <a:srgbClr val="0000FF"/>
+                </a:solidFill>
+              </a:rPr>
+              <a:t> </a:t>
+            </a:r>
+            <a:r>
+              <a:rPr lang="en-US" dirty="0" smtClean="0"/>
+              <a:t>– allocates a shared virtual memory buffer</a:t>
+            </a:r>
+          </a:p>
+          <a:p>
+            <a:pPr lvl="1"/>
+            <a:r>
+              <a:rPr lang="en-US" dirty="0" smtClean="0"/>
+              <a:t>Specify size in bytes</a:t>
+            </a:r>
+          </a:p>
+          <a:p>
+            <a:pPr lvl="1"/>
+            <a:r>
+              <a:rPr lang="en-US" dirty="0" smtClean="0"/>
+              <a:t>Specify usage information</a:t>
+            </a:r>
+          </a:p>
+          <a:p>
+            <a:pPr lvl="1"/>
+            <a:r>
+              <a:rPr lang="en-US" dirty="0" smtClean="0"/>
+              <a:t>Optional alignment value</a:t>
+            </a:r>
+          </a:p>
+          <a:p>
+            <a:pPr lvl="1"/>
+            <a:endParaRPr lang="en-US" dirty="0" smtClean="0"/>
+          </a:p>
+          <a:p>
+            <a:r>
+              <a:rPr lang="en-US" dirty="0" smtClean="0"/>
+              <a:t>An SVM pointer can be shared by the host </a:t>
+            </a:r>
+            <a:r>
+              <a:rPr lang="en-US" b="1" dirty="0" smtClean="0">
+                <a:solidFill>
+                  <a:srgbClr val="008000"/>
+                </a:solidFill>
+              </a:rPr>
+              <a:t>and</a:t>
+            </a:r>
+            <a:r>
+              <a:rPr lang="en-US" dirty="0" smtClean="0"/>
+              <a:t> OpenCL device</a:t>
+            </a:r>
+          </a:p>
+        </p:txBody>
+      </p:sp>
+    </p:spTree>
+    <p:extLst>
+      <p:ext uri="{BB962C8B-B14F-4D97-AF65-F5344CB8AC3E}">
+        <p14:creationId xmlns:p14="http://schemas.microsoft.com/office/powerpoint/2010/main" val="3865471143"/>
+      </p:ext>
+    </p:extLst>
+  </p:cSld>
+  <p:clrMapOvr>
+    <a:masterClrMapping/>
+  </p:clrMapOvr>
+  <mc:AlternateContent xmlns:mc="http://schemas.openxmlformats.org/markup-compatibility/2006" xmlns:p14="http://schemas.microsoft.com/office/powerpoint/2010/main">
+    <mc:Choice Requires="p14">
+      <p:transition spd="slow" p14:dur="2000"/>
+    </mc:Choice>
+    <mc:Fallback xmlns="">
+      <p:transition xmlns:p14="http://schemas.microsoft.com/office/powerpoint/2010/main" spd="slow"/>
+    </mc:Fallback>
+  </mc:AlternateContent>
+  <p:timing>
+    <p:tnLst>
+      <p:par>
+        <p:cTn xmlns:p14="http://schemas.microsoft.com/office/powerpoint/2010/main" id="1" dur="indefinite" restart="never" nodeType="tmRoot"/>
+      </p:par>
+    </p:tnLst>
+  </p:timing>
+</p:sld>
+</file>
+
+<file path=ppt/slides/slide29.xml><?xml version="1.0" encoding="utf-8"?>
+<p:sld xmlns:a="http://schemas.openxmlformats.org/drawingml/2006/main" xmlns:r="http://schemas.openxmlformats.org/officeDocument/2006/relationships" xmlns:p="http://schemas.openxmlformats.org/presentationml/2006/main">
+  <p:cSld>
+    <p:spTree>
+      <p:nvGrpSpPr>
+        <p:cNvPr id="1" name=""/>
+        <p:cNvGrpSpPr/>
+        <p:nvPr/>
+      </p:nvGrpSpPr>
+      <p:grpSpPr>
+        <a:xfrm>
+          <a:off x="0" y="0"/>
+          <a:ext cx="0" cy="0"/>
+          <a:chOff x="0" y="0"/>
+          <a:chExt cx="0" cy="0"/>
+        </a:xfrm>
+      </p:grpSpPr>
+      <p:sp>
+        <p:nvSpPr>
+          <p:cNvPr id="2" name="Title 1"/>
+          <p:cNvSpPr>
+            <a:spLocks noGrp="1"/>
+          </p:cNvSpPr>
+          <p:nvPr>
+            <p:ph type="title"/>
+          </p:nvPr>
+        </p:nvSpPr>
+        <p:spPr/>
+        <p:txBody>
+          <a:bodyPr>
+            <a:normAutofit/>
+          </a:bodyPr>
+          <a:lstStyle/>
+          <a:p>
+            <a:r>
+              <a:rPr lang="en-US" dirty="0" smtClean="0"/>
+              <a:t>Shared Virtual Memory</a:t>
+            </a:r>
+            <a:endParaRPr lang="en-US" dirty="0"/>
           </a:p>
         </p:txBody>
       </p:sp>
@@ -10315,13 +10488,13 @@
         </p:nvSpPr>
         <p:spPr>
           <a:xfrm>
-            <a:off x="457200" y="1042404"/>
-            <a:ext cx="8229600" cy="5607415"/>
+            <a:off x="179512" y="1523925"/>
+            <a:ext cx="8507288" cy="4785395"/>
           </a:xfrm>
         </p:spPr>
         <p:txBody>
           <a:bodyPr>
-            <a:normAutofit fontScale="47500" lnSpcReduction="20000"/>
+            <a:normAutofit/>
           </a:bodyPr>
           <a:lstStyle/>
           <a:p>
@@ -10329,448 +10502,1175 @@
               <a:buNone/>
             </a:pPr>
             <a:r>
-              <a:rPr lang="en-GB" b="1" dirty="0" smtClean="0">
-                <a:latin typeface="Courier New"/>
-                <a:cs typeface="Courier New"/>
-              </a:rPr>
-              <a:t>$ </a:t>
-            </a:r>
-            <a:r>
-              <a:rPr lang="en-GB" b="1" dirty="0">
-                <a:latin typeface="Courier New"/>
-                <a:cs typeface="Courier New"/>
-              </a:rPr>
-              <a:t>./transfer --</a:t>
-            </a:r>
-            <a:r>
-              <a:rPr lang="en-GB" b="1" dirty="0" smtClean="0">
-                <a:latin typeface="Courier New"/>
-                <a:cs typeface="Courier New"/>
-              </a:rPr>
-              <a:t>list</a:t>
-            </a:r>
-            <a:endParaRPr lang="en-GB" b="1" dirty="0">
+              <a:rPr lang="en-US" sz="2000" b="1" dirty="0" err="1" smtClean="0">
+                <a:solidFill>
+                  <a:srgbClr val="3366FF"/>
+                </a:solidFill>
+                <a:latin typeface="Courier New"/>
+                <a:cs typeface="Courier New"/>
+              </a:rPr>
+              <a:t>clSetKernelArgSVMPointer</a:t>
+            </a:r>
+            <a:endParaRPr lang="en-US" sz="2000" b="1" dirty="0" smtClean="0">
+              <a:solidFill>
+                <a:srgbClr val="3366FF"/>
+              </a:solidFill>
               <a:latin typeface="Courier New"/>
               <a:cs typeface="Courier New"/>
             </a:endParaRPr>
           </a:p>
           <a:p>
-            <a:pPr marL="0" indent="0">
-              <a:buNone/>
-            </a:pPr>
-            <a:r>
-              <a:rPr lang="en-GB" dirty="0">
-                <a:latin typeface="Courier New"/>
-                <a:cs typeface="Courier New"/>
-              </a:rPr>
-              <a:t>Devices:</a:t>
-            </a:r>
-          </a:p>
-          <a:p>
-            <a:pPr marL="0" indent="0">
-              <a:buNone/>
-            </a:pPr>
-            <a:r>
-              <a:rPr lang="nb-NO" dirty="0">
-                <a:latin typeface="Courier New"/>
-                <a:cs typeface="Courier New"/>
-              </a:rPr>
-              <a:t>0: Tesla K40c</a:t>
-            </a:r>
-          </a:p>
-          <a:p>
-            <a:pPr marL="0" indent="0">
-              <a:buNone/>
-            </a:pPr>
-            <a:r>
-              <a:rPr lang="nb-NO" dirty="0">
-                <a:latin typeface="Courier New"/>
-                <a:cs typeface="Courier New"/>
-              </a:rPr>
-              <a:t>1: Tesla K20c</a:t>
-            </a:r>
-          </a:p>
-          <a:p>
-            <a:pPr marL="0" indent="0">
-              <a:buNone/>
-            </a:pPr>
-            <a:r>
-              <a:rPr lang="de-DE" dirty="0">
-                <a:latin typeface="Courier New"/>
-                <a:cs typeface="Courier New"/>
-              </a:rPr>
-              <a:t>2: </a:t>
-            </a:r>
-            <a:r>
-              <a:rPr lang="de-DE" dirty="0" smtClean="0">
-                <a:latin typeface="Courier New"/>
-                <a:cs typeface="Courier New"/>
-              </a:rPr>
-              <a:t>Intel</a:t>
-            </a:r>
-            <a:r>
-              <a:rPr lang="de-DE" dirty="0">
-                <a:latin typeface="Courier New"/>
-                <a:cs typeface="Courier New"/>
-              </a:rPr>
-              <a:t>(R) Core(TM) i5-3550 CPU @ </a:t>
-            </a:r>
-            <a:r>
-              <a:rPr lang="de-DE" dirty="0" smtClean="0">
-                <a:latin typeface="Courier New"/>
-                <a:cs typeface="Courier New"/>
-              </a:rPr>
-              <a:t>3.30GHz</a:t>
-            </a:r>
-          </a:p>
-          <a:p>
-            <a:pPr marL="0" indent="0">
-              <a:buNone/>
-            </a:pPr>
-            <a:endParaRPr lang="de-DE" dirty="0">
-              <a:latin typeface="Courier New"/>
-              <a:cs typeface="Courier New"/>
+            <a:r>
+              <a:rPr lang="en-US" sz="2000" dirty="0" smtClean="0"/>
+              <a:t>SVM pointers as kernel arguments</a:t>
+            </a:r>
+          </a:p>
+          <a:p>
+            <a:r>
+              <a:rPr lang="en-US" sz="2000" dirty="0" smtClean="0"/>
+              <a:t>A SVM pointer</a:t>
+            </a:r>
+          </a:p>
+          <a:p>
+            <a:r>
+              <a:rPr lang="en-US" sz="2000" dirty="0" smtClean="0"/>
+              <a:t>A SVM pointer + offset</a:t>
+            </a:r>
+          </a:p>
+        </p:txBody>
+      </p:sp>
+      <p:sp>
+        <p:nvSpPr>
+          <p:cNvPr id="6" name="TextBox 5"/>
+          <p:cNvSpPr txBox="1"/>
+          <p:nvPr/>
+        </p:nvSpPr>
+        <p:spPr bwMode="auto">
+          <a:xfrm>
+            <a:off x="4849272" y="1434129"/>
+            <a:ext cx="3901673" cy="1815882"/>
+          </a:xfrm>
+          <a:prstGeom prst="rect">
+            <a:avLst/>
+          </a:prstGeom>
+          <a:noFill/>
+          <a:ln w="3175" algn="ctr">
+            <a:noFill/>
+            <a:miter lim="800000"/>
+            <a:headEnd/>
+            <a:tailEnd/>
+          </a:ln>
+          <a:effectLst/>
+        </p:spPr>
+        <p:txBody>
+          <a:bodyPr wrap="square" rtlCol="0">
+            <a:spAutoFit/>
+          </a:bodyPr>
+          <a:lstStyle/>
+          <a:p>
+            <a:r>
+              <a:rPr lang="en-US" sz="1600" b="1" dirty="0" smtClean="0">
+                <a:solidFill>
+                  <a:srgbClr val="C60000"/>
+                </a:solidFill>
+                <a:latin typeface="Courier New" pitchFamily="49" charset="0"/>
+                <a:cs typeface="Courier New" pitchFamily="49" charset="0"/>
+              </a:rPr>
+              <a:t>kernel</a:t>
+            </a:r>
+            <a:r>
+              <a:rPr lang="en-US" sz="1600" b="1" dirty="0" smtClean="0">
+                <a:latin typeface="Courier New" pitchFamily="49" charset="0"/>
+                <a:cs typeface="Courier New" pitchFamily="49" charset="0"/>
+              </a:rPr>
+              <a:t> </a:t>
+            </a:r>
+            <a:r>
+              <a:rPr lang="en-US" sz="1600" b="1" i="1" dirty="0" smtClean="0">
+                <a:solidFill>
+                  <a:srgbClr val="3366FF"/>
+                </a:solidFill>
+                <a:latin typeface="Courier New" pitchFamily="49" charset="0"/>
+                <a:cs typeface="Courier New" pitchFamily="49" charset="0"/>
+              </a:rPr>
+              <a:t>void</a:t>
+            </a:r>
+          </a:p>
+          <a:p>
+            <a:r>
+              <a:rPr lang="en-US" sz="1600" b="1" dirty="0" err="1" smtClean="0">
+                <a:solidFill>
+                  <a:schemeClr val="accent3"/>
+                </a:solidFill>
+                <a:latin typeface="Courier New" pitchFamily="49" charset="0"/>
+                <a:cs typeface="Courier New" pitchFamily="49" charset="0"/>
+              </a:rPr>
+              <a:t>vecadd</a:t>
+            </a:r>
+            <a:r>
+              <a:rPr lang="en-US" sz="1600" b="1" dirty="0" smtClean="0">
+                <a:latin typeface="Courier New" pitchFamily="49" charset="0"/>
+                <a:cs typeface="Courier New" pitchFamily="49" charset="0"/>
+              </a:rPr>
+              <a:t>(</a:t>
+            </a:r>
+            <a:r>
+              <a:rPr lang="en-US" sz="1600" b="1" dirty="0" smtClean="0">
+                <a:solidFill>
+                  <a:srgbClr val="C60000"/>
+                </a:solidFill>
+                <a:latin typeface="Courier New" pitchFamily="49" charset="0"/>
+                <a:cs typeface="Courier New" pitchFamily="49" charset="0"/>
+              </a:rPr>
+              <a:t>global </a:t>
+            </a:r>
+            <a:r>
+              <a:rPr lang="en-US" sz="1600" b="1" i="1" dirty="0" smtClean="0">
+                <a:solidFill>
+                  <a:srgbClr val="3366FF"/>
+                </a:solidFill>
+                <a:latin typeface="Courier New" pitchFamily="49" charset="0"/>
+                <a:cs typeface="Courier New" pitchFamily="49" charset="0"/>
+              </a:rPr>
+              <a:t>float</a:t>
+            </a:r>
+            <a:r>
+              <a:rPr lang="en-US" sz="1600" b="1" dirty="0" smtClean="0">
+                <a:latin typeface="Courier New" pitchFamily="49" charset="0"/>
+                <a:cs typeface="Courier New" pitchFamily="49" charset="0"/>
+              </a:rPr>
+              <a:t> </a:t>
+            </a:r>
+            <a:r>
+              <a:rPr lang="en-US" sz="1600" b="1" dirty="0" smtClean="0">
+                <a:latin typeface="Courier New" pitchFamily="49" charset="0"/>
+                <a:cs typeface="Courier New" pitchFamily="49" charset="0"/>
+              </a:rPr>
+              <a:t>*</a:t>
+            </a:r>
+            <a:r>
+              <a:rPr lang="en-US" sz="1600" b="1" dirty="0" err="1" smtClean="0">
+                <a:latin typeface="Courier New" pitchFamily="49" charset="0"/>
+                <a:cs typeface="Courier New" pitchFamily="49" charset="0"/>
+              </a:rPr>
+              <a:t>src</a:t>
+            </a:r>
+            <a:r>
+              <a:rPr lang="en-US" sz="1600" b="1" dirty="0" smtClean="0">
+                <a:latin typeface="Courier New" pitchFamily="49" charset="0"/>
+                <a:cs typeface="Courier New" pitchFamily="49" charset="0"/>
+              </a:rPr>
+              <a:t>,</a:t>
+            </a:r>
+          </a:p>
+          <a:p>
+            <a:r>
+              <a:rPr lang="en-US" sz="1600" b="1" dirty="0">
+                <a:latin typeface="Courier New" pitchFamily="49" charset="0"/>
+                <a:cs typeface="Courier New" pitchFamily="49" charset="0"/>
+              </a:rPr>
+              <a:t> </a:t>
+            </a:r>
+            <a:r>
+              <a:rPr lang="en-US" sz="1600" b="1" dirty="0" smtClean="0">
+                <a:latin typeface="Courier New" pitchFamily="49" charset="0"/>
+                <a:cs typeface="Courier New" pitchFamily="49" charset="0"/>
+              </a:rPr>
+              <a:t>      </a:t>
+            </a:r>
+            <a:r>
+              <a:rPr lang="en-US" sz="1600" b="1" dirty="0" smtClean="0">
+                <a:solidFill>
+                  <a:srgbClr val="C60000"/>
+                </a:solidFill>
+                <a:latin typeface="Courier New" pitchFamily="49" charset="0"/>
+                <a:cs typeface="Courier New" pitchFamily="49" charset="0"/>
+              </a:rPr>
+              <a:t>global </a:t>
+            </a:r>
+            <a:r>
+              <a:rPr lang="en-US" sz="1600" b="1" i="1" dirty="0" smtClean="0">
+                <a:solidFill>
+                  <a:srgbClr val="3366FF"/>
+                </a:solidFill>
+                <a:latin typeface="Courier New" pitchFamily="49" charset="0"/>
+                <a:cs typeface="Courier New" pitchFamily="49" charset="0"/>
+              </a:rPr>
+              <a:t>float</a:t>
+            </a:r>
+            <a:r>
+              <a:rPr lang="en-US" sz="1600" b="1" dirty="0" smtClean="0">
+                <a:latin typeface="Courier New" pitchFamily="49" charset="0"/>
+                <a:cs typeface="Courier New" pitchFamily="49" charset="0"/>
+              </a:rPr>
+              <a:t> </a:t>
+            </a:r>
+            <a:r>
+              <a:rPr lang="en-US" sz="1600" b="1" dirty="0" smtClean="0">
+                <a:latin typeface="Courier New" pitchFamily="49" charset="0"/>
+                <a:cs typeface="Courier New" pitchFamily="49" charset="0"/>
+              </a:rPr>
+              <a:t>*</a:t>
+            </a:r>
+            <a:r>
+              <a:rPr lang="en-US" sz="1600" b="1" dirty="0" err="1" smtClean="0">
+                <a:latin typeface="Courier New" pitchFamily="49" charset="0"/>
+                <a:cs typeface="Courier New" pitchFamily="49" charset="0"/>
+              </a:rPr>
+              <a:t>dst</a:t>
+            </a:r>
+            <a:r>
+              <a:rPr lang="en-US" sz="1600" b="1" dirty="0" smtClean="0">
+                <a:latin typeface="Courier New" pitchFamily="49" charset="0"/>
+                <a:cs typeface="Courier New" pitchFamily="49" charset="0"/>
+              </a:rPr>
+              <a:t>)</a:t>
+            </a:r>
+            <a:br>
+              <a:rPr lang="en-US" sz="1600" b="1" dirty="0" smtClean="0">
+                <a:latin typeface="Courier New" pitchFamily="49" charset="0"/>
+                <a:cs typeface="Courier New" pitchFamily="49" charset="0"/>
+              </a:rPr>
+            </a:br>
+            <a:r>
+              <a:rPr lang="en-US" sz="1600" b="1" dirty="0" smtClean="0">
+                <a:latin typeface="Courier New" pitchFamily="49" charset="0"/>
+                <a:cs typeface="Courier New" pitchFamily="49" charset="0"/>
+              </a:rPr>
+              <a:t>{</a:t>
+            </a:r>
+          </a:p>
+          <a:p>
+            <a:r>
+              <a:rPr lang="en-US" sz="1600" b="1" dirty="0">
+                <a:latin typeface="Courier New" pitchFamily="49" charset="0"/>
+                <a:cs typeface="Courier New" pitchFamily="49" charset="0"/>
+              </a:rPr>
+              <a:t> </a:t>
+            </a:r>
+            <a:r>
+              <a:rPr lang="en-US" sz="1600" b="1" dirty="0" smtClean="0">
+                <a:latin typeface="Courier New" pitchFamily="49" charset="0"/>
+                <a:cs typeface="Courier New" pitchFamily="49" charset="0"/>
+              </a:rPr>
+              <a:t>   </a:t>
+            </a:r>
+            <a:r>
+              <a:rPr lang="en-US" sz="1600" b="1" i="1" dirty="0" err="1" smtClean="0">
+                <a:solidFill>
+                  <a:srgbClr val="3366FF"/>
+                </a:solidFill>
+                <a:latin typeface="Courier New" pitchFamily="49" charset="0"/>
+                <a:cs typeface="Courier New" pitchFamily="49" charset="0"/>
+              </a:rPr>
+              <a:t>int</a:t>
+            </a:r>
+            <a:r>
+              <a:rPr lang="en-US" sz="1600" b="1" dirty="0" smtClean="0">
+                <a:latin typeface="Courier New" pitchFamily="49" charset="0"/>
+                <a:cs typeface="Courier New" pitchFamily="49" charset="0"/>
+              </a:rPr>
+              <a:t> </a:t>
+            </a:r>
+            <a:r>
+              <a:rPr lang="en-US" sz="1600" b="1" dirty="0" smtClean="0">
+                <a:latin typeface="Courier New" pitchFamily="49" charset="0"/>
+                <a:cs typeface="Courier New" pitchFamily="49" charset="0"/>
+              </a:rPr>
+              <a:t>id = </a:t>
+            </a:r>
+            <a:r>
+              <a:rPr lang="en-US" sz="1600" b="1" dirty="0" err="1" smtClean="0">
+                <a:solidFill>
+                  <a:srgbClr val="3366FF"/>
+                </a:solidFill>
+                <a:latin typeface="Courier New" pitchFamily="49" charset="0"/>
+                <a:cs typeface="Courier New" pitchFamily="49" charset="0"/>
+              </a:rPr>
+              <a:t>get_global_id</a:t>
+            </a:r>
+            <a:r>
+              <a:rPr lang="en-US" sz="1600" b="1" dirty="0" smtClean="0">
+                <a:latin typeface="Courier New" pitchFamily="49" charset="0"/>
+                <a:cs typeface="Courier New" pitchFamily="49" charset="0"/>
+              </a:rPr>
+              <a:t>(</a:t>
+            </a:r>
+            <a:r>
+              <a:rPr lang="en-US" sz="1600" b="1" dirty="0" smtClean="0">
+                <a:solidFill>
+                  <a:srgbClr val="FF00FF"/>
+                </a:solidFill>
+                <a:latin typeface="Courier New" pitchFamily="49" charset="0"/>
+                <a:cs typeface="Courier New" pitchFamily="49" charset="0"/>
+              </a:rPr>
+              <a:t>0</a:t>
+            </a:r>
+            <a:r>
+              <a:rPr lang="en-US" sz="1600" b="1" dirty="0" smtClean="0">
+                <a:latin typeface="Courier New" pitchFamily="49" charset="0"/>
+                <a:cs typeface="Courier New" pitchFamily="49" charset="0"/>
+              </a:rPr>
+              <a:t>);</a:t>
+            </a:r>
+          </a:p>
+          <a:p>
+            <a:r>
+              <a:rPr lang="en-US" sz="1600" b="1" dirty="0" smtClean="0">
+                <a:latin typeface="Courier New" pitchFamily="49" charset="0"/>
+                <a:cs typeface="Courier New" pitchFamily="49" charset="0"/>
+              </a:rPr>
+              <a:t>    </a:t>
+            </a:r>
+            <a:r>
+              <a:rPr lang="en-US" sz="1600" b="1" dirty="0" err="1" smtClean="0">
+                <a:latin typeface="Courier New" pitchFamily="49" charset="0"/>
+                <a:cs typeface="Courier New" pitchFamily="49" charset="0"/>
+              </a:rPr>
+              <a:t>dst</a:t>
+            </a:r>
+            <a:r>
+              <a:rPr lang="en-US" sz="1600" b="1" dirty="0" smtClean="0">
+                <a:latin typeface="Courier New" pitchFamily="49" charset="0"/>
+                <a:cs typeface="Courier New" pitchFamily="49" charset="0"/>
+              </a:rPr>
+              <a:t>[id] += </a:t>
+            </a:r>
+            <a:r>
+              <a:rPr lang="en-US" sz="1600" b="1" dirty="0" err="1" smtClean="0">
+                <a:latin typeface="Courier New" pitchFamily="49" charset="0"/>
+                <a:cs typeface="Courier New" pitchFamily="49" charset="0"/>
+              </a:rPr>
+              <a:t>src</a:t>
+            </a:r>
+            <a:r>
+              <a:rPr lang="en-US" sz="1600" b="1" dirty="0" smtClean="0">
+                <a:latin typeface="Courier New" pitchFamily="49" charset="0"/>
+                <a:cs typeface="Courier New" pitchFamily="49" charset="0"/>
+              </a:rPr>
+              <a:t>[id];</a:t>
+            </a:r>
+          </a:p>
+          <a:p>
+            <a:r>
+              <a:rPr lang="en-US" sz="1600" b="1" dirty="0" smtClean="0">
+                <a:latin typeface="Courier New" pitchFamily="49" charset="0"/>
+                <a:cs typeface="Courier New" pitchFamily="49" charset="0"/>
+              </a:rPr>
+              <a:t>}</a:t>
+            </a:r>
+            <a:endParaRPr lang="en-US" sz="1600" b="1" dirty="0">
+              <a:latin typeface="Courier New" pitchFamily="49" charset="0"/>
+              <a:cs typeface="Courier New" pitchFamily="49" charset="0"/>
             </a:endParaRPr>
           </a:p>
-          <a:p>
-            <a:pPr marL="0" indent="0">
-              <a:buNone/>
-            </a:pPr>
-            <a:r>
-              <a:rPr lang="en-GB" b="1" dirty="0" smtClean="0">
-                <a:latin typeface="Courier New"/>
-                <a:cs typeface="Courier New"/>
-              </a:rPr>
-              <a:t>Using </a:t>
-            </a:r>
-            <a:r>
-              <a:rPr lang="en-GB" b="1" dirty="0">
-                <a:latin typeface="Courier New"/>
-                <a:cs typeface="Courier New"/>
-              </a:rPr>
-              <a:t>OpenCL device: Tesla </a:t>
-            </a:r>
-            <a:r>
-              <a:rPr lang="en-GB" b="1" dirty="0" smtClean="0">
-                <a:latin typeface="Courier New"/>
-                <a:cs typeface="Courier New"/>
-              </a:rPr>
-              <a:t>K40c</a:t>
-            </a:r>
-            <a:endParaRPr lang="en-GB" b="1" dirty="0">
-              <a:latin typeface="Courier New"/>
-              <a:cs typeface="Courier New"/>
-            </a:endParaRPr>
-          </a:p>
-          <a:p>
-            <a:pPr marL="0" indent="0">
-              <a:buNone/>
-            </a:pPr>
-            <a:r>
-              <a:rPr lang="en-GB" dirty="0">
-                <a:latin typeface="Courier New"/>
-                <a:cs typeface="Courier New"/>
-              </a:rPr>
-              <a:t>Type          Total   Transfer       Bandwidth</a:t>
-            </a:r>
-          </a:p>
-          <a:p>
-            <a:pPr marL="0" indent="0">
-              <a:buNone/>
-            </a:pPr>
-            <a:r>
-              <a:rPr lang="en-US" dirty="0">
-                <a:latin typeface="Courier New"/>
-                <a:cs typeface="Courier New"/>
-              </a:rPr>
-              <a:t>----------------------------------------------</a:t>
-            </a:r>
-          </a:p>
-          <a:p>
-            <a:pPr marL="0" indent="0">
-              <a:buNone/>
-            </a:pPr>
-            <a:r>
-              <a:rPr lang="de-DE" dirty="0">
-                <a:latin typeface="Courier New"/>
-                <a:cs typeface="Courier New"/>
-              </a:rPr>
-              <a:t>Baseline      5.28s      1.77s       4.86 GB/s</a:t>
-            </a:r>
-          </a:p>
-          <a:p>
-            <a:pPr marL="0" indent="0">
-              <a:buNone/>
-            </a:pPr>
-            <a:r>
-              <a:rPr lang="de-DE" dirty="0" err="1">
-                <a:latin typeface="Courier New"/>
-                <a:cs typeface="Courier New"/>
-              </a:rPr>
-              <a:t>Pinned</a:t>
-            </a:r>
-            <a:r>
-              <a:rPr lang="de-DE" dirty="0">
-                <a:latin typeface="Courier New"/>
-                <a:cs typeface="Courier New"/>
-              </a:rPr>
-              <a:t>        4.86s      1.30s       6.61 GB/s</a:t>
-            </a:r>
-            <a:endParaRPr lang="de-DE" dirty="0" smtClean="0">
-              <a:latin typeface="Courier New"/>
-              <a:cs typeface="Courier New"/>
-            </a:endParaRPr>
-          </a:p>
-          <a:p>
-            <a:pPr marL="0" indent="0">
-              <a:buNone/>
-            </a:pPr>
-            <a:endParaRPr lang="de-DE" dirty="0">
-              <a:latin typeface="Courier New"/>
-              <a:cs typeface="Courier New"/>
-            </a:endParaRPr>
-          </a:p>
-          <a:p>
-            <a:pPr marL="0" indent="0">
-              <a:buNone/>
-            </a:pPr>
-            <a:r>
-              <a:rPr lang="en-GB" b="1" dirty="0" smtClean="0">
-                <a:latin typeface="Courier New"/>
-                <a:cs typeface="Courier New"/>
-              </a:rPr>
-              <a:t>Using </a:t>
-            </a:r>
-            <a:r>
-              <a:rPr lang="en-GB" b="1" dirty="0">
-                <a:latin typeface="Courier New"/>
-                <a:cs typeface="Courier New"/>
-              </a:rPr>
-              <a:t>OpenCL device: Tesla </a:t>
-            </a:r>
-            <a:r>
-              <a:rPr lang="en-GB" b="1" dirty="0" smtClean="0">
-                <a:latin typeface="Courier New"/>
-                <a:cs typeface="Courier New"/>
-              </a:rPr>
-              <a:t>K20c</a:t>
-            </a:r>
-            <a:endParaRPr lang="en-GB" b="1" dirty="0">
-              <a:latin typeface="Courier New"/>
-              <a:cs typeface="Courier New"/>
-            </a:endParaRPr>
-          </a:p>
-          <a:p>
-            <a:pPr marL="0" indent="0">
-              <a:buNone/>
-            </a:pPr>
-            <a:r>
-              <a:rPr lang="en-GB" dirty="0">
-                <a:latin typeface="Courier New"/>
-                <a:cs typeface="Courier New"/>
-              </a:rPr>
-              <a:t>Type          Total   Transfer       Bandwidth</a:t>
-            </a:r>
-          </a:p>
-          <a:p>
-            <a:pPr marL="0" indent="0">
-              <a:buNone/>
-            </a:pPr>
-            <a:r>
-              <a:rPr lang="en-US" dirty="0">
-                <a:latin typeface="Courier New"/>
-                <a:cs typeface="Courier New"/>
-              </a:rPr>
-              <a:t>----------------------------------------------</a:t>
-            </a:r>
-          </a:p>
-          <a:p>
-            <a:pPr marL="0" indent="0">
-              <a:buNone/>
-            </a:pPr>
-            <a:r>
-              <a:rPr lang="de-DE" dirty="0">
-                <a:latin typeface="Courier New"/>
-                <a:cs typeface="Courier New"/>
-              </a:rPr>
-              <a:t>Baseline      6.21s      2.61s       3.29 GB/s</a:t>
-            </a:r>
-          </a:p>
-          <a:p>
-            <a:pPr marL="0" indent="0">
-              <a:buNone/>
-            </a:pPr>
-            <a:r>
-              <a:rPr lang="de-DE" dirty="0" err="1">
-                <a:latin typeface="Courier New"/>
-                <a:cs typeface="Courier New"/>
-              </a:rPr>
-              <a:t>Pinned</a:t>
-            </a:r>
-            <a:r>
-              <a:rPr lang="de-DE" dirty="0">
-                <a:latin typeface="Courier New"/>
-                <a:cs typeface="Courier New"/>
-              </a:rPr>
-              <a:t>        6.18s      2.56s       3.36 GB/</a:t>
-            </a:r>
-            <a:r>
-              <a:rPr lang="de-DE" dirty="0" smtClean="0">
-                <a:latin typeface="Courier New"/>
-                <a:cs typeface="Courier New"/>
-              </a:rPr>
-              <a:t>s</a:t>
-            </a:r>
-          </a:p>
-          <a:p>
-            <a:pPr marL="0" indent="0">
-              <a:buNone/>
-            </a:pPr>
-            <a:endParaRPr lang="de-DE" dirty="0">
-              <a:latin typeface="Courier New"/>
-              <a:cs typeface="Courier New"/>
-            </a:endParaRPr>
-          </a:p>
-          <a:p>
-            <a:pPr marL="0" indent="0">
-              <a:buNone/>
-            </a:pPr>
-            <a:r>
-              <a:rPr lang="en-GB" b="1" dirty="0">
-                <a:latin typeface="Courier New"/>
-                <a:cs typeface="Courier New"/>
-              </a:rPr>
-              <a:t>Using OpenCL device:         Intel(R) Core(TM) i5-3550 CPU @ 3.30GHz</a:t>
-            </a:r>
-          </a:p>
-          <a:p>
-            <a:pPr marL="0" indent="0">
-              <a:buNone/>
-            </a:pPr>
-            <a:r>
-              <a:rPr lang="en-GB" b="1" dirty="0" smtClean="0">
-                <a:latin typeface="Courier New"/>
-                <a:cs typeface="Courier New"/>
-              </a:rPr>
-              <a:t>Device </a:t>
-            </a:r>
-            <a:r>
-              <a:rPr lang="en-GB" b="1" dirty="0">
-                <a:latin typeface="Courier New"/>
-                <a:cs typeface="Courier New"/>
-              </a:rPr>
-              <a:t>has host-unified </a:t>
-            </a:r>
-            <a:r>
-              <a:rPr lang="en-GB" b="1" dirty="0" smtClean="0">
-                <a:latin typeface="Courier New"/>
-                <a:cs typeface="Courier New"/>
-              </a:rPr>
-              <a:t>memory</a:t>
-            </a:r>
-            <a:endParaRPr lang="en-GB" b="1" dirty="0">
-              <a:latin typeface="Courier New"/>
-              <a:cs typeface="Courier New"/>
-            </a:endParaRPr>
-          </a:p>
-          <a:p>
-            <a:pPr marL="0" indent="0">
-              <a:buNone/>
-            </a:pPr>
-            <a:r>
-              <a:rPr lang="en-GB" dirty="0">
-                <a:latin typeface="Courier New"/>
-                <a:cs typeface="Courier New"/>
-              </a:rPr>
-              <a:t>Type          Total   Transfer       Bandwidth</a:t>
-            </a:r>
-          </a:p>
-          <a:p>
-            <a:pPr marL="0" indent="0">
-              <a:buNone/>
-            </a:pPr>
-            <a:r>
-              <a:rPr lang="en-US" dirty="0">
-                <a:latin typeface="Courier New"/>
-                <a:cs typeface="Courier New"/>
-              </a:rPr>
-              <a:t>----------------------------------------------</a:t>
-            </a:r>
-          </a:p>
-          <a:p>
-            <a:pPr marL="0" indent="0">
-              <a:buNone/>
-            </a:pPr>
-            <a:r>
-              <a:rPr lang="de-DE" dirty="0">
-                <a:latin typeface="Courier New"/>
-                <a:cs typeface="Courier New"/>
-              </a:rPr>
-              <a:t>Baseline      4.06s      1.44s       5.95 GB/s</a:t>
-            </a:r>
-          </a:p>
-          <a:p>
-            <a:pPr marL="0" indent="0">
-              <a:buNone/>
-            </a:pPr>
-            <a:r>
-              <a:rPr lang="de-DE" dirty="0">
-                <a:latin typeface="Courier New"/>
-                <a:cs typeface="Courier New"/>
-              </a:rPr>
-              <a:t>Zero-</a:t>
-            </a:r>
-            <a:r>
-              <a:rPr lang="de-DE" dirty="0" err="1">
-                <a:latin typeface="Courier New"/>
-                <a:cs typeface="Courier New"/>
-              </a:rPr>
-              <a:t>Copy</a:t>
-            </a:r>
-            <a:r>
-              <a:rPr lang="de-DE" dirty="0">
-                <a:latin typeface="Courier New"/>
-                <a:cs typeface="Courier New"/>
-              </a:rPr>
-              <a:t>     2.82s      0.00s    5156.02 GB/s</a:t>
-            </a:r>
-          </a:p>
-          <a:p>
-            <a:pPr marL="0" indent="0">
-              <a:buNone/>
-            </a:pPr>
-            <a:endParaRPr lang="de-DE" dirty="0" smtClean="0"/>
-          </a:p>
-          <a:p>
-            <a:pPr marL="0" indent="0">
-              <a:buNone/>
-            </a:pPr>
-            <a:endParaRPr lang="de-DE" dirty="0"/>
-          </a:p>
-          <a:p>
-            <a:pPr marL="0" indent="0">
-              <a:buNone/>
-            </a:pPr>
-            <a:endParaRPr lang="de-DE" dirty="0"/>
-          </a:p>
-          <a:p>
-            <a:pPr marL="0" indent="0">
-              <a:buNone/>
-            </a:pPr>
-            <a:endParaRPr lang="en-GB" dirty="0"/>
+        </p:txBody>
+      </p:sp>
+      <p:sp>
+        <p:nvSpPr>
+          <p:cNvPr id="10" name="TextBox 9"/>
+          <p:cNvSpPr txBox="1"/>
+          <p:nvPr/>
+        </p:nvSpPr>
+        <p:spPr bwMode="auto">
+          <a:xfrm>
+            <a:off x="179512" y="3179057"/>
+            <a:ext cx="8964488" cy="830997"/>
+          </a:xfrm>
+          <a:prstGeom prst="rect">
+            <a:avLst/>
+          </a:prstGeom>
+          <a:noFill/>
+          <a:ln w="3175" algn="ctr">
+            <a:noFill/>
+            <a:miter lim="800000"/>
+            <a:headEnd/>
+            <a:tailEnd/>
+          </a:ln>
+          <a:effectLst/>
+        </p:spPr>
+        <p:txBody>
+          <a:bodyPr wrap="square" rtlCol="0">
+            <a:spAutoFit/>
+          </a:bodyPr>
+          <a:lstStyle/>
+          <a:p>
+            <a:r>
+              <a:rPr lang="en-US" sz="1600" b="1" dirty="0" smtClean="0">
+                <a:solidFill>
+                  <a:srgbClr val="008000"/>
+                </a:solidFill>
+                <a:latin typeface="Courier New" pitchFamily="49" charset="0"/>
+                <a:cs typeface="Courier New" pitchFamily="49" charset="0"/>
+              </a:rPr>
+              <a:t>// </a:t>
+            </a:r>
+            <a:r>
+              <a:rPr lang="en-US" sz="1600" b="1" dirty="0" smtClean="0">
+                <a:solidFill>
+                  <a:srgbClr val="008000"/>
+                </a:solidFill>
+                <a:latin typeface="Courier New" pitchFamily="49" charset="0"/>
+                <a:cs typeface="Courier New" pitchFamily="49" charset="0"/>
+              </a:rPr>
+              <a:t>Allocating </a:t>
+            </a:r>
+            <a:r>
+              <a:rPr lang="en-US" sz="1600" b="1" dirty="0" smtClean="0">
+                <a:solidFill>
+                  <a:srgbClr val="008000"/>
+                </a:solidFill>
+                <a:latin typeface="Courier New" pitchFamily="49" charset="0"/>
+                <a:cs typeface="Courier New" pitchFamily="49" charset="0"/>
+              </a:rPr>
+              <a:t>SVM pointers</a:t>
+            </a:r>
+          </a:p>
+          <a:p>
+            <a:r>
+              <a:rPr lang="en-US" sz="1600" b="1" dirty="0" err="1" smtClean="0">
+                <a:latin typeface="Courier New" pitchFamily="49" charset="0"/>
+                <a:cs typeface="Courier New" pitchFamily="49" charset="0"/>
+              </a:rPr>
+              <a:t>cl_float</a:t>
+            </a:r>
+            <a:r>
+              <a:rPr lang="en-US" sz="1600" b="1" dirty="0" smtClean="0">
+                <a:latin typeface="Courier New" pitchFamily="49" charset="0"/>
+                <a:cs typeface="Courier New" pitchFamily="49" charset="0"/>
+              </a:rPr>
+              <a:t> *</a:t>
+            </a:r>
+            <a:r>
+              <a:rPr lang="en-US" sz="1600" b="1" dirty="0" err="1" smtClean="0">
+                <a:latin typeface="Courier New" pitchFamily="49" charset="0"/>
+                <a:cs typeface="Courier New" pitchFamily="49" charset="0"/>
+              </a:rPr>
+              <a:t>src</a:t>
+            </a:r>
+            <a:r>
+              <a:rPr lang="en-US" sz="1600" b="1" dirty="0" smtClean="0">
+                <a:latin typeface="Courier New" pitchFamily="49" charset="0"/>
+                <a:cs typeface="Courier New" pitchFamily="49" charset="0"/>
+              </a:rPr>
+              <a:t> = (</a:t>
+            </a:r>
+            <a:r>
+              <a:rPr lang="en-US" sz="1600" b="1" dirty="0" err="1" smtClean="0">
+                <a:latin typeface="Courier New" pitchFamily="49" charset="0"/>
+                <a:cs typeface="Courier New" pitchFamily="49" charset="0"/>
+              </a:rPr>
+              <a:t>cl_float</a:t>
+            </a:r>
+            <a:r>
+              <a:rPr lang="en-US" sz="1600" b="1" dirty="0" smtClean="0">
+                <a:latin typeface="Courier New" pitchFamily="49" charset="0"/>
+                <a:cs typeface="Courier New" pitchFamily="49" charset="0"/>
+              </a:rPr>
+              <a:t>*</a:t>
+            </a:r>
+            <a:r>
+              <a:rPr lang="en-US" sz="1600" b="1" dirty="0" smtClean="0">
+                <a:latin typeface="Courier New" pitchFamily="49" charset="0"/>
+                <a:cs typeface="Courier New" pitchFamily="49" charset="0"/>
+              </a:rPr>
+              <a:t>)</a:t>
+            </a:r>
+            <a:r>
+              <a:rPr lang="en-US" sz="1600" b="1" dirty="0" err="1" smtClean="0">
+                <a:solidFill>
+                  <a:srgbClr val="3366FF"/>
+                </a:solidFill>
+                <a:latin typeface="Courier New" pitchFamily="49" charset="0"/>
+                <a:cs typeface="Courier New" pitchFamily="49" charset="0"/>
+              </a:rPr>
+              <a:t>clSVMAlloc</a:t>
+            </a:r>
+            <a:r>
+              <a:rPr lang="en-US" sz="1600" b="1" dirty="0" smtClean="0">
+                <a:latin typeface="Courier New" pitchFamily="49" charset="0"/>
+                <a:cs typeface="Courier New" pitchFamily="49" charset="0"/>
+              </a:rPr>
+              <a:t>(</a:t>
+            </a:r>
+            <a:r>
+              <a:rPr lang="en-US" sz="1600" b="1" dirty="0" err="1" smtClean="0">
+                <a:latin typeface="Courier New" pitchFamily="49" charset="0"/>
+                <a:cs typeface="Courier New" pitchFamily="49" charset="0"/>
+              </a:rPr>
+              <a:t>ctx</a:t>
+            </a:r>
+            <a:r>
+              <a:rPr lang="en-US" sz="1600" b="1" dirty="0" smtClean="0">
+                <a:latin typeface="Courier New" pitchFamily="49" charset="0"/>
+                <a:cs typeface="Courier New" pitchFamily="49" charset="0"/>
+              </a:rPr>
+              <a:t>, CL_MEM_READ_ONLY, size, </a:t>
+            </a:r>
+            <a:r>
+              <a:rPr lang="en-US" sz="1600" b="1" dirty="0" smtClean="0">
+                <a:solidFill>
+                  <a:srgbClr val="FF00FF"/>
+                </a:solidFill>
+                <a:latin typeface="Courier New" pitchFamily="49" charset="0"/>
+                <a:cs typeface="Courier New" pitchFamily="49" charset="0"/>
+              </a:rPr>
+              <a:t>0</a:t>
+            </a:r>
+            <a:r>
+              <a:rPr lang="en-US" sz="1600" b="1" dirty="0" smtClean="0">
+                <a:latin typeface="Courier New" pitchFamily="49" charset="0"/>
+                <a:cs typeface="Courier New" pitchFamily="49" charset="0"/>
+              </a:rPr>
+              <a:t>);</a:t>
+            </a:r>
+          </a:p>
+          <a:p>
+            <a:r>
+              <a:rPr lang="en-US" sz="1600" b="1" dirty="0" err="1">
+                <a:latin typeface="Courier New" pitchFamily="49" charset="0"/>
+                <a:cs typeface="Courier New" pitchFamily="49" charset="0"/>
+              </a:rPr>
+              <a:t>cl_float</a:t>
+            </a:r>
+            <a:r>
+              <a:rPr lang="en-US" sz="1600" b="1" dirty="0">
+                <a:latin typeface="Courier New" pitchFamily="49" charset="0"/>
+                <a:cs typeface="Courier New" pitchFamily="49" charset="0"/>
+              </a:rPr>
+              <a:t> </a:t>
+            </a:r>
+            <a:r>
+              <a:rPr lang="en-US" sz="1600" b="1" dirty="0" smtClean="0">
+                <a:latin typeface="Courier New" pitchFamily="49" charset="0"/>
+                <a:cs typeface="Courier New" pitchFamily="49" charset="0"/>
+              </a:rPr>
+              <a:t>*</a:t>
+            </a:r>
+            <a:r>
+              <a:rPr lang="en-US" sz="1600" b="1" dirty="0" err="1" smtClean="0">
+                <a:latin typeface="Courier New" pitchFamily="49" charset="0"/>
+                <a:cs typeface="Courier New" pitchFamily="49" charset="0"/>
+              </a:rPr>
+              <a:t>dst</a:t>
+            </a:r>
+            <a:r>
+              <a:rPr lang="en-US" sz="1600" b="1" dirty="0" smtClean="0">
+                <a:latin typeface="Courier New" pitchFamily="49" charset="0"/>
+                <a:cs typeface="Courier New" pitchFamily="49" charset="0"/>
+              </a:rPr>
+              <a:t> = (</a:t>
+            </a:r>
+            <a:r>
+              <a:rPr lang="en-US" sz="1600" b="1" dirty="0" err="1" smtClean="0">
+                <a:latin typeface="Courier New" pitchFamily="49" charset="0"/>
+                <a:cs typeface="Courier New" pitchFamily="49" charset="0"/>
+              </a:rPr>
+              <a:t>cl_float</a:t>
+            </a:r>
+            <a:r>
+              <a:rPr lang="en-US" sz="1600" b="1" dirty="0" smtClean="0">
+                <a:latin typeface="Courier New" pitchFamily="49" charset="0"/>
+                <a:cs typeface="Courier New" pitchFamily="49" charset="0"/>
+              </a:rPr>
+              <a:t>*</a:t>
+            </a:r>
+            <a:r>
+              <a:rPr lang="en-US" sz="1600" b="1" dirty="0">
+                <a:latin typeface="Courier New" pitchFamily="49" charset="0"/>
+                <a:cs typeface="Courier New" pitchFamily="49" charset="0"/>
+              </a:rPr>
+              <a:t>)</a:t>
+            </a:r>
+            <a:r>
+              <a:rPr lang="en-US" sz="1600" b="1" dirty="0" err="1">
+                <a:solidFill>
+                  <a:srgbClr val="3366FF"/>
+                </a:solidFill>
+                <a:latin typeface="Courier New" pitchFamily="49" charset="0"/>
+                <a:cs typeface="Courier New" pitchFamily="49" charset="0"/>
+              </a:rPr>
+              <a:t>clSVMAlloc</a:t>
+            </a:r>
+            <a:r>
+              <a:rPr lang="en-US" sz="1600" b="1" dirty="0">
+                <a:latin typeface="Courier New" pitchFamily="49" charset="0"/>
+                <a:cs typeface="Courier New" pitchFamily="49" charset="0"/>
+              </a:rPr>
+              <a:t>(</a:t>
+            </a:r>
+            <a:r>
+              <a:rPr lang="en-US" sz="1600" b="1" dirty="0" err="1">
+                <a:latin typeface="Courier New" pitchFamily="49" charset="0"/>
+                <a:cs typeface="Courier New" pitchFamily="49" charset="0"/>
+              </a:rPr>
+              <a:t>ctx</a:t>
+            </a:r>
+            <a:r>
+              <a:rPr lang="en-US" sz="1600" b="1" dirty="0">
+                <a:latin typeface="Courier New" pitchFamily="49" charset="0"/>
+                <a:cs typeface="Courier New" pitchFamily="49" charset="0"/>
+              </a:rPr>
+              <a:t>, </a:t>
+            </a:r>
+            <a:r>
+              <a:rPr lang="en-US" sz="1600" b="1" dirty="0" smtClean="0">
+                <a:latin typeface="Courier New" pitchFamily="49" charset="0"/>
+                <a:cs typeface="Courier New" pitchFamily="49" charset="0"/>
+              </a:rPr>
+              <a:t>CL_MEM_READ_WRITE</a:t>
+            </a:r>
+            <a:r>
+              <a:rPr lang="en-US" sz="1600" b="1" dirty="0">
+                <a:latin typeface="Courier New" pitchFamily="49" charset="0"/>
+                <a:cs typeface="Courier New" pitchFamily="49" charset="0"/>
+              </a:rPr>
+              <a:t>, size, </a:t>
+            </a:r>
+            <a:r>
+              <a:rPr lang="en-US" sz="1600" b="1" dirty="0">
+                <a:solidFill>
+                  <a:srgbClr val="FF00FF"/>
+                </a:solidFill>
+                <a:latin typeface="Courier New" pitchFamily="49" charset="0"/>
+                <a:cs typeface="Courier New" pitchFamily="49" charset="0"/>
+              </a:rPr>
+              <a:t>0</a:t>
+            </a:r>
+            <a:r>
+              <a:rPr lang="en-US" sz="1600" b="1" dirty="0">
+                <a:latin typeface="Courier New" pitchFamily="49" charset="0"/>
+                <a:cs typeface="Courier New" pitchFamily="49" charset="0"/>
+              </a:rPr>
+              <a:t>)</a:t>
+            </a:r>
+            <a:r>
+              <a:rPr lang="en-US" sz="1600" b="1" dirty="0" smtClean="0">
+                <a:latin typeface="Courier New" pitchFamily="49" charset="0"/>
+                <a:cs typeface="Courier New" pitchFamily="49" charset="0"/>
+              </a:rPr>
+              <a:t>;</a:t>
+            </a:r>
+          </a:p>
+        </p:txBody>
+      </p:sp>
+      <p:sp>
+        <p:nvSpPr>
+          <p:cNvPr id="11" name="TextBox 10"/>
+          <p:cNvSpPr txBox="1"/>
+          <p:nvPr/>
+        </p:nvSpPr>
+        <p:spPr bwMode="auto">
+          <a:xfrm>
+            <a:off x="179514" y="4279723"/>
+            <a:ext cx="8208369" cy="830997"/>
+          </a:xfrm>
+          <a:prstGeom prst="rect">
+            <a:avLst/>
+          </a:prstGeom>
+          <a:noFill/>
+          <a:ln w="3175" algn="ctr">
+            <a:noFill/>
+            <a:miter lim="800000"/>
+            <a:headEnd/>
+            <a:tailEnd/>
+          </a:ln>
+          <a:effectLst/>
+        </p:spPr>
+        <p:txBody>
+          <a:bodyPr wrap="square" rtlCol="0">
+            <a:spAutoFit/>
+          </a:bodyPr>
+          <a:lstStyle/>
+          <a:p>
+            <a:r>
+              <a:rPr lang="en-US" sz="1600" b="1" dirty="0" smtClean="0">
+                <a:solidFill>
+                  <a:srgbClr val="008000"/>
+                </a:solidFill>
+                <a:latin typeface="Courier New" pitchFamily="49" charset="0"/>
+                <a:cs typeface="Courier New" pitchFamily="49" charset="0"/>
+              </a:rPr>
+              <a:t>// </a:t>
+            </a:r>
+            <a:r>
+              <a:rPr lang="en-US" sz="1600" b="1" dirty="0">
+                <a:solidFill>
+                  <a:srgbClr val="008000"/>
+                </a:solidFill>
+                <a:latin typeface="Courier New" pitchFamily="49" charset="0"/>
+                <a:cs typeface="Courier New" pitchFamily="49" charset="0"/>
+              </a:rPr>
+              <a:t>P</a:t>
+            </a:r>
+            <a:r>
+              <a:rPr lang="en-US" sz="1600" b="1" dirty="0" smtClean="0">
+                <a:solidFill>
+                  <a:srgbClr val="008000"/>
+                </a:solidFill>
+                <a:latin typeface="Courier New" pitchFamily="49" charset="0"/>
+                <a:cs typeface="Courier New" pitchFamily="49" charset="0"/>
+              </a:rPr>
+              <a:t>assing </a:t>
+            </a:r>
+            <a:r>
+              <a:rPr lang="en-US" sz="1600" b="1" dirty="0" smtClean="0">
+                <a:solidFill>
+                  <a:srgbClr val="008000"/>
+                </a:solidFill>
+                <a:latin typeface="Courier New" pitchFamily="49" charset="0"/>
+                <a:cs typeface="Courier New" pitchFamily="49" charset="0"/>
+              </a:rPr>
+              <a:t>SVM pointers as arguments</a:t>
+            </a:r>
+          </a:p>
+          <a:p>
+            <a:r>
+              <a:rPr lang="en-US" sz="1600" b="1" dirty="0" err="1" smtClean="0">
+                <a:solidFill>
+                  <a:srgbClr val="3366FF"/>
+                </a:solidFill>
+                <a:latin typeface="Courier New" pitchFamily="49" charset="0"/>
+                <a:cs typeface="Courier New" pitchFamily="49" charset="0"/>
+              </a:rPr>
+              <a:t>clSetKernelArgSVMPointer</a:t>
+            </a:r>
+            <a:r>
+              <a:rPr lang="en-US" sz="1600" b="1" dirty="0">
+                <a:solidFill>
+                  <a:srgbClr val="000000"/>
+                </a:solidFill>
+                <a:latin typeface="Courier New" pitchFamily="49" charset="0"/>
+                <a:cs typeface="Courier New" pitchFamily="49" charset="0"/>
+              </a:rPr>
+              <a:t>(</a:t>
+            </a:r>
+            <a:r>
+              <a:rPr lang="en-US" sz="1600" b="1" dirty="0" err="1" smtClean="0">
+                <a:solidFill>
+                  <a:srgbClr val="000000"/>
+                </a:solidFill>
+                <a:latin typeface="Courier New" pitchFamily="49" charset="0"/>
+                <a:cs typeface="Courier New" pitchFamily="49" charset="0"/>
+              </a:rPr>
+              <a:t>vec_add_kernel</a:t>
+            </a:r>
+            <a:r>
+              <a:rPr lang="en-US" sz="1600" b="1" dirty="0">
+                <a:solidFill>
+                  <a:srgbClr val="000000"/>
+                </a:solidFill>
+                <a:latin typeface="Courier New" pitchFamily="49" charset="0"/>
+                <a:cs typeface="Courier New" pitchFamily="49" charset="0"/>
+              </a:rPr>
+              <a:t>, </a:t>
+            </a:r>
+            <a:r>
+              <a:rPr lang="en-US" sz="1600" b="1" dirty="0">
+                <a:solidFill>
+                  <a:srgbClr val="FF00FF"/>
+                </a:solidFill>
+                <a:latin typeface="Courier New" pitchFamily="49" charset="0"/>
+                <a:cs typeface="Courier New" pitchFamily="49" charset="0"/>
+              </a:rPr>
+              <a:t>0</a:t>
+            </a:r>
+            <a:r>
+              <a:rPr lang="en-US" sz="1600" b="1" dirty="0">
+                <a:solidFill>
+                  <a:srgbClr val="000000"/>
+                </a:solidFill>
+                <a:latin typeface="Courier New" pitchFamily="49" charset="0"/>
+                <a:cs typeface="Courier New" pitchFamily="49" charset="0"/>
+              </a:rPr>
+              <a:t>, </a:t>
+            </a:r>
+            <a:r>
+              <a:rPr lang="en-US" sz="1600" b="1" dirty="0" err="1">
+                <a:solidFill>
+                  <a:srgbClr val="000000"/>
+                </a:solidFill>
+                <a:latin typeface="Courier New" pitchFamily="49" charset="0"/>
+                <a:cs typeface="Courier New" pitchFamily="49" charset="0"/>
+              </a:rPr>
+              <a:t>src</a:t>
+            </a:r>
+            <a:r>
+              <a:rPr lang="en-US" sz="1600" b="1" dirty="0">
+                <a:solidFill>
+                  <a:srgbClr val="000000"/>
+                </a:solidFill>
+                <a:latin typeface="Courier New" pitchFamily="49" charset="0"/>
+                <a:cs typeface="Courier New" pitchFamily="49" charset="0"/>
+              </a:rPr>
+              <a:t>);</a:t>
+            </a:r>
+          </a:p>
+          <a:p>
+            <a:r>
+              <a:rPr lang="en-US" sz="1600" b="1" dirty="0" err="1">
+                <a:solidFill>
+                  <a:srgbClr val="3366FF"/>
+                </a:solidFill>
+                <a:latin typeface="Courier New" pitchFamily="49" charset="0"/>
+                <a:cs typeface="Courier New" pitchFamily="49" charset="0"/>
+              </a:rPr>
+              <a:t>clSetKernelArgSVMPointer</a:t>
+            </a:r>
+            <a:r>
+              <a:rPr lang="en-US" sz="1600" b="1" dirty="0">
+                <a:solidFill>
+                  <a:srgbClr val="000000"/>
+                </a:solidFill>
+                <a:latin typeface="Courier New" pitchFamily="49" charset="0"/>
+                <a:cs typeface="Courier New" pitchFamily="49" charset="0"/>
+              </a:rPr>
+              <a:t>(</a:t>
+            </a:r>
+            <a:r>
+              <a:rPr lang="en-US" sz="1600" b="1" dirty="0" err="1" smtClean="0">
+                <a:solidFill>
+                  <a:srgbClr val="000000"/>
+                </a:solidFill>
+                <a:latin typeface="Courier New" pitchFamily="49" charset="0"/>
+                <a:cs typeface="Courier New" pitchFamily="49" charset="0"/>
+              </a:rPr>
+              <a:t>vec_add_kernel</a:t>
+            </a:r>
+            <a:r>
+              <a:rPr lang="en-US" sz="1600" b="1" dirty="0">
+                <a:solidFill>
+                  <a:srgbClr val="000000"/>
+                </a:solidFill>
+                <a:latin typeface="Courier New" pitchFamily="49" charset="0"/>
+                <a:cs typeface="Courier New" pitchFamily="49" charset="0"/>
+              </a:rPr>
+              <a:t>, </a:t>
+            </a:r>
+            <a:r>
+              <a:rPr lang="en-US" sz="1600" b="1" dirty="0">
+                <a:solidFill>
+                  <a:srgbClr val="FF00FF"/>
+                </a:solidFill>
+                <a:latin typeface="Courier New" pitchFamily="49" charset="0"/>
+                <a:cs typeface="Courier New" pitchFamily="49" charset="0"/>
+              </a:rPr>
+              <a:t>1</a:t>
+            </a:r>
+            <a:r>
+              <a:rPr lang="en-US" sz="1600" b="1" dirty="0">
+                <a:solidFill>
+                  <a:srgbClr val="000000"/>
+                </a:solidFill>
+                <a:latin typeface="Courier New" pitchFamily="49" charset="0"/>
+                <a:cs typeface="Courier New" pitchFamily="49" charset="0"/>
+              </a:rPr>
+              <a:t>, </a:t>
+            </a:r>
+            <a:r>
+              <a:rPr lang="en-US" sz="1600" b="1" dirty="0" err="1">
+                <a:solidFill>
+                  <a:srgbClr val="000000"/>
+                </a:solidFill>
+                <a:latin typeface="Courier New" pitchFamily="49" charset="0"/>
+                <a:cs typeface="Courier New" pitchFamily="49" charset="0"/>
+              </a:rPr>
+              <a:t>dst</a:t>
+            </a:r>
+            <a:r>
+              <a:rPr lang="en-US" sz="1600" b="1" dirty="0">
+                <a:solidFill>
+                  <a:srgbClr val="000000"/>
+                </a:solidFill>
+                <a:latin typeface="Courier New" pitchFamily="49" charset="0"/>
+                <a:cs typeface="Courier New" pitchFamily="49" charset="0"/>
+              </a:rPr>
+              <a:t>);</a:t>
+            </a:r>
+          </a:p>
+        </p:txBody>
+      </p:sp>
+      <p:sp>
+        <p:nvSpPr>
+          <p:cNvPr id="12" name="TextBox 11"/>
+          <p:cNvSpPr txBox="1"/>
+          <p:nvPr/>
+        </p:nvSpPr>
+        <p:spPr bwMode="auto">
+          <a:xfrm>
+            <a:off x="179512" y="5380390"/>
+            <a:ext cx="7375812" cy="830997"/>
+          </a:xfrm>
+          <a:prstGeom prst="rect">
+            <a:avLst/>
+          </a:prstGeom>
+          <a:noFill/>
+          <a:ln w="3175" algn="ctr">
+            <a:noFill/>
+            <a:miter lim="800000"/>
+            <a:headEnd/>
+            <a:tailEnd/>
+          </a:ln>
+          <a:effectLst/>
+        </p:spPr>
+        <p:txBody>
+          <a:bodyPr wrap="square" rtlCol="0">
+            <a:spAutoFit/>
+          </a:bodyPr>
+          <a:lstStyle/>
+          <a:p>
+            <a:r>
+              <a:rPr lang="en-US" sz="1600" b="1" dirty="0" smtClean="0">
+                <a:solidFill>
+                  <a:srgbClr val="008000"/>
+                </a:solidFill>
+                <a:latin typeface="Courier New" pitchFamily="49" charset="0"/>
+                <a:cs typeface="Courier New" pitchFamily="49" charset="0"/>
+              </a:rPr>
+              <a:t>// </a:t>
+            </a:r>
+            <a:r>
+              <a:rPr lang="en-US" sz="1600" b="1" dirty="0">
+                <a:solidFill>
+                  <a:srgbClr val="008000"/>
+                </a:solidFill>
+                <a:latin typeface="Courier New" pitchFamily="49" charset="0"/>
+                <a:cs typeface="Courier New" pitchFamily="49" charset="0"/>
+              </a:rPr>
+              <a:t>P</a:t>
+            </a:r>
+            <a:r>
+              <a:rPr lang="en-US" sz="1600" b="1" dirty="0" smtClean="0">
+                <a:solidFill>
+                  <a:srgbClr val="008000"/>
+                </a:solidFill>
+                <a:latin typeface="Courier New" pitchFamily="49" charset="0"/>
+                <a:cs typeface="Courier New" pitchFamily="49" charset="0"/>
+              </a:rPr>
+              <a:t>assing </a:t>
+            </a:r>
+            <a:r>
+              <a:rPr lang="en-US" sz="1600" b="1" dirty="0" smtClean="0">
+                <a:solidFill>
+                  <a:srgbClr val="008000"/>
+                </a:solidFill>
+                <a:latin typeface="Courier New" pitchFamily="49" charset="0"/>
+                <a:cs typeface="Courier New" pitchFamily="49" charset="0"/>
+              </a:rPr>
+              <a:t>SVM pointer + offset as arguments</a:t>
+            </a:r>
+          </a:p>
+          <a:p>
+            <a:r>
+              <a:rPr lang="en-US" sz="1600" b="1" dirty="0" err="1" smtClean="0">
+                <a:solidFill>
+                  <a:srgbClr val="3366FF"/>
+                </a:solidFill>
+                <a:latin typeface="Courier New" pitchFamily="49" charset="0"/>
+                <a:cs typeface="Courier New" pitchFamily="49" charset="0"/>
+              </a:rPr>
+              <a:t>clSetKernelArgSVMPointer</a:t>
+            </a:r>
+            <a:r>
+              <a:rPr lang="en-US" sz="1600" b="1" dirty="0">
+                <a:solidFill>
+                  <a:srgbClr val="000000"/>
+                </a:solidFill>
+                <a:latin typeface="Courier New" pitchFamily="49" charset="0"/>
+                <a:cs typeface="Courier New" pitchFamily="49" charset="0"/>
+              </a:rPr>
+              <a:t>(</a:t>
+            </a:r>
+            <a:r>
+              <a:rPr lang="en-US" sz="1600" b="1" dirty="0" err="1" smtClean="0">
+                <a:solidFill>
+                  <a:srgbClr val="000000"/>
+                </a:solidFill>
+                <a:latin typeface="Courier New" pitchFamily="49" charset="0"/>
+                <a:cs typeface="Courier New" pitchFamily="49" charset="0"/>
+              </a:rPr>
+              <a:t>vec_add_kernel</a:t>
+            </a:r>
+            <a:r>
+              <a:rPr lang="en-US" sz="1600" b="1" dirty="0">
+                <a:solidFill>
+                  <a:srgbClr val="000000"/>
+                </a:solidFill>
+                <a:latin typeface="Courier New" pitchFamily="49" charset="0"/>
+                <a:cs typeface="Courier New" pitchFamily="49" charset="0"/>
+              </a:rPr>
+              <a:t>, </a:t>
+            </a:r>
+            <a:r>
+              <a:rPr lang="en-US" sz="1600" b="1" dirty="0">
+                <a:solidFill>
+                  <a:srgbClr val="FF00FF"/>
+                </a:solidFill>
+                <a:latin typeface="Courier New" pitchFamily="49" charset="0"/>
+                <a:cs typeface="Courier New" pitchFamily="49" charset="0"/>
+              </a:rPr>
+              <a:t>0</a:t>
+            </a:r>
+            <a:r>
+              <a:rPr lang="en-US" sz="1600" b="1" dirty="0">
+                <a:solidFill>
+                  <a:srgbClr val="000000"/>
+                </a:solidFill>
+                <a:latin typeface="Courier New" pitchFamily="49" charset="0"/>
+                <a:cs typeface="Courier New" pitchFamily="49" charset="0"/>
+              </a:rPr>
+              <a:t>, </a:t>
+            </a:r>
+            <a:r>
+              <a:rPr lang="en-US" sz="1600" b="1" dirty="0" err="1" smtClean="0">
+                <a:solidFill>
+                  <a:srgbClr val="000000"/>
+                </a:solidFill>
+                <a:latin typeface="Courier New" pitchFamily="49" charset="0"/>
+                <a:cs typeface="Courier New" pitchFamily="49" charset="0"/>
+              </a:rPr>
+              <a:t>src</a:t>
+            </a:r>
+            <a:r>
+              <a:rPr lang="en-US" sz="1600" b="1" dirty="0" smtClean="0">
+                <a:solidFill>
+                  <a:srgbClr val="000000"/>
+                </a:solidFill>
+                <a:latin typeface="Courier New" pitchFamily="49" charset="0"/>
+                <a:cs typeface="Courier New" pitchFamily="49" charset="0"/>
+              </a:rPr>
+              <a:t> + offset)</a:t>
+            </a:r>
+            <a:r>
+              <a:rPr lang="en-US" sz="1600" b="1" dirty="0">
+                <a:solidFill>
+                  <a:srgbClr val="000000"/>
+                </a:solidFill>
+                <a:latin typeface="Courier New" pitchFamily="49" charset="0"/>
+                <a:cs typeface="Courier New" pitchFamily="49" charset="0"/>
+              </a:rPr>
+              <a:t>;</a:t>
+            </a:r>
+          </a:p>
+          <a:p>
+            <a:r>
+              <a:rPr lang="en-US" sz="1600" b="1" dirty="0" err="1">
+                <a:solidFill>
+                  <a:srgbClr val="3366FF"/>
+                </a:solidFill>
+                <a:latin typeface="Courier New" pitchFamily="49" charset="0"/>
+                <a:cs typeface="Courier New" pitchFamily="49" charset="0"/>
+              </a:rPr>
+              <a:t>clSetKernelArgSVMPointer</a:t>
+            </a:r>
+            <a:r>
+              <a:rPr lang="en-US" sz="1600" b="1" dirty="0">
+                <a:solidFill>
+                  <a:srgbClr val="000000"/>
+                </a:solidFill>
+                <a:latin typeface="Courier New" pitchFamily="49" charset="0"/>
+                <a:cs typeface="Courier New" pitchFamily="49" charset="0"/>
+              </a:rPr>
+              <a:t>(</a:t>
+            </a:r>
+            <a:r>
+              <a:rPr lang="en-US" sz="1600" b="1" dirty="0" err="1" smtClean="0">
+                <a:solidFill>
+                  <a:srgbClr val="000000"/>
+                </a:solidFill>
+                <a:latin typeface="Courier New" pitchFamily="49" charset="0"/>
+                <a:cs typeface="Courier New" pitchFamily="49" charset="0"/>
+              </a:rPr>
+              <a:t>vec_add_kernel</a:t>
+            </a:r>
+            <a:r>
+              <a:rPr lang="en-US" sz="1600" b="1" dirty="0">
+                <a:solidFill>
+                  <a:srgbClr val="000000"/>
+                </a:solidFill>
+                <a:latin typeface="Courier New" pitchFamily="49" charset="0"/>
+                <a:cs typeface="Courier New" pitchFamily="49" charset="0"/>
+              </a:rPr>
+              <a:t>, </a:t>
+            </a:r>
+            <a:r>
+              <a:rPr lang="en-US" sz="1600" b="1" dirty="0">
+                <a:solidFill>
+                  <a:srgbClr val="FF00FF"/>
+                </a:solidFill>
+                <a:latin typeface="Courier New" pitchFamily="49" charset="0"/>
+                <a:cs typeface="Courier New" pitchFamily="49" charset="0"/>
+              </a:rPr>
+              <a:t>1</a:t>
+            </a:r>
+            <a:r>
+              <a:rPr lang="en-US" sz="1600" b="1" dirty="0">
+                <a:solidFill>
+                  <a:srgbClr val="000000"/>
+                </a:solidFill>
+                <a:latin typeface="Courier New" pitchFamily="49" charset="0"/>
+                <a:cs typeface="Courier New" pitchFamily="49" charset="0"/>
+              </a:rPr>
+              <a:t>, </a:t>
+            </a:r>
+            <a:r>
+              <a:rPr lang="en-US" sz="1600" b="1" dirty="0" err="1" smtClean="0">
+                <a:solidFill>
+                  <a:srgbClr val="000000"/>
+                </a:solidFill>
+                <a:latin typeface="Courier New" pitchFamily="49" charset="0"/>
+                <a:cs typeface="Courier New" pitchFamily="49" charset="0"/>
+              </a:rPr>
+              <a:t>dst</a:t>
+            </a:r>
+            <a:r>
+              <a:rPr lang="en-US" sz="1600" b="1" dirty="0" smtClean="0">
+                <a:solidFill>
+                  <a:srgbClr val="000000"/>
+                </a:solidFill>
+                <a:latin typeface="Courier New" pitchFamily="49" charset="0"/>
+                <a:cs typeface="Courier New" pitchFamily="49" charset="0"/>
+              </a:rPr>
+              <a:t> + offset)</a:t>
+            </a:r>
+            <a:r>
+              <a:rPr lang="en-US" sz="1600" b="1" dirty="0">
+                <a:solidFill>
+                  <a:srgbClr val="000000"/>
+                </a:solidFill>
+                <a:latin typeface="Courier New" pitchFamily="49" charset="0"/>
+                <a:cs typeface="Courier New" pitchFamily="49" charset="0"/>
+              </a:rPr>
+              <a:t>;</a:t>
+            </a:r>
           </a:p>
         </p:txBody>
       </p:sp>
     </p:spTree>
     <p:extLst>
       <p:ext uri="{BB962C8B-B14F-4D97-AF65-F5344CB8AC3E}">
-        <p14:creationId xmlns:p14="http://schemas.microsoft.com/office/powerpoint/2010/main" val="3716420950"/>
+        <p14:creationId xmlns:p14="http://schemas.microsoft.com/office/powerpoint/2010/main" val="2594862784"/>
       </p:ext>
     </p:extLst>
   </p:cSld>
   <p:clrMapOvr>
     <a:masterClrMapping/>
   </p:clrMapOvr>
+  <mc:AlternateContent xmlns:mc="http://schemas.openxmlformats.org/markup-compatibility/2006" xmlns:p14="http://schemas.microsoft.com/office/powerpoint/2010/main">
+    <mc:Choice Requires="p14">
+      <p:transition spd="slow" p14:dur="2000"/>
+    </mc:Choice>
+    <mc:Fallback xmlns="">
+      <p:transition xmlns:p14="http://schemas.microsoft.com/office/powerpoint/2010/main" spd="slow"/>
+    </mc:Fallback>
+  </mc:AlternateContent>
+  <p:timing>
+    <p:tnLst>
+      <p:par>
+        <p:cTn xmlns:p14="http://schemas.microsoft.com/office/powerpoint/2010/main" id="1" dur="indefinite" restart="never" nodeType="tmRoot"/>
+      </p:par>
+    </p:tnLst>
+  </p:timing>
 </p:sld>
 </file>
 
@@ -11196,6 +12096,1802 @@
       </p:par>
     </p:tnLst>
   </p:timing>
+</p:sld>
+</file>
+
+<file path=ppt/slides/slide30.xml><?xml version="1.0" encoding="utf-8"?>
+<p:sld xmlns:a="http://schemas.openxmlformats.org/drawingml/2006/main" xmlns:r="http://schemas.openxmlformats.org/officeDocument/2006/relationships" xmlns:p="http://schemas.openxmlformats.org/presentationml/2006/main">
+  <p:cSld>
+    <p:spTree>
+      <p:nvGrpSpPr>
+        <p:cNvPr id="1" name=""/>
+        <p:cNvGrpSpPr/>
+        <p:nvPr/>
+      </p:nvGrpSpPr>
+      <p:grpSpPr>
+        <a:xfrm>
+          <a:off x="0" y="0"/>
+          <a:ext cx="0" cy="0"/>
+          <a:chOff x="0" y="0"/>
+          <a:chExt cx="0" cy="0"/>
+        </a:xfrm>
+      </p:grpSpPr>
+      <p:sp>
+        <p:nvSpPr>
+          <p:cNvPr id="2" name="Title 1"/>
+          <p:cNvSpPr>
+            <a:spLocks noGrp="1"/>
+          </p:cNvSpPr>
+          <p:nvPr>
+            <p:ph type="title"/>
+          </p:nvPr>
+        </p:nvSpPr>
+        <p:spPr/>
+        <p:txBody>
+          <a:bodyPr/>
+          <a:lstStyle/>
+          <a:p>
+            <a:r>
+              <a:rPr lang="en-US" dirty="0" smtClean="0"/>
+              <a:t>Shared Virtual Memory</a:t>
+            </a:r>
+            <a:endParaRPr lang="en-US" dirty="0"/>
+          </a:p>
+        </p:txBody>
+      </p:sp>
+      <p:sp>
+        <p:nvSpPr>
+          <p:cNvPr id="3" name="Content Placeholder 2"/>
+          <p:cNvSpPr>
+            <a:spLocks noGrp="1"/>
+          </p:cNvSpPr>
+          <p:nvPr>
+            <p:ph idx="1"/>
+          </p:nvPr>
+        </p:nvSpPr>
+        <p:spPr/>
+        <p:txBody>
+          <a:bodyPr/>
+          <a:lstStyle/>
+          <a:p>
+            <a:r>
+              <a:rPr lang="en-US" dirty="0" smtClean="0"/>
+              <a:t>Three types of sharing</a:t>
+            </a:r>
+          </a:p>
+          <a:p>
+            <a:pPr lvl="1"/>
+            <a:r>
+              <a:rPr lang="en-US" b="1" dirty="0" smtClean="0">
+                <a:solidFill>
+                  <a:srgbClr val="008000"/>
+                </a:solidFill>
+              </a:rPr>
+              <a:t>Coarse-grained </a:t>
+            </a:r>
+            <a:r>
+              <a:rPr lang="en-US" dirty="0" smtClean="0"/>
+              <a:t>buffer sharing</a:t>
+            </a:r>
+          </a:p>
+          <a:p>
+            <a:pPr lvl="1"/>
+            <a:r>
+              <a:rPr lang="en-US" b="1" dirty="0" smtClean="0">
+                <a:solidFill>
+                  <a:srgbClr val="008000"/>
+                </a:solidFill>
+              </a:rPr>
+              <a:t>Fine-grained </a:t>
+            </a:r>
+            <a:r>
+              <a:rPr lang="en-US" dirty="0" smtClean="0"/>
+              <a:t>buffer sharing</a:t>
+            </a:r>
+          </a:p>
+          <a:p>
+            <a:pPr lvl="1"/>
+            <a:r>
+              <a:rPr lang="en-US" b="1" dirty="0" smtClean="0">
+                <a:solidFill>
+                  <a:srgbClr val="008000"/>
+                </a:solidFill>
+              </a:rPr>
+              <a:t>System sharing</a:t>
+            </a:r>
+          </a:p>
+          <a:p>
+            <a:pPr lvl="1"/>
+            <a:endParaRPr lang="en-US" dirty="0" smtClean="0"/>
+          </a:p>
+        </p:txBody>
+      </p:sp>
+    </p:spTree>
+    <p:extLst>
+      <p:ext uri="{BB962C8B-B14F-4D97-AF65-F5344CB8AC3E}">
+        <p14:creationId xmlns:p14="http://schemas.microsoft.com/office/powerpoint/2010/main" val="736215397"/>
+      </p:ext>
+    </p:extLst>
+  </p:cSld>
+  <p:clrMapOvr>
+    <a:masterClrMapping/>
+  </p:clrMapOvr>
+  <mc:AlternateContent xmlns:mc="http://schemas.openxmlformats.org/markup-compatibility/2006" xmlns:p14="http://schemas.microsoft.com/office/powerpoint/2010/main">
+    <mc:Choice Requires="p14">
+      <p:transition spd="slow" p14:dur="2000"/>
+    </mc:Choice>
+    <mc:Fallback xmlns="">
+      <p:transition xmlns:p14="http://schemas.microsoft.com/office/powerpoint/2010/main" spd="slow"/>
+    </mc:Fallback>
+  </mc:AlternateContent>
+  <p:timing>
+    <p:tnLst>
+      <p:par>
+        <p:cTn xmlns:p14="http://schemas.microsoft.com/office/powerpoint/2010/main" id="1" dur="indefinite" restart="never" nodeType="tmRoot"/>
+      </p:par>
+    </p:tnLst>
+  </p:timing>
+</p:sld>
+</file>
+
+<file path=ppt/slides/slide31.xml><?xml version="1.0" encoding="utf-8"?>
+<p:sld xmlns:a="http://schemas.openxmlformats.org/drawingml/2006/main" xmlns:r="http://schemas.openxmlformats.org/officeDocument/2006/relationships" xmlns:p="http://schemas.openxmlformats.org/presentationml/2006/main">
+  <p:cSld>
+    <p:spTree>
+      <p:nvGrpSpPr>
+        <p:cNvPr id="1" name=""/>
+        <p:cNvGrpSpPr/>
+        <p:nvPr/>
+      </p:nvGrpSpPr>
+      <p:grpSpPr>
+        <a:xfrm>
+          <a:off x="0" y="0"/>
+          <a:ext cx="0" cy="0"/>
+          <a:chOff x="0" y="0"/>
+          <a:chExt cx="0" cy="0"/>
+        </a:xfrm>
+      </p:grpSpPr>
+      <p:sp>
+        <p:nvSpPr>
+          <p:cNvPr id="2" name="Title 1"/>
+          <p:cNvSpPr>
+            <a:spLocks noGrp="1"/>
+          </p:cNvSpPr>
+          <p:nvPr>
+            <p:ph type="title"/>
+          </p:nvPr>
+        </p:nvSpPr>
+        <p:spPr/>
+        <p:txBody>
+          <a:bodyPr>
+            <a:normAutofit fontScale="90000"/>
+          </a:bodyPr>
+          <a:lstStyle/>
+          <a:p>
+            <a:r>
+              <a:rPr lang="en-US" dirty="0" smtClean="0"/>
+              <a:t>Shared Virtual Memory:</a:t>
+            </a:r>
+            <a:br>
+              <a:rPr lang="en-US" dirty="0" smtClean="0"/>
+            </a:br>
+            <a:r>
+              <a:rPr lang="en-US" dirty="0" smtClean="0"/>
+              <a:t>Coarse &amp; Fine Grained</a:t>
+            </a:r>
+            <a:endParaRPr lang="en-US" dirty="0"/>
+          </a:p>
+        </p:txBody>
+      </p:sp>
+      <p:sp>
+        <p:nvSpPr>
+          <p:cNvPr id="3" name="Content Placeholder 2"/>
+          <p:cNvSpPr>
+            <a:spLocks noGrp="1"/>
+          </p:cNvSpPr>
+          <p:nvPr>
+            <p:ph idx="1"/>
+          </p:nvPr>
+        </p:nvSpPr>
+        <p:spPr>
+          <a:xfrm>
+            <a:off x="467544" y="1772816"/>
+            <a:ext cx="8229600" cy="4824536"/>
+          </a:xfrm>
+        </p:spPr>
+        <p:txBody>
+          <a:bodyPr>
+            <a:normAutofit fontScale="70000" lnSpcReduction="20000"/>
+          </a:bodyPr>
+          <a:lstStyle/>
+          <a:p>
+            <a:pPr>
+              <a:lnSpc>
+                <a:spcPct val="110000"/>
+              </a:lnSpc>
+            </a:pPr>
+            <a:r>
+              <a:rPr lang="en-US" dirty="0" smtClean="0"/>
+              <a:t>SVM buffers allocated using </a:t>
+            </a:r>
+            <a:r>
+              <a:rPr lang="en-US" b="1" dirty="0" err="1" smtClean="0">
+                <a:solidFill>
+                  <a:srgbClr val="3366FF"/>
+                </a:solidFill>
+                <a:latin typeface="Courier New"/>
+                <a:cs typeface="Courier New"/>
+              </a:rPr>
+              <a:t>clSVMAlloc</a:t>
+            </a:r>
+            <a:endParaRPr lang="en-US" b="1" dirty="0" smtClean="0">
+              <a:solidFill>
+                <a:srgbClr val="3366FF"/>
+              </a:solidFill>
+              <a:latin typeface="Courier New"/>
+              <a:cs typeface="Courier New"/>
+            </a:endParaRPr>
+          </a:p>
+          <a:p>
+            <a:pPr>
+              <a:lnSpc>
+                <a:spcPct val="110000"/>
+              </a:lnSpc>
+            </a:pPr>
+            <a:r>
+              <a:rPr lang="en-US" b="1" dirty="0" smtClean="0">
+                <a:solidFill>
+                  <a:srgbClr val="008000"/>
+                </a:solidFill>
+              </a:rPr>
+              <a:t>Coarse grained sharing</a:t>
+            </a:r>
+          </a:p>
+          <a:p>
+            <a:pPr lvl="1">
+              <a:lnSpc>
+                <a:spcPct val="110000"/>
+              </a:lnSpc>
+            </a:pPr>
+            <a:r>
+              <a:rPr lang="en-US" dirty="0" smtClean="0"/>
+              <a:t>Memory consistency only guaranteed at synchronization points</a:t>
+            </a:r>
+          </a:p>
+          <a:p>
+            <a:pPr lvl="1">
+              <a:lnSpc>
+                <a:spcPct val="110000"/>
+              </a:lnSpc>
+            </a:pPr>
+            <a:r>
+              <a:rPr lang="en-US" dirty="0" smtClean="0"/>
+              <a:t>Host still needs to use synchronization APIs to update data</a:t>
+            </a:r>
+          </a:p>
+          <a:p>
+            <a:pPr lvl="2">
+              <a:lnSpc>
+                <a:spcPct val="110000"/>
+              </a:lnSpc>
+            </a:pPr>
+            <a:r>
+              <a:rPr lang="en-US" b="1" dirty="0" err="1" smtClean="0">
+                <a:solidFill>
+                  <a:srgbClr val="3366FF"/>
+                </a:solidFill>
+                <a:latin typeface="Courier New"/>
+                <a:cs typeface="Courier New"/>
+              </a:rPr>
+              <a:t>clEnqueueSVMMap</a:t>
+            </a:r>
+            <a:r>
+              <a:rPr lang="en-US" dirty="0" smtClean="0"/>
+              <a:t> / </a:t>
+            </a:r>
+            <a:r>
+              <a:rPr lang="en-US" b="1" dirty="0" err="1" smtClean="0">
+                <a:solidFill>
+                  <a:srgbClr val="3366FF"/>
+                </a:solidFill>
+                <a:latin typeface="Courier New"/>
+                <a:cs typeface="Courier New"/>
+              </a:rPr>
+              <a:t>clEnqueueSVMUnmap</a:t>
+            </a:r>
+            <a:r>
+              <a:rPr lang="en-US" dirty="0" smtClean="0"/>
+              <a:t> or event callbacks</a:t>
+            </a:r>
+          </a:p>
+          <a:p>
+            <a:pPr lvl="1">
+              <a:lnSpc>
+                <a:spcPct val="110000"/>
+              </a:lnSpc>
+            </a:pPr>
+            <a:r>
+              <a:rPr lang="en-US" dirty="0" smtClean="0"/>
+              <a:t>Memory consistency is at a buffer level</a:t>
+            </a:r>
+          </a:p>
+          <a:p>
+            <a:pPr lvl="1">
+              <a:lnSpc>
+                <a:spcPct val="110000"/>
+              </a:lnSpc>
+            </a:pPr>
+            <a:r>
+              <a:rPr lang="en-US" dirty="0" smtClean="0"/>
+              <a:t>Allows sharing of pointers between host and </a:t>
+            </a:r>
+            <a:r>
+              <a:rPr lang="en-US" dirty="0" err="1" smtClean="0"/>
+              <a:t>OpenCL</a:t>
+            </a:r>
+            <a:r>
+              <a:rPr lang="en-US" dirty="0" smtClean="0"/>
+              <a:t> device</a:t>
+            </a:r>
+          </a:p>
+          <a:p>
+            <a:pPr>
+              <a:lnSpc>
+                <a:spcPct val="110000"/>
+              </a:lnSpc>
+            </a:pPr>
+            <a:r>
+              <a:rPr lang="en-US" b="1" dirty="0" smtClean="0">
+                <a:solidFill>
+                  <a:srgbClr val="008000"/>
+                </a:solidFill>
+              </a:rPr>
+              <a:t>Fine grained sharing</a:t>
+            </a:r>
+          </a:p>
+          <a:p>
+            <a:pPr lvl="1">
+              <a:lnSpc>
+                <a:spcPct val="110000"/>
+              </a:lnSpc>
+            </a:pPr>
+            <a:r>
+              <a:rPr lang="en-US" dirty="0" smtClean="0"/>
+              <a:t>No synchronization needed between host and </a:t>
+            </a:r>
+            <a:r>
+              <a:rPr lang="en-US" dirty="0" err="1" smtClean="0"/>
+              <a:t>OpenCL</a:t>
+            </a:r>
+            <a:r>
+              <a:rPr lang="en-US" dirty="0" smtClean="0"/>
+              <a:t> device</a:t>
+            </a:r>
+          </a:p>
+          <a:p>
+            <a:pPr lvl="1">
+              <a:lnSpc>
+                <a:spcPct val="110000"/>
+              </a:lnSpc>
+            </a:pPr>
+            <a:r>
+              <a:rPr lang="en-US" dirty="0" smtClean="0"/>
+              <a:t>Host and device can update data in buffer concurrently</a:t>
+            </a:r>
+          </a:p>
+          <a:p>
+            <a:pPr lvl="1">
+              <a:lnSpc>
+                <a:spcPct val="110000"/>
+              </a:lnSpc>
+            </a:pPr>
+            <a:r>
+              <a:rPr lang="en-US" dirty="0" smtClean="0"/>
+              <a:t>Memory consistency using C11 atomics and synchronization operations</a:t>
+            </a:r>
+          </a:p>
+          <a:p>
+            <a:pPr lvl="1">
+              <a:lnSpc>
+                <a:spcPct val="110000"/>
+              </a:lnSpc>
+            </a:pPr>
+            <a:r>
+              <a:rPr lang="en-US" dirty="0" smtClean="0"/>
+              <a:t>This is an </a:t>
+            </a:r>
+            <a:r>
+              <a:rPr lang="en-US" b="1" i="1" u="sng" dirty="0" smtClean="0"/>
+              <a:t>optional</a:t>
+            </a:r>
+            <a:r>
+              <a:rPr lang="en-US" dirty="0" smtClean="0"/>
+              <a:t> </a:t>
+            </a:r>
+            <a:r>
+              <a:rPr lang="en-US" dirty="0"/>
+              <a:t>f</a:t>
+            </a:r>
+            <a:r>
+              <a:rPr lang="en-US" dirty="0" smtClean="0"/>
+              <a:t>eature</a:t>
+            </a:r>
+          </a:p>
+        </p:txBody>
+      </p:sp>
+    </p:spTree>
+    <p:extLst>
+      <p:ext uri="{BB962C8B-B14F-4D97-AF65-F5344CB8AC3E}">
+        <p14:creationId xmlns:p14="http://schemas.microsoft.com/office/powerpoint/2010/main" val="1373532729"/>
+      </p:ext>
+    </p:extLst>
+  </p:cSld>
+  <p:clrMapOvr>
+    <a:masterClrMapping/>
+  </p:clrMapOvr>
+  <mc:AlternateContent xmlns:mc="http://schemas.openxmlformats.org/markup-compatibility/2006" xmlns:p14="http://schemas.microsoft.com/office/powerpoint/2010/main">
+    <mc:Choice Requires="p14">
+      <p:transition spd="slow" p14:dur="2000"/>
+    </mc:Choice>
+    <mc:Fallback xmlns="">
+      <p:transition xmlns:p14="http://schemas.microsoft.com/office/powerpoint/2010/main" spd="slow"/>
+    </mc:Fallback>
+  </mc:AlternateContent>
+  <p:timing>
+    <p:tnLst>
+      <p:par>
+        <p:cTn xmlns:p14="http://schemas.microsoft.com/office/powerpoint/2010/main" id="1" dur="indefinite" restart="never" nodeType="tmRoot">
+          <p:childTnLst>
+            <p:seq concurrent="1" nextAc="seek">
+              <p:cTn id="2" dur="indefinite" nodeType="mainSeq">
+                <p:childTnLst>
+                  <p:par>
+                    <p:cTn id="3" fill="hold">
+                      <p:stCondLst>
+                        <p:cond delay="indefinite"/>
+                      </p:stCondLst>
+                      <p:childTnLst>
+                        <p:par>
+                          <p:cTn id="4" fill="hold">
+                            <p:stCondLst>
+                              <p:cond delay="0"/>
+                            </p:stCondLst>
+                            <p:childTnLst>
+                              <p:par>
+                                <p:cTn id="5" presetID="22" presetClass="entr" presetSubtype="1" fill="hold" nodeType="clickEffect">
+                                  <p:stCondLst>
+                                    <p:cond delay="0"/>
+                                  </p:stCondLst>
+                                  <p:childTnLst>
+                                    <p:set>
+                                      <p:cBhvr>
+                                        <p:cTn id="6" dur="1" fill="hold">
+                                          <p:stCondLst>
+                                            <p:cond delay="0"/>
+                                          </p:stCondLst>
+                                        </p:cTn>
+                                        <p:tgtEl>
+                                          <p:spTgt spid="3">
+                                            <p:txEl>
+                                              <p:pRg st="1" end="1"/>
+                                            </p:txEl>
+                                          </p:spTgt>
+                                        </p:tgtEl>
+                                        <p:attrNameLst>
+                                          <p:attrName>style.visibility</p:attrName>
+                                        </p:attrNameLst>
+                                      </p:cBhvr>
+                                      <p:to>
+                                        <p:strVal val="visible"/>
+                                      </p:to>
+                                    </p:set>
+                                    <p:animEffect transition="in" filter="wipe(up)">
+                                      <p:cBhvr>
+                                        <p:cTn id="7" dur="500"/>
+                                        <p:tgtEl>
+                                          <p:spTgt spid="3">
+                                            <p:txEl>
+                                              <p:pRg st="1" end="1"/>
+                                            </p:txEl>
+                                          </p:spTgt>
+                                        </p:tgtEl>
+                                      </p:cBhvr>
+                                    </p:animEffect>
+                                  </p:childTnLst>
+                                </p:cTn>
+                              </p:par>
+                              <p:par>
+                                <p:cTn id="8" presetID="22" presetClass="entr" presetSubtype="1" fill="hold" nodeType="withEffect">
+                                  <p:stCondLst>
+                                    <p:cond delay="0"/>
+                                  </p:stCondLst>
+                                  <p:childTnLst>
+                                    <p:set>
+                                      <p:cBhvr>
+                                        <p:cTn id="9" dur="1" fill="hold">
+                                          <p:stCondLst>
+                                            <p:cond delay="0"/>
+                                          </p:stCondLst>
+                                        </p:cTn>
+                                        <p:tgtEl>
+                                          <p:spTgt spid="3">
+                                            <p:txEl>
+                                              <p:pRg st="2" end="2"/>
+                                            </p:txEl>
+                                          </p:spTgt>
+                                        </p:tgtEl>
+                                        <p:attrNameLst>
+                                          <p:attrName>style.visibility</p:attrName>
+                                        </p:attrNameLst>
+                                      </p:cBhvr>
+                                      <p:to>
+                                        <p:strVal val="visible"/>
+                                      </p:to>
+                                    </p:set>
+                                    <p:animEffect transition="in" filter="wipe(up)">
+                                      <p:cBhvr>
+                                        <p:cTn id="10" dur="500"/>
+                                        <p:tgtEl>
+                                          <p:spTgt spid="3">
+                                            <p:txEl>
+                                              <p:pRg st="2" end="2"/>
+                                            </p:txEl>
+                                          </p:spTgt>
+                                        </p:tgtEl>
+                                      </p:cBhvr>
+                                    </p:animEffect>
+                                  </p:childTnLst>
+                                </p:cTn>
+                              </p:par>
+                              <p:par>
+                                <p:cTn id="11" presetID="22" presetClass="entr" presetSubtype="1" fill="hold" nodeType="withEffect">
+                                  <p:stCondLst>
+                                    <p:cond delay="0"/>
+                                  </p:stCondLst>
+                                  <p:childTnLst>
+                                    <p:set>
+                                      <p:cBhvr>
+                                        <p:cTn id="12" dur="1" fill="hold">
+                                          <p:stCondLst>
+                                            <p:cond delay="0"/>
+                                          </p:stCondLst>
+                                        </p:cTn>
+                                        <p:tgtEl>
+                                          <p:spTgt spid="3">
+                                            <p:txEl>
+                                              <p:pRg st="3" end="3"/>
+                                            </p:txEl>
+                                          </p:spTgt>
+                                        </p:tgtEl>
+                                        <p:attrNameLst>
+                                          <p:attrName>style.visibility</p:attrName>
+                                        </p:attrNameLst>
+                                      </p:cBhvr>
+                                      <p:to>
+                                        <p:strVal val="visible"/>
+                                      </p:to>
+                                    </p:set>
+                                    <p:animEffect transition="in" filter="wipe(up)">
+                                      <p:cBhvr>
+                                        <p:cTn id="13" dur="500"/>
+                                        <p:tgtEl>
+                                          <p:spTgt spid="3">
+                                            <p:txEl>
+                                              <p:pRg st="3" end="3"/>
+                                            </p:txEl>
+                                          </p:spTgt>
+                                        </p:tgtEl>
+                                      </p:cBhvr>
+                                    </p:animEffect>
+                                  </p:childTnLst>
+                                </p:cTn>
+                              </p:par>
+                              <p:par>
+                                <p:cTn id="14" presetID="22" presetClass="entr" presetSubtype="1" fill="hold" nodeType="withEffect">
+                                  <p:stCondLst>
+                                    <p:cond delay="0"/>
+                                  </p:stCondLst>
+                                  <p:childTnLst>
+                                    <p:set>
+                                      <p:cBhvr>
+                                        <p:cTn id="15" dur="1" fill="hold">
+                                          <p:stCondLst>
+                                            <p:cond delay="0"/>
+                                          </p:stCondLst>
+                                        </p:cTn>
+                                        <p:tgtEl>
+                                          <p:spTgt spid="3">
+                                            <p:txEl>
+                                              <p:pRg st="4" end="4"/>
+                                            </p:txEl>
+                                          </p:spTgt>
+                                        </p:tgtEl>
+                                        <p:attrNameLst>
+                                          <p:attrName>style.visibility</p:attrName>
+                                        </p:attrNameLst>
+                                      </p:cBhvr>
+                                      <p:to>
+                                        <p:strVal val="visible"/>
+                                      </p:to>
+                                    </p:set>
+                                    <p:animEffect transition="in" filter="wipe(up)">
+                                      <p:cBhvr>
+                                        <p:cTn id="16" dur="500"/>
+                                        <p:tgtEl>
+                                          <p:spTgt spid="3">
+                                            <p:txEl>
+                                              <p:pRg st="4" end="4"/>
+                                            </p:txEl>
+                                          </p:spTgt>
+                                        </p:tgtEl>
+                                      </p:cBhvr>
+                                    </p:animEffect>
+                                  </p:childTnLst>
+                                </p:cTn>
+                              </p:par>
+                              <p:par>
+                                <p:cTn id="17" presetID="22" presetClass="entr" presetSubtype="1" fill="hold" nodeType="withEffect">
+                                  <p:stCondLst>
+                                    <p:cond delay="0"/>
+                                  </p:stCondLst>
+                                  <p:childTnLst>
+                                    <p:set>
+                                      <p:cBhvr>
+                                        <p:cTn id="18" dur="1" fill="hold">
+                                          <p:stCondLst>
+                                            <p:cond delay="0"/>
+                                          </p:stCondLst>
+                                        </p:cTn>
+                                        <p:tgtEl>
+                                          <p:spTgt spid="3">
+                                            <p:txEl>
+                                              <p:pRg st="5" end="5"/>
+                                            </p:txEl>
+                                          </p:spTgt>
+                                        </p:tgtEl>
+                                        <p:attrNameLst>
+                                          <p:attrName>style.visibility</p:attrName>
+                                        </p:attrNameLst>
+                                      </p:cBhvr>
+                                      <p:to>
+                                        <p:strVal val="visible"/>
+                                      </p:to>
+                                    </p:set>
+                                    <p:animEffect transition="in" filter="wipe(up)">
+                                      <p:cBhvr>
+                                        <p:cTn id="19" dur="500"/>
+                                        <p:tgtEl>
+                                          <p:spTgt spid="3">
+                                            <p:txEl>
+                                              <p:pRg st="5" end="5"/>
+                                            </p:txEl>
+                                          </p:spTgt>
+                                        </p:tgtEl>
+                                      </p:cBhvr>
+                                    </p:animEffect>
+                                  </p:childTnLst>
+                                </p:cTn>
+                              </p:par>
+                              <p:par>
+                                <p:cTn id="20" presetID="22" presetClass="entr" presetSubtype="1" fill="hold" nodeType="withEffect">
+                                  <p:stCondLst>
+                                    <p:cond delay="0"/>
+                                  </p:stCondLst>
+                                  <p:childTnLst>
+                                    <p:set>
+                                      <p:cBhvr>
+                                        <p:cTn id="21" dur="1" fill="hold">
+                                          <p:stCondLst>
+                                            <p:cond delay="0"/>
+                                          </p:stCondLst>
+                                        </p:cTn>
+                                        <p:tgtEl>
+                                          <p:spTgt spid="3">
+                                            <p:txEl>
+                                              <p:pRg st="6" end="6"/>
+                                            </p:txEl>
+                                          </p:spTgt>
+                                        </p:tgtEl>
+                                        <p:attrNameLst>
+                                          <p:attrName>style.visibility</p:attrName>
+                                        </p:attrNameLst>
+                                      </p:cBhvr>
+                                      <p:to>
+                                        <p:strVal val="visible"/>
+                                      </p:to>
+                                    </p:set>
+                                    <p:animEffect transition="in" filter="wipe(up)">
+                                      <p:cBhvr>
+                                        <p:cTn id="22" dur="500"/>
+                                        <p:tgtEl>
+                                          <p:spTgt spid="3">
+                                            <p:txEl>
+                                              <p:pRg st="6" end="6"/>
+                                            </p:txEl>
+                                          </p:spTgt>
+                                        </p:tgtEl>
+                                      </p:cBhvr>
+                                    </p:animEffect>
+                                  </p:childTnLst>
+                                </p:cTn>
+                              </p:par>
+                            </p:childTnLst>
+                          </p:cTn>
+                        </p:par>
+                      </p:childTnLst>
+                    </p:cTn>
+                  </p:par>
+                  <p:par>
+                    <p:cTn id="23" fill="hold">
+                      <p:stCondLst>
+                        <p:cond delay="indefinite"/>
+                      </p:stCondLst>
+                      <p:childTnLst>
+                        <p:par>
+                          <p:cTn id="24" fill="hold">
+                            <p:stCondLst>
+                              <p:cond delay="0"/>
+                            </p:stCondLst>
+                            <p:childTnLst>
+                              <p:par>
+                                <p:cTn id="25" presetID="22" presetClass="entr" presetSubtype="1" fill="hold" nodeType="clickEffect">
+                                  <p:stCondLst>
+                                    <p:cond delay="0"/>
+                                  </p:stCondLst>
+                                  <p:childTnLst>
+                                    <p:set>
+                                      <p:cBhvr>
+                                        <p:cTn id="26" dur="1" fill="hold">
+                                          <p:stCondLst>
+                                            <p:cond delay="0"/>
+                                          </p:stCondLst>
+                                        </p:cTn>
+                                        <p:tgtEl>
+                                          <p:spTgt spid="3">
+                                            <p:txEl>
+                                              <p:pRg st="7" end="7"/>
+                                            </p:txEl>
+                                          </p:spTgt>
+                                        </p:tgtEl>
+                                        <p:attrNameLst>
+                                          <p:attrName>style.visibility</p:attrName>
+                                        </p:attrNameLst>
+                                      </p:cBhvr>
+                                      <p:to>
+                                        <p:strVal val="visible"/>
+                                      </p:to>
+                                    </p:set>
+                                    <p:animEffect transition="in" filter="wipe(up)">
+                                      <p:cBhvr>
+                                        <p:cTn id="27" dur="500"/>
+                                        <p:tgtEl>
+                                          <p:spTgt spid="3">
+                                            <p:txEl>
+                                              <p:pRg st="7" end="7"/>
+                                            </p:txEl>
+                                          </p:spTgt>
+                                        </p:tgtEl>
+                                      </p:cBhvr>
+                                    </p:animEffect>
+                                  </p:childTnLst>
+                                </p:cTn>
+                              </p:par>
+                              <p:par>
+                                <p:cTn id="28" presetID="22" presetClass="entr" presetSubtype="1" fill="hold" nodeType="withEffect">
+                                  <p:stCondLst>
+                                    <p:cond delay="0"/>
+                                  </p:stCondLst>
+                                  <p:childTnLst>
+                                    <p:set>
+                                      <p:cBhvr>
+                                        <p:cTn id="29" dur="1" fill="hold">
+                                          <p:stCondLst>
+                                            <p:cond delay="0"/>
+                                          </p:stCondLst>
+                                        </p:cTn>
+                                        <p:tgtEl>
+                                          <p:spTgt spid="3">
+                                            <p:txEl>
+                                              <p:pRg st="8" end="8"/>
+                                            </p:txEl>
+                                          </p:spTgt>
+                                        </p:tgtEl>
+                                        <p:attrNameLst>
+                                          <p:attrName>style.visibility</p:attrName>
+                                        </p:attrNameLst>
+                                      </p:cBhvr>
+                                      <p:to>
+                                        <p:strVal val="visible"/>
+                                      </p:to>
+                                    </p:set>
+                                    <p:animEffect transition="in" filter="wipe(up)">
+                                      <p:cBhvr>
+                                        <p:cTn id="30" dur="500"/>
+                                        <p:tgtEl>
+                                          <p:spTgt spid="3">
+                                            <p:txEl>
+                                              <p:pRg st="8" end="8"/>
+                                            </p:txEl>
+                                          </p:spTgt>
+                                        </p:tgtEl>
+                                      </p:cBhvr>
+                                    </p:animEffect>
+                                  </p:childTnLst>
+                                </p:cTn>
+                              </p:par>
+                              <p:par>
+                                <p:cTn id="31" presetID="22" presetClass="entr" presetSubtype="1" fill="hold" nodeType="withEffect">
+                                  <p:stCondLst>
+                                    <p:cond delay="0"/>
+                                  </p:stCondLst>
+                                  <p:childTnLst>
+                                    <p:set>
+                                      <p:cBhvr>
+                                        <p:cTn id="32" dur="1" fill="hold">
+                                          <p:stCondLst>
+                                            <p:cond delay="0"/>
+                                          </p:stCondLst>
+                                        </p:cTn>
+                                        <p:tgtEl>
+                                          <p:spTgt spid="3">
+                                            <p:txEl>
+                                              <p:pRg st="9" end="9"/>
+                                            </p:txEl>
+                                          </p:spTgt>
+                                        </p:tgtEl>
+                                        <p:attrNameLst>
+                                          <p:attrName>style.visibility</p:attrName>
+                                        </p:attrNameLst>
+                                      </p:cBhvr>
+                                      <p:to>
+                                        <p:strVal val="visible"/>
+                                      </p:to>
+                                    </p:set>
+                                    <p:animEffect transition="in" filter="wipe(up)">
+                                      <p:cBhvr>
+                                        <p:cTn id="33" dur="500"/>
+                                        <p:tgtEl>
+                                          <p:spTgt spid="3">
+                                            <p:txEl>
+                                              <p:pRg st="9" end="9"/>
+                                            </p:txEl>
+                                          </p:spTgt>
+                                        </p:tgtEl>
+                                      </p:cBhvr>
+                                    </p:animEffect>
+                                  </p:childTnLst>
+                                </p:cTn>
+                              </p:par>
+                              <p:par>
+                                <p:cTn id="34" presetID="22" presetClass="entr" presetSubtype="1" fill="hold" nodeType="withEffect">
+                                  <p:stCondLst>
+                                    <p:cond delay="0"/>
+                                  </p:stCondLst>
+                                  <p:childTnLst>
+                                    <p:set>
+                                      <p:cBhvr>
+                                        <p:cTn id="35" dur="1" fill="hold">
+                                          <p:stCondLst>
+                                            <p:cond delay="0"/>
+                                          </p:stCondLst>
+                                        </p:cTn>
+                                        <p:tgtEl>
+                                          <p:spTgt spid="3">
+                                            <p:txEl>
+                                              <p:pRg st="10" end="10"/>
+                                            </p:txEl>
+                                          </p:spTgt>
+                                        </p:tgtEl>
+                                        <p:attrNameLst>
+                                          <p:attrName>style.visibility</p:attrName>
+                                        </p:attrNameLst>
+                                      </p:cBhvr>
+                                      <p:to>
+                                        <p:strVal val="visible"/>
+                                      </p:to>
+                                    </p:set>
+                                    <p:animEffect transition="in" filter="wipe(up)">
+                                      <p:cBhvr>
+                                        <p:cTn id="36" dur="500"/>
+                                        <p:tgtEl>
+                                          <p:spTgt spid="3">
+                                            <p:txEl>
+                                              <p:pRg st="10" end="10"/>
+                                            </p:txEl>
+                                          </p:spTgt>
+                                        </p:tgtEl>
+                                      </p:cBhvr>
+                                    </p:animEffect>
+                                  </p:childTnLst>
+                                </p:cTn>
+                              </p:par>
+                              <p:par>
+                                <p:cTn id="37" presetID="22" presetClass="entr" presetSubtype="1" fill="hold" nodeType="withEffect">
+                                  <p:stCondLst>
+                                    <p:cond delay="0"/>
+                                  </p:stCondLst>
+                                  <p:childTnLst>
+                                    <p:set>
+                                      <p:cBhvr>
+                                        <p:cTn id="38" dur="1" fill="hold">
+                                          <p:stCondLst>
+                                            <p:cond delay="0"/>
+                                          </p:stCondLst>
+                                        </p:cTn>
+                                        <p:tgtEl>
+                                          <p:spTgt spid="3">
+                                            <p:txEl>
+                                              <p:pRg st="11" end="11"/>
+                                            </p:txEl>
+                                          </p:spTgt>
+                                        </p:tgtEl>
+                                        <p:attrNameLst>
+                                          <p:attrName>style.visibility</p:attrName>
+                                        </p:attrNameLst>
+                                      </p:cBhvr>
+                                      <p:to>
+                                        <p:strVal val="visible"/>
+                                      </p:to>
+                                    </p:set>
+                                    <p:animEffect transition="in" filter="wipe(up)">
+                                      <p:cBhvr>
+                                        <p:cTn id="39" dur="500"/>
+                                        <p:tgtEl>
+                                          <p:spTgt spid="3">
+                                            <p:txEl>
+                                              <p:pRg st="11" end="11"/>
+                                            </p:txEl>
+                                          </p:spTgt>
+                                        </p:tgtEl>
+                                      </p:cBhvr>
+                                    </p:animEffect>
+                                  </p:childTnLst>
+                                </p:cTn>
+                              </p:par>
+                            </p:childTnLst>
+                          </p:cTn>
+                        </p:par>
+                      </p:childTnLst>
+                    </p:cTn>
+                  </p:par>
+                </p:childTnLst>
+              </p:cTn>
+              <p:prevCondLst>
+                <p:cond evt="onPrev" delay="0">
+                  <p:tgtEl>
+                    <p:sldTgt/>
+                  </p:tgtEl>
+                </p:cond>
+              </p:prevCondLst>
+              <p:nextCondLst>
+                <p:cond evt="onNext" delay="0">
+                  <p:tgtEl>
+                    <p:sldTgt/>
+                  </p:tgtEl>
+                </p:cond>
+              </p:nextCondLst>
+            </p:seq>
+          </p:childTnLst>
+        </p:cTn>
+      </p:par>
+    </p:tnLst>
+  </p:timing>
+</p:sld>
+</file>
+
+<file path=ppt/slides/slide32.xml><?xml version="1.0" encoding="utf-8"?>
+<p:sld xmlns:a="http://schemas.openxmlformats.org/drawingml/2006/main" xmlns:r="http://schemas.openxmlformats.org/officeDocument/2006/relationships" xmlns:p="http://schemas.openxmlformats.org/presentationml/2006/main">
+  <p:cSld>
+    <p:spTree>
+      <p:nvGrpSpPr>
+        <p:cNvPr id="1" name=""/>
+        <p:cNvGrpSpPr/>
+        <p:nvPr/>
+      </p:nvGrpSpPr>
+      <p:grpSpPr>
+        <a:xfrm>
+          <a:off x="0" y="0"/>
+          <a:ext cx="0" cy="0"/>
+          <a:chOff x="0" y="0"/>
+          <a:chExt cx="0" cy="0"/>
+        </a:xfrm>
+      </p:grpSpPr>
+      <p:sp>
+        <p:nvSpPr>
+          <p:cNvPr id="2" name="Title 1"/>
+          <p:cNvSpPr>
+            <a:spLocks noGrp="1"/>
+          </p:cNvSpPr>
+          <p:nvPr>
+            <p:ph type="title"/>
+          </p:nvPr>
+        </p:nvSpPr>
+        <p:spPr/>
+        <p:txBody>
+          <a:bodyPr>
+            <a:normAutofit fontScale="90000"/>
+          </a:bodyPr>
+          <a:lstStyle/>
+          <a:p>
+            <a:r>
+              <a:rPr lang="en-US" dirty="0" smtClean="0"/>
+              <a:t>Shared Virtual Memory:</a:t>
+            </a:r>
+            <a:br>
+              <a:rPr lang="en-US" dirty="0" smtClean="0"/>
+            </a:br>
+            <a:r>
+              <a:rPr lang="en-US" dirty="0" smtClean="0"/>
+              <a:t>System Sharing</a:t>
+            </a:r>
+            <a:endParaRPr lang="en-US" dirty="0"/>
+          </a:p>
+        </p:txBody>
+      </p:sp>
+      <p:sp>
+        <p:nvSpPr>
+          <p:cNvPr id="3" name="Content Placeholder 2"/>
+          <p:cNvSpPr>
+            <a:spLocks noGrp="1"/>
+          </p:cNvSpPr>
+          <p:nvPr>
+            <p:ph idx="1"/>
+          </p:nvPr>
+        </p:nvSpPr>
+        <p:spPr/>
+        <p:txBody>
+          <a:bodyPr/>
+          <a:lstStyle/>
+          <a:p>
+            <a:r>
+              <a:rPr lang="en-US" dirty="0" smtClean="0"/>
+              <a:t>Can directly use </a:t>
+            </a:r>
+            <a:r>
+              <a:rPr lang="en-US" i="1" dirty="0" smtClean="0"/>
+              <a:t>any</a:t>
+            </a:r>
+            <a:r>
+              <a:rPr lang="en-US" dirty="0" smtClean="0"/>
+              <a:t> pointer allocated on the host</a:t>
+            </a:r>
+          </a:p>
+          <a:p>
+            <a:pPr lvl="1"/>
+            <a:r>
+              <a:rPr lang="en-US" dirty="0" smtClean="0"/>
+              <a:t>No </a:t>
+            </a:r>
+            <a:r>
+              <a:rPr lang="en-US" dirty="0" err="1" smtClean="0"/>
+              <a:t>OpenCL</a:t>
+            </a:r>
+            <a:r>
+              <a:rPr lang="en-US" dirty="0" smtClean="0"/>
+              <a:t> APIs needed to allocate SVM buffers</a:t>
+            </a:r>
+          </a:p>
+          <a:p>
+            <a:r>
+              <a:rPr lang="en-US" dirty="0"/>
+              <a:t>Both host and </a:t>
+            </a:r>
+            <a:r>
+              <a:rPr lang="en-US" dirty="0" err="1"/>
+              <a:t>OpenCL</a:t>
+            </a:r>
+            <a:r>
+              <a:rPr lang="en-US" dirty="0"/>
+              <a:t> device can update data </a:t>
+            </a:r>
+            <a:r>
+              <a:rPr lang="en-US" dirty="0" smtClean="0"/>
+              <a:t>using </a:t>
+            </a:r>
+            <a:r>
+              <a:rPr lang="en-US" dirty="0"/>
+              <a:t>C11 atomics and synchronization </a:t>
+            </a:r>
+            <a:r>
+              <a:rPr lang="en-US" dirty="0" smtClean="0"/>
+              <a:t>functions</a:t>
+            </a:r>
+          </a:p>
+          <a:p>
+            <a:r>
+              <a:rPr lang="en-US" dirty="0" smtClean="0"/>
+              <a:t>This is an </a:t>
+            </a:r>
+            <a:r>
+              <a:rPr lang="en-US" b="1" i="1" u="sng" dirty="0" smtClean="0"/>
+              <a:t>optional</a:t>
+            </a:r>
+            <a:r>
+              <a:rPr lang="en-US" dirty="0" smtClean="0"/>
+              <a:t> feature</a:t>
+            </a:r>
+          </a:p>
+          <a:p>
+            <a:endParaRPr lang="en-US" dirty="0" smtClean="0"/>
+          </a:p>
+        </p:txBody>
+      </p:sp>
+    </p:spTree>
+    <p:extLst>
+      <p:ext uri="{BB962C8B-B14F-4D97-AF65-F5344CB8AC3E}">
+        <p14:creationId xmlns:p14="http://schemas.microsoft.com/office/powerpoint/2010/main" val="267376104"/>
+      </p:ext>
+    </p:extLst>
+  </p:cSld>
+  <p:clrMapOvr>
+    <a:masterClrMapping/>
+  </p:clrMapOvr>
+  <mc:AlternateContent xmlns:mc="http://schemas.openxmlformats.org/markup-compatibility/2006" xmlns:p14="http://schemas.microsoft.com/office/powerpoint/2010/main">
+    <mc:Choice Requires="p14">
+      <p:transition spd="slow" p14:dur="2000"/>
+    </mc:Choice>
+    <mc:Fallback xmlns="">
+      <p:transition xmlns:p14="http://schemas.microsoft.com/office/powerpoint/2010/main" spd="slow"/>
+    </mc:Fallback>
+  </mc:AlternateContent>
+  <p:timing>
+    <p:tnLst>
+      <p:par>
+        <p:cTn xmlns:p14="http://schemas.microsoft.com/office/powerpoint/2010/main" id="1" dur="indefinite" restart="never" nodeType="tmRoot"/>
+      </p:par>
+    </p:tnLst>
+  </p:timing>
+</p:sld>
+</file>
+
+<file path=ppt/slides/slide33.xml><?xml version="1.0" encoding="utf-8"?>
+<p:sld xmlns:a="http://schemas.openxmlformats.org/drawingml/2006/main" xmlns:r="http://schemas.openxmlformats.org/officeDocument/2006/relationships" xmlns:p="http://schemas.openxmlformats.org/presentationml/2006/main">
+  <p:cSld>
+    <p:spTree>
+      <p:nvGrpSpPr>
+        <p:cNvPr id="1" name=""/>
+        <p:cNvGrpSpPr/>
+        <p:nvPr/>
+      </p:nvGrpSpPr>
+      <p:grpSpPr>
+        <a:xfrm>
+          <a:off x="0" y="0"/>
+          <a:ext cx="0" cy="0"/>
+          <a:chOff x="0" y="0"/>
+          <a:chExt cx="0" cy="0"/>
+        </a:xfrm>
+      </p:grpSpPr>
+      <p:sp>
+        <p:nvSpPr>
+          <p:cNvPr id="2" name="Title 1"/>
+          <p:cNvSpPr>
+            <a:spLocks noGrp="1"/>
+          </p:cNvSpPr>
+          <p:nvPr>
+            <p:ph type="title"/>
+          </p:nvPr>
+        </p:nvSpPr>
+        <p:spPr/>
+        <p:txBody>
+          <a:bodyPr>
+            <a:normAutofit fontScale="90000"/>
+          </a:bodyPr>
+          <a:lstStyle/>
+          <a:p>
+            <a:r>
+              <a:rPr lang="en-GB" dirty="0" smtClean="0"/>
+              <a:t>Exercise:</a:t>
+            </a:r>
+            <a:br>
+              <a:rPr lang="en-GB" dirty="0" smtClean="0"/>
+            </a:br>
+            <a:r>
+              <a:rPr lang="en-GB" dirty="0" smtClean="0"/>
+              <a:t>Fast host-device data transfers</a:t>
+            </a:r>
+            <a:endParaRPr lang="en-GB" dirty="0"/>
+          </a:p>
+        </p:txBody>
+      </p:sp>
+      <p:sp>
+        <p:nvSpPr>
+          <p:cNvPr id="3" name="Content Placeholder 2"/>
+          <p:cNvSpPr>
+            <a:spLocks noGrp="1"/>
+          </p:cNvSpPr>
+          <p:nvPr>
+            <p:ph idx="1"/>
+          </p:nvPr>
+        </p:nvSpPr>
+        <p:spPr>
+          <a:xfrm>
+            <a:off x="457200" y="1600200"/>
+            <a:ext cx="8229600" cy="4997152"/>
+          </a:xfrm>
+        </p:spPr>
+        <p:txBody>
+          <a:bodyPr>
+            <a:normAutofit/>
+          </a:bodyPr>
+          <a:lstStyle/>
+          <a:p>
+            <a:r>
+              <a:rPr lang="en-GB" dirty="0" smtClean="0"/>
+              <a:t>Start with the </a:t>
+            </a:r>
+            <a:r>
+              <a:rPr lang="en-GB" dirty="0" err="1" smtClean="0">
+                <a:latin typeface="Courier New"/>
+                <a:cs typeface="Courier New"/>
+              </a:rPr>
+              <a:t>HostDevTransfer</a:t>
+            </a:r>
+            <a:r>
+              <a:rPr lang="en-GB" dirty="0" smtClean="0"/>
+              <a:t> example</a:t>
+            </a:r>
+          </a:p>
+          <a:p>
+            <a:r>
+              <a:rPr lang="en-GB" dirty="0" smtClean="0"/>
+              <a:t>Improve the performance of the host-to-device data transfers by using pinned memory or zero-copy</a:t>
+            </a:r>
+          </a:p>
+          <a:p>
+            <a:r>
+              <a:rPr lang="en-GB" dirty="0" smtClean="0"/>
+              <a:t>Experiment with different sized buffers</a:t>
+            </a:r>
+          </a:p>
+          <a:p>
+            <a:r>
+              <a:rPr lang="en-GB" dirty="0" smtClean="0"/>
+              <a:t>Experiment with different devices</a:t>
+            </a:r>
+          </a:p>
+          <a:p>
+            <a:r>
+              <a:rPr lang="en-GB" dirty="0" smtClean="0"/>
+              <a:t>An example solution will be provided</a:t>
+            </a:r>
+          </a:p>
+        </p:txBody>
+      </p:sp>
+    </p:spTree>
+    <p:extLst>
+      <p:ext uri="{BB962C8B-B14F-4D97-AF65-F5344CB8AC3E}">
+        <p14:creationId xmlns:p14="http://schemas.microsoft.com/office/powerpoint/2010/main" val="2740977216"/>
+      </p:ext>
+    </p:extLst>
+  </p:cSld>
+  <p:clrMapOvr>
+    <a:masterClrMapping/>
+  </p:clrMapOvr>
+  <p:timing>
+    <p:tnLst>
+      <p:par>
+        <p:cTn xmlns:p14="http://schemas.microsoft.com/office/powerpoint/2010/main" id="1" dur="indefinite" restart="never" nodeType="tmRoot"/>
+      </p:par>
+    </p:tnLst>
+  </p:timing>
+</p:sld>
+</file>
+
+<file path=ppt/slides/slide34.xml><?xml version="1.0" encoding="utf-8"?>
+<p:sld xmlns:a="http://schemas.openxmlformats.org/drawingml/2006/main" xmlns:r="http://schemas.openxmlformats.org/officeDocument/2006/relationships" xmlns:p="http://schemas.openxmlformats.org/presentationml/2006/main">
+  <p:cSld>
+    <p:spTree>
+      <p:nvGrpSpPr>
+        <p:cNvPr id="1" name=""/>
+        <p:cNvGrpSpPr/>
+        <p:nvPr/>
+      </p:nvGrpSpPr>
+      <p:grpSpPr>
+        <a:xfrm>
+          <a:off x="0" y="0"/>
+          <a:ext cx="0" cy="0"/>
+          <a:chOff x="0" y="0"/>
+          <a:chExt cx="0" cy="0"/>
+        </a:xfrm>
+      </p:grpSpPr>
+      <p:sp>
+        <p:nvSpPr>
+          <p:cNvPr id="2" name="Title 1"/>
+          <p:cNvSpPr>
+            <a:spLocks noGrp="1"/>
+          </p:cNvSpPr>
+          <p:nvPr>
+            <p:ph type="title"/>
+          </p:nvPr>
+        </p:nvSpPr>
+        <p:spPr>
+          <a:xfrm>
+            <a:off x="457200" y="23016"/>
+            <a:ext cx="8229600" cy="839663"/>
+          </a:xfrm>
+        </p:spPr>
+        <p:txBody>
+          <a:bodyPr>
+            <a:normAutofit/>
+          </a:bodyPr>
+          <a:lstStyle/>
+          <a:p>
+            <a:r>
+              <a:rPr lang="en-GB" dirty="0" smtClean="0"/>
+              <a:t>Exercise results</a:t>
+            </a:r>
+            <a:endParaRPr lang="en-GB" dirty="0"/>
+          </a:p>
+        </p:txBody>
+      </p:sp>
+      <p:sp>
+        <p:nvSpPr>
+          <p:cNvPr id="3" name="Content Placeholder 2"/>
+          <p:cNvSpPr>
+            <a:spLocks noGrp="1"/>
+          </p:cNvSpPr>
+          <p:nvPr>
+            <p:ph idx="1"/>
+          </p:nvPr>
+        </p:nvSpPr>
+        <p:spPr>
+          <a:xfrm>
+            <a:off x="457200" y="1042404"/>
+            <a:ext cx="8229600" cy="5607415"/>
+          </a:xfrm>
+        </p:spPr>
+        <p:txBody>
+          <a:bodyPr>
+            <a:normAutofit fontScale="47500" lnSpcReduction="20000"/>
+          </a:bodyPr>
+          <a:lstStyle/>
+          <a:p>
+            <a:pPr marL="0" indent="0">
+              <a:buNone/>
+            </a:pPr>
+            <a:r>
+              <a:rPr lang="en-GB" b="1" dirty="0" smtClean="0">
+                <a:latin typeface="Courier New"/>
+                <a:cs typeface="Courier New"/>
+              </a:rPr>
+              <a:t>$ </a:t>
+            </a:r>
+            <a:r>
+              <a:rPr lang="en-GB" b="1" dirty="0">
+                <a:latin typeface="Courier New"/>
+                <a:cs typeface="Courier New"/>
+              </a:rPr>
+              <a:t>./transfer --</a:t>
+            </a:r>
+            <a:r>
+              <a:rPr lang="en-GB" b="1" dirty="0" smtClean="0">
+                <a:latin typeface="Courier New"/>
+                <a:cs typeface="Courier New"/>
+              </a:rPr>
+              <a:t>list</a:t>
+            </a:r>
+            <a:endParaRPr lang="en-GB" b="1" dirty="0">
+              <a:latin typeface="Courier New"/>
+              <a:cs typeface="Courier New"/>
+            </a:endParaRPr>
+          </a:p>
+          <a:p>
+            <a:pPr marL="0" indent="0">
+              <a:buNone/>
+            </a:pPr>
+            <a:r>
+              <a:rPr lang="en-GB" dirty="0">
+                <a:latin typeface="Courier New"/>
+                <a:cs typeface="Courier New"/>
+              </a:rPr>
+              <a:t>Devices:</a:t>
+            </a:r>
+          </a:p>
+          <a:p>
+            <a:pPr marL="0" indent="0">
+              <a:buNone/>
+            </a:pPr>
+            <a:r>
+              <a:rPr lang="nb-NO" dirty="0">
+                <a:latin typeface="Courier New"/>
+                <a:cs typeface="Courier New"/>
+              </a:rPr>
+              <a:t>0: Tesla K40c</a:t>
+            </a:r>
+          </a:p>
+          <a:p>
+            <a:pPr marL="0" indent="0">
+              <a:buNone/>
+            </a:pPr>
+            <a:r>
+              <a:rPr lang="nb-NO" dirty="0">
+                <a:latin typeface="Courier New"/>
+                <a:cs typeface="Courier New"/>
+              </a:rPr>
+              <a:t>1: Tesla K20c</a:t>
+            </a:r>
+          </a:p>
+          <a:p>
+            <a:pPr marL="0" indent="0">
+              <a:buNone/>
+            </a:pPr>
+            <a:r>
+              <a:rPr lang="de-DE" dirty="0">
+                <a:latin typeface="Courier New"/>
+                <a:cs typeface="Courier New"/>
+              </a:rPr>
+              <a:t>2: </a:t>
+            </a:r>
+            <a:r>
+              <a:rPr lang="de-DE" dirty="0" smtClean="0">
+                <a:latin typeface="Courier New"/>
+                <a:cs typeface="Courier New"/>
+              </a:rPr>
+              <a:t>Intel</a:t>
+            </a:r>
+            <a:r>
+              <a:rPr lang="de-DE" dirty="0">
+                <a:latin typeface="Courier New"/>
+                <a:cs typeface="Courier New"/>
+              </a:rPr>
+              <a:t>(R) Core(TM) i5-3550 CPU @ </a:t>
+            </a:r>
+            <a:r>
+              <a:rPr lang="de-DE" dirty="0" smtClean="0">
+                <a:latin typeface="Courier New"/>
+                <a:cs typeface="Courier New"/>
+              </a:rPr>
+              <a:t>3.30GHz</a:t>
+            </a:r>
+          </a:p>
+          <a:p>
+            <a:pPr marL="0" indent="0">
+              <a:buNone/>
+            </a:pPr>
+            <a:endParaRPr lang="de-DE" dirty="0">
+              <a:latin typeface="Courier New"/>
+              <a:cs typeface="Courier New"/>
+            </a:endParaRPr>
+          </a:p>
+          <a:p>
+            <a:pPr marL="0" indent="0">
+              <a:buNone/>
+            </a:pPr>
+            <a:r>
+              <a:rPr lang="en-GB" b="1" dirty="0" smtClean="0">
+                <a:latin typeface="Courier New"/>
+                <a:cs typeface="Courier New"/>
+              </a:rPr>
+              <a:t>Using </a:t>
+            </a:r>
+            <a:r>
+              <a:rPr lang="en-GB" b="1" dirty="0">
+                <a:latin typeface="Courier New"/>
+                <a:cs typeface="Courier New"/>
+              </a:rPr>
+              <a:t>OpenCL device: Tesla </a:t>
+            </a:r>
+            <a:r>
+              <a:rPr lang="en-GB" b="1" dirty="0" smtClean="0">
+                <a:latin typeface="Courier New"/>
+                <a:cs typeface="Courier New"/>
+              </a:rPr>
+              <a:t>K40c</a:t>
+            </a:r>
+            <a:endParaRPr lang="en-GB" b="1" dirty="0">
+              <a:latin typeface="Courier New"/>
+              <a:cs typeface="Courier New"/>
+            </a:endParaRPr>
+          </a:p>
+          <a:p>
+            <a:pPr marL="0" indent="0">
+              <a:buNone/>
+            </a:pPr>
+            <a:r>
+              <a:rPr lang="en-GB" dirty="0">
+                <a:latin typeface="Courier New"/>
+                <a:cs typeface="Courier New"/>
+              </a:rPr>
+              <a:t>Type          Total   Transfer       Bandwidth</a:t>
+            </a:r>
+          </a:p>
+          <a:p>
+            <a:pPr marL="0" indent="0">
+              <a:buNone/>
+            </a:pPr>
+            <a:r>
+              <a:rPr lang="en-US" dirty="0">
+                <a:latin typeface="Courier New"/>
+                <a:cs typeface="Courier New"/>
+              </a:rPr>
+              <a:t>----------------------------------------------</a:t>
+            </a:r>
+          </a:p>
+          <a:p>
+            <a:pPr marL="0" indent="0">
+              <a:buNone/>
+            </a:pPr>
+            <a:r>
+              <a:rPr lang="de-DE" dirty="0">
+                <a:latin typeface="Courier New"/>
+                <a:cs typeface="Courier New"/>
+              </a:rPr>
+              <a:t>Baseline      5.28s      1.77s       4.86 GB/s</a:t>
+            </a:r>
+          </a:p>
+          <a:p>
+            <a:pPr marL="0" indent="0">
+              <a:buNone/>
+            </a:pPr>
+            <a:r>
+              <a:rPr lang="de-DE" dirty="0" err="1">
+                <a:latin typeface="Courier New"/>
+                <a:cs typeface="Courier New"/>
+              </a:rPr>
+              <a:t>Pinned</a:t>
+            </a:r>
+            <a:r>
+              <a:rPr lang="de-DE" dirty="0">
+                <a:latin typeface="Courier New"/>
+                <a:cs typeface="Courier New"/>
+              </a:rPr>
+              <a:t>        4.86s      1.30s       6.61 GB/s</a:t>
+            </a:r>
+            <a:endParaRPr lang="de-DE" dirty="0" smtClean="0">
+              <a:latin typeface="Courier New"/>
+              <a:cs typeface="Courier New"/>
+            </a:endParaRPr>
+          </a:p>
+          <a:p>
+            <a:pPr marL="0" indent="0">
+              <a:buNone/>
+            </a:pPr>
+            <a:endParaRPr lang="de-DE" dirty="0">
+              <a:latin typeface="Courier New"/>
+              <a:cs typeface="Courier New"/>
+            </a:endParaRPr>
+          </a:p>
+          <a:p>
+            <a:pPr marL="0" indent="0">
+              <a:buNone/>
+            </a:pPr>
+            <a:r>
+              <a:rPr lang="en-GB" b="1" dirty="0" smtClean="0">
+                <a:latin typeface="Courier New"/>
+                <a:cs typeface="Courier New"/>
+              </a:rPr>
+              <a:t>Using </a:t>
+            </a:r>
+            <a:r>
+              <a:rPr lang="en-GB" b="1" dirty="0">
+                <a:latin typeface="Courier New"/>
+                <a:cs typeface="Courier New"/>
+              </a:rPr>
+              <a:t>OpenCL device: Tesla </a:t>
+            </a:r>
+            <a:r>
+              <a:rPr lang="en-GB" b="1" dirty="0" smtClean="0">
+                <a:latin typeface="Courier New"/>
+                <a:cs typeface="Courier New"/>
+              </a:rPr>
+              <a:t>K20c</a:t>
+            </a:r>
+            <a:endParaRPr lang="en-GB" b="1" dirty="0">
+              <a:latin typeface="Courier New"/>
+              <a:cs typeface="Courier New"/>
+            </a:endParaRPr>
+          </a:p>
+          <a:p>
+            <a:pPr marL="0" indent="0">
+              <a:buNone/>
+            </a:pPr>
+            <a:r>
+              <a:rPr lang="en-GB" dirty="0">
+                <a:latin typeface="Courier New"/>
+                <a:cs typeface="Courier New"/>
+              </a:rPr>
+              <a:t>Type          Total   Transfer       Bandwidth</a:t>
+            </a:r>
+          </a:p>
+          <a:p>
+            <a:pPr marL="0" indent="0">
+              <a:buNone/>
+            </a:pPr>
+            <a:r>
+              <a:rPr lang="en-US" dirty="0">
+                <a:latin typeface="Courier New"/>
+                <a:cs typeface="Courier New"/>
+              </a:rPr>
+              <a:t>----------------------------------------------</a:t>
+            </a:r>
+          </a:p>
+          <a:p>
+            <a:pPr marL="0" indent="0">
+              <a:buNone/>
+            </a:pPr>
+            <a:r>
+              <a:rPr lang="de-DE" dirty="0">
+                <a:latin typeface="Courier New"/>
+                <a:cs typeface="Courier New"/>
+              </a:rPr>
+              <a:t>Baseline      6.21s      2.61s       3.29 GB/s</a:t>
+            </a:r>
+          </a:p>
+          <a:p>
+            <a:pPr marL="0" indent="0">
+              <a:buNone/>
+            </a:pPr>
+            <a:r>
+              <a:rPr lang="de-DE" dirty="0" err="1">
+                <a:latin typeface="Courier New"/>
+                <a:cs typeface="Courier New"/>
+              </a:rPr>
+              <a:t>Pinned</a:t>
+            </a:r>
+            <a:r>
+              <a:rPr lang="de-DE" dirty="0">
+                <a:latin typeface="Courier New"/>
+                <a:cs typeface="Courier New"/>
+              </a:rPr>
+              <a:t>        6.18s      2.56s       3.36 GB/</a:t>
+            </a:r>
+            <a:r>
+              <a:rPr lang="de-DE" dirty="0" smtClean="0">
+                <a:latin typeface="Courier New"/>
+                <a:cs typeface="Courier New"/>
+              </a:rPr>
+              <a:t>s</a:t>
+            </a:r>
+          </a:p>
+          <a:p>
+            <a:pPr marL="0" indent="0">
+              <a:buNone/>
+            </a:pPr>
+            <a:endParaRPr lang="de-DE" dirty="0">
+              <a:latin typeface="Courier New"/>
+              <a:cs typeface="Courier New"/>
+            </a:endParaRPr>
+          </a:p>
+          <a:p>
+            <a:pPr marL="0" indent="0">
+              <a:buNone/>
+            </a:pPr>
+            <a:r>
+              <a:rPr lang="en-GB" b="1" dirty="0">
+                <a:latin typeface="Courier New"/>
+                <a:cs typeface="Courier New"/>
+              </a:rPr>
+              <a:t>Using OpenCL device:         Intel(R) Core(TM) i5-3550 CPU @ 3.30GHz</a:t>
+            </a:r>
+          </a:p>
+          <a:p>
+            <a:pPr marL="0" indent="0">
+              <a:buNone/>
+            </a:pPr>
+            <a:r>
+              <a:rPr lang="en-GB" b="1" dirty="0" smtClean="0">
+                <a:latin typeface="Courier New"/>
+                <a:cs typeface="Courier New"/>
+              </a:rPr>
+              <a:t>Device </a:t>
+            </a:r>
+            <a:r>
+              <a:rPr lang="en-GB" b="1" dirty="0">
+                <a:latin typeface="Courier New"/>
+                <a:cs typeface="Courier New"/>
+              </a:rPr>
+              <a:t>has host-unified </a:t>
+            </a:r>
+            <a:r>
+              <a:rPr lang="en-GB" b="1" dirty="0" smtClean="0">
+                <a:latin typeface="Courier New"/>
+                <a:cs typeface="Courier New"/>
+              </a:rPr>
+              <a:t>memory</a:t>
+            </a:r>
+            <a:endParaRPr lang="en-GB" b="1" dirty="0">
+              <a:latin typeface="Courier New"/>
+              <a:cs typeface="Courier New"/>
+            </a:endParaRPr>
+          </a:p>
+          <a:p>
+            <a:pPr marL="0" indent="0">
+              <a:buNone/>
+            </a:pPr>
+            <a:r>
+              <a:rPr lang="en-GB" dirty="0">
+                <a:latin typeface="Courier New"/>
+                <a:cs typeface="Courier New"/>
+              </a:rPr>
+              <a:t>Type          Total   Transfer       Bandwidth</a:t>
+            </a:r>
+          </a:p>
+          <a:p>
+            <a:pPr marL="0" indent="0">
+              <a:buNone/>
+            </a:pPr>
+            <a:r>
+              <a:rPr lang="en-US" dirty="0">
+                <a:latin typeface="Courier New"/>
+                <a:cs typeface="Courier New"/>
+              </a:rPr>
+              <a:t>----------------------------------------------</a:t>
+            </a:r>
+          </a:p>
+          <a:p>
+            <a:pPr marL="0" indent="0">
+              <a:buNone/>
+            </a:pPr>
+            <a:r>
+              <a:rPr lang="de-DE" dirty="0">
+                <a:latin typeface="Courier New"/>
+                <a:cs typeface="Courier New"/>
+              </a:rPr>
+              <a:t>Baseline      4.06s      1.44s       5.95 GB/s</a:t>
+            </a:r>
+          </a:p>
+          <a:p>
+            <a:pPr marL="0" indent="0">
+              <a:buNone/>
+            </a:pPr>
+            <a:r>
+              <a:rPr lang="de-DE" dirty="0">
+                <a:latin typeface="Courier New"/>
+                <a:cs typeface="Courier New"/>
+              </a:rPr>
+              <a:t>Zero-</a:t>
+            </a:r>
+            <a:r>
+              <a:rPr lang="de-DE" dirty="0" err="1">
+                <a:latin typeface="Courier New"/>
+                <a:cs typeface="Courier New"/>
+              </a:rPr>
+              <a:t>Copy</a:t>
+            </a:r>
+            <a:r>
+              <a:rPr lang="de-DE" dirty="0">
+                <a:latin typeface="Courier New"/>
+                <a:cs typeface="Courier New"/>
+              </a:rPr>
+              <a:t>     2.82s      0.00s    5156.02 GB/s</a:t>
+            </a:r>
+          </a:p>
+          <a:p>
+            <a:pPr marL="0" indent="0">
+              <a:buNone/>
+            </a:pPr>
+            <a:endParaRPr lang="de-DE" dirty="0" smtClean="0"/>
+          </a:p>
+          <a:p>
+            <a:pPr marL="0" indent="0">
+              <a:buNone/>
+            </a:pPr>
+            <a:endParaRPr lang="de-DE" dirty="0"/>
+          </a:p>
+          <a:p>
+            <a:pPr marL="0" indent="0">
+              <a:buNone/>
+            </a:pPr>
+            <a:endParaRPr lang="de-DE" dirty="0"/>
+          </a:p>
+          <a:p>
+            <a:pPr marL="0" indent="0">
+              <a:buNone/>
+            </a:pPr>
+            <a:endParaRPr lang="en-GB" dirty="0"/>
+          </a:p>
+        </p:txBody>
+      </p:sp>
+    </p:spTree>
+    <p:extLst>
+      <p:ext uri="{BB962C8B-B14F-4D97-AF65-F5344CB8AC3E}">
+        <p14:creationId xmlns:p14="http://schemas.microsoft.com/office/powerpoint/2010/main" val="3716420950"/>
+      </p:ext>
+    </p:extLst>
+  </p:cSld>
+  <p:clrMapOvr>
+    <a:masterClrMapping/>
+  </p:clrMapOvr>
 </p:sld>
 </file>
 

</xml_diff>

<commit_message>
Add note about current SVM support
</commit_message>
<xml_diff>
--- a/slides/advanced_part1.pptx
+++ b/slides/advanced_part1.pptx
@@ -10324,11 +10324,27 @@
         </p:spPr>
         <p:txBody>
           <a:bodyPr>
-            <a:normAutofit/>
+            <a:normAutofit fontScale="92500" lnSpcReduction="20000"/>
           </a:bodyPr>
           <a:lstStyle/>
           <a:p>
             <a:r>
+              <a:rPr lang="en-US" dirty="0" smtClean="0"/>
+              <a:t>OpenCL 2.0 introduces shared virtual memory</a:t>
+            </a:r>
+          </a:p>
+          <a:p>
+            <a:pPr lvl="1"/>
+            <a:r>
+              <a:rPr lang="en-US" dirty="0" smtClean="0"/>
+              <a:t>Currently supported by AMD, Intel, NVIDIA (beta), ARM, Imagination, Qualcomm</a:t>
+            </a:r>
+          </a:p>
+          <a:p>
+            <a:endParaRPr lang="en-US" dirty="0" smtClean="0"/>
+          </a:p>
+          <a:p>
+            <a:r>
               <a:rPr lang="en-US" b="1" dirty="0" err="1" smtClean="0">
                 <a:solidFill>
                   <a:srgbClr val="3366FF"/>
@@ -10401,7 +10417,11 @@
             </a:r>
             <a:r>
               <a:rPr lang="en-US" dirty="0" smtClean="0"/>
-              <a:t> OpenCL device</a:t>
+              <a:t> OpenCL </a:t>
+            </a:r>
+            <a:r>
+              <a:rPr lang="en-US" dirty="0" smtClean="0"/>
+              <a:t>device</a:t>
             </a:r>
           </a:p>
         </p:txBody>
@@ -10639,78 +10659,64 @@
                 <a:latin typeface="Courier New" pitchFamily="49" charset="0"/>
                 <a:cs typeface="Courier New" pitchFamily="49" charset="0"/>
               </a:rPr>
-              <a:t> </a:t>
+              <a:t> *</a:t>
+            </a:r>
+            <a:r>
+              <a:rPr lang="en-US" sz="1600" b="1" dirty="0" err="1" smtClean="0">
+                <a:latin typeface="Courier New" pitchFamily="49" charset="0"/>
+                <a:cs typeface="Courier New" pitchFamily="49" charset="0"/>
+              </a:rPr>
+              <a:t>src</a:t>
             </a:r>
             <a:r>
               <a:rPr lang="en-US" sz="1600" b="1" dirty="0" smtClean="0">
                 <a:latin typeface="Courier New" pitchFamily="49" charset="0"/>
                 <a:cs typeface="Courier New" pitchFamily="49" charset="0"/>
               </a:rPr>
-              <a:t>*</a:t>
-            </a:r>
-            <a:r>
-              <a:rPr lang="en-US" sz="1600" b="1" dirty="0" err="1" smtClean="0">
+              <a:t>,</a:t>
+            </a:r>
+          </a:p>
+          <a:p>
+            <a:r>
+              <a:rPr lang="en-US" sz="1600" b="1" dirty="0">
                 <a:latin typeface="Courier New" pitchFamily="49" charset="0"/>
                 <a:cs typeface="Courier New" pitchFamily="49" charset="0"/>
               </a:rPr>
-              <a:t>src</a:t>
+              <a:t> </a:t>
             </a:r>
             <a:r>
               <a:rPr lang="en-US" sz="1600" b="1" dirty="0" smtClean="0">
                 <a:latin typeface="Courier New" pitchFamily="49" charset="0"/>
                 <a:cs typeface="Courier New" pitchFamily="49" charset="0"/>
               </a:rPr>
-              <a:t>,</a:t>
-            </a:r>
-          </a:p>
-          <a:p>
-            <a:r>
-              <a:rPr lang="en-US" sz="1600" b="1" dirty="0">
+              <a:t>      </a:t>
+            </a:r>
+            <a:r>
+              <a:rPr lang="en-US" sz="1600" b="1" dirty="0" smtClean="0">
+                <a:solidFill>
+                  <a:srgbClr val="C60000"/>
+                </a:solidFill>
                 <a:latin typeface="Courier New" pitchFamily="49" charset="0"/>
                 <a:cs typeface="Courier New" pitchFamily="49" charset="0"/>
               </a:rPr>
-              <a:t> </a:t>
+              <a:t>global </a:t>
+            </a:r>
+            <a:r>
+              <a:rPr lang="en-US" sz="1600" b="1" i="1" dirty="0" smtClean="0">
+                <a:solidFill>
+                  <a:srgbClr val="3366FF"/>
+                </a:solidFill>
+                <a:latin typeface="Courier New" pitchFamily="49" charset="0"/>
+                <a:cs typeface="Courier New" pitchFamily="49" charset="0"/>
+              </a:rPr>
+              <a:t>float</a:t>
             </a:r>
             <a:r>
               <a:rPr lang="en-US" sz="1600" b="1" dirty="0" smtClean="0">
                 <a:latin typeface="Courier New" pitchFamily="49" charset="0"/>
                 <a:cs typeface="Courier New" pitchFamily="49" charset="0"/>
               </a:rPr>
-              <a:t>      </a:t>
-            </a:r>
-            <a:r>
-              <a:rPr lang="en-US" sz="1600" b="1" dirty="0" smtClean="0">
-                <a:solidFill>
-                  <a:srgbClr val="C60000"/>
-                </a:solidFill>
-                <a:latin typeface="Courier New" pitchFamily="49" charset="0"/>
-                <a:cs typeface="Courier New" pitchFamily="49" charset="0"/>
-              </a:rPr>
-              <a:t>global </a:t>
-            </a:r>
-            <a:r>
-              <a:rPr lang="en-US" sz="1600" b="1" i="1" dirty="0" smtClean="0">
-                <a:solidFill>
-                  <a:srgbClr val="3366FF"/>
-                </a:solidFill>
-                <a:latin typeface="Courier New" pitchFamily="49" charset="0"/>
-                <a:cs typeface="Courier New" pitchFamily="49" charset="0"/>
-              </a:rPr>
-              <a:t>float</a:t>
-            </a:r>
-            <a:r>
-              <a:rPr lang="en-US" sz="1600" b="1" dirty="0" smtClean="0">
-                <a:latin typeface="Courier New" pitchFamily="49" charset="0"/>
-                <a:cs typeface="Courier New" pitchFamily="49" charset="0"/>
-              </a:rPr>
-              <a:t> </a:t>
-            </a:r>
-            <a:r>
-              <a:rPr lang="en-US" sz="1600" b="1" dirty="0" smtClean="0">
-                <a:latin typeface="Courier New" pitchFamily="49" charset="0"/>
-                <a:cs typeface="Courier New" pitchFamily="49" charset="0"/>
-              </a:rPr>
-              <a:t>*</a:t>
+              <a:t> *</a:t>
             </a:r>
             <a:r>
               <a:rPr lang="en-US" sz="1600" b="1" dirty="0" err="1" smtClean="0">
@@ -10770,14 +10776,7 @@
                 <a:latin typeface="Courier New" pitchFamily="49" charset="0"/>
                 <a:cs typeface="Courier New" pitchFamily="49" charset="0"/>
               </a:rPr>
-              <a:t> </a:t>
-            </a:r>
-            <a:r>
-              <a:rPr lang="en-US" sz="1600" b="1" dirty="0" smtClean="0">
-                <a:latin typeface="Courier New" pitchFamily="49" charset="0"/>
-                <a:cs typeface="Courier New" pitchFamily="49" charset="0"/>
-              </a:rPr>
-              <a:t>id = </a:t>
+              <a:t> id = </a:t>
             </a:r>
             <a:r>
               <a:rPr lang="en-US" sz="1600" b="1" dirty="0" err="1" smtClean="0">
@@ -10903,27 +10902,7 @@
                 <a:latin typeface="Courier New" pitchFamily="49" charset="0"/>
                 <a:cs typeface="Courier New" pitchFamily="49" charset="0"/>
               </a:rPr>
-              <a:t>// </a:t>
-            </a:r>
-            <a:r>
-              <a:rPr lang="en-US" sz="1600" b="1" dirty="0" smtClean="0">
-                <a:solidFill>
-                  <a:srgbClr val="008000"/>
-                </a:solidFill>
-                <a:latin typeface="Courier New" pitchFamily="49" charset="0"/>
-                <a:cs typeface="Courier New" pitchFamily="49" charset="0"/>
-              </a:rPr>
-              <a:t>Allocating </a:t>
-            </a:r>
-            <a:r>
-              <a:rPr lang="en-US" sz="1600" b="1" dirty="0" smtClean="0">
-                <a:solidFill>
-                  <a:srgbClr val="008000"/>
-                </a:solidFill>
-                <a:latin typeface="Courier New" pitchFamily="49" charset="0"/>
-                <a:cs typeface="Courier New" pitchFamily="49" charset="0"/>
-              </a:rPr>
-              <a:t>SVM pointers</a:t>
+              <a:t>// Allocating SVM pointers</a:t>
             </a:r>
           </a:p>
           <a:p>
@@ -10967,14 +10946,7 @@
                 <a:latin typeface="Courier New" pitchFamily="49" charset="0"/>
                 <a:cs typeface="Courier New" pitchFamily="49" charset="0"/>
               </a:rPr>
-              <a:t>*</a:t>
-            </a:r>
-            <a:r>
-              <a:rPr lang="en-US" sz="1600" b="1" dirty="0" smtClean="0">
-                <a:latin typeface="Courier New" pitchFamily="49" charset="0"/>
-                <a:cs typeface="Courier New" pitchFamily="49" charset="0"/>
-              </a:rPr>
-              <a:t>)</a:t>
+              <a:t>*)</a:t>
             </a:r>
             <a:r>
               <a:rPr lang="en-US" sz="1600" b="1" dirty="0" err="1" smtClean="0">
@@ -11211,17 +11183,7 @@
                 <a:latin typeface="Courier New" pitchFamily="49" charset="0"/>
                 <a:cs typeface="Courier New" pitchFamily="49" charset="0"/>
               </a:rPr>
-              <a:t>assing </a:t>
-            </a:r>
-            <a:r>
-              <a:rPr lang="en-US" sz="1600" b="1" dirty="0" smtClean="0">
-                <a:solidFill>
-                  <a:srgbClr val="008000"/>
-                </a:solidFill>
-                <a:latin typeface="Courier New" pitchFamily="49" charset="0"/>
-                <a:cs typeface="Courier New" pitchFamily="49" charset="0"/>
-              </a:rPr>
-              <a:t>SVM pointers as arguments</a:t>
+              <a:t>assing SVM pointers as arguments</a:t>
             </a:r>
           </a:p>
           <a:p>
@@ -11447,17 +11409,7 @@
                 <a:latin typeface="Courier New" pitchFamily="49" charset="0"/>
                 <a:cs typeface="Courier New" pitchFamily="49" charset="0"/>
               </a:rPr>
-              <a:t>assing </a:t>
-            </a:r>
-            <a:r>
-              <a:rPr lang="en-US" sz="1600" b="1" dirty="0" smtClean="0">
-                <a:solidFill>
-                  <a:srgbClr val="008000"/>
-                </a:solidFill>
-                <a:latin typeface="Courier New" pitchFamily="49" charset="0"/>
-                <a:cs typeface="Courier New" pitchFamily="49" charset="0"/>
-              </a:rPr>
-              <a:t>SVM pointer + offset as arguments</a:t>
+              <a:t>assing SVM pointer + offset as arguments</a:t>
             </a:r>
           </a:p>
           <a:p>
@@ -12151,7 +12103,9 @@
         </p:nvSpPr>
         <p:spPr/>
         <p:txBody>
-          <a:bodyPr/>
+          <a:bodyPr>
+            <a:normAutofit lnSpcReduction="10000"/>
+          </a:bodyPr>
           <a:lstStyle/>
           <a:p>
             <a:r>
@@ -12197,8 +12151,58 @@
                   <a:srgbClr val="008000"/>
                 </a:solidFill>
               </a:rPr>
-              <a:t>System sharing</a:t>
-            </a:r>
+              <a:t>System </a:t>
+            </a:r>
+            <a:r>
+              <a:rPr lang="en-US" b="1" dirty="0" smtClean="0">
+                <a:solidFill>
+                  <a:srgbClr val="008000"/>
+                </a:solidFill>
+              </a:rPr>
+              <a:t>sharing</a:t>
+            </a:r>
+          </a:p>
+          <a:p>
+            <a:endParaRPr lang="en-US" dirty="0" smtClean="0">
+              <a:solidFill>
+                <a:srgbClr val="000000"/>
+              </a:solidFill>
+            </a:endParaRPr>
+          </a:p>
+          <a:p>
+            <a:r>
+              <a:rPr lang="en-US" dirty="0" smtClean="0">
+                <a:solidFill>
+                  <a:srgbClr val="000000"/>
+                </a:solidFill>
+              </a:rPr>
+              <a:t>Coarse-grained buffer sharing is required to be supported by all OpenCL 2.x platforms</a:t>
+            </a:r>
+          </a:p>
+          <a:p>
+            <a:pPr marL="0" indent="0">
+              <a:buNone/>
+            </a:pPr>
+            <a:endParaRPr lang="en-US" dirty="0" smtClean="0">
+              <a:solidFill>
+                <a:srgbClr val="000000"/>
+              </a:solidFill>
+            </a:endParaRPr>
+          </a:p>
+          <a:p>
+            <a:r>
+              <a:rPr lang="en-US" dirty="0" smtClean="0">
+                <a:solidFill>
+                  <a:srgbClr val="000000"/>
+                </a:solidFill>
+              </a:rPr>
+              <a:t>Fine-grained and system sharing are optional</a:t>
+            </a:r>
+            <a:endParaRPr lang="en-US" dirty="0" smtClean="0">
+              <a:solidFill>
+                <a:srgbClr val="000000"/>
+              </a:solidFill>
+            </a:endParaRPr>
           </a:p>
           <a:p>
             <a:pPr lvl="1"/>

</xml_diff>

<commit_message>
Update timings for HostDevTransfer on K40
</commit_message>
<xml_diff>
--- a/slides/advanced_part1.pptx
+++ b/slides/advanced_part1.pptx
@@ -142,7 +142,7 @@
   </p:defaultTextStyle>
   <p:extLst>
     <p:ext uri="{EFAFB233-063F-42B5-8137-9DF3F51BA10A}">
-      <p15:sldGuideLst xmlns:p15="http://schemas.microsoft.com/office/powerpoint/2012/main">
+      <p15:sldGuideLst xmlns:p15="http://schemas.microsoft.com/office/powerpoint/2012/main" xmlns="">
         <p15:guide id="1" orient="horz" pos="2160">
           <p15:clr>
             <a:srgbClr val="A4A3A4"/>
@@ -241,7 +241,7 @@
           <a:p>
             <a:fld id="{C020D4C0-2770-3946-ABDD-0C7492C2C34D}" type="datetimeFigureOut">
               <a:rPr lang="en-US" smtClean="0"/>
-              <a:t>5/13/17</a:t>
+              <a:t>15/05/17</a:t>
             </a:fld>
             <a:endParaRPr lang="en-GB"/>
           </a:p>
@@ -1072,7 +1072,7 @@
           <a:p>
             <a:fld id="{8959E172-2558-6049-8DA8-C86E1F6924DD}" type="datetimeFigureOut">
               <a:rPr lang="en-US" smtClean="0"/>
-              <a:t>5/13/17</a:t>
+              <a:t>15/05/17</a:t>
             </a:fld>
             <a:endParaRPr lang="en-GB"/>
           </a:p>
@@ -1242,7 +1242,7 @@
           <a:p>
             <a:fld id="{8959E172-2558-6049-8DA8-C86E1F6924DD}" type="datetimeFigureOut">
               <a:rPr lang="en-US" smtClean="0"/>
-              <a:t>5/13/17</a:t>
+              <a:t>15/05/17</a:t>
             </a:fld>
             <a:endParaRPr lang="en-GB"/>
           </a:p>
@@ -1422,7 +1422,7 @@
           <a:p>
             <a:fld id="{8959E172-2558-6049-8DA8-C86E1F6924DD}" type="datetimeFigureOut">
               <a:rPr lang="en-US" smtClean="0"/>
-              <a:t>5/13/17</a:t>
+              <a:t>15/05/17</a:t>
             </a:fld>
             <a:endParaRPr lang="en-GB"/>
           </a:p>
@@ -1592,7 +1592,7 @@
           <a:p>
             <a:fld id="{8959E172-2558-6049-8DA8-C86E1F6924DD}" type="datetimeFigureOut">
               <a:rPr lang="en-US" smtClean="0"/>
-              <a:t>5/13/17</a:t>
+              <a:t>15/05/17</a:t>
             </a:fld>
             <a:endParaRPr lang="en-GB"/>
           </a:p>
@@ -1838,7 +1838,7 @@
           <a:p>
             <a:fld id="{8959E172-2558-6049-8DA8-C86E1F6924DD}" type="datetimeFigureOut">
               <a:rPr lang="en-US" smtClean="0"/>
-              <a:t>5/13/17</a:t>
+              <a:t>15/05/17</a:t>
             </a:fld>
             <a:endParaRPr lang="en-GB"/>
           </a:p>
@@ -2126,7 +2126,7 @@
           <a:p>
             <a:fld id="{8959E172-2558-6049-8DA8-C86E1F6924DD}" type="datetimeFigureOut">
               <a:rPr lang="en-US" smtClean="0"/>
-              <a:t>5/13/17</a:t>
+              <a:t>15/05/17</a:t>
             </a:fld>
             <a:endParaRPr lang="en-GB"/>
           </a:p>
@@ -2548,7 +2548,7 @@
           <a:p>
             <a:fld id="{8959E172-2558-6049-8DA8-C86E1F6924DD}" type="datetimeFigureOut">
               <a:rPr lang="en-US" smtClean="0"/>
-              <a:t>5/13/17</a:t>
+              <a:t>15/05/17</a:t>
             </a:fld>
             <a:endParaRPr lang="en-GB"/>
           </a:p>
@@ -2666,7 +2666,7 @@
           <a:p>
             <a:fld id="{8959E172-2558-6049-8DA8-C86E1F6924DD}" type="datetimeFigureOut">
               <a:rPr lang="en-US" smtClean="0"/>
-              <a:t>5/13/17</a:t>
+              <a:t>15/05/17</a:t>
             </a:fld>
             <a:endParaRPr lang="en-GB"/>
           </a:p>
@@ -2761,7 +2761,7 @@
           <a:p>
             <a:fld id="{8959E172-2558-6049-8DA8-C86E1F6924DD}" type="datetimeFigureOut">
               <a:rPr lang="en-US" smtClean="0"/>
-              <a:t>5/13/17</a:t>
+              <a:t>15/05/17</a:t>
             </a:fld>
             <a:endParaRPr lang="en-GB"/>
           </a:p>
@@ -3038,7 +3038,7 @@
           <a:p>
             <a:fld id="{8959E172-2558-6049-8DA8-C86E1F6924DD}" type="datetimeFigureOut">
               <a:rPr lang="en-US" smtClean="0"/>
-              <a:t>5/13/17</a:t>
+              <a:t>15/05/17</a:t>
             </a:fld>
             <a:endParaRPr lang="en-GB"/>
           </a:p>
@@ -3291,7 +3291,7 @@
           <a:p>
             <a:fld id="{8959E172-2558-6049-8DA8-C86E1F6924DD}" type="datetimeFigureOut">
               <a:rPr lang="en-US" smtClean="0"/>
-              <a:t>5/13/17</a:t>
+              <a:t>15/05/17</a:t>
             </a:fld>
             <a:endParaRPr lang="en-GB"/>
           </a:p>
@@ -3504,7 +3504,7 @@
           <a:p>
             <a:fld id="{8959E172-2558-6049-8DA8-C86E1F6924DD}" type="datetimeFigureOut">
               <a:rPr lang="en-US" smtClean="0"/>
-              <a:t>5/13/17</a:t>
+              <a:t>15/05/17</a:t>
             </a:fld>
             <a:endParaRPr lang="en-GB"/>
           </a:p>
@@ -3955,7 +3955,7 @@
   <p:timing>
     <p:tnLst>
       <p:par>
-        <p:cTn id="1" dur="indefinite" restart="never" nodeType="tmRoot"/>
+        <p:cTn xmlns:p14="http://schemas.microsoft.com/office/powerpoint/2010/main" id="1" dur="indefinite" restart="never" nodeType="tmRoot"/>
       </p:par>
     </p:tnLst>
   </p:timing>
@@ -4035,11 +4035,7 @@
             </a:r>
             <a:r>
               <a:rPr lang="en-US" dirty="0" smtClean="0"/>
-              <a:t>to </a:t>
-            </a:r>
-            <a:r>
-              <a:rPr lang="en-US" dirty="0" smtClean="0"/>
-              <a:t>use multiple devices</a:t>
+              <a:t>to use multiple devices</a:t>
             </a:r>
           </a:p>
           <a:p>
@@ -4057,11 +4053,7 @@
           <a:p>
             <a:r>
               <a:rPr lang="en-US" dirty="0" smtClean="0"/>
-              <a:t>However, moving memory between them can be very </a:t>
-            </a:r>
-            <a:r>
-              <a:rPr lang="en-US" dirty="0" smtClean="0"/>
-              <a:t>expensive (has to go via the host)</a:t>
+              <a:t>However, moving memory between them can be very expensive (has to go via the host)</a:t>
             </a:r>
             <a:endParaRPr lang="en-US" dirty="0"/>
           </a:p>
@@ -4080,7 +4072,7 @@
   <p:timing>
     <p:tnLst>
       <p:par>
-        <p:cTn id="1" dur="indefinite" restart="never" nodeType="tmRoot"/>
+        <p:cTn xmlns:p14="http://schemas.microsoft.com/office/powerpoint/2010/main" id="1" dur="indefinite" restart="never" nodeType="tmRoot"/>
       </p:par>
     </p:tnLst>
   </p:timing>
@@ -4121,15 +4113,7 @@
           <a:p>
             <a:r>
               <a:rPr lang="en-US" dirty="0" smtClean="0"/>
-              <a:t>E.g. </a:t>
-            </a:r>
-            <a:r>
-              <a:rPr lang="en-US" dirty="0" smtClean="0"/>
-              <a:t>Halo </a:t>
-            </a:r>
-            <a:r>
-              <a:rPr lang="en-US" dirty="0" smtClean="0"/>
-              <a:t>Exchange</a:t>
+              <a:t>E.g. Halo Exchange</a:t>
             </a:r>
             <a:endParaRPr lang="en-US" dirty="0"/>
           </a:p>
@@ -4159,15 +4143,7 @@
           <a:p>
             <a:r>
               <a:rPr lang="en-US" dirty="0" smtClean="0"/>
-              <a:t>If you can split your </a:t>
-            </a:r>
-            <a:r>
-              <a:rPr lang="en-US" dirty="0" smtClean="0"/>
-              <a:t>data up </a:t>
-            </a:r>
-            <a:r>
-              <a:rPr lang="en-US" dirty="0" smtClean="0"/>
-              <a:t>into regions, then the edges may need to be synchronized across devices</a:t>
+              <a:t>If you can split your data up into regions, then the edges may need to be synchronized across devices</a:t>
             </a:r>
           </a:p>
           <a:p>
@@ -4226,26 +4202,14 @@
           <a:p>
             <a:r>
               <a:rPr lang="en-US" dirty="0" smtClean="0"/>
-              <a:t>A much better alternative is to write kernels that will pack/unpack buffer regions into contiguous chunks that can be read </a:t>
-            </a:r>
-            <a:r>
-              <a:rPr lang="en-US" dirty="0" smtClean="0"/>
-              <a:t>directly</a:t>
+              <a:t>A much better alternative is to write kernels that will pack/unpack buffer regions into contiguous chunks that can be read directly</a:t>
             </a:r>
           </a:p>
           <a:p>
             <a:pPr lvl="1"/>
             <a:r>
               <a:rPr lang="en-US" dirty="0" smtClean="0"/>
-              <a:t>This </a:t>
-            </a:r>
-            <a:r>
-              <a:rPr lang="en-US" dirty="0" smtClean="0"/>
-              <a:t>is </a:t>
-            </a:r>
-            <a:r>
-              <a:rPr lang="en-US" dirty="0" smtClean="0"/>
-              <a:t>more complicated but usually faster and more portable</a:t>
+              <a:t>This is more complicated but usually faster and more portable</a:t>
             </a:r>
             <a:endParaRPr lang="en-US" dirty="0"/>
           </a:p>
@@ -4264,7 +4228,7 @@
   <p:timing>
     <p:tnLst>
       <p:par>
-        <p:cTn id="1" dur="indefinite" restart="never" nodeType="tmRoot"/>
+        <p:cTn xmlns:p14="http://schemas.microsoft.com/office/powerpoint/2010/main" id="1" dur="indefinite" restart="never" nodeType="tmRoot"/>
       </p:par>
     </p:tnLst>
   </p:timing>
@@ -4374,30 +4338,14 @@
           <a:p>
             <a:r>
               <a:rPr lang="en-US" dirty="0" smtClean="0"/>
-              <a:t>If supported, </a:t>
-            </a:r>
-            <a:r>
-              <a:rPr lang="en-US" dirty="0" smtClean="0"/>
-              <a:t>this can </a:t>
-            </a:r>
-            <a:r>
-              <a:rPr lang="en-US" dirty="0" smtClean="0"/>
-              <a:t>enable much </a:t>
-            </a:r>
-            <a:r>
-              <a:rPr lang="en-US" dirty="0" smtClean="0"/>
-              <a:t>faster</a:t>
+              <a:t>If supported, this can enable much faster</a:t>
             </a:r>
             <a:br>
               <a:rPr lang="en-US" dirty="0" smtClean="0"/>
             </a:br>
             <a:r>
               <a:rPr lang="en-US" dirty="0" smtClean="0"/>
-              <a:t>host </a:t>
-            </a:r>
-            <a:r>
-              <a:rPr lang="en-US" dirty="0" smtClean="0"/>
-              <a:t>&lt;-&gt; device communications</a:t>
+              <a:t>host &lt;-&gt; device communications</a:t>
             </a:r>
             <a:endParaRPr lang="en-US" dirty="0"/>
           </a:p>
@@ -4416,7 +4364,7 @@
   <p:timing>
     <p:tnLst>
       <p:par>
-        <p:cTn id="1" dur="indefinite" restart="never" nodeType="tmRoot"/>
+        <p:cTn xmlns:p14="http://schemas.microsoft.com/office/powerpoint/2010/main" id="1" dur="indefinite" restart="never" nodeType="tmRoot"/>
       </p:par>
     </p:tnLst>
   </p:timing>
@@ -4504,35 +4452,14 @@
             </a:r>
             <a:r>
               <a:rPr lang="en-US" dirty="0" smtClean="0"/>
-              <a:t>3.0 </a:t>
-            </a:r>
-            <a:r>
-              <a:rPr lang="en-US" dirty="0" smtClean="0"/>
-              <a:t>might </a:t>
-            </a:r>
-            <a:r>
-              <a:rPr lang="en-US" dirty="0" smtClean="0"/>
-              <a:t>manage ~6GB/s</a:t>
-            </a:r>
-          </a:p>
-          <a:p>
-            <a:r>
-              <a:rPr lang="en-US" dirty="0" smtClean="0"/>
-              <a:t>But </a:t>
-            </a:r>
-            <a:r>
-              <a:rPr lang="en-US" dirty="0" smtClean="0"/>
-              <a:t>the hardware can sustain </a:t>
-            </a:r>
-            <a:r>
-              <a:rPr lang="en-US" dirty="0" smtClean="0"/>
-              <a:t>transfer rates of up to </a:t>
-            </a:r>
-            <a:r>
-              <a:rPr lang="en-US" dirty="0" smtClean="0"/>
-              <a:t>12GB/s</a:t>
-            </a:r>
-            <a:endParaRPr lang="en-US" dirty="0" smtClean="0"/>
+              <a:t>3.0 might manage ~6GB/s</a:t>
+            </a:r>
+          </a:p>
+          <a:p>
+            <a:r>
+              <a:rPr lang="en-US" dirty="0" smtClean="0"/>
+              <a:t>But the hardware can sustain transfer rates of up to 12GB/s</a:t>
+            </a:r>
           </a:p>
           <a:p>
             <a:r>
@@ -4568,7 +4495,7 @@
   <p:timing>
     <p:tnLst>
       <p:par>
-        <p:cTn id="1" dur="indefinite" restart="never" nodeType="tmRoot"/>
+        <p:cTn xmlns:p14="http://schemas.microsoft.com/office/powerpoint/2010/main" id="1" dur="indefinite" restart="never" nodeType="tmRoot"/>
       </p:par>
     </p:tnLst>
   </p:timing>
@@ -4703,7 +4630,7 @@
   <p:timing>
     <p:tnLst>
       <p:par>
-        <p:cTn id="1" dur="indefinite" restart="never" nodeType="tmRoot"/>
+        <p:cTn xmlns:p14="http://schemas.microsoft.com/office/powerpoint/2010/main" id="1" dur="indefinite" restart="never" nodeType="tmRoot"/>
       </p:par>
     </p:tnLst>
   </p:timing>
@@ -5293,18 +5220,18 @@
   <p:clrMapOvr>
     <a:masterClrMapping/>
   </p:clrMapOvr>
-  <mc:AlternateContent xmlns:mc="http://schemas.openxmlformats.org/markup-compatibility/2006">
-    <mc:Choice xmlns:p14="http://schemas.microsoft.com/office/powerpoint/2010/main" Requires="p14">
+  <mc:AlternateContent xmlns:mc="http://schemas.openxmlformats.org/markup-compatibility/2006" xmlns:p14="http://schemas.microsoft.com/office/powerpoint/2010/main">
+    <mc:Choice Requires="p14">
       <p:transition spd="slow" p14:dur="2000"/>
     </mc:Choice>
-    <mc:Fallback>
+    <mc:Fallback xmlns="">
       <p:transition spd="slow"/>
     </mc:Fallback>
   </mc:AlternateContent>
   <p:timing>
     <p:tnLst>
       <p:par>
-        <p:cTn id="1" dur="indefinite" restart="never" nodeType="tmRoot"/>
+        <p:cTn xmlns:p14="http://schemas.microsoft.com/office/powerpoint/2010/main" id="1" dur="indefinite" restart="never" nodeType="tmRoot"/>
       </p:par>
     </p:tnLst>
   </p:timing>
@@ -5491,18 +5418,18 @@
   <p:clrMapOvr>
     <a:masterClrMapping/>
   </p:clrMapOvr>
-  <mc:AlternateContent xmlns:mc="http://schemas.openxmlformats.org/markup-compatibility/2006">
-    <mc:Choice xmlns:p14="http://schemas.microsoft.com/office/powerpoint/2010/main" Requires="p14">
+  <mc:AlternateContent xmlns:mc="http://schemas.openxmlformats.org/markup-compatibility/2006" xmlns:p14="http://schemas.microsoft.com/office/powerpoint/2010/main">
+    <mc:Choice Requires="p14">
       <p:transition spd="slow" p14:dur="2000"/>
     </mc:Choice>
-    <mc:Fallback>
+    <mc:Fallback xmlns="">
       <p:transition spd="slow"/>
     </mc:Fallback>
   </mc:AlternateContent>
   <p:timing>
     <p:tnLst>
       <p:par>
-        <p:cTn id="1" dur="indefinite" restart="never" nodeType="tmRoot"/>
+        <p:cTn xmlns:p14="http://schemas.microsoft.com/office/powerpoint/2010/main" id="1" dur="indefinite" restart="never" nodeType="tmRoot"/>
       </p:par>
     </p:tnLst>
   </p:timing>
@@ -6168,18 +6095,18 @@
   <p:clrMapOvr>
     <a:masterClrMapping/>
   </p:clrMapOvr>
-  <mc:AlternateContent xmlns:mc="http://schemas.openxmlformats.org/markup-compatibility/2006">
-    <mc:Choice xmlns:p14="http://schemas.microsoft.com/office/powerpoint/2010/main" Requires="p14">
+  <mc:AlternateContent xmlns:mc="http://schemas.openxmlformats.org/markup-compatibility/2006" xmlns:p14="http://schemas.microsoft.com/office/powerpoint/2010/main">
+    <mc:Choice Requires="p14">
       <p:transition spd="slow" p14:dur="2000"/>
     </mc:Choice>
-    <mc:Fallback>
+    <mc:Fallback xmlns="">
       <p:transition spd="slow"/>
     </mc:Fallback>
   </mc:AlternateContent>
   <p:timing>
     <p:tnLst>
       <p:par>
-        <p:cTn id="1" dur="indefinite" restart="never" nodeType="tmRoot"/>
+        <p:cTn xmlns:p14="http://schemas.microsoft.com/office/powerpoint/2010/main" id="1" dur="indefinite" restart="never" nodeType="tmRoot"/>
       </p:par>
     </p:tnLst>
   </p:timing>
@@ -6663,18 +6590,18 @@
   <p:clrMapOvr>
     <a:masterClrMapping/>
   </p:clrMapOvr>
-  <mc:AlternateContent xmlns:mc="http://schemas.openxmlformats.org/markup-compatibility/2006">
-    <mc:Choice xmlns:p14="http://schemas.microsoft.com/office/powerpoint/2010/main" Requires="p14">
+  <mc:AlternateContent xmlns:mc="http://schemas.openxmlformats.org/markup-compatibility/2006" xmlns:p14="http://schemas.microsoft.com/office/powerpoint/2010/main">
+    <mc:Choice Requires="p14">
       <p:transition spd="slow" p14:dur="2000"/>
     </mc:Choice>
-    <mc:Fallback>
+    <mc:Fallback xmlns="">
       <p:transition spd="slow"/>
     </mc:Fallback>
   </mc:AlternateContent>
   <p:timing>
     <p:tnLst>
       <p:par>
-        <p:cTn id="1" dur="indefinite" restart="never" nodeType="tmRoot"/>
+        <p:cTn xmlns:p14="http://schemas.microsoft.com/office/powerpoint/2010/main" id="1" dur="indefinite" restart="never" nodeType="tmRoot"/>
       </p:par>
     </p:tnLst>
   </p:timing>
@@ -7185,18 +7112,18 @@
   <p:clrMapOvr>
     <a:masterClrMapping/>
   </p:clrMapOvr>
-  <mc:AlternateContent xmlns:mc="http://schemas.openxmlformats.org/markup-compatibility/2006">
-    <mc:Choice xmlns:p14="http://schemas.microsoft.com/office/powerpoint/2010/main" Requires="p14">
+  <mc:AlternateContent xmlns:mc="http://schemas.openxmlformats.org/markup-compatibility/2006" xmlns:p14="http://schemas.microsoft.com/office/powerpoint/2010/main">
+    <mc:Choice Requires="p14">
       <p:transition spd="slow" p14:dur="2000"/>
     </mc:Choice>
-    <mc:Fallback>
+    <mc:Fallback xmlns="">
       <p:transition spd="slow"/>
     </mc:Fallback>
   </mc:AlternateContent>
   <p:timing>
     <p:tnLst>
       <p:par>
-        <p:cTn id="1" dur="indefinite" restart="never" nodeType="tmRoot"/>
+        <p:cTn xmlns:p14="http://schemas.microsoft.com/office/powerpoint/2010/main" id="1" dur="indefinite" restart="never" nodeType="tmRoot"/>
       </p:par>
     </p:tnLst>
   </p:timing>
@@ -7313,7 +7240,7 @@
   <p:timing>
     <p:tnLst>
       <p:par>
-        <p:cTn id="1" dur="indefinite" restart="never" nodeType="tmRoot"/>
+        <p:cTn xmlns:p14="http://schemas.microsoft.com/office/powerpoint/2010/main" id="1" dur="indefinite" restart="never" nodeType="tmRoot"/>
       </p:par>
     </p:tnLst>
   </p:timing>
@@ -7474,7 +7401,7 @@
   <p:timing>
     <p:tnLst>
       <p:par>
-        <p:cTn id="1" dur="indefinite" restart="never" nodeType="tmRoot"/>
+        <p:cTn xmlns:p14="http://schemas.microsoft.com/office/powerpoint/2010/main" id="1" dur="indefinite" restart="never" nodeType="tmRoot"/>
       </p:par>
     </p:tnLst>
   </p:timing>
@@ -7654,7 +7581,7 @@
   <p:timing>
     <p:tnLst>
       <p:par>
-        <p:cTn id="1" dur="indefinite" restart="never" nodeType="tmRoot"/>
+        <p:cTn xmlns:p14="http://schemas.microsoft.com/office/powerpoint/2010/main" id="1" dur="indefinite" restart="never" nodeType="tmRoot"/>
       </p:par>
     </p:tnLst>
   </p:timing>
@@ -7753,7 +7680,7 @@
   <p:timing>
     <p:tnLst>
       <p:par>
-        <p:cTn id="1" dur="indefinite" restart="never" nodeType="tmRoot"/>
+        <p:cTn xmlns:p14="http://schemas.microsoft.com/office/powerpoint/2010/main" id="1" dur="indefinite" restart="never" nodeType="tmRoot"/>
       </p:par>
     </p:tnLst>
   </p:timing>
@@ -8905,7 +8832,7 @@
   <p:timing>
     <p:tnLst>
       <p:par>
-        <p:cTn id="1" dur="indefinite" restart="never" nodeType="tmRoot"/>
+        <p:cTn xmlns:p14="http://schemas.microsoft.com/office/powerpoint/2010/main" id="1" dur="indefinite" restart="never" nodeType="tmRoot"/>
       </p:par>
     </p:tnLst>
   </p:timing>
@@ -9058,7 +8985,7 @@
   <p:timing>
     <p:tnLst>
       <p:par>
-        <p:cTn id="1" dur="indefinite" restart="never" nodeType="tmRoot"/>
+        <p:cTn xmlns:p14="http://schemas.microsoft.com/office/powerpoint/2010/main" id="1" dur="indefinite" restart="never" nodeType="tmRoot"/>
       </p:par>
     </p:tnLst>
   </p:timing>
@@ -9191,7 +9118,7 @@
   <p:timing>
     <p:tnLst>
       <p:par>
-        <p:cTn id="1" dur="indefinite" restart="never" nodeType="tmRoot"/>
+        <p:cTn xmlns:p14="http://schemas.microsoft.com/office/powerpoint/2010/main" id="1" dur="indefinite" restart="never" nodeType="tmRoot"/>
       </p:par>
     </p:tnLst>
   </p:timing>
@@ -10284,7 +10211,7 @@
   <p:timing>
     <p:tnLst>
       <p:par>
-        <p:cTn id="1" dur="indefinite" restart="never" nodeType="tmRoot"/>
+        <p:cTn xmlns:p14="http://schemas.microsoft.com/office/powerpoint/2010/main" id="1" dur="indefinite" restart="never" nodeType="tmRoot"/>
       </p:par>
     </p:tnLst>
   </p:timing>
@@ -10361,15 +10288,7 @@
           <a:p>
             <a:r>
               <a:rPr lang="en-US" dirty="0" smtClean="0"/>
-              <a:t>Buffer </a:t>
-            </a:r>
-            <a:r>
-              <a:rPr lang="en-US" dirty="0" smtClean="0"/>
-              <a:t>objects </a:t>
-            </a:r>
-            <a:r>
-              <a:rPr lang="en-US" dirty="0" smtClean="0"/>
-              <a:t>are described as a pointer to type in kernels</a:t>
+              <a:t>Buffer objects are described as a pointer to type in kernels</a:t>
             </a:r>
           </a:p>
           <a:p>
@@ -10382,15 +10301,7 @@
             <a:pPr lvl="1"/>
             <a:r>
               <a:rPr lang="en-US" dirty="0" smtClean="0"/>
-              <a:t>Can't pass a pointer + offset as </a:t>
-            </a:r>
-            <a:r>
-              <a:rPr lang="en-US" dirty="0" smtClean="0"/>
-              <a:t>an argument </a:t>
-            </a:r>
-            <a:r>
-              <a:rPr lang="en-US" dirty="0" smtClean="0"/>
-              <a:t>value</a:t>
+              <a:t>Can't pass a pointer + offset as an argument value</a:t>
             </a:r>
           </a:p>
           <a:p>
@@ -10451,7 +10362,7 @@
   <p:timing>
     <p:tnLst>
       <p:par>
-        <p:cTn id="1" dur="indefinite" restart="never" nodeType="tmRoot"/>
+        <p:cTn xmlns:p14="http://schemas.microsoft.com/office/powerpoint/2010/main" id="1" dur="indefinite" restart="never" nodeType="tmRoot"/>
       </p:par>
     </p:tnLst>
   </p:timing>
@@ -10635,7 +10546,7 @@
   <p:timing>
     <p:tnLst>
       <p:par>
-        <p:cTn id="1" dur="indefinite" restart="never" nodeType="tmRoot"/>
+        <p:cTn xmlns:p14="http://schemas.microsoft.com/office/powerpoint/2010/main" id="1" dur="indefinite" restart="never" nodeType="tmRoot"/>
       </p:par>
     </p:tnLst>
   </p:timing>
@@ -11807,7 +11718,7 @@
   <p:timing>
     <p:tnLst>
       <p:par>
-        <p:cTn id="1" dur="indefinite" restart="never" nodeType="tmRoot"/>
+        <p:cTn xmlns:p14="http://schemas.microsoft.com/office/powerpoint/2010/main" id="1" dur="indefinite" restart="never" nodeType="tmRoot"/>
       </p:par>
     </p:tnLst>
   </p:timing>
@@ -12232,7 +12143,7 @@
   <p:timing>
     <p:tnLst>
       <p:par>
-        <p:cTn id="1" dur="indefinite" restart="never" nodeType="tmRoot"/>
+        <p:cTn xmlns:p14="http://schemas.microsoft.com/office/powerpoint/2010/main" id="1" dur="indefinite" restart="never" nodeType="tmRoot"/>
       </p:par>
     </p:tnLst>
   </p:timing>
@@ -12414,7 +12325,7 @@
   <p:timing>
     <p:tnLst>
       <p:par>
-        <p:cTn id="1" dur="indefinite" restart="never" nodeType="tmRoot"/>
+        <p:cTn xmlns:p14="http://schemas.microsoft.com/office/powerpoint/2010/main" id="1" dur="indefinite" restart="never" nodeType="tmRoot"/>
       </p:par>
     </p:tnLst>
   </p:timing>
@@ -12542,15 +12453,7 @@
             </a:pPr>
             <a:r>
               <a:rPr lang="en-US" dirty="0" smtClean="0"/>
-              <a:t>Memory consistency </a:t>
-            </a:r>
-            <a:r>
-              <a:rPr lang="en-US" dirty="0" smtClean="0"/>
-              <a:t>is only </a:t>
-            </a:r>
-            <a:r>
-              <a:rPr lang="en-US" dirty="0" smtClean="0"/>
-              <a:t>guaranteed at synchronization points</a:t>
+              <a:t>Memory consistency is only guaranteed at synchronization points</a:t>
             </a:r>
           </a:p>
           <a:p>
@@ -12607,15 +12510,7 @@
             </a:pPr>
             <a:r>
               <a:rPr lang="en-US" dirty="0" smtClean="0"/>
-              <a:t>Memory consistency is at a </a:t>
-            </a:r>
-            <a:r>
-              <a:rPr lang="en-US" dirty="0" smtClean="0"/>
-              <a:t>the buffer </a:t>
-            </a:r>
-            <a:r>
-              <a:rPr lang="en-US" dirty="0" smtClean="0"/>
-              <a:t>level</a:t>
+              <a:t>Memory consistency is at a the buffer level</a:t>
             </a:r>
           </a:p>
           <a:p>
@@ -12743,7 +12638,7 @@
   <p:timing>
     <p:tnLst>
       <p:par>
-        <p:cTn id="1" dur="indefinite" restart="never" nodeType="tmRoot">
+        <p:cTn xmlns:p14="http://schemas.microsoft.com/office/powerpoint/2010/main" id="1" dur="indefinite" restart="never" nodeType="tmRoot">
           <p:childTnLst>
             <p:seq concurrent="1" nextAc="seek">
               <p:cTn id="2" dur="indefinite" nodeType="mainSeq">
@@ -13440,7 +13335,7 @@
   <p:timing>
     <p:tnLst>
       <p:par>
-        <p:cTn id="1" dur="indefinite" restart="never" nodeType="tmRoot"/>
+        <p:cTn xmlns:p14="http://schemas.microsoft.com/office/powerpoint/2010/main" id="1" dur="indefinite" restart="never" nodeType="tmRoot"/>
       </p:par>
     </p:tnLst>
   </p:timing>
@@ -13537,23 +13432,7 @@
           <a:p>
             <a:r>
               <a:rPr lang="en-GB" dirty="0" smtClean="0"/>
-              <a:t>Improve the performance of the host-to-device data transfers by </a:t>
-            </a:r>
-            <a:r>
-              <a:rPr lang="en-GB" dirty="0" smtClean="0"/>
-              <a:t>using </a:t>
-            </a:r>
-            <a:r>
-              <a:rPr lang="en-GB" dirty="0" smtClean="0"/>
-              <a:t>pinned </a:t>
-            </a:r>
-            <a:r>
-              <a:rPr lang="en-GB" dirty="0" smtClean="0"/>
-              <a:t>memory, then if time allows, also try </a:t>
-            </a:r>
-            <a:r>
-              <a:rPr lang="en-GB" dirty="0" smtClean="0"/>
-              <a:t>zero-copy</a:t>
+              <a:t>Improve the performance of the host-to-device data transfers by using pinned memory, then if time allows, also try zero-copy</a:t>
             </a:r>
           </a:p>
           <a:p>
@@ -13589,7 +13468,7 @@
   <p:timing>
     <p:tnLst>
       <p:par>
-        <p:cTn id="1" dur="indefinite" restart="never" nodeType="tmRoot"/>
+        <p:cTn xmlns:p14="http://schemas.microsoft.com/office/powerpoint/2010/main" id="1" dur="indefinite" restart="never" nodeType="tmRoot"/>
       </p:par>
     </p:tnLst>
   </p:timing>
@@ -13835,7 +13714,28 @@
                 <a:latin typeface="Courier New"/>
                 <a:cs typeface="Courier New"/>
               </a:rPr>
-              <a:t>Baseline      5.28s      1.77s       4.86 GB/s</a:t>
+              <a:t>Baseline      </a:t>
+            </a:r>
+            <a:r>
+              <a:rPr lang="de-DE" dirty="0" smtClean="0">
+                <a:latin typeface="Courier New"/>
+                <a:cs typeface="Courier New"/>
+              </a:rPr>
+              <a:t>3.04</a:t>
+            </a:r>
+            <a:r>
+              <a:rPr lang="de-DE" dirty="0" smtClean="0">
+                <a:latin typeface="Courier New"/>
+                <a:cs typeface="Courier New"/>
+              </a:rPr>
+              <a:t>s      1.43s       5.99 </a:t>
+            </a:r>
+            <a:r>
+              <a:rPr lang="de-DE" dirty="0">
+                <a:latin typeface="Courier New"/>
+                <a:cs typeface="Courier New"/>
+              </a:rPr>
+              <a:t>GB/s</a:t>
             </a:r>
           </a:p>
           <a:p>
@@ -13854,7 +13754,42 @@
                 <a:latin typeface="Courier New"/>
                 <a:cs typeface="Courier New"/>
               </a:rPr>
-              <a:t>        4.86s      1.30s       6.61 GB/s</a:t>
+              <a:t>        </a:t>
+            </a:r>
+            <a:r>
+              <a:rPr lang="de-DE" dirty="0" smtClean="0">
+                <a:latin typeface="Courier New"/>
+                <a:cs typeface="Courier New"/>
+              </a:rPr>
+              <a:t>2.90</a:t>
+            </a:r>
+            <a:r>
+              <a:rPr lang="de-DE" dirty="0" smtClean="0">
+                <a:latin typeface="Courier New"/>
+                <a:cs typeface="Courier New"/>
+              </a:rPr>
+              <a:t>s      </a:t>
+            </a:r>
+            <a:r>
+              <a:rPr lang="de-DE" dirty="0">
+                <a:latin typeface="Courier New"/>
+                <a:cs typeface="Courier New"/>
+              </a:rPr>
+              <a:t>1.30s       </a:t>
+            </a:r>
+            <a:r>
+              <a:rPr lang="de-DE" dirty="0" smtClean="0">
+                <a:latin typeface="Courier New"/>
+                <a:cs typeface="Courier New"/>
+              </a:rPr>
+              <a:t>6.62 </a:t>
+            </a:r>
+            <a:r>
+              <a:rPr lang="de-DE" dirty="0">
+                <a:latin typeface="Courier New"/>
+                <a:cs typeface="Courier New"/>
+              </a:rPr>
+              <a:t>GB/s</a:t>
             </a:r>
             <a:endParaRPr lang="de-DE" dirty="0" smtClean="0">
               <a:latin typeface="Courier New"/>
@@ -13933,7 +13868,28 @@
                 <a:latin typeface="Courier New"/>
                 <a:cs typeface="Courier New"/>
               </a:rPr>
-              <a:t>Baseline      6.21s      2.61s       3.29 GB/s</a:t>
+              <a:t>Baseline      </a:t>
+            </a:r>
+            <a:r>
+              <a:rPr lang="de-DE" dirty="0" smtClean="0">
+                <a:latin typeface="Courier New"/>
+                <a:cs typeface="Courier New"/>
+              </a:rPr>
+              <a:t>4.22</a:t>
+            </a:r>
+            <a:r>
+              <a:rPr lang="de-DE" dirty="0" smtClean="0">
+                <a:latin typeface="Courier New"/>
+                <a:cs typeface="Courier New"/>
+              </a:rPr>
+              <a:t>s      2.59s       3.32 </a:t>
+            </a:r>
+            <a:r>
+              <a:rPr lang="de-DE" dirty="0">
+                <a:latin typeface="Courier New"/>
+                <a:cs typeface="Courier New"/>
+              </a:rPr>
+              <a:t>GB/s</a:t>
             </a:r>
           </a:p>
           <a:p>
@@ -13952,7 +13908,21 @@
                 <a:latin typeface="Courier New"/>
                 <a:cs typeface="Courier New"/>
               </a:rPr>
-              <a:t>        6.18s      2.56s       3.36 GB/</a:t>
+              <a:t>        </a:t>
+            </a:r>
+            <a:r>
+              <a:rPr lang="de-DE" dirty="0" smtClean="0">
+                <a:latin typeface="Courier New"/>
+                <a:cs typeface="Courier New"/>
+              </a:rPr>
+              <a:t>4.18s      </a:t>
+            </a:r>
+            <a:r>
+              <a:rPr lang="de-DE" dirty="0">
+                <a:latin typeface="Courier New"/>
+                <a:cs typeface="Courier New"/>
+              </a:rPr>
+              <a:t>2.56s       3.36 GB/</a:t>
             </a:r>
             <a:r>
               <a:rPr lang="de-DE" dirty="0" smtClean="0">
@@ -14046,7 +14016,35 @@
                 <a:latin typeface="Courier New"/>
                 <a:cs typeface="Courier New"/>
               </a:rPr>
-              <a:t>Baseline      4.06s      1.44s       5.95 GB/s</a:t>
+              <a:t>Baseline      </a:t>
+            </a:r>
+            <a:r>
+              <a:rPr lang="de-DE" dirty="0" smtClean="0">
+                <a:latin typeface="Courier New"/>
+                <a:cs typeface="Courier New"/>
+              </a:rPr>
+              <a:t>3.66s      1.10s       </a:t>
+            </a:r>
+            <a:r>
+              <a:rPr lang="de-DE" dirty="0" smtClean="0">
+                <a:latin typeface="Courier New"/>
+                <a:cs typeface="Courier New"/>
+              </a:rPr>
+              <a:t>7</a:t>
+            </a:r>
+            <a:r>
+              <a:rPr lang="de-DE" dirty="0" smtClean="0">
+                <a:latin typeface="Courier New"/>
+                <a:cs typeface="Courier New"/>
+              </a:rPr>
+              <a:t>.84 </a:t>
+            </a:r>
+            <a:r>
+              <a:rPr lang="de-DE" dirty="0">
+                <a:latin typeface="Courier New"/>
+                <a:cs typeface="Courier New"/>
+              </a:rPr>
+              <a:t>GB/s</a:t>
             </a:r>
           </a:p>
           <a:p>
@@ -14072,7 +14070,42 @@
                 <a:latin typeface="Courier New"/>
                 <a:cs typeface="Courier New"/>
               </a:rPr>
-              <a:t>     2.82s      0.00s    5156.02 GB/s</a:t>
+              <a:t>     </a:t>
+            </a:r>
+            <a:r>
+              <a:rPr lang="de-DE" dirty="0" smtClean="0">
+                <a:latin typeface="Courier New"/>
+                <a:cs typeface="Courier New"/>
+              </a:rPr>
+              <a:t>2.58s      </a:t>
+            </a:r>
+            <a:r>
+              <a:rPr lang="de-DE" dirty="0">
+                <a:latin typeface="Courier New"/>
+                <a:cs typeface="Courier New"/>
+              </a:rPr>
+              <a:t>0.00s    </a:t>
+            </a:r>
+            <a:r>
+              <a:rPr lang="de-DE" dirty="0" smtClean="0">
+                <a:latin typeface="Courier New"/>
+                <a:cs typeface="Courier New"/>
+              </a:rPr>
+              <a:t>7122</a:t>
+            </a:r>
+            <a:r>
+              <a:rPr lang="de-DE" dirty="0" smtClean="0">
+                <a:latin typeface="Courier New"/>
+                <a:cs typeface="Courier New"/>
+              </a:rPr>
+              <a:t>.67 </a:t>
+            </a:r>
+            <a:r>
+              <a:rPr lang="de-DE" dirty="0">
+                <a:latin typeface="Courier New"/>
+                <a:cs typeface="Courier New"/>
+              </a:rPr>
+              <a:t>GB/s</a:t>
             </a:r>
           </a:p>
           <a:p>
@@ -14798,7 +14831,7 @@
   <p:timing>
     <p:tnLst>
       <p:par>
-        <p:cTn id="1" dur="indefinite" restart="never" nodeType="tmRoot"/>
+        <p:cTn xmlns:p14="http://schemas.microsoft.com/office/powerpoint/2010/main" id="1" dur="indefinite" restart="never" nodeType="tmRoot"/>
       </p:par>
     </p:tnLst>
   </p:timing>
@@ -15051,7 +15084,7 @@
   <p:timing>
     <p:tnLst>
       <p:par>
-        <p:cTn id="1" dur="indefinite" restart="never" nodeType="tmRoot"/>
+        <p:cTn xmlns:p14="http://schemas.microsoft.com/office/powerpoint/2010/main" id="1" dur="indefinite" restart="never" nodeType="tmRoot"/>
       </p:par>
     </p:tnLst>
   </p:timing>
@@ -15123,23 +15156,7 @@
           <a:p>
             <a:r>
               <a:rPr lang="en-US" dirty="0" smtClean="0"/>
-              <a:t>But </a:t>
-            </a:r>
-            <a:r>
-              <a:rPr lang="en-US" dirty="0" smtClean="0"/>
-              <a:t>you have </a:t>
-            </a:r>
-            <a:r>
-              <a:rPr lang="en-US" dirty="0" smtClean="0"/>
-              <a:t>to manually partition </a:t>
-            </a:r>
-            <a:r>
-              <a:rPr lang="en-US" dirty="0" smtClean="0"/>
-              <a:t>the problem and/or </a:t>
-            </a:r>
-            <a:r>
-              <a:rPr lang="en-US" dirty="0" smtClean="0"/>
-              <a:t>load balance</a:t>
+              <a:t>But you have to manually partition the problem and/or load balance</a:t>
             </a:r>
           </a:p>
           <a:p>
@@ -15153,29 +15170,13 @@
             </a:r>
             <a:r>
               <a:rPr lang="en-US" dirty="0" smtClean="0"/>
-              <a:t>, so avoid </a:t>
-            </a:r>
-            <a:r>
-              <a:rPr lang="en-US" dirty="0" smtClean="0"/>
-              <a:t>this where </a:t>
-            </a:r>
-            <a:r>
-              <a:rPr lang="en-US" dirty="0" smtClean="0"/>
-              <a:t>possible</a:t>
-            </a:r>
-          </a:p>
-          <a:p>
-            <a:r>
-              <a:rPr lang="en-US" dirty="0" smtClean="0"/>
-              <a:t>There are a couple of </a:t>
-            </a:r>
-            <a:r>
-              <a:rPr lang="en-US" dirty="0" smtClean="0"/>
-              <a:t>different ways to use </a:t>
-            </a:r>
-            <a:r>
-              <a:rPr lang="en-US" dirty="0" smtClean="0"/>
-              <a:t>multiple devices within OpenCL</a:t>
+              <a:t>, so avoid this where possible</a:t>
+            </a:r>
+          </a:p>
+          <a:p>
+            <a:r>
+              <a:rPr lang="en-US" dirty="0" smtClean="0"/>
+              <a:t>There are a couple of different ways to use multiple devices within OpenCL</a:t>
             </a:r>
             <a:endParaRPr lang="en-US" dirty="0"/>
           </a:p>
@@ -15194,7 +15195,7 @@
   <p:timing>
     <p:tnLst>
       <p:par>
-        <p:cTn id="1" dur="indefinite" restart="never" nodeType="tmRoot"/>
+        <p:cTn xmlns:p14="http://schemas.microsoft.com/office/powerpoint/2010/main" id="1" dur="indefinite" restart="never" nodeType="tmRoot"/>
       </p:par>
     </p:tnLst>
   </p:timing>
@@ -15287,11 +15288,7 @@
             <a:pPr lvl="1"/>
             <a:r>
               <a:rPr lang="en-US" dirty="0" smtClean="0"/>
-              <a:t>All memory will have to be copied via </a:t>
-            </a:r>
-            <a:r>
-              <a:rPr lang="en-US" dirty="0" smtClean="0"/>
-              <a:t>the host</a:t>
+              <a:t>All memory will have to be copied via the host</a:t>
             </a:r>
             <a:endParaRPr lang="en-US" dirty="0"/>
           </a:p>
@@ -15340,7 +15337,7 @@
   <p:timing>
     <p:tnLst>
       <p:par>
-        <p:cTn id="1" dur="indefinite" restart="never" nodeType="tmRoot"/>
+        <p:cTn xmlns:p14="http://schemas.microsoft.com/office/powerpoint/2010/main" id="1" dur="indefinite" restart="never" nodeType="tmRoot"/>
       </p:par>
     </p:tnLst>
   </p:timing>
@@ -15404,15 +15401,7 @@
           <a:p>
             <a:r>
               <a:rPr lang="en-US" dirty="0" smtClean="0"/>
-              <a:t>A context can support more than one </a:t>
-            </a:r>
-            <a:r>
-              <a:rPr lang="en-US" dirty="0" smtClean="0"/>
-              <a:t>device</a:t>
-            </a:r>
-            <a:r>
-              <a:rPr lang="en-US" dirty="0" smtClean="0"/>
-              <a:t>, although </a:t>
+              <a:t>A context can support more than one device, although </a:t>
             </a:r>
             <a:r>
               <a:rPr lang="en-US" u="sng" dirty="0" smtClean="0"/>
@@ -15473,7 +15462,7 @@
   <p:timing>
     <p:tnLst>
       <p:par>
-        <p:cTn id="1" dur="indefinite" restart="never" nodeType="tmRoot"/>
+        <p:cTn xmlns:p14="http://schemas.microsoft.com/office/powerpoint/2010/main" id="1" dur="indefinite" restart="never" nodeType="tmRoot"/>
       </p:par>
     </p:tnLst>
   </p:timing>

</xml_diff>

<commit_message>
Updates from the IWOCL 2018 tutorial
Added P100 results from the Exercise (these were interesting as they showed more difference between baseline, pinned and zero-copy)
</commit_message>
<xml_diff>
--- a/slides/advanced_part1.pptx
+++ b/slides/advanced_part1.pptx
@@ -5,7 +5,7 @@
     <p:sldMasterId id="2147483648" r:id="rId1"/>
   </p:sldMasterIdLst>
   <p:notesMasterIdLst>
-    <p:notesMasterId r:id="rId37"/>
+    <p:notesMasterId r:id="rId38"/>
   </p:notesMasterIdLst>
   <p:sldIdLst>
     <p:sldId id="257" r:id="rId2"/>
@@ -43,6 +43,7 @@
     <p:sldId id="291" r:id="rId34"/>
     <p:sldId id="279" r:id="rId35"/>
     <p:sldId id="285" r:id="rId36"/>
+    <p:sldId id="294" r:id="rId37"/>
   </p:sldIdLst>
   <p:sldSz cx="9144000" cy="6858000" type="screen4x3"/>
   <p:notesSz cx="6858000" cy="9144000"/>
@@ -242,7 +243,7 @@
           <a:p>
             <a:fld id="{C020D4C0-2770-3946-ABDD-0C7492C2C34D}" type="datetimeFigureOut">
               <a:rPr lang="en-US" smtClean="0"/>
-              <a:t>5/9/18</a:t>
+              <a:t>5/14/18</a:t>
             </a:fld>
             <a:endParaRPr lang="en-GB"/>
           </a:p>
@@ -1196,7 +1197,7 @@
           <a:p>
             <a:fld id="{8959E172-2558-6049-8DA8-C86E1F6924DD}" type="datetimeFigureOut">
               <a:rPr lang="en-US" smtClean="0"/>
-              <a:t>5/9/18</a:t>
+              <a:t>5/14/18</a:t>
             </a:fld>
             <a:endParaRPr lang="en-GB"/>
           </a:p>
@@ -1364,7 +1365,7 @@
           <a:p>
             <a:fld id="{8959E172-2558-6049-8DA8-C86E1F6924DD}" type="datetimeFigureOut">
               <a:rPr lang="en-US" smtClean="0"/>
-              <a:t>5/9/18</a:t>
+              <a:t>5/14/18</a:t>
             </a:fld>
             <a:endParaRPr lang="en-GB"/>
           </a:p>
@@ -1542,7 +1543,7 @@
           <a:p>
             <a:fld id="{8959E172-2558-6049-8DA8-C86E1F6924DD}" type="datetimeFigureOut">
               <a:rPr lang="en-US" smtClean="0"/>
-              <a:t>5/9/18</a:t>
+              <a:t>5/14/18</a:t>
             </a:fld>
             <a:endParaRPr lang="en-GB"/>
           </a:p>
@@ -1710,7 +1711,7 @@
           <a:p>
             <a:fld id="{8959E172-2558-6049-8DA8-C86E1F6924DD}" type="datetimeFigureOut">
               <a:rPr lang="en-US" smtClean="0"/>
-              <a:t>5/9/18</a:t>
+              <a:t>5/14/18</a:t>
             </a:fld>
             <a:endParaRPr lang="en-GB"/>
           </a:p>
@@ -1955,7 +1956,7 @@
           <a:p>
             <a:fld id="{8959E172-2558-6049-8DA8-C86E1F6924DD}" type="datetimeFigureOut">
               <a:rPr lang="en-US" smtClean="0"/>
-              <a:t>5/9/18</a:t>
+              <a:t>5/14/18</a:t>
             </a:fld>
             <a:endParaRPr lang="en-GB"/>
           </a:p>
@@ -2240,7 +2241,7 @@
           <a:p>
             <a:fld id="{8959E172-2558-6049-8DA8-C86E1F6924DD}" type="datetimeFigureOut">
               <a:rPr lang="en-US" smtClean="0"/>
-              <a:t>5/9/18</a:t>
+              <a:t>5/14/18</a:t>
             </a:fld>
             <a:endParaRPr lang="en-GB"/>
           </a:p>
@@ -2659,7 +2660,7 @@
           <a:p>
             <a:fld id="{8959E172-2558-6049-8DA8-C86E1F6924DD}" type="datetimeFigureOut">
               <a:rPr lang="en-US" smtClean="0"/>
-              <a:t>5/9/18</a:t>
+              <a:t>5/14/18</a:t>
             </a:fld>
             <a:endParaRPr lang="en-GB"/>
           </a:p>
@@ -2776,7 +2777,7 @@
           <a:p>
             <a:fld id="{8959E172-2558-6049-8DA8-C86E1F6924DD}" type="datetimeFigureOut">
               <a:rPr lang="en-US" smtClean="0"/>
-              <a:t>5/9/18</a:t>
+              <a:t>5/14/18</a:t>
             </a:fld>
             <a:endParaRPr lang="en-GB"/>
           </a:p>
@@ -2871,7 +2872,7 @@
           <a:p>
             <a:fld id="{8959E172-2558-6049-8DA8-C86E1F6924DD}" type="datetimeFigureOut">
               <a:rPr lang="en-US" smtClean="0"/>
-              <a:t>5/9/18</a:t>
+              <a:t>5/14/18</a:t>
             </a:fld>
             <a:endParaRPr lang="en-GB"/>
           </a:p>
@@ -3146,7 +3147,7 @@
           <a:p>
             <a:fld id="{8959E172-2558-6049-8DA8-C86E1F6924DD}" type="datetimeFigureOut">
               <a:rPr lang="en-US" smtClean="0"/>
-              <a:t>5/9/18</a:t>
+              <a:t>5/14/18</a:t>
             </a:fld>
             <a:endParaRPr lang="en-GB"/>
           </a:p>
@@ -3398,7 +3399,7 @@
           <a:p>
             <a:fld id="{8959E172-2558-6049-8DA8-C86E1F6924DD}" type="datetimeFigureOut">
               <a:rPr lang="en-US" smtClean="0"/>
-              <a:t>5/9/18</a:t>
+              <a:t>5/14/18</a:t>
             </a:fld>
             <a:endParaRPr lang="en-GB"/>
           </a:p>
@@ -3609,7 +3610,7 @@
           <a:p>
             <a:fld id="{8959E172-2558-6049-8DA8-C86E1F6924DD}" type="datetimeFigureOut">
               <a:rPr lang="en-US" smtClean="0"/>
-              <a:t>5/9/18</a:t>
+              <a:t>5/14/18</a:t>
             </a:fld>
             <a:endParaRPr lang="en-GB"/>
           </a:p>
@@ -13776,6 +13777,238 @@
     <p:extLst>
       <p:ext uri="{BB962C8B-B14F-4D97-AF65-F5344CB8AC3E}">
         <p14:creationId xmlns:p14="http://schemas.microsoft.com/office/powerpoint/2010/main" val="3716420950"/>
+      </p:ext>
+    </p:extLst>
+  </p:cSld>
+  <p:clrMapOvr>
+    <a:masterClrMapping/>
+  </p:clrMapOvr>
+</p:sld>
+</file>
+
+<file path=ppt/slides/slide36.xml><?xml version="1.0" encoding="utf-8"?>
+<p:sld xmlns:a="http://schemas.openxmlformats.org/drawingml/2006/main" xmlns:r="http://schemas.openxmlformats.org/officeDocument/2006/relationships" xmlns:p="http://schemas.openxmlformats.org/presentationml/2006/main">
+  <p:cSld>
+    <p:spTree>
+      <p:nvGrpSpPr>
+        <p:cNvPr id="1" name=""/>
+        <p:cNvGrpSpPr/>
+        <p:nvPr/>
+      </p:nvGrpSpPr>
+      <p:grpSpPr>
+        <a:xfrm>
+          <a:off x="0" y="0"/>
+          <a:ext cx="0" cy="0"/>
+          <a:chOff x="0" y="0"/>
+          <a:chExt cx="0" cy="0"/>
+        </a:xfrm>
+      </p:grpSpPr>
+      <p:sp>
+        <p:nvSpPr>
+          <p:cNvPr id="2" name="Title 1"/>
+          <p:cNvSpPr>
+            <a:spLocks noGrp="1"/>
+          </p:cNvSpPr>
+          <p:nvPr>
+            <p:ph type="title"/>
+          </p:nvPr>
+        </p:nvSpPr>
+        <p:spPr>
+          <a:xfrm>
+            <a:off x="457200" y="23016"/>
+            <a:ext cx="8229600" cy="839663"/>
+          </a:xfrm>
+        </p:spPr>
+        <p:txBody>
+          <a:bodyPr>
+            <a:normAutofit/>
+          </a:bodyPr>
+          <a:lstStyle/>
+          <a:p>
+            <a:r>
+              <a:rPr lang="en-GB" dirty="0"/>
+              <a:t>Exercise results</a:t>
+            </a:r>
+          </a:p>
+        </p:txBody>
+      </p:sp>
+      <p:sp>
+        <p:nvSpPr>
+          <p:cNvPr id="3" name="Content Placeholder 2"/>
+          <p:cNvSpPr>
+            <a:spLocks noGrp="1"/>
+          </p:cNvSpPr>
+          <p:nvPr>
+            <p:ph idx="1"/>
+          </p:nvPr>
+        </p:nvSpPr>
+        <p:spPr>
+          <a:xfrm>
+            <a:off x="457200" y="1042404"/>
+            <a:ext cx="8229600" cy="5607415"/>
+          </a:xfrm>
+        </p:spPr>
+        <p:txBody>
+          <a:bodyPr>
+            <a:normAutofit/>
+          </a:bodyPr>
+          <a:lstStyle/>
+          <a:p>
+            <a:pPr marL="0" indent="0">
+              <a:buNone/>
+            </a:pPr>
+            <a:r>
+              <a:rPr lang="en-GB" sz="2200" dirty="0">
+                <a:latin typeface="Courier New"/>
+                <a:cs typeface="Courier New"/>
+              </a:rPr>
+              <a:t>Using OpenCL device: Tesla P100-PCIE-16GB</a:t>
+            </a:r>
+          </a:p>
+          <a:p>
+            <a:pPr marL="0" indent="0">
+              <a:buNone/>
+            </a:pPr>
+            <a:r>
+              <a:rPr lang="en-GB" sz="2200" dirty="0">
+                <a:latin typeface="Courier New"/>
+                <a:cs typeface="Courier New"/>
+              </a:rPr>
+              <a:t>Buffer size = 256 MB</a:t>
+            </a:r>
+          </a:p>
+          <a:p>
+            <a:pPr marL="0" indent="0">
+              <a:buNone/>
+            </a:pPr>
+            <a:r>
+              <a:rPr lang="en-GB" sz="2200" dirty="0">
+                <a:latin typeface="Courier New"/>
+                <a:cs typeface="Courier New"/>
+              </a:rPr>
+              <a:t>Iterations  = 32</a:t>
+            </a:r>
+          </a:p>
+          <a:p>
+            <a:pPr marL="0" indent="0">
+              <a:buNone/>
+            </a:pPr>
+            <a:r>
+              <a:rPr lang="en-GB" sz="2200" dirty="0">
+                <a:latin typeface="Courier New"/>
+                <a:cs typeface="Courier New"/>
+              </a:rPr>
+              <a:t>Device does not have host-unified memory</a:t>
+            </a:r>
+          </a:p>
+          <a:p>
+            <a:pPr marL="0" indent="0">
+              <a:buNone/>
+            </a:pPr>
+            <a:endParaRPr lang="en-GB" sz="2200" dirty="0">
+              <a:latin typeface="Courier New"/>
+              <a:cs typeface="Courier New"/>
+            </a:endParaRPr>
+          </a:p>
+          <a:p>
+            <a:pPr marL="0" indent="0">
+              <a:buNone/>
+            </a:pPr>
+            <a:r>
+              <a:rPr lang="en-GB" sz="2200" dirty="0">
+                <a:latin typeface="Courier New"/>
+                <a:cs typeface="Courier New"/>
+              </a:rPr>
+              <a:t>Type          Total   Transfer       Bandwidth</a:t>
+            </a:r>
+          </a:p>
+          <a:p>
+            <a:pPr marL="0" indent="0">
+              <a:buNone/>
+            </a:pPr>
+            <a:r>
+              <a:rPr lang="en-GB" sz="2200" dirty="0">
+                <a:latin typeface="Courier New"/>
+                <a:cs typeface="Courier New"/>
+              </a:rPr>
+              <a:t>----------------------------------------------</a:t>
+            </a:r>
+          </a:p>
+          <a:p>
+            <a:pPr marL="0" indent="0">
+              <a:buNone/>
+            </a:pPr>
+            <a:r>
+              <a:rPr lang="en-GB" sz="2200" dirty="0">
+                <a:latin typeface="Courier New"/>
+                <a:cs typeface="Courier New"/>
+              </a:rPr>
+              <a:t>Baseline      2.69s      0.87s       9.85 GB/s</a:t>
+            </a:r>
+          </a:p>
+          <a:p>
+            <a:pPr marL="0" indent="0">
+              <a:buNone/>
+            </a:pPr>
+            <a:r>
+              <a:rPr lang="en-GB" sz="2200" dirty="0">
+                <a:latin typeface="Courier New"/>
+                <a:cs typeface="Courier New"/>
+              </a:rPr>
+              <a:t>Pinned        2.48s      0.65s      13.19 GB/s</a:t>
+            </a:r>
+          </a:p>
+          <a:p>
+            <a:pPr marL="0" indent="0">
+              <a:buNone/>
+            </a:pPr>
+            <a:r>
+              <a:rPr lang="en-GB" sz="2200" dirty="0">
+                <a:latin typeface="Courier New"/>
+                <a:cs typeface="Courier New"/>
+              </a:rPr>
+              <a:t>Zero-Copy     2.64s      0.78s      11.07 GB/s   (NVIDIA recommend </a:t>
+            </a:r>
+            <a:r>
+              <a:rPr lang="en-GB" sz="2200">
+                <a:latin typeface="Courier New"/>
+                <a:cs typeface="Courier New"/>
+              </a:rPr>
+              <a:t>the zero-copy </a:t>
+            </a:r>
+            <a:r>
+              <a:rPr lang="en-GB" sz="2200" dirty="0">
+                <a:latin typeface="Courier New"/>
+                <a:cs typeface="Courier New"/>
+              </a:rPr>
+              <a:t>approach)</a:t>
+            </a:r>
+            <a:endParaRPr lang="de-DE" sz="2200" dirty="0"/>
+          </a:p>
+          <a:p>
+            <a:pPr marL="0" indent="0">
+              <a:buNone/>
+            </a:pPr>
+            <a:endParaRPr lang="de-DE" dirty="0"/>
+          </a:p>
+          <a:p>
+            <a:pPr marL="0" indent="0">
+              <a:buNone/>
+            </a:pPr>
+            <a:endParaRPr lang="de-DE" dirty="0"/>
+          </a:p>
+          <a:p>
+            <a:pPr marL="0" indent="0">
+              <a:buNone/>
+            </a:pPr>
+            <a:endParaRPr lang="en-GB" dirty="0"/>
+          </a:p>
+        </p:txBody>
+      </p:sp>
+    </p:spTree>
+    <p:extLst>
+      <p:ext uri="{BB962C8B-B14F-4D97-AF65-F5344CB8AC3E}">
+        <p14:creationId xmlns:p14="http://schemas.microsoft.com/office/powerpoint/2010/main" val="1680660440"/>
       </p:ext>
     </p:extLst>
   </p:cSld>

</xml_diff>

<commit_message>
Revert "Updates from the IWOCL 2018 tutorial"
This reverts commit 2dbde844c3b39e456ce826561dae3722c521cc5e.
</commit_message>
<xml_diff>
--- a/slides/advanced_part1.pptx
+++ b/slides/advanced_part1.pptx
@@ -5,7 +5,7 @@
     <p:sldMasterId id="2147483648" r:id="rId1"/>
   </p:sldMasterIdLst>
   <p:notesMasterIdLst>
-    <p:notesMasterId r:id="rId38"/>
+    <p:notesMasterId r:id="rId37"/>
   </p:notesMasterIdLst>
   <p:sldIdLst>
     <p:sldId id="257" r:id="rId2"/>
@@ -43,7 +43,6 @@
     <p:sldId id="291" r:id="rId34"/>
     <p:sldId id="279" r:id="rId35"/>
     <p:sldId id="285" r:id="rId36"/>
-    <p:sldId id="294" r:id="rId37"/>
   </p:sldIdLst>
   <p:sldSz cx="9144000" cy="6858000" type="screen4x3"/>
   <p:notesSz cx="6858000" cy="9144000"/>
@@ -243,7 +242,7 @@
           <a:p>
             <a:fld id="{C020D4C0-2770-3946-ABDD-0C7492C2C34D}" type="datetimeFigureOut">
               <a:rPr lang="en-US" smtClean="0"/>
-              <a:t>5/14/18</a:t>
+              <a:t>5/9/18</a:t>
             </a:fld>
             <a:endParaRPr lang="en-GB"/>
           </a:p>
@@ -1197,7 +1196,7 @@
           <a:p>
             <a:fld id="{8959E172-2558-6049-8DA8-C86E1F6924DD}" type="datetimeFigureOut">
               <a:rPr lang="en-US" smtClean="0"/>
-              <a:t>5/14/18</a:t>
+              <a:t>5/9/18</a:t>
             </a:fld>
             <a:endParaRPr lang="en-GB"/>
           </a:p>
@@ -1365,7 +1364,7 @@
           <a:p>
             <a:fld id="{8959E172-2558-6049-8DA8-C86E1F6924DD}" type="datetimeFigureOut">
               <a:rPr lang="en-US" smtClean="0"/>
-              <a:t>5/14/18</a:t>
+              <a:t>5/9/18</a:t>
             </a:fld>
             <a:endParaRPr lang="en-GB"/>
           </a:p>
@@ -1543,7 +1542,7 @@
           <a:p>
             <a:fld id="{8959E172-2558-6049-8DA8-C86E1F6924DD}" type="datetimeFigureOut">
               <a:rPr lang="en-US" smtClean="0"/>
-              <a:t>5/14/18</a:t>
+              <a:t>5/9/18</a:t>
             </a:fld>
             <a:endParaRPr lang="en-GB"/>
           </a:p>
@@ -1711,7 +1710,7 @@
           <a:p>
             <a:fld id="{8959E172-2558-6049-8DA8-C86E1F6924DD}" type="datetimeFigureOut">
               <a:rPr lang="en-US" smtClean="0"/>
-              <a:t>5/14/18</a:t>
+              <a:t>5/9/18</a:t>
             </a:fld>
             <a:endParaRPr lang="en-GB"/>
           </a:p>
@@ -1956,7 +1955,7 @@
           <a:p>
             <a:fld id="{8959E172-2558-6049-8DA8-C86E1F6924DD}" type="datetimeFigureOut">
               <a:rPr lang="en-US" smtClean="0"/>
-              <a:t>5/14/18</a:t>
+              <a:t>5/9/18</a:t>
             </a:fld>
             <a:endParaRPr lang="en-GB"/>
           </a:p>
@@ -2241,7 +2240,7 @@
           <a:p>
             <a:fld id="{8959E172-2558-6049-8DA8-C86E1F6924DD}" type="datetimeFigureOut">
               <a:rPr lang="en-US" smtClean="0"/>
-              <a:t>5/14/18</a:t>
+              <a:t>5/9/18</a:t>
             </a:fld>
             <a:endParaRPr lang="en-GB"/>
           </a:p>
@@ -2660,7 +2659,7 @@
           <a:p>
             <a:fld id="{8959E172-2558-6049-8DA8-C86E1F6924DD}" type="datetimeFigureOut">
               <a:rPr lang="en-US" smtClean="0"/>
-              <a:t>5/14/18</a:t>
+              <a:t>5/9/18</a:t>
             </a:fld>
             <a:endParaRPr lang="en-GB"/>
           </a:p>
@@ -2777,7 +2776,7 @@
           <a:p>
             <a:fld id="{8959E172-2558-6049-8DA8-C86E1F6924DD}" type="datetimeFigureOut">
               <a:rPr lang="en-US" smtClean="0"/>
-              <a:t>5/14/18</a:t>
+              <a:t>5/9/18</a:t>
             </a:fld>
             <a:endParaRPr lang="en-GB"/>
           </a:p>
@@ -2872,7 +2871,7 @@
           <a:p>
             <a:fld id="{8959E172-2558-6049-8DA8-C86E1F6924DD}" type="datetimeFigureOut">
               <a:rPr lang="en-US" smtClean="0"/>
-              <a:t>5/14/18</a:t>
+              <a:t>5/9/18</a:t>
             </a:fld>
             <a:endParaRPr lang="en-GB"/>
           </a:p>
@@ -3147,7 +3146,7 @@
           <a:p>
             <a:fld id="{8959E172-2558-6049-8DA8-C86E1F6924DD}" type="datetimeFigureOut">
               <a:rPr lang="en-US" smtClean="0"/>
-              <a:t>5/14/18</a:t>
+              <a:t>5/9/18</a:t>
             </a:fld>
             <a:endParaRPr lang="en-GB"/>
           </a:p>
@@ -3399,7 +3398,7 @@
           <a:p>
             <a:fld id="{8959E172-2558-6049-8DA8-C86E1F6924DD}" type="datetimeFigureOut">
               <a:rPr lang="en-US" smtClean="0"/>
-              <a:t>5/14/18</a:t>
+              <a:t>5/9/18</a:t>
             </a:fld>
             <a:endParaRPr lang="en-GB"/>
           </a:p>
@@ -3610,7 +3609,7 @@
           <a:p>
             <a:fld id="{8959E172-2558-6049-8DA8-C86E1F6924DD}" type="datetimeFigureOut">
               <a:rPr lang="en-US" smtClean="0"/>
-              <a:t>5/14/18</a:t>
+              <a:t>5/9/18</a:t>
             </a:fld>
             <a:endParaRPr lang="en-GB"/>
           </a:p>
@@ -13777,238 +13776,6 @@
     <p:extLst>
       <p:ext uri="{BB962C8B-B14F-4D97-AF65-F5344CB8AC3E}">
         <p14:creationId xmlns:p14="http://schemas.microsoft.com/office/powerpoint/2010/main" val="3716420950"/>
-      </p:ext>
-    </p:extLst>
-  </p:cSld>
-  <p:clrMapOvr>
-    <a:masterClrMapping/>
-  </p:clrMapOvr>
-</p:sld>
-</file>
-
-<file path=ppt/slides/slide36.xml><?xml version="1.0" encoding="utf-8"?>
-<p:sld xmlns:a="http://schemas.openxmlformats.org/drawingml/2006/main" xmlns:r="http://schemas.openxmlformats.org/officeDocument/2006/relationships" xmlns:p="http://schemas.openxmlformats.org/presentationml/2006/main">
-  <p:cSld>
-    <p:spTree>
-      <p:nvGrpSpPr>
-        <p:cNvPr id="1" name=""/>
-        <p:cNvGrpSpPr/>
-        <p:nvPr/>
-      </p:nvGrpSpPr>
-      <p:grpSpPr>
-        <a:xfrm>
-          <a:off x="0" y="0"/>
-          <a:ext cx="0" cy="0"/>
-          <a:chOff x="0" y="0"/>
-          <a:chExt cx="0" cy="0"/>
-        </a:xfrm>
-      </p:grpSpPr>
-      <p:sp>
-        <p:nvSpPr>
-          <p:cNvPr id="2" name="Title 1"/>
-          <p:cNvSpPr>
-            <a:spLocks noGrp="1"/>
-          </p:cNvSpPr>
-          <p:nvPr>
-            <p:ph type="title"/>
-          </p:nvPr>
-        </p:nvSpPr>
-        <p:spPr>
-          <a:xfrm>
-            <a:off x="457200" y="23016"/>
-            <a:ext cx="8229600" cy="839663"/>
-          </a:xfrm>
-        </p:spPr>
-        <p:txBody>
-          <a:bodyPr>
-            <a:normAutofit/>
-          </a:bodyPr>
-          <a:lstStyle/>
-          <a:p>
-            <a:r>
-              <a:rPr lang="en-GB" dirty="0"/>
-              <a:t>Exercise results</a:t>
-            </a:r>
-          </a:p>
-        </p:txBody>
-      </p:sp>
-      <p:sp>
-        <p:nvSpPr>
-          <p:cNvPr id="3" name="Content Placeholder 2"/>
-          <p:cNvSpPr>
-            <a:spLocks noGrp="1"/>
-          </p:cNvSpPr>
-          <p:nvPr>
-            <p:ph idx="1"/>
-          </p:nvPr>
-        </p:nvSpPr>
-        <p:spPr>
-          <a:xfrm>
-            <a:off x="457200" y="1042404"/>
-            <a:ext cx="8229600" cy="5607415"/>
-          </a:xfrm>
-        </p:spPr>
-        <p:txBody>
-          <a:bodyPr>
-            <a:normAutofit/>
-          </a:bodyPr>
-          <a:lstStyle/>
-          <a:p>
-            <a:pPr marL="0" indent="0">
-              <a:buNone/>
-            </a:pPr>
-            <a:r>
-              <a:rPr lang="en-GB" sz="2200" dirty="0">
-                <a:latin typeface="Courier New"/>
-                <a:cs typeface="Courier New"/>
-              </a:rPr>
-              <a:t>Using OpenCL device: Tesla P100-PCIE-16GB</a:t>
-            </a:r>
-          </a:p>
-          <a:p>
-            <a:pPr marL="0" indent="0">
-              <a:buNone/>
-            </a:pPr>
-            <a:r>
-              <a:rPr lang="en-GB" sz="2200" dirty="0">
-                <a:latin typeface="Courier New"/>
-                <a:cs typeface="Courier New"/>
-              </a:rPr>
-              <a:t>Buffer size = 256 MB</a:t>
-            </a:r>
-          </a:p>
-          <a:p>
-            <a:pPr marL="0" indent="0">
-              <a:buNone/>
-            </a:pPr>
-            <a:r>
-              <a:rPr lang="en-GB" sz="2200" dirty="0">
-                <a:latin typeface="Courier New"/>
-                <a:cs typeface="Courier New"/>
-              </a:rPr>
-              <a:t>Iterations  = 32</a:t>
-            </a:r>
-          </a:p>
-          <a:p>
-            <a:pPr marL="0" indent="0">
-              <a:buNone/>
-            </a:pPr>
-            <a:r>
-              <a:rPr lang="en-GB" sz="2200" dirty="0">
-                <a:latin typeface="Courier New"/>
-                <a:cs typeface="Courier New"/>
-              </a:rPr>
-              <a:t>Device does not have host-unified memory</a:t>
-            </a:r>
-          </a:p>
-          <a:p>
-            <a:pPr marL="0" indent="0">
-              <a:buNone/>
-            </a:pPr>
-            <a:endParaRPr lang="en-GB" sz="2200" dirty="0">
-              <a:latin typeface="Courier New"/>
-              <a:cs typeface="Courier New"/>
-            </a:endParaRPr>
-          </a:p>
-          <a:p>
-            <a:pPr marL="0" indent="0">
-              <a:buNone/>
-            </a:pPr>
-            <a:r>
-              <a:rPr lang="en-GB" sz="2200" dirty="0">
-                <a:latin typeface="Courier New"/>
-                <a:cs typeface="Courier New"/>
-              </a:rPr>
-              <a:t>Type          Total   Transfer       Bandwidth</a:t>
-            </a:r>
-          </a:p>
-          <a:p>
-            <a:pPr marL="0" indent="0">
-              <a:buNone/>
-            </a:pPr>
-            <a:r>
-              <a:rPr lang="en-GB" sz="2200" dirty="0">
-                <a:latin typeface="Courier New"/>
-                <a:cs typeface="Courier New"/>
-              </a:rPr>
-              <a:t>----------------------------------------------</a:t>
-            </a:r>
-          </a:p>
-          <a:p>
-            <a:pPr marL="0" indent="0">
-              <a:buNone/>
-            </a:pPr>
-            <a:r>
-              <a:rPr lang="en-GB" sz="2200" dirty="0">
-                <a:latin typeface="Courier New"/>
-                <a:cs typeface="Courier New"/>
-              </a:rPr>
-              <a:t>Baseline      2.69s      0.87s       9.85 GB/s</a:t>
-            </a:r>
-          </a:p>
-          <a:p>
-            <a:pPr marL="0" indent="0">
-              <a:buNone/>
-            </a:pPr>
-            <a:r>
-              <a:rPr lang="en-GB" sz="2200" dirty="0">
-                <a:latin typeface="Courier New"/>
-                <a:cs typeface="Courier New"/>
-              </a:rPr>
-              <a:t>Pinned        2.48s      0.65s      13.19 GB/s</a:t>
-            </a:r>
-          </a:p>
-          <a:p>
-            <a:pPr marL="0" indent="0">
-              <a:buNone/>
-            </a:pPr>
-            <a:r>
-              <a:rPr lang="en-GB" sz="2200" dirty="0">
-                <a:latin typeface="Courier New"/>
-                <a:cs typeface="Courier New"/>
-              </a:rPr>
-              <a:t>Zero-Copy     2.64s      0.78s      11.07 GB/s   (NVIDIA recommend </a:t>
-            </a:r>
-            <a:r>
-              <a:rPr lang="en-GB" sz="2200">
-                <a:latin typeface="Courier New"/>
-                <a:cs typeface="Courier New"/>
-              </a:rPr>
-              <a:t>the zero-copy </a:t>
-            </a:r>
-            <a:r>
-              <a:rPr lang="en-GB" sz="2200" dirty="0">
-                <a:latin typeface="Courier New"/>
-                <a:cs typeface="Courier New"/>
-              </a:rPr>
-              <a:t>approach)</a:t>
-            </a:r>
-            <a:endParaRPr lang="de-DE" sz="2200" dirty="0"/>
-          </a:p>
-          <a:p>
-            <a:pPr marL="0" indent="0">
-              <a:buNone/>
-            </a:pPr>
-            <a:endParaRPr lang="de-DE" dirty="0"/>
-          </a:p>
-          <a:p>
-            <a:pPr marL="0" indent="0">
-              <a:buNone/>
-            </a:pPr>
-            <a:endParaRPr lang="de-DE" dirty="0"/>
-          </a:p>
-          <a:p>
-            <a:pPr marL="0" indent="0">
-              <a:buNone/>
-            </a:pPr>
-            <a:endParaRPr lang="en-GB" dirty="0"/>
-          </a:p>
-        </p:txBody>
-      </p:sp>
-    </p:spTree>
-    <p:extLst>
-      <p:ext uri="{BB962C8B-B14F-4D97-AF65-F5344CB8AC3E}">
-        <p14:creationId xmlns:p14="http://schemas.microsoft.com/office/powerpoint/2010/main" val="1680660440"/>
       </p:ext>
     </p:extLst>
   </p:cSld>

</xml_diff>

<commit_message>
Added P100 bandwidth numbers
Post IWOCL 2018, numbers from BCp4
</commit_message>
<xml_diff>
--- a/slides/advanced_part1.pptx
+++ b/slides/advanced_part1.pptx
@@ -5,7 +5,7 @@
     <p:sldMasterId id="2147483648" r:id="rId1"/>
   </p:sldMasterIdLst>
   <p:notesMasterIdLst>
-    <p:notesMasterId r:id="rId37"/>
+    <p:notesMasterId r:id="rId38"/>
   </p:notesMasterIdLst>
   <p:sldIdLst>
     <p:sldId id="257" r:id="rId2"/>
@@ -43,6 +43,7 @@
     <p:sldId id="291" r:id="rId34"/>
     <p:sldId id="279" r:id="rId35"/>
     <p:sldId id="285" r:id="rId36"/>
+    <p:sldId id="293" r:id="rId37"/>
   </p:sldIdLst>
   <p:sldSz cx="9144000" cy="6858000" type="screen4x3"/>
   <p:notesSz cx="6858000" cy="9144000"/>
@@ -242,7 +243,7 @@
           <a:p>
             <a:fld id="{C020D4C0-2770-3946-ABDD-0C7492C2C34D}" type="datetimeFigureOut">
               <a:rPr lang="en-US" smtClean="0"/>
-              <a:t>5/9/18</a:t>
+              <a:t>5/14/18</a:t>
             </a:fld>
             <a:endParaRPr lang="en-GB"/>
           </a:p>
@@ -1196,7 +1197,7 @@
           <a:p>
             <a:fld id="{8959E172-2558-6049-8DA8-C86E1F6924DD}" type="datetimeFigureOut">
               <a:rPr lang="en-US" smtClean="0"/>
-              <a:t>5/9/18</a:t>
+              <a:t>5/14/18</a:t>
             </a:fld>
             <a:endParaRPr lang="en-GB"/>
           </a:p>
@@ -1364,7 +1365,7 @@
           <a:p>
             <a:fld id="{8959E172-2558-6049-8DA8-C86E1F6924DD}" type="datetimeFigureOut">
               <a:rPr lang="en-US" smtClean="0"/>
-              <a:t>5/9/18</a:t>
+              <a:t>5/14/18</a:t>
             </a:fld>
             <a:endParaRPr lang="en-GB"/>
           </a:p>
@@ -1542,7 +1543,7 @@
           <a:p>
             <a:fld id="{8959E172-2558-6049-8DA8-C86E1F6924DD}" type="datetimeFigureOut">
               <a:rPr lang="en-US" smtClean="0"/>
-              <a:t>5/9/18</a:t>
+              <a:t>5/14/18</a:t>
             </a:fld>
             <a:endParaRPr lang="en-GB"/>
           </a:p>
@@ -1710,7 +1711,7 @@
           <a:p>
             <a:fld id="{8959E172-2558-6049-8DA8-C86E1F6924DD}" type="datetimeFigureOut">
               <a:rPr lang="en-US" smtClean="0"/>
-              <a:t>5/9/18</a:t>
+              <a:t>5/14/18</a:t>
             </a:fld>
             <a:endParaRPr lang="en-GB"/>
           </a:p>
@@ -1955,7 +1956,7 @@
           <a:p>
             <a:fld id="{8959E172-2558-6049-8DA8-C86E1F6924DD}" type="datetimeFigureOut">
               <a:rPr lang="en-US" smtClean="0"/>
-              <a:t>5/9/18</a:t>
+              <a:t>5/14/18</a:t>
             </a:fld>
             <a:endParaRPr lang="en-GB"/>
           </a:p>
@@ -2240,7 +2241,7 @@
           <a:p>
             <a:fld id="{8959E172-2558-6049-8DA8-C86E1F6924DD}" type="datetimeFigureOut">
               <a:rPr lang="en-US" smtClean="0"/>
-              <a:t>5/9/18</a:t>
+              <a:t>5/14/18</a:t>
             </a:fld>
             <a:endParaRPr lang="en-GB"/>
           </a:p>
@@ -2659,7 +2660,7 @@
           <a:p>
             <a:fld id="{8959E172-2558-6049-8DA8-C86E1F6924DD}" type="datetimeFigureOut">
               <a:rPr lang="en-US" smtClean="0"/>
-              <a:t>5/9/18</a:t>
+              <a:t>5/14/18</a:t>
             </a:fld>
             <a:endParaRPr lang="en-GB"/>
           </a:p>
@@ -2776,7 +2777,7 @@
           <a:p>
             <a:fld id="{8959E172-2558-6049-8DA8-C86E1F6924DD}" type="datetimeFigureOut">
               <a:rPr lang="en-US" smtClean="0"/>
-              <a:t>5/9/18</a:t>
+              <a:t>5/14/18</a:t>
             </a:fld>
             <a:endParaRPr lang="en-GB"/>
           </a:p>
@@ -2871,7 +2872,7 @@
           <a:p>
             <a:fld id="{8959E172-2558-6049-8DA8-C86E1F6924DD}" type="datetimeFigureOut">
               <a:rPr lang="en-US" smtClean="0"/>
-              <a:t>5/9/18</a:t>
+              <a:t>5/14/18</a:t>
             </a:fld>
             <a:endParaRPr lang="en-GB"/>
           </a:p>
@@ -3146,7 +3147,7 @@
           <a:p>
             <a:fld id="{8959E172-2558-6049-8DA8-C86E1F6924DD}" type="datetimeFigureOut">
               <a:rPr lang="en-US" smtClean="0"/>
-              <a:t>5/9/18</a:t>
+              <a:t>5/14/18</a:t>
             </a:fld>
             <a:endParaRPr lang="en-GB"/>
           </a:p>
@@ -3398,7 +3399,7 @@
           <a:p>
             <a:fld id="{8959E172-2558-6049-8DA8-C86E1F6924DD}" type="datetimeFigureOut">
               <a:rPr lang="en-US" smtClean="0"/>
-              <a:t>5/9/18</a:t>
+              <a:t>5/14/18</a:t>
             </a:fld>
             <a:endParaRPr lang="en-GB"/>
           </a:p>
@@ -3609,7 +3610,7 @@
           <a:p>
             <a:fld id="{8959E172-2558-6049-8DA8-C86E1F6924DD}" type="datetimeFigureOut">
               <a:rPr lang="en-US" smtClean="0"/>
-              <a:t>5/9/18</a:t>
+              <a:t>5/14/18</a:t>
             </a:fld>
             <a:endParaRPr lang="en-GB"/>
           </a:p>
@@ -13776,6 +13777,213 @@
     <p:extLst>
       <p:ext uri="{BB962C8B-B14F-4D97-AF65-F5344CB8AC3E}">
         <p14:creationId xmlns:p14="http://schemas.microsoft.com/office/powerpoint/2010/main" val="3716420950"/>
+      </p:ext>
+    </p:extLst>
+  </p:cSld>
+  <p:clrMapOvr>
+    <a:masterClrMapping/>
+  </p:clrMapOvr>
+</p:sld>
+</file>
+
+<file path=ppt/slides/slide36.xml><?xml version="1.0" encoding="utf-8"?>
+<p:sld xmlns:a="http://schemas.openxmlformats.org/drawingml/2006/main" xmlns:r="http://schemas.openxmlformats.org/officeDocument/2006/relationships" xmlns:p="http://schemas.openxmlformats.org/presentationml/2006/main">
+  <p:cSld>
+    <p:spTree>
+      <p:nvGrpSpPr>
+        <p:cNvPr id="1" name=""/>
+        <p:cNvGrpSpPr/>
+        <p:nvPr/>
+      </p:nvGrpSpPr>
+      <p:grpSpPr>
+        <a:xfrm>
+          <a:off x="0" y="0"/>
+          <a:ext cx="0" cy="0"/>
+          <a:chOff x="0" y="0"/>
+          <a:chExt cx="0" cy="0"/>
+        </a:xfrm>
+      </p:grpSpPr>
+      <p:sp>
+        <p:nvSpPr>
+          <p:cNvPr id="2" name="Title 1"/>
+          <p:cNvSpPr>
+            <a:spLocks noGrp="1"/>
+          </p:cNvSpPr>
+          <p:nvPr>
+            <p:ph type="title"/>
+          </p:nvPr>
+        </p:nvSpPr>
+        <p:spPr>
+          <a:xfrm>
+            <a:off x="457200" y="23016"/>
+            <a:ext cx="8229600" cy="839663"/>
+          </a:xfrm>
+        </p:spPr>
+        <p:txBody>
+          <a:bodyPr>
+            <a:normAutofit/>
+          </a:bodyPr>
+          <a:lstStyle/>
+          <a:p>
+            <a:r>
+              <a:rPr lang="en-GB" dirty="0"/>
+              <a:t>Exercise results</a:t>
+            </a:r>
+          </a:p>
+        </p:txBody>
+      </p:sp>
+      <p:sp>
+        <p:nvSpPr>
+          <p:cNvPr id="3" name="Content Placeholder 2"/>
+          <p:cNvSpPr>
+            <a:spLocks noGrp="1"/>
+          </p:cNvSpPr>
+          <p:nvPr>
+            <p:ph idx="1"/>
+          </p:nvPr>
+        </p:nvSpPr>
+        <p:spPr>
+          <a:xfrm>
+            <a:off x="457200" y="1042404"/>
+            <a:ext cx="8229600" cy="5607415"/>
+          </a:xfrm>
+        </p:spPr>
+        <p:txBody>
+          <a:bodyPr>
+            <a:normAutofit/>
+          </a:bodyPr>
+          <a:lstStyle/>
+          <a:p>
+            <a:pPr marL="0" indent="0">
+              <a:buNone/>
+            </a:pPr>
+            <a:r>
+              <a:rPr lang="en-GB" sz="2000" dirty="0">
+                <a:latin typeface="Courier New"/>
+                <a:cs typeface="Courier New"/>
+              </a:rPr>
+              <a:t>Using OpenCL device: Tesla P100-PCIE-16GB</a:t>
+            </a:r>
+            <a:endParaRPr lang="de-DE" sz="2000" dirty="0">
+              <a:latin typeface="Courier New"/>
+              <a:cs typeface="Courier New"/>
+            </a:endParaRPr>
+          </a:p>
+          <a:p>
+            <a:pPr marL="0" indent="0">
+              <a:buNone/>
+            </a:pPr>
+            <a:endParaRPr lang="de-DE" sz="2000" dirty="0">
+              <a:latin typeface="Courier New"/>
+              <a:cs typeface="Courier New"/>
+            </a:endParaRPr>
+          </a:p>
+          <a:p>
+            <a:pPr marL="0" indent="0">
+              <a:buNone/>
+            </a:pPr>
+            <a:r>
+              <a:rPr lang="en-GB" sz="2000" dirty="0">
+                <a:latin typeface="Courier New"/>
+                <a:cs typeface="Courier New"/>
+              </a:rPr>
+              <a:t>Type          Total   Transfer       Bandwidth</a:t>
+            </a:r>
+          </a:p>
+          <a:p>
+            <a:pPr marL="0" indent="0">
+              <a:buNone/>
+            </a:pPr>
+            <a:r>
+              <a:rPr lang="en-GB" sz="2000" dirty="0">
+                <a:latin typeface="Courier New"/>
+                <a:cs typeface="Courier New"/>
+              </a:rPr>
+              <a:t>----------------------------------------------</a:t>
+            </a:r>
+          </a:p>
+          <a:p>
+            <a:pPr marL="0" indent="0">
+              <a:buNone/>
+            </a:pPr>
+            <a:r>
+              <a:rPr lang="en-GB" sz="2000" dirty="0">
+                <a:latin typeface="Courier New"/>
+                <a:cs typeface="Courier New"/>
+              </a:rPr>
+              <a:t>Baseline      2.69s      0.87s       9.85 GB/s</a:t>
+            </a:r>
+          </a:p>
+          <a:p>
+            <a:pPr marL="0" indent="0">
+              <a:buNone/>
+            </a:pPr>
+            <a:r>
+              <a:rPr lang="en-GB" sz="2000" dirty="0">
+                <a:latin typeface="Courier New"/>
+                <a:cs typeface="Courier New"/>
+              </a:rPr>
+              <a:t>Pinned        2.48s      0.65s      13.19 GB/s</a:t>
+            </a:r>
+          </a:p>
+          <a:p>
+            <a:pPr marL="0" indent="0">
+              <a:buNone/>
+            </a:pPr>
+            <a:r>
+              <a:rPr lang="en-GB" sz="2000" dirty="0">
+                <a:latin typeface="Courier New"/>
+                <a:cs typeface="Courier New"/>
+              </a:rPr>
+              <a:t>Zero-Copy     2.64s      0.78s      11.07 GB/s</a:t>
+            </a:r>
+          </a:p>
+          <a:p>
+            <a:pPr marL="0" indent="0">
+              <a:buNone/>
+            </a:pPr>
+            <a:r>
+              <a:rPr lang="en-GB" sz="2000" dirty="0">
+                <a:latin typeface="Courier New"/>
+                <a:cs typeface="Courier New"/>
+              </a:rPr>
+              <a:t> </a:t>
+            </a:r>
+          </a:p>
+          <a:p>
+            <a:pPr marL="0" indent="0">
+              <a:buNone/>
+            </a:pPr>
+            <a:r>
+              <a:rPr lang="en-GB" sz="2000" dirty="0">
+                <a:latin typeface="Courier New"/>
+                <a:cs typeface="Courier New"/>
+              </a:rPr>
+              <a:t>(NVIDIA recommend the zero-copy approach)</a:t>
+            </a:r>
+            <a:endParaRPr lang="de-DE" sz="2000" dirty="0">
+              <a:latin typeface="Courier New"/>
+              <a:cs typeface="Courier New"/>
+            </a:endParaRPr>
+          </a:p>
+          <a:p>
+            <a:pPr marL="0" indent="0">
+              <a:buNone/>
+            </a:pPr>
+            <a:endParaRPr lang="de-DE" sz="2000" dirty="0"/>
+          </a:p>
+          <a:p>
+            <a:pPr marL="0" indent="0">
+              <a:buNone/>
+            </a:pPr>
+            <a:endParaRPr lang="en-GB" sz="2000" dirty="0"/>
+          </a:p>
+        </p:txBody>
+      </p:sp>
+    </p:spTree>
+    <p:extLst>
+      <p:ext uri="{BB962C8B-B14F-4D97-AF65-F5344CB8AC3E}">
+        <p14:creationId xmlns:p14="http://schemas.microsoft.com/office/powerpoint/2010/main" val="2623907617"/>
       </p:ext>
     </p:extLst>
   </p:cSld>

</xml_diff>